<commit_message>
added new class GameNodeWithGameDeathNode, separate from GameNodeWithMoMo
</commit_message>
<xml_diff>
--- a/gameFlowChart new.pptx
+++ b/gameFlowChart new.pptx
@@ -2545,9 +2545,10 @@
             <a:t>momo</a:t>
           </a:r>
           <a:r>
-            <a:rPr lang="en-US" dirty="0"/>
-            <a:t> gen twice. </a:t>
-          </a:r>
+            <a:rPr lang="en-US"/>
+            <a:t> gen</a:t>
+          </a:r>
+          <a:endParaRPr lang="en-US" dirty="0"/>
         </a:p>
       </dgm:t>
     </dgm:pt>
@@ -11146,9 +11147,10 @@
             <a:t>momo</a:t>
           </a:r>
           <a:r>
-            <a:rPr lang="en-US" sz="500" kern="1200" dirty="0"/>
-            <a:t> gen twice. </a:t>
-          </a:r>
+            <a:rPr lang="en-US" sz="500" kern="1200"/>
+            <a:t> gen</a:t>
+          </a:r>
+          <a:endParaRPr lang="en-US" sz="500" kern="1200" dirty="0"/>
         </a:p>
       </dsp:txBody>
       <dsp:txXfrm>
@@ -22717,7 +22719,7 @@
           <p:nvPr>
             <p:extLst>
               <p:ext uri="{D42A27DB-BD31-4B8C-83A1-F6EECF244321}">
-                <p14:modId xmlns:p14="http://schemas.microsoft.com/office/powerpoint/2010/main" val="1240544445"/>
+                <p14:modId xmlns:p14="http://schemas.microsoft.com/office/powerpoint/2010/main" val="3871623238"/>
               </p:ext>
             </p:extLst>
           </p:nvPr>

</xml_diff>

<commit_message>
solidifying plot and storyline
</commit_message>
<xml_diff>
--- a/gameFlowChart new.pptx
+++ b/gameFlowChart new.pptx
@@ -3560,6 +3560,32 @@
         </a:p>
       </dgm:t>
     </dgm:pt>
+    <dgm:pt modelId="{F46CFE8E-B9D8-1F43-BAE5-C0EBA300E1AE}">
+      <dgm:prSet/>
+      <dgm:spPr/>
+      <dgm:t>
+        <a:bodyPr/>
+        <a:lstStyle/>
+        <a:p>
+          <a:endParaRPr lang="en-US"/>
+        </a:p>
+      </dgm:t>
+    </dgm:pt>
+    <dgm:pt modelId="{7BEBD233-7B02-8147-AE4D-E4DD0C76C806}" type="parTrans" cxnId="{B3449EC8-CA91-1A40-9445-7674FB4EE2D0}">
+      <dgm:prSet/>
+      <dgm:spPr/>
+      <dgm:t>
+        <a:bodyPr/>
+        <a:lstStyle/>
+        <a:p>
+          <a:endParaRPr lang="en-US"/>
+        </a:p>
+      </dgm:t>
+    </dgm:pt>
+    <dgm:pt modelId="{FD1FE467-2EB7-0E46-B213-D9C951832CA3}" type="sibTrans" cxnId="{B3449EC8-CA91-1A40-9445-7674FB4EE2D0}">
+      <dgm:prSet/>
+      <dgm:spPr/>
+    </dgm:pt>
     <dgm:pt modelId="{AAEAF223-4AC7-9243-834C-30AD905AC5ED}" type="pres">
       <dgm:prSet presAssocID="{DC3FA29B-C79A-184D-93E5-2555F2F344A6}" presName="diagram" presStyleCnt="0">
         <dgm:presLayoutVars>
@@ -3637,11 +3663,11 @@
       <dgm:spPr/>
     </dgm:pt>
     <dgm:pt modelId="{0FE0DC5E-02A4-B44D-8A14-6E47565AF5D5}" type="pres">
-      <dgm:prSet presAssocID="{CB106D45-EF6B-A24A-B9D6-C5EBA4B563E2}" presName="conn2-1" presStyleLbl="parChTrans1D4" presStyleIdx="0" presStyleCnt="53"/>
+      <dgm:prSet presAssocID="{CB106D45-EF6B-A24A-B9D6-C5EBA4B563E2}" presName="conn2-1" presStyleLbl="parChTrans1D4" presStyleIdx="0" presStyleCnt="54"/>
       <dgm:spPr/>
     </dgm:pt>
     <dgm:pt modelId="{E08C38C7-38ED-BA4D-84A9-FF9D24B54B0A}" type="pres">
-      <dgm:prSet presAssocID="{CB106D45-EF6B-A24A-B9D6-C5EBA4B563E2}" presName="connTx" presStyleLbl="parChTrans1D4" presStyleIdx="0" presStyleCnt="53"/>
+      <dgm:prSet presAssocID="{CB106D45-EF6B-A24A-B9D6-C5EBA4B563E2}" presName="connTx" presStyleLbl="parChTrans1D4" presStyleIdx="0" presStyleCnt="54"/>
       <dgm:spPr/>
     </dgm:pt>
     <dgm:pt modelId="{85005ED8-A8CC-4249-AD76-FA014AECE599}" type="pres">
@@ -3649,7 +3675,7 @@
       <dgm:spPr/>
     </dgm:pt>
     <dgm:pt modelId="{1EA76DE5-1C8F-FA4D-A04F-5E95F39407AD}" type="pres">
-      <dgm:prSet presAssocID="{12EF4AD2-B0C0-334C-9700-49F85A200C9B}" presName="LevelTwoTextNode" presStyleLbl="node4" presStyleIdx="0" presStyleCnt="53" custScaleX="229087" custScaleY="221683">
+      <dgm:prSet presAssocID="{12EF4AD2-B0C0-334C-9700-49F85A200C9B}" presName="LevelTwoTextNode" presStyleLbl="node4" presStyleIdx="0" presStyleCnt="54" custScaleX="229087" custScaleY="221683">
         <dgm:presLayoutVars>
           <dgm:chPref val="3"/>
         </dgm:presLayoutVars>
@@ -3661,11 +3687,11 @@
       <dgm:spPr/>
     </dgm:pt>
     <dgm:pt modelId="{37DEF7A6-F983-8642-9B6E-B3CCE7EA354A}" type="pres">
-      <dgm:prSet presAssocID="{E38F7A21-DD2B-5241-87A5-82A96C564D58}" presName="conn2-1" presStyleLbl="parChTrans1D4" presStyleIdx="1" presStyleCnt="53"/>
+      <dgm:prSet presAssocID="{E38F7A21-DD2B-5241-87A5-82A96C564D58}" presName="conn2-1" presStyleLbl="parChTrans1D4" presStyleIdx="1" presStyleCnt="54"/>
       <dgm:spPr/>
     </dgm:pt>
     <dgm:pt modelId="{D0A01E75-22DA-5643-BFF4-8A726FDEB812}" type="pres">
-      <dgm:prSet presAssocID="{E38F7A21-DD2B-5241-87A5-82A96C564D58}" presName="connTx" presStyleLbl="parChTrans1D4" presStyleIdx="1" presStyleCnt="53"/>
+      <dgm:prSet presAssocID="{E38F7A21-DD2B-5241-87A5-82A96C564D58}" presName="connTx" presStyleLbl="parChTrans1D4" presStyleIdx="1" presStyleCnt="54"/>
       <dgm:spPr/>
     </dgm:pt>
     <dgm:pt modelId="{CEF76F03-3D55-3F4A-B724-94E14018B095}" type="pres">
@@ -3673,7 +3699,7 @@
       <dgm:spPr/>
     </dgm:pt>
     <dgm:pt modelId="{AA6D8249-2433-114B-AD68-5DAD34076478}" type="pres">
-      <dgm:prSet presAssocID="{0CC64CDE-03F3-5145-9992-9CBD8640F750}" presName="LevelTwoTextNode" presStyleLbl="node4" presStyleIdx="1" presStyleCnt="53" custScaleX="260748" custScaleY="357003" custLinFactY="12795" custLinFactNeighborX="-12766" custLinFactNeighborY="100000">
+      <dgm:prSet presAssocID="{0CC64CDE-03F3-5145-9992-9CBD8640F750}" presName="LevelTwoTextNode" presStyleLbl="node4" presStyleIdx="1" presStyleCnt="54" custScaleX="260748" custScaleY="357003" custLinFactY="12795" custLinFactNeighborX="-12766" custLinFactNeighborY="100000">
         <dgm:presLayoutVars>
           <dgm:chPref val="3"/>
         </dgm:presLayoutVars>
@@ -3685,11 +3711,11 @@
       <dgm:spPr/>
     </dgm:pt>
     <dgm:pt modelId="{F2F73D55-5C37-CD44-BC1E-CDBC3CD0F101}" type="pres">
-      <dgm:prSet presAssocID="{DEC33D82-86DE-144B-A01C-CB3C301AB057}" presName="conn2-1" presStyleLbl="parChTrans1D4" presStyleIdx="2" presStyleCnt="53"/>
+      <dgm:prSet presAssocID="{DEC33D82-86DE-144B-A01C-CB3C301AB057}" presName="conn2-1" presStyleLbl="parChTrans1D4" presStyleIdx="2" presStyleCnt="54"/>
       <dgm:spPr/>
     </dgm:pt>
     <dgm:pt modelId="{8CD01425-6999-1B43-A074-9B4B66D474FE}" type="pres">
-      <dgm:prSet presAssocID="{DEC33D82-86DE-144B-A01C-CB3C301AB057}" presName="connTx" presStyleLbl="parChTrans1D4" presStyleIdx="2" presStyleCnt="53"/>
+      <dgm:prSet presAssocID="{DEC33D82-86DE-144B-A01C-CB3C301AB057}" presName="connTx" presStyleLbl="parChTrans1D4" presStyleIdx="2" presStyleCnt="54"/>
       <dgm:spPr/>
     </dgm:pt>
     <dgm:pt modelId="{0E05F525-FD97-BE49-BACE-281076CC37A6}" type="pres">
@@ -3697,7 +3723,7 @@
       <dgm:spPr/>
     </dgm:pt>
     <dgm:pt modelId="{1FCD5530-9E05-B046-B8ED-0484835169DE}" type="pres">
-      <dgm:prSet presAssocID="{E4C021FE-8A7E-294E-B917-3CCED5372D53}" presName="LevelTwoTextNode" presStyleLbl="node4" presStyleIdx="2" presStyleCnt="53" custScaleX="335086" custScaleY="274945" custLinFactY="-34306" custLinFactNeighborX="47498" custLinFactNeighborY="-100000">
+      <dgm:prSet presAssocID="{E4C021FE-8A7E-294E-B917-3CCED5372D53}" presName="LevelTwoTextNode" presStyleLbl="node4" presStyleIdx="2" presStyleCnt="54" custScaleX="335086" custScaleY="274945" custLinFactY="-34306" custLinFactNeighborX="47498" custLinFactNeighborY="-100000">
         <dgm:presLayoutVars>
           <dgm:chPref val="3"/>
         </dgm:presLayoutVars>
@@ -3709,11 +3735,11 @@
       <dgm:spPr/>
     </dgm:pt>
     <dgm:pt modelId="{0904125F-8547-564B-8B1D-703FF6EDB6C9}" type="pres">
-      <dgm:prSet presAssocID="{CDC15278-99AA-3E4F-831E-5A7AD3E5E1FE}" presName="conn2-1" presStyleLbl="parChTrans1D4" presStyleIdx="3" presStyleCnt="53"/>
+      <dgm:prSet presAssocID="{CDC15278-99AA-3E4F-831E-5A7AD3E5E1FE}" presName="conn2-1" presStyleLbl="parChTrans1D4" presStyleIdx="3" presStyleCnt="54"/>
       <dgm:spPr/>
     </dgm:pt>
     <dgm:pt modelId="{B5BF25CD-8BF1-5048-868C-30217B5C9A24}" type="pres">
-      <dgm:prSet presAssocID="{CDC15278-99AA-3E4F-831E-5A7AD3E5E1FE}" presName="connTx" presStyleLbl="parChTrans1D4" presStyleIdx="3" presStyleCnt="53"/>
+      <dgm:prSet presAssocID="{CDC15278-99AA-3E4F-831E-5A7AD3E5E1FE}" presName="connTx" presStyleLbl="parChTrans1D4" presStyleIdx="3" presStyleCnt="54"/>
       <dgm:spPr/>
     </dgm:pt>
     <dgm:pt modelId="{1D95E1D6-FA45-614A-B171-8C9054062FA3}" type="pres">
@@ -3721,7 +3747,7 @@
       <dgm:spPr/>
     </dgm:pt>
     <dgm:pt modelId="{69460287-3B04-F142-8B8F-38364A84B16E}" type="pres">
-      <dgm:prSet presAssocID="{BF9C033C-4AFB-A34B-AE36-E0F43283D02E}" presName="LevelTwoTextNode" presStyleLbl="node4" presStyleIdx="3" presStyleCnt="53" custLinFactX="35157" custLinFactY="40069" custLinFactNeighborX="100000" custLinFactNeighborY="100000">
+      <dgm:prSet presAssocID="{BF9C033C-4AFB-A34B-AE36-E0F43283D02E}" presName="LevelTwoTextNode" presStyleLbl="node4" presStyleIdx="3" presStyleCnt="54" custLinFactX="35157" custLinFactY="40069" custLinFactNeighborX="100000" custLinFactNeighborY="100000">
         <dgm:presLayoutVars>
           <dgm:chPref val="3"/>
         </dgm:presLayoutVars>
@@ -3733,11 +3759,11 @@
       <dgm:spPr/>
     </dgm:pt>
     <dgm:pt modelId="{E1CC1DA7-E052-D145-8E3D-02E51BEAF7D1}" type="pres">
-      <dgm:prSet presAssocID="{1100FF0A-B281-C24B-933C-4A94BA74F661}" presName="conn2-1" presStyleLbl="parChTrans1D4" presStyleIdx="4" presStyleCnt="53"/>
+      <dgm:prSet presAssocID="{1100FF0A-B281-C24B-933C-4A94BA74F661}" presName="conn2-1" presStyleLbl="parChTrans1D4" presStyleIdx="4" presStyleCnt="54"/>
       <dgm:spPr/>
     </dgm:pt>
     <dgm:pt modelId="{AD0CB518-2F16-A749-9C97-747B3498BAD9}" type="pres">
-      <dgm:prSet presAssocID="{1100FF0A-B281-C24B-933C-4A94BA74F661}" presName="connTx" presStyleLbl="parChTrans1D4" presStyleIdx="4" presStyleCnt="53"/>
+      <dgm:prSet presAssocID="{1100FF0A-B281-C24B-933C-4A94BA74F661}" presName="connTx" presStyleLbl="parChTrans1D4" presStyleIdx="4" presStyleCnt="54"/>
       <dgm:spPr/>
     </dgm:pt>
     <dgm:pt modelId="{16328237-3EE4-7943-A3AC-0CF6AEB3A54C}" type="pres">
@@ -3745,7 +3771,7 @@
       <dgm:spPr/>
     </dgm:pt>
     <dgm:pt modelId="{39E3DC0E-53C8-5144-B0B1-07F4E7334A85}" type="pres">
-      <dgm:prSet presAssocID="{89AA8F52-95A6-0A42-B8DB-917B4D349CF6}" presName="LevelTwoTextNode" presStyleLbl="node4" presStyleIdx="4" presStyleCnt="53" custLinFactX="55450" custLinFactNeighborX="100000" custLinFactNeighborY="20499">
+      <dgm:prSet presAssocID="{89AA8F52-95A6-0A42-B8DB-917B4D349CF6}" presName="LevelTwoTextNode" presStyleLbl="node4" presStyleIdx="4" presStyleCnt="54" custLinFactX="55450" custLinFactNeighborX="100000" custLinFactNeighborY="20499">
         <dgm:presLayoutVars>
           <dgm:chPref val="3"/>
         </dgm:presLayoutVars>
@@ -3757,11 +3783,11 @@
       <dgm:spPr/>
     </dgm:pt>
     <dgm:pt modelId="{2B20767A-1A33-C248-85FD-1D93D89083D2}" type="pres">
-      <dgm:prSet presAssocID="{B743AEA8-216B-2E46-9601-0AD3641A5E9E}" presName="conn2-1" presStyleLbl="parChTrans1D4" presStyleIdx="5" presStyleCnt="53"/>
+      <dgm:prSet presAssocID="{B743AEA8-216B-2E46-9601-0AD3641A5E9E}" presName="conn2-1" presStyleLbl="parChTrans1D4" presStyleIdx="5" presStyleCnt="54"/>
       <dgm:spPr/>
     </dgm:pt>
     <dgm:pt modelId="{4488718A-C95B-7B4D-8FA2-82EDC2308CB4}" type="pres">
-      <dgm:prSet presAssocID="{B743AEA8-216B-2E46-9601-0AD3641A5E9E}" presName="connTx" presStyleLbl="parChTrans1D4" presStyleIdx="5" presStyleCnt="53"/>
+      <dgm:prSet presAssocID="{B743AEA8-216B-2E46-9601-0AD3641A5E9E}" presName="connTx" presStyleLbl="parChTrans1D4" presStyleIdx="5" presStyleCnt="54"/>
       <dgm:spPr/>
     </dgm:pt>
     <dgm:pt modelId="{2B3D292C-6E64-6043-8EC9-1C6C07D745B0}" type="pres">
@@ -3769,7 +3795,7 @@
       <dgm:spPr/>
     </dgm:pt>
     <dgm:pt modelId="{2915A037-971F-304E-9764-FAB284167672}" type="pres">
-      <dgm:prSet presAssocID="{E5C55A35-ED3B-F147-A326-B9256B7FAB23}" presName="LevelTwoTextNode" presStyleLbl="node4" presStyleIdx="5" presStyleCnt="53" custLinFactX="52034" custLinFactNeighborX="100000" custLinFactNeighborY="27332">
+      <dgm:prSet presAssocID="{E5C55A35-ED3B-F147-A326-B9256B7FAB23}" presName="LevelTwoTextNode" presStyleLbl="node4" presStyleIdx="5" presStyleCnt="54" custLinFactX="52034" custLinFactNeighborX="100000" custLinFactNeighborY="27332">
         <dgm:presLayoutVars>
           <dgm:chPref val="3"/>
         </dgm:presLayoutVars>
@@ -3780,180 +3806,204 @@
       <dgm:prSet presAssocID="{E5C55A35-ED3B-F147-A326-B9256B7FAB23}" presName="level3hierChild" presStyleCnt="0"/>
       <dgm:spPr/>
     </dgm:pt>
-    <dgm:pt modelId="{28940162-CD59-DD4E-88C0-70FA243B6697}" type="pres">
-      <dgm:prSet presAssocID="{6575138D-D60D-6742-BB52-DC29084B29E3}" presName="conn2-1" presStyleLbl="parChTrans1D4" presStyleIdx="6" presStyleCnt="53"/>
-      <dgm:spPr/>
-    </dgm:pt>
-    <dgm:pt modelId="{340D38DE-40A2-C548-959C-EA21A68DC045}" type="pres">
-      <dgm:prSet presAssocID="{6575138D-D60D-6742-BB52-DC29084B29E3}" presName="connTx" presStyleLbl="parChTrans1D4" presStyleIdx="6" presStyleCnt="53"/>
-      <dgm:spPr/>
-    </dgm:pt>
-    <dgm:pt modelId="{67FF1E95-D42C-0845-B131-6C6E5FC865AB}" type="pres">
-      <dgm:prSet presAssocID="{658FBE69-F69F-494C-A4A4-B9E0D73E2DCF}" presName="root2" presStyleCnt="0"/>
-      <dgm:spPr/>
-    </dgm:pt>
-    <dgm:pt modelId="{CC7634C0-ED13-644B-9ED7-D06A037B0A09}" type="pres">
-      <dgm:prSet presAssocID="{658FBE69-F69F-494C-A4A4-B9E0D73E2DCF}" presName="LevelTwoTextNode" presStyleLbl="node4" presStyleIdx="6" presStyleCnt="53" custScaleX="199182" custScaleY="381775" custLinFactX="100000" custLinFactNeighborX="195595" custLinFactNeighborY="42401">
+    <dgm:pt modelId="{BA1CDD9D-9A6E-0C4E-A9A3-029341159AEA}" type="pres">
+      <dgm:prSet presAssocID="{7BEBD233-7B02-8147-AE4D-E4DD0C76C806}" presName="conn2-1" presStyleLbl="parChTrans1D4" presStyleIdx="6" presStyleCnt="54"/>
+      <dgm:spPr/>
+    </dgm:pt>
+    <dgm:pt modelId="{078132C5-A031-0748-9C75-15F7D2568E9E}" type="pres">
+      <dgm:prSet presAssocID="{7BEBD233-7B02-8147-AE4D-E4DD0C76C806}" presName="connTx" presStyleLbl="parChTrans1D4" presStyleIdx="6" presStyleCnt="54"/>
+      <dgm:spPr/>
+    </dgm:pt>
+    <dgm:pt modelId="{02397F2C-1A5D-AF43-82E6-F4645AE83246}" type="pres">
+      <dgm:prSet presAssocID="{F46CFE8E-B9D8-1F43-BAE5-C0EBA300E1AE}" presName="root2" presStyleCnt="0"/>
+      <dgm:spPr/>
+    </dgm:pt>
+    <dgm:pt modelId="{01AE4A20-5465-E046-9D6A-4C2689ECEBB2}" type="pres">
+      <dgm:prSet presAssocID="{F46CFE8E-B9D8-1F43-BAE5-C0EBA300E1AE}" presName="LevelTwoTextNode" presStyleLbl="node4" presStyleIdx="6" presStyleCnt="54" custLinFactY="-6981" custLinFactNeighborX="58166" custLinFactNeighborY="-100000">
         <dgm:presLayoutVars>
           <dgm:chPref val="3"/>
         </dgm:presLayoutVars>
       </dgm:prSet>
       <dgm:spPr/>
     </dgm:pt>
-    <dgm:pt modelId="{FEC1F169-0803-C748-91BB-5F63A1DA3A53}" type="pres">
-      <dgm:prSet presAssocID="{658FBE69-F69F-494C-A4A4-B9E0D73E2DCF}" presName="level3hierChild" presStyleCnt="0"/>
-      <dgm:spPr/>
-    </dgm:pt>
-    <dgm:pt modelId="{30C20B8D-B9DE-FC4A-A8FC-F855AACFD13C}" type="pres">
-      <dgm:prSet presAssocID="{CCEAFC7A-D65A-504C-A795-E458869A94AA}" presName="conn2-1" presStyleLbl="parChTrans1D4" presStyleIdx="7" presStyleCnt="53"/>
-      <dgm:spPr/>
-    </dgm:pt>
-    <dgm:pt modelId="{514A0DE5-E2F7-1642-9C22-82D2271D99DD}" type="pres">
-      <dgm:prSet presAssocID="{CCEAFC7A-D65A-504C-A795-E458869A94AA}" presName="connTx" presStyleLbl="parChTrans1D4" presStyleIdx="7" presStyleCnt="53"/>
-      <dgm:spPr/>
-    </dgm:pt>
-    <dgm:pt modelId="{2E659DA2-3323-B74D-8AD2-29FFAF43757D}" type="pres">
-      <dgm:prSet presAssocID="{070ABDEE-2B94-3A4C-B123-8BFB22D3792E}" presName="root2" presStyleCnt="0"/>
-      <dgm:spPr/>
-    </dgm:pt>
-    <dgm:pt modelId="{6C8DB8F2-3E6F-E842-B341-B9444FABBF52}" type="pres">
-      <dgm:prSet presAssocID="{070ABDEE-2B94-3A4C-B123-8BFB22D3792E}" presName="LevelTwoTextNode" presStyleLbl="node4" presStyleIdx="7" presStyleCnt="53" custScaleX="217378" custScaleY="316517" custLinFactX="100000" custLinFactNeighborX="189611" custLinFactNeighborY="-62887">
+    <dgm:pt modelId="{7745136C-2619-9042-AE17-7EFDD8230B96}" type="pres">
+      <dgm:prSet presAssocID="{F46CFE8E-B9D8-1F43-BAE5-C0EBA300E1AE}" presName="level3hierChild" presStyleCnt="0"/>
+      <dgm:spPr/>
+    </dgm:pt>
+    <dgm:pt modelId="{28940162-CD59-DD4E-88C0-70FA243B6697}" type="pres">
+      <dgm:prSet presAssocID="{6575138D-D60D-6742-BB52-DC29084B29E3}" presName="conn2-1" presStyleLbl="parChTrans1D4" presStyleIdx="7" presStyleCnt="54"/>
+      <dgm:spPr/>
+    </dgm:pt>
+    <dgm:pt modelId="{340D38DE-40A2-C548-959C-EA21A68DC045}" type="pres">
+      <dgm:prSet presAssocID="{6575138D-D60D-6742-BB52-DC29084B29E3}" presName="connTx" presStyleLbl="parChTrans1D4" presStyleIdx="7" presStyleCnt="54"/>
+      <dgm:spPr/>
+    </dgm:pt>
+    <dgm:pt modelId="{67FF1E95-D42C-0845-B131-6C6E5FC865AB}" type="pres">
+      <dgm:prSet presAssocID="{658FBE69-F69F-494C-A4A4-B9E0D73E2DCF}" presName="root2" presStyleCnt="0"/>
+      <dgm:spPr/>
+    </dgm:pt>
+    <dgm:pt modelId="{CC7634C0-ED13-644B-9ED7-D06A037B0A09}" type="pres">
+      <dgm:prSet presAssocID="{658FBE69-F69F-494C-A4A4-B9E0D73E2DCF}" presName="LevelTwoTextNode" presStyleLbl="node4" presStyleIdx="7" presStyleCnt="54" custScaleX="199182" custScaleY="381775" custLinFactX="100000" custLinFactNeighborX="195595" custLinFactNeighborY="42401">
         <dgm:presLayoutVars>
           <dgm:chPref val="3"/>
         </dgm:presLayoutVars>
       </dgm:prSet>
       <dgm:spPr/>
     </dgm:pt>
-    <dgm:pt modelId="{7DF82C3F-976D-8941-AAC0-E0B3BBE56D03}" type="pres">
-      <dgm:prSet presAssocID="{070ABDEE-2B94-3A4C-B123-8BFB22D3792E}" presName="level3hierChild" presStyleCnt="0"/>
-      <dgm:spPr/>
-    </dgm:pt>
-    <dgm:pt modelId="{E4AA040D-31C5-5D46-845E-005448A40686}" type="pres">
-      <dgm:prSet presAssocID="{187244EF-C31E-6344-8FCF-96AF4AF3BC2A}" presName="conn2-1" presStyleLbl="parChTrans1D4" presStyleIdx="8" presStyleCnt="53"/>
-      <dgm:spPr/>
-    </dgm:pt>
-    <dgm:pt modelId="{1B19DBDE-7BB1-664E-A05B-426990BEADD2}" type="pres">
-      <dgm:prSet presAssocID="{187244EF-C31E-6344-8FCF-96AF4AF3BC2A}" presName="connTx" presStyleLbl="parChTrans1D4" presStyleIdx="8" presStyleCnt="53"/>
-      <dgm:spPr/>
-    </dgm:pt>
-    <dgm:pt modelId="{67649436-0A96-A24A-A701-56CB57441ADF}" type="pres">
-      <dgm:prSet presAssocID="{335EBAED-2E86-8340-B7AC-8CACBDECEB6C}" presName="root2" presStyleCnt="0"/>
-      <dgm:spPr/>
-    </dgm:pt>
-    <dgm:pt modelId="{FE860302-7B4F-8444-86E7-3E89E24F2AE0}" type="pres">
-      <dgm:prSet presAssocID="{335EBAED-2E86-8340-B7AC-8CACBDECEB6C}" presName="LevelTwoTextNode" presStyleLbl="node4" presStyleIdx="8" presStyleCnt="53" custScaleY="344397" custLinFactX="172021" custLinFactNeighborX="200000" custLinFactNeighborY="11895">
+    <dgm:pt modelId="{FEC1F169-0803-C748-91BB-5F63A1DA3A53}" type="pres">
+      <dgm:prSet presAssocID="{658FBE69-F69F-494C-A4A4-B9E0D73E2DCF}" presName="level3hierChild" presStyleCnt="0"/>
+      <dgm:spPr/>
+    </dgm:pt>
+    <dgm:pt modelId="{30C20B8D-B9DE-FC4A-A8FC-F855AACFD13C}" type="pres">
+      <dgm:prSet presAssocID="{CCEAFC7A-D65A-504C-A795-E458869A94AA}" presName="conn2-1" presStyleLbl="parChTrans1D4" presStyleIdx="8" presStyleCnt="54"/>
+      <dgm:spPr/>
+    </dgm:pt>
+    <dgm:pt modelId="{514A0DE5-E2F7-1642-9C22-82D2271D99DD}" type="pres">
+      <dgm:prSet presAssocID="{CCEAFC7A-D65A-504C-A795-E458869A94AA}" presName="connTx" presStyleLbl="parChTrans1D4" presStyleIdx="8" presStyleCnt="54"/>
+      <dgm:spPr/>
+    </dgm:pt>
+    <dgm:pt modelId="{2E659DA2-3323-B74D-8AD2-29FFAF43757D}" type="pres">
+      <dgm:prSet presAssocID="{070ABDEE-2B94-3A4C-B123-8BFB22D3792E}" presName="root2" presStyleCnt="0"/>
+      <dgm:spPr/>
+    </dgm:pt>
+    <dgm:pt modelId="{6C8DB8F2-3E6F-E842-B341-B9444FABBF52}" type="pres">
+      <dgm:prSet presAssocID="{070ABDEE-2B94-3A4C-B123-8BFB22D3792E}" presName="LevelTwoTextNode" presStyleLbl="node4" presStyleIdx="8" presStyleCnt="54" custScaleX="217378" custScaleY="316517" custLinFactX="100000" custLinFactNeighborX="189611" custLinFactNeighborY="-62887">
         <dgm:presLayoutVars>
           <dgm:chPref val="3"/>
         </dgm:presLayoutVars>
       </dgm:prSet>
       <dgm:spPr/>
     </dgm:pt>
-    <dgm:pt modelId="{057AE7D0-DCA5-E645-9EBC-E9E5461A3DD4}" type="pres">
-      <dgm:prSet presAssocID="{335EBAED-2E86-8340-B7AC-8CACBDECEB6C}" presName="level3hierChild" presStyleCnt="0"/>
-      <dgm:spPr/>
-    </dgm:pt>
-    <dgm:pt modelId="{AE66067E-8C8F-C146-AE9F-FD6D23D7EA7D}" type="pres">
-      <dgm:prSet presAssocID="{D06F829E-D606-FF46-A42D-A54189EDC959}" presName="conn2-1" presStyleLbl="parChTrans1D4" presStyleIdx="9" presStyleCnt="53"/>
-      <dgm:spPr/>
-    </dgm:pt>
-    <dgm:pt modelId="{FBF4C144-F351-7546-9706-1D522BDDE758}" type="pres">
-      <dgm:prSet presAssocID="{D06F829E-D606-FF46-A42D-A54189EDC959}" presName="connTx" presStyleLbl="parChTrans1D4" presStyleIdx="9" presStyleCnt="53"/>
-      <dgm:spPr/>
-    </dgm:pt>
-    <dgm:pt modelId="{C2CB1567-B53F-2C4E-9848-D0D9F318BA21}" type="pres">
-      <dgm:prSet presAssocID="{ECC38862-6814-954F-80AE-DBF7C83AD452}" presName="root2" presStyleCnt="0"/>
-      <dgm:spPr/>
-    </dgm:pt>
-    <dgm:pt modelId="{3FE5FC00-5B11-B04A-8DA8-F4959DA3D91E}" type="pres">
-      <dgm:prSet presAssocID="{ECC38862-6814-954F-80AE-DBF7C83AD452}" presName="LevelTwoTextNode" presStyleLbl="node4" presStyleIdx="9" presStyleCnt="53" custLinFactX="183941" custLinFactNeighborX="200000" custLinFactNeighborY="36408">
+    <dgm:pt modelId="{7DF82C3F-976D-8941-AAC0-E0B3BBE56D03}" type="pres">
+      <dgm:prSet presAssocID="{070ABDEE-2B94-3A4C-B123-8BFB22D3792E}" presName="level3hierChild" presStyleCnt="0"/>
+      <dgm:spPr/>
+    </dgm:pt>
+    <dgm:pt modelId="{E4AA040D-31C5-5D46-845E-005448A40686}" type="pres">
+      <dgm:prSet presAssocID="{187244EF-C31E-6344-8FCF-96AF4AF3BC2A}" presName="conn2-1" presStyleLbl="parChTrans1D4" presStyleIdx="9" presStyleCnt="54"/>
+      <dgm:spPr/>
+    </dgm:pt>
+    <dgm:pt modelId="{1B19DBDE-7BB1-664E-A05B-426990BEADD2}" type="pres">
+      <dgm:prSet presAssocID="{187244EF-C31E-6344-8FCF-96AF4AF3BC2A}" presName="connTx" presStyleLbl="parChTrans1D4" presStyleIdx="9" presStyleCnt="54"/>
+      <dgm:spPr/>
+    </dgm:pt>
+    <dgm:pt modelId="{67649436-0A96-A24A-A701-56CB57441ADF}" type="pres">
+      <dgm:prSet presAssocID="{335EBAED-2E86-8340-B7AC-8CACBDECEB6C}" presName="root2" presStyleCnt="0"/>
+      <dgm:spPr/>
+    </dgm:pt>
+    <dgm:pt modelId="{FE860302-7B4F-8444-86E7-3E89E24F2AE0}" type="pres">
+      <dgm:prSet presAssocID="{335EBAED-2E86-8340-B7AC-8CACBDECEB6C}" presName="LevelTwoTextNode" presStyleLbl="node4" presStyleIdx="9" presStyleCnt="54" custScaleY="344397" custLinFactX="172021" custLinFactNeighborX="200000" custLinFactNeighborY="11895">
         <dgm:presLayoutVars>
           <dgm:chPref val="3"/>
         </dgm:presLayoutVars>
       </dgm:prSet>
       <dgm:spPr/>
     </dgm:pt>
-    <dgm:pt modelId="{C845A82A-50F8-5341-ABE4-01A7ECB0DC19}" type="pres">
-      <dgm:prSet presAssocID="{ECC38862-6814-954F-80AE-DBF7C83AD452}" presName="level3hierChild" presStyleCnt="0"/>
-      <dgm:spPr/>
-    </dgm:pt>
-    <dgm:pt modelId="{32E1E92B-B747-1945-8244-8375262856A2}" type="pres">
-      <dgm:prSet presAssocID="{58D9B40E-196C-F64A-AD54-97A01917AAC3}" presName="conn2-1" presStyleLbl="parChTrans1D4" presStyleIdx="10" presStyleCnt="53"/>
-      <dgm:spPr/>
-    </dgm:pt>
-    <dgm:pt modelId="{B3130863-C367-4E49-B7AD-D2B418734F30}" type="pres">
-      <dgm:prSet presAssocID="{58D9B40E-196C-F64A-AD54-97A01917AAC3}" presName="connTx" presStyleLbl="parChTrans1D4" presStyleIdx="10" presStyleCnt="53"/>
-      <dgm:spPr/>
-    </dgm:pt>
-    <dgm:pt modelId="{8C10BC1F-0671-2340-A9C0-9E71D9E53B19}" type="pres">
-      <dgm:prSet presAssocID="{5B4D6E87-7AAD-9244-B432-B58448146B80}" presName="root2" presStyleCnt="0"/>
-      <dgm:spPr/>
-    </dgm:pt>
-    <dgm:pt modelId="{00CFE4B8-8832-0246-A40E-11D4FB02AE84}" type="pres">
-      <dgm:prSet presAssocID="{5B4D6E87-7AAD-9244-B432-B58448146B80}" presName="LevelTwoTextNode" presStyleLbl="node4" presStyleIdx="10" presStyleCnt="53" custLinFactX="185596" custLinFactNeighborX="200000" custLinFactNeighborY="52957">
+    <dgm:pt modelId="{057AE7D0-DCA5-E645-9EBC-E9E5461A3DD4}" type="pres">
+      <dgm:prSet presAssocID="{335EBAED-2E86-8340-B7AC-8CACBDECEB6C}" presName="level3hierChild" presStyleCnt="0"/>
+      <dgm:spPr/>
+    </dgm:pt>
+    <dgm:pt modelId="{AE66067E-8C8F-C146-AE9F-FD6D23D7EA7D}" type="pres">
+      <dgm:prSet presAssocID="{D06F829E-D606-FF46-A42D-A54189EDC959}" presName="conn2-1" presStyleLbl="parChTrans1D4" presStyleIdx="10" presStyleCnt="54"/>
+      <dgm:spPr/>
+    </dgm:pt>
+    <dgm:pt modelId="{FBF4C144-F351-7546-9706-1D522BDDE758}" type="pres">
+      <dgm:prSet presAssocID="{D06F829E-D606-FF46-A42D-A54189EDC959}" presName="connTx" presStyleLbl="parChTrans1D4" presStyleIdx="10" presStyleCnt="54"/>
+      <dgm:spPr/>
+    </dgm:pt>
+    <dgm:pt modelId="{C2CB1567-B53F-2C4E-9848-D0D9F318BA21}" type="pres">
+      <dgm:prSet presAssocID="{ECC38862-6814-954F-80AE-DBF7C83AD452}" presName="root2" presStyleCnt="0"/>
+      <dgm:spPr/>
+    </dgm:pt>
+    <dgm:pt modelId="{3FE5FC00-5B11-B04A-8DA8-F4959DA3D91E}" type="pres">
+      <dgm:prSet presAssocID="{ECC38862-6814-954F-80AE-DBF7C83AD452}" presName="LevelTwoTextNode" presStyleLbl="node4" presStyleIdx="10" presStyleCnt="54" custLinFactX="183941" custLinFactNeighborX="200000" custLinFactNeighborY="36408">
         <dgm:presLayoutVars>
           <dgm:chPref val="3"/>
         </dgm:presLayoutVars>
       </dgm:prSet>
       <dgm:spPr/>
     </dgm:pt>
-    <dgm:pt modelId="{4A66CD93-FEF2-5647-87D1-459C3DA519CA}" type="pres">
-      <dgm:prSet presAssocID="{5B4D6E87-7AAD-9244-B432-B58448146B80}" presName="level3hierChild" presStyleCnt="0"/>
-      <dgm:spPr/>
-    </dgm:pt>
-    <dgm:pt modelId="{679B93C1-DE35-6440-84FA-556B81DC0458}" type="pres">
-      <dgm:prSet presAssocID="{2A1D79E9-5180-CD44-A6E4-DF75859017DD}" presName="conn2-1" presStyleLbl="parChTrans1D4" presStyleIdx="11" presStyleCnt="53"/>
-      <dgm:spPr/>
-    </dgm:pt>
-    <dgm:pt modelId="{17969B6C-27C4-594D-AD5E-6F5032B8027F}" type="pres">
-      <dgm:prSet presAssocID="{2A1D79E9-5180-CD44-A6E4-DF75859017DD}" presName="connTx" presStyleLbl="parChTrans1D4" presStyleIdx="11" presStyleCnt="53"/>
-      <dgm:spPr/>
-    </dgm:pt>
-    <dgm:pt modelId="{607A5C4E-8E72-DF43-B8DD-7245A3FEAF65}" type="pres">
-      <dgm:prSet presAssocID="{F2515F6F-2FC4-6043-BE11-A587AFEA6F81}" presName="root2" presStyleCnt="0"/>
-      <dgm:spPr/>
-    </dgm:pt>
-    <dgm:pt modelId="{FFFF1321-B119-DD44-91BC-A8BB725CB204}" type="pres">
-      <dgm:prSet presAssocID="{F2515F6F-2FC4-6043-BE11-A587AFEA6F81}" presName="LevelTwoTextNode" presStyleLbl="node4" presStyleIdx="11" presStyleCnt="53" custScaleX="261224" custScaleY="408900" custLinFactY="-57089" custLinFactNeighborX="74678" custLinFactNeighborY="-100000">
+    <dgm:pt modelId="{C845A82A-50F8-5341-ABE4-01A7ECB0DC19}" type="pres">
+      <dgm:prSet presAssocID="{ECC38862-6814-954F-80AE-DBF7C83AD452}" presName="level3hierChild" presStyleCnt="0"/>
+      <dgm:spPr/>
+    </dgm:pt>
+    <dgm:pt modelId="{32E1E92B-B747-1945-8244-8375262856A2}" type="pres">
+      <dgm:prSet presAssocID="{58D9B40E-196C-F64A-AD54-97A01917AAC3}" presName="conn2-1" presStyleLbl="parChTrans1D4" presStyleIdx="11" presStyleCnt="54"/>
+      <dgm:spPr/>
+    </dgm:pt>
+    <dgm:pt modelId="{B3130863-C367-4E49-B7AD-D2B418734F30}" type="pres">
+      <dgm:prSet presAssocID="{58D9B40E-196C-F64A-AD54-97A01917AAC3}" presName="connTx" presStyleLbl="parChTrans1D4" presStyleIdx="11" presStyleCnt="54"/>
+      <dgm:spPr/>
+    </dgm:pt>
+    <dgm:pt modelId="{8C10BC1F-0671-2340-A9C0-9E71D9E53B19}" type="pres">
+      <dgm:prSet presAssocID="{5B4D6E87-7AAD-9244-B432-B58448146B80}" presName="root2" presStyleCnt="0"/>
+      <dgm:spPr/>
+    </dgm:pt>
+    <dgm:pt modelId="{00CFE4B8-8832-0246-A40E-11D4FB02AE84}" type="pres">
+      <dgm:prSet presAssocID="{5B4D6E87-7AAD-9244-B432-B58448146B80}" presName="LevelTwoTextNode" presStyleLbl="node4" presStyleIdx="11" presStyleCnt="54" custLinFactX="185596" custLinFactNeighborX="200000" custLinFactNeighborY="52957">
         <dgm:presLayoutVars>
           <dgm:chPref val="3"/>
         </dgm:presLayoutVars>
       </dgm:prSet>
       <dgm:spPr/>
     </dgm:pt>
-    <dgm:pt modelId="{6ACF99BD-0065-D644-91BC-8C88EAA585AA}" type="pres">
-      <dgm:prSet presAssocID="{F2515F6F-2FC4-6043-BE11-A587AFEA6F81}" presName="level3hierChild" presStyleCnt="0"/>
-      <dgm:spPr/>
-    </dgm:pt>
-    <dgm:pt modelId="{8C192C57-F760-C64F-93E5-9832B628B4B9}" type="pres">
-      <dgm:prSet presAssocID="{FD3B25B1-A208-984D-9C0E-E986BA7CB932}" presName="conn2-1" presStyleLbl="parChTrans1D4" presStyleIdx="12" presStyleCnt="53"/>
-      <dgm:spPr/>
-    </dgm:pt>
-    <dgm:pt modelId="{231E55CB-9002-9944-B177-034B990C250F}" type="pres">
-      <dgm:prSet presAssocID="{FD3B25B1-A208-984D-9C0E-E986BA7CB932}" presName="connTx" presStyleLbl="parChTrans1D4" presStyleIdx="12" presStyleCnt="53"/>
-      <dgm:spPr/>
-    </dgm:pt>
-    <dgm:pt modelId="{77028C31-781D-624B-BB89-6FDBC3329700}" type="pres">
-      <dgm:prSet presAssocID="{50A98565-4DA9-C14B-9F93-63779A96F28A}" presName="root2" presStyleCnt="0"/>
-      <dgm:spPr/>
-    </dgm:pt>
-    <dgm:pt modelId="{1530674F-400B-AA4E-BAF1-41A723567EF5}" type="pres">
-      <dgm:prSet presAssocID="{50A98565-4DA9-C14B-9F93-63779A96F28A}" presName="LevelTwoTextNode" presStyleLbl="node4" presStyleIdx="12" presStyleCnt="53" custScaleX="184909" custScaleY="308989" custLinFactY="-95818" custLinFactNeighborX="94570" custLinFactNeighborY="-100000">
+    <dgm:pt modelId="{4A66CD93-FEF2-5647-87D1-459C3DA519CA}" type="pres">
+      <dgm:prSet presAssocID="{5B4D6E87-7AAD-9244-B432-B58448146B80}" presName="level3hierChild" presStyleCnt="0"/>
+      <dgm:spPr/>
+    </dgm:pt>
+    <dgm:pt modelId="{679B93C1-DE35-6440-84FA-556B81DC0458}" type="pres">
+      <dgm:prSet presAssocID="{2A1D79E9-5180-CD44-A6E4-DF75859017DD}" presName="conn2-1" presStyleLbl="parChTrans1D4" presStyleIdx="12" presStyleCnt="54"/>
+      <dgm:spPr/>
+    </dgm:pt>
+    <dgm:pt modelId="{17969B6C-27C4-594D-AD5E-6F5032B8027F}" type="pres">
+      <dgm:prSet presAssocID="{2A1D79E9-5180-CD44-A6E4-DF75859017DD}" presName="connTx" presStyleLbl="parChTrans1D4" presStyleIdx="12" presStyleCnt="54"/>
+      <dgm:spPr/>
+    </dgm:pt>
+    <dgm:pt modelId="{607A5C4E-8E72-DF43-B8DD-7245A3FEAF65}" type="pres">
+      <dgm:prSet presAssocID="{F2515F6F-2FC4-6043-BE11-A587AFEA6F81}" presName="root2" presStyleCnt="0"/>
+      <dgm:spPr/>
+    </dgm:pt>
+    <dgm:pt modelId="{FFFF1321-B119-DD44-91BC-A8BB725CB204}" type="pres">
+      <dgm:prSet presAssocID="{F2515F6F-2FC4-6043-BE11-A587AFEA6F81}" presName="LevelTwoTextNode" presStyleLbl="node4" presStyleIdx="12" presStyleCnt="54" custScaleX="261224" custScaleY="408900" custLinFactY="-57089" custLinFactNeighborX="74678" custLinFactNeighborY="-100000">
         <dgm:presLayoutVars>
           <dgm:chPref val="3"/>
         </dgm:presLayoutVars>
       </dgm:prSet>
       <dgm:spPr/>
     </dgm:pt>
+    <dgm:pt modelId="{6ACF99BD-0065-D644-91BC-8C88EAA585AA}" type="pres">
+      <dgm:prSet presAssocID="{F2515F6F-2FC4-6043-BE11-A587AFEA6F81}" presName="level3hierChild" presStyleCnt="0"/>
+      <dgm:spPr/>
+    </dgm:pt>
+    <dgm:pt modelId="{8C192C57-F760-C64F-93E5-9832B628B4B9}" type="pres">
+      <dgm:prSet presAssocID="{FD3B25B1-A208-984D-9C0E-E986BA7CB932}" presName="conn2-1" presStyleLbl="parChTrans1D4" presStyleIdx="13" presStyleCnt="54"/>
+      <dgm:spPr/>
+    </dgm:pt>
+    <dgm:pt modelId="{231E55CB-9002-9944-B177-034B990C250F}" type="pres">
+      <dgm:prSet presAssocID="{FD3B25B1-A208-984D-9C0E-E986BA7CB932}" presName="connTx" presStyleLbl="parChTrans1D4" presStyleIdx="13" presStyleCnt="54"/>
+      <dgm:spPr/>
+    </dgm:pt>
+    <dgm:pt modelId="{77028C31-781D-624B-BB89-6FDBC3329700}" type="pres">
+      <dgm:prSet presAssocID="{50A98565-4DA9-C14B-9F93-63779A96F28A}" presName="root2" presStyleCnt="0"/>
+      <dgm:spPr/>
+    </dgm:pt>
+    <dgm:pt modelId="{1530674F-400B-AA4E-BAF1-41A723567EF5}" type="pres">
+      <dgm:prSet presAssocID="{50A98565-4DA9-C14B-9F93-63779A96F28A}" presName="LevelTwoTextNode" presStyleLbl="node4" presStyleIdx="13" presStyleCnt="54" custScaleX="184909" custScaleY="308989" custLinFactY="-95818" custLinFactNeighborX="94570" custLinFactNeighborY="-100000">
+        <dgm:presLayoutVars>
+          <dgm:chPref val="3"/>
+        </dgm:presLayoutVars>
+      </dgm:prSet>
+      <dgm:spPr/>
+    </dgm:pt>
     <dgm:pt modelId="{822DEA25-8009-FD4B-A009-A8B9E4849BB9}" type="pres">
       <dgm:prSet presAssocID="{50A98565-4DA9-C14B-9F93-63779A96F28A}" presName="level3hierChild" presStyleCnt="0"/>
       <dgm:spPr/>
     </dgm:pt>
     <dgm:pt modelId="{882C5457-CC43-4A48-A99D-03D91C22C0F5}" type="pres">
-      <dgm:prSet presAssocID="{A0A62DC7-4D31-8249-B14F-D2C78956C1B4}" presName="conn2-1" presStyleLbl="parChTrans1D4" presStyleIdx="13" presStyleCnt="53"/>
+      <dgm:prSet presAssocID="{A0A62DC7-4D31-8249-B14F-D2C78956C1B4}" presName="conn2-1" presStyleLbl="parChTrans1D4" presStyleIdx="14" presStyleCnt="54"/>
       <dgm:spPr/>
     </dgm:pt>
     <dgm:pt modelId="{10CA0EB9-E970-1C4C-B964-68E6097168BF}" type="pres">
-      <dgm:prSet presAssocID="{A0A62DC7-4D31-8249-B14F-D2C78956C1B4}" presName="connTx" presStyleLbl="parChTrans1D4" presStyleIdx="13" presStyleCnt="53"/>
+      <dgm:prSet presAssocID="{A0A62DC7-4D31-8249-B14F-D2C78956C1B4}" presName="connTx" presStyleLbl="parChTrans1D4" presStyleIdx="14" presStyleCnt="54"/>
       <dgm:spPr/>
     </dgm:pt>
     <dgm:pt modelId="{F0E02FA8-2358-A14C-8DB7-605DE4349BDD}" type="pres">
@@ -3961,7 +4011,7 @@
       <dgm:spPr/>
     </dgm:pt>
     <dgm:pt modelId="{B0BA1A94-5289-E747-92C5-8031204115B7}" type="pres">
-      <dgm:prSet presAssocID="{B84B88EC-21E0-6348-9457-4C6CD50C8F83}" presName="LevelTwoTextNode" presStyleLbl="node4" presStyleIdx="13" presStyleCnt="53" custScaleY="188199" custLinFactX="100000" custLinFactY="-32039" custLinFactNeighborX="137403" custLinFactNeighborY="-100000">
+      <dgm:prSet presAssocID="{B84B88EC-21E0-6348-9457-4C6CD50C8F83}" presName="LevelTwoTextNode" presStyleLbl="node4" presStyleIdx="14" presStyleCnt="54" custScaleY="188199" custLinFactX="100000" custLinFactY="-32039" custLinFactNeighborX="137403" custLinFactNeighborY="-100000">
         <dgm:presLayoutVars>
           <dgm:chPref val="3"/>
         </dgm:presLayoutVars>
@@ -3997,11 +4047,11 @@
       <dgm:spPr/>
     </dgm:pt>
     <dgm:pt modelId="{E0E8B3D1-202F-F448-A89C-7325EF939FBE}" type="pres">
-      <dgm:prSet presAssocID="{B9D6EB9F-5A0E-B94C-B310-2355C0FB920D}" presName="conn2-1" presStyleLbl="parChTrans1D4" presStyleIdx="14" presStyleCnt="53"/>
+      <dgm:prSet presAssocID="{B9D6EB9F-5A0E-B94C-B310-2355C0FB920D}" presName="conn2-1" presStyleLbl="parChTrans1D4" presStyleIdx="15" presStyleCnt="54"/>
       <dgm:spPr/>
     </dgm:pt>
     <dgm:pt modelId="{82082EF3-F943-6040-8F27-9EE49BF77273}" type="pres">
-      <dgm:prSet presAssocID="{B9D6EB9F-5A0E-B94C-B310-2355C0FB920D}" presName="connTx" presStyleLbl="parChTrans1D4" presStyleIdx="14" presStyleCnt="53"/>
+      <dgm:prSet presAssocID="{B9D6EB9F-5A0E-B94C-B310-2355C0FB920D}" presName="connTx" presStyleLbl="parChTrans1D4" presStyleIdx="15" presStyleCnt="54"/>
       <dgm:spPr/>
     </dgm:pt>
     <dgm:pt modelId="{FE01A907-E60A-7241-A73F-4556CF4B7B90}" type="pres">
@@ -4009,7 +4059,7 @@
       <dgm:spPr/>
     </dgm:pt>
     <dgm:pt modelId="{1F61B25A-1771-6C48-A23E-9F44BFFFE83A}" type="pres">
-      <dgm:prSet presAssocID="{3ECA71C2-7B10-C24A-8256-9BBBEBA76CC4}" presName="LevelTwoTextNode" presStyleLbl="node4" presStyleIdx="14" presStyleCnt="53" custScaleY="417941" custLinFactY="-100000" custLinFactNeighborX="-7502" custLinFactNeighborY="-105049">
+      <dgm:prSet presAssocID="{3ECA71C2-7B10-C24A-8256-9BBBEBA76CC4}" presName="LevelTwoTextNode" presStyleLbl="node4" presStyleIdx="15" presStyleCnt="54" custScaleY="417941" custLinFactY="-100000" custLinFactNeighborX="-7502" custLinFactNeighborY="-105049">
         <dgm:presLayoutVars>
           <dgm:chPref val="3"/>
         </dgm:presLayoutVars>
@@ -4021,11 +4071,11 @@
       <dgm:spPr/>
     </dgm:pt>
     <dgm:pt modelId="{6F1542E3-3EE9-7643-98A4-02BB96297F69}" type="pres">
-      <dgm:prSet presAssocID="{55836E6C-FEC0-0A4F-9D46-6320613A632B}" presName="conn2-1" presStyleLbl="parChTrans1D4" presStyleIdx="15" presStyleCnt="53"/>
+      <dgm:prSet presAssocID="{55836E6C-FEC0-0A4F-9D46-6320613A632B}" presName="conn2-1" presStyleLbl="parChTrans1D4" presStyleIdx="16" presStyleCnt="54"/>
       <dgm:spPr/>
     </dgm:pt>
     <dgm:pt modelId="{ADC457D0-4675-8749-9954-B3A7E3C7E138}" type="pres">
-      <dgm:prSet presAssocID="{55836E6C-FEC0-0A4F-9D46-6320613A632B}" presName="connTx" presStyleLbl="parChTrans1D4" presStyleIdx="15" presStyleCnt="53"/>
+      <dgm:prSet presAssocID="{55836E6C-FEC0-0A4F-9D46-6320613A632B}" presName="connTx" presStyleLbl="parChTrans1D4" presStyleIdx="16" presStyleCnt="54"/>
       <dgm:spPr/>
     </dgm:pt>
     <dgm:pt modelId="{2A862D7C-77B7-264A-A1F0-8F6D2BED61CE}" type="pres">
@@ -4033,7 +4083,7 @@
       <dgm:spPr/>
     </dgm:pt>
     <dgm:pt modelId="{EAF5B26D-7BCE-5249-BEA2-027D32033BF5}" type="pres">
-      <dgm:prSet presAssocID="{2E1432B9-2340-7B4F-A4FB-3C8F85A920DA}" presName="LevelTwoTextNode" presStyleLbl="node4" presStyleIdx="15" presStyleCnt="53" custLinFactY="-72699" custLinFactNeighborX="2578" custLinFactNeighborY="-100000">
+      <dgm:prSet presAssocID="{2E1432B9-2340-7B4F-A4FB-3C8F85A920DA}" presName="LevelTwoTextNode" presStyleLbl="node4" presStyleIdx="16" presStyleCnt="54" custLinFactY="-72699" custLinFactNeighborX="2578" custLinFactNeighborY="-100000">
         <dgm:presLayoutVars>
           <dgm:chPref val="3"/>
         </dgm:presLayoutVars>
@@ -4045,11 +4095,11 @@
       <dgm:spPr/>
     </dgm:pt>
     <dgm:pt modelId="{97208B3F-EBA3-4845-94E7-920477ECF453}" type="pres">
-      <dgm:prSet presAssocID="{7570DA5B-305E-2D4F-9C43-9143998CD399}" presName="conn2-1" presStyleLbl="parChTrans1D4" presStyleIdx="16" presStyleCnt="53"/>
+      <dgm:prSet presAssocID="{7570DA5B-305E-2D4F-9C43-9143998CD399}" presName="conn2-1" presStyleLbl="parChTrans1D4" presStyleIdx="17" presStyleCnt="54"/>
       <dgm:spPr/>
     </dgm:pt>
     <dgm:pt modelId="{99F05CAB-2148-F444-8941-3147FA138FC8}" type="pres">
-      <dgm:prSet presAssocID="{7570DA5B-305E-2D4F-9C43-9143998CD399}" presName="connTx" presStyleLbl="parChTrans1D4" presStyleIdx="16" presStyleCnt="53"/>
+      <dgm:prSet presAssocID="{7570DA5B-305E-2D4F-9C43-9143998CD399}" presName="connTx" presStyleLbl="parChTrans1D4" presStyleIdx="17" presStyleCnt="54"/>
       <dgm:spPr/>
     </dgm:pt>
     <dgm:pt modelId="{BEB9413D-1E65-E648-9E27-A0E8F477336A}" type="pres">
@@ -4057,7 +4107,7 @@
       <dgm:spPr/>
     </dgm:pt>
     <dgm:pt modelId="{4AC7893F-6937-5446-9898-4892D379DA93}" type="pres">
-      <dgm:prSet presAssocID="{03BEA625-8334-C148-B76E-B4B95225C8F2}" presName="LevelTwoTextNode" presStyleLbl="node4" presStyleIdx="16" presStyleCnt="53" custScaleX="276564" custLinFactNeighborX="-16335" custLinFactNeighborY="-49286">
+      <dgm:prSet presAssocID="{03BEA625-8334-C148-B76E-B4B95225C8F2}" presName="LevelTwoTextNode" presStyleLbl="node4" presStyleIdx="17" presStyleCnt="54" custScaleX="276564" custLinFactNeighborX="-16335" custLinFactNeighborY="-49286">
         <dgm:presLayoutVars>
           <dgm:chPref val="3"/>
         </dgm:presLayoutVars>
@@ -4069,11 +4119,11 @@
       <dgm:spPr/>
     </dgm:pt>
     <dgm:pt modelId="{DF2248CE-7D7C-5D4B-8277-D213DA6DD3EB}" type="pres">
-      <dgm:prSet presAssocID="{CD5A3357-FB5B-E644-82F7-D0F9608221E7}" presName="conn2-1" presStyleLbl="parChTrans1D4" presStyleIdx="17" presStyleCnt="53"/>
+      <dgm:prSet presAssocID="{CD5A3357-FB5B-E644-82F7-D0F9608221E7}" presName="conn2-1" presStyleLbl="parChTrans1D4" presStyleIdx="18" presStyleCnt="54"/>
       <dgm:spPr/>
     </dgm:pt>
     <dgm:pt modelId="{A52AB215-CE3B-6540-84CE-C7392438F501}" type="pres">
-      <dgm:prSet presAssocID="{CD5A3357-FB5B-E644-82F7-D0F9608221E7}" presName="connTx" presStyleLbl="parChTrans1D4" presStyleIdx="17" presStyleCnt="53"/>
+      <dgm:prSet presAssocID="{CD5A3357-FB5B-E644-82F7-D0F9608221E7}" presName="connTx" presStyleLbl="parChTrans1D4" presStyleIdx="18" presStyleCnt="54"/>
       <dgm:spPr/>
     </dgm:pt>
     <dgm:pt modelId="{1A261F39-0BA9-4948-A5A6-DB65EB31F286}" type="pres">
@@ -4081,7 +4131,7 @@
       <dgm:spPr/>
     </dgm:pt>
     <dgm:pt modelId="{973B5C1F-9A88-FA43-9797-E750A0514CF6}" type="pres">
-      <dgm:prSet presAssocID="{837D2806-A598-914C-9E7E-530603CC9694}" presName="LevelTwoTextNode" presStyleLbl="node4" presStyleIdx="17" presStyleCnt="53" custScaleX="193176" custScaleY="299095" custLinFactY="-14314" custLinFactNeighborX="-12446" custLinFactNeighborY="-100000">
+      <dgm:prSet presAssocID="{837D2806-A598-914C-9E7E-530603CC9694}" presName="LevelTwoTextNode" presStyleLbl="node4" presStyleIdx="18" presStyleCnt="54" custScaleX="193176" custScaleY="299095" custLinFactY="-14314" custLinFactNeighborX="-12446" custLinFactNeighborY="-100000">
         <dgm:presLayoutVars>
           <dgm:chPref val="3"/>
         </dgm:presLayoutVars>
@@ -4093,11 +4143,11 @@
       <dgm:spPr/>
     </dgm:pt>
     <dgm:pt modelId="{48C1939D-7F8F-224A-89D3-D240B4AD4863}" type="pres">
-      <dgm:prSet presAssocID="{30E67414-1EDC-E747-94E6-77002BE10CB6}" presName="conn2-1" presStyleLbl="parChTrans1D4" presStyleIdx="18" presStyleCnt="53"/>
+      <dgm:prSet presAssocID="{30E67414-1EDC-E747-94E6-77002BE10CB6}" presName="conn2-1" presStyleLbl="parChTrans1D4" presStyleIdx="19" presStyleCnt="54"/>
       <dgm:spPr/>
     </dgm:pt>
     <dgm:pt modelId="{9D8B57B8-631C-FB43-A057-C6F4840439BB}" type="pres">
-      <dgm:prSet presAssocID="{30E67414-1EDC-E747-94E6-77002BE10CB6}" presName="connTx" presStyleLbl="parChTrans1D4" presStyleIdx="18" presStyleCnt="53"/>
+      <dgm:prSet presAssocID="{30E67414-1EDC-E747-94E6-77002BE10CB6}" presName="connTx" presStyleLbl="parChTrans1D4" presStyleIdx="19" presStyleCnt="54"/>
       <dgm:spPr/>
     </dgm:pt>
     <dgm:pt modelId="{9B156E3B-6B87-DB4D-BA13-CFAC7D71D3F1}" type="pres">
@@ -4105,7 +4155,7 @@
       <dgm:spPr/>
     </dgm:pt>
     <dgm:pt modelId="{6D61A4E9-20E0-724F-8506-4AF9CF093D61}" type="pres">
-      <dgm:prSet presAssocID="{99B9F1DD-A4C8-824C-8A75-F8555EA0A282}" presName="LevelTwoTextNode" presStyleLbl="node4" presStyleIdx="18" presStyleCnt="53" custScaleY="330007" custLinFactNeighborX="-8298" custLinFactNeighborY="-71913">
+      <dgm:prSet presAssocID="{99B9F1DD-A4C8-824C-8A75-F8555EA0A282}" presName="LevelTwoTextNode" presStyleLbl="node4" presStyleIdx="19" presStyleCnt="54" custScaleY="330007" custLinFactNeighborX="-8298" custLinFactNeighborY="-71913">
         <dgm:presLayoutVars>
           <dgm:chPref val="3"/>
         </dgm:presLayoutVars>
@@ -4117,11 +4167,11 @@
       <dgm:spPr/>
     </dgm:pt>
     <dgm:pt modelId="{D5E03AE9-CD36-1E45-8924-A89701186EA4}" type="pres">
-      <dgm:prSet presAssocID="{4FBF82B5-C669-CA4C-A43F-FC7BB5DF2751}" presName="conn2-1" presStyleLbl="parChTrans1D4" presStyleIdx="19" presStyleCnt="53"/>
+      <dgm:prSet presAssocID="{4FBF82B5-C669-CA4C-A43F-FC7BB5DF2751}" presName="conn2-1" presStyleLbl="parChTrans1D4" presStyleIdx="20" presStyleCnt="54"/>
       <dgm:spPr/>
     </dgm:pt>
     <dgm:pt modelId="{A4EEFD49-E628-3740-A93E-6D11E409D24D}" type="pres">
-      <dgm:prSet presAssocID="{4FBF82B5-C669-CA4C-A43F-FC7BB5DF2751}" presName="connTx" presStyleLbl="parChTrans1D4" presStyleIdx="19" presStyleCnt="53"/>
+      <dgm:prSet presAssocID="{4FBF82B5-C669-CA4C-A43F-FC7BB5DF2751}" presName="connTx" presStyleLbl="parChTrans1D4" presStyleIdx="20" presStyleCnt="54"/>
       <dgm:spPr/>
     </dgm:pt>
     <dgm:pt modelId="{6788474E-B969-384B-B022-EB3A33F173C9}" type="pres">
@@ -4129,7 +4179,7 @@
       <dgm:spPr/>
     </dgm:pt>
     <dgm:pt modelId="{020ECFE7-D082-9944-8AD2-DBD727F66CA5}" type="pres">
-      <dgm:prSet presAssocID="{6B79D810-F8DD-BC40-A9B1-5D821F1FBA6D}" presName="LevelTwoTextNode" presStyleLbl="node4" presStyleIdx="19" presStyleCnt="53" custLinFactY="-100000" custLinFactNeighborX="-23510" custLinFactNeighborY="-110206">
+      <dgm:prSet presAssocID="{6B79D810-F8DD-BC40-A9B1-5D821F1FBA6D}" presName="LevelTwoTextNode" presStyleLbl="node4" presStyleIdx="20" presStyleCnt="54" custLinFactY="-100000" custLinFactNeighborX="-23510" custLinFactNeighborY="-110206">
         <dgm:presLayoutVars>
           <dgm:chPref val="3"/>
         </dgm:presLayoutVars>
@@ -4141,11 +4191,11 @@
       <dgm:spPr/>
     </dgm:pt>
     <dgm:pt modelId="{6B63E564-88B8-E64A-B9FB-CD4F663F06C4}" type="pres">
-      <dgm:prSet presAssocID="{56F3205A-6C26-3647-AD88-9D60DDAC1A4F}" presName="conn2-1" presStyleLbl="parChTrans1D4" presStyleIdx="20" presStyleCnt="53"/>
+      <dgm:prSet presAssocID="{56F3205A-6C26-3647-AD88-9D60DDAC1A4F}" presName="conn2-1" presStyleLbl="parChTrans1D4" presStyleIdx="21" presStyleCnt="54"/>
       <dgm:spPr/>
     </dgm:pt>
     <dgm:pt modelId="{0BB8C1D1-32D5-F247-90B9-6406D7687D76}" type="pres">
-      <dgm:prSet presAssocID="{56F3205A-6C26-3647-AD88-9D60DDAC1A4F}" presName="connTx" presStyleLbl="parChTrans1D4" presStyleIdx="20" presStyleCnt="53"/>
+      <dgm:prSet presAssocID="{56F3205A-6C26-3647-AD88-9D60DDAC1A4F}" presName="connTx" presStyleLbl="parChTrans1D4" presStyleIdx="21" presStyleCnt="54"/>
       <dgm:spPr/>
     </dgm:pt>
     <dgm:pt modelId="{9AA4CB9B-D3ED-B443-B3FD-E68710357950}" type="pres">
@@ -4153,7 +4203,7 @@
       <dgm:spPr/>
     </dgm:pt>
     <dgm:pt modelId="{2E029F71-35C9-9044-867B-C62FC8CEDC2C}" type="pres">
-      <dgm:prSet presAssocID="{A2AFE9BF-4648-8847-9B35-BF89E09D0D1C}" presName="LevelTwoTextNode" presStyleLbl="node4" presStyleIdx="20" presStyleCnt="53" custLinFactNeighborX="28453" custLinFactNeighborY="-23960">
+      <dgm:prSet presAssocID="{A2AFE9BF-4648-8847-9B35-BF89E09D0D1C}" presName="LevelTwoTextNode" presStyleLbl="node4" presStyleIdx="21" presStyleCnt="54" custLinFactNeighborX="28453" custLinFactNeighborY="-23960">
         <dgm:presLayoutVars>
           <dgm:chPref val="3"/>
         </dgm:presLayoutVars>
@@ -4165,11 +4215,11 @@
       <dgm:spPr/>
     </dgm:pt>
     <dgm:pt modelId="{641BAAFD-D329-7E42-8738-0A74C231BC0A}" type="pres">
-      <dgm:prSet presAssocID="{D083BCCB-23E8-3A40-9DC9-70EB5FEA9DBA}" presName="conn2-1" presStyleLbl="parChTrans1D4" presStyleIdx="21" presStyleCnt="53"/>
+      <dgm:prSet presAssocID="{D083BCCB-23E8-3A40-9DC9-70EB5FEA9DBA}" presName="conn2-1" presStyleLbl="parChTrans1D4" presStyleIdx="22" presStyleCnt="54"/>
       <dgm:spPr/>
     </dgm:pt>
     <dgm:pt modelId="{8F379772-4468-2D48-8E1C-02F9C1718421}" type="pres">
-      <dgm:prSet presAssocID="{D083BCCB-23E8-3A40-9DC9-70EB5FEA9DBA}" presName="connTx" presStyleLbl="parChTrans1D4" presStyleIdx="21" presStyleCnt="53"/>
+      <dgm:prSet presAssocID="{D083BCCB-23E8-3A40-9DC9-70EB5FEA9DBA}" presName="connTx" presStyleLbl="parChTrans1D4" presStyleIdx="22" presStyleCnt="54"/>
       <dgm:spPr/>
     </dgm:pt>
     <dgm:pt modelId="{E4854849-0AC0-954F-BD0F-9A4D48A7DB3F}" type="pres">
@@ -4177,7 +4227,7 @@
       <dgm:spPr/>
     </dgm:pt>
     <dgm:pt modelId="{6EB62837-1E38-C84D-ACB4-94B49AFC73CE}" type="pres">
-      <dgm:prSet presAssocID="{D67B605D-1D92-354B-A719-EF56821C6E13}" presName="LevelTwoTextNode" presStyleLbl="node4" presStyleIdx="21" presStyleCnt="53" custLinFactY="-180373" custLinFactNeighborX="-11980" custLinFactNeighborY="-200000">
+      <dgm:prSet presAssocID="{D67B605D-1D92-354B-A719-EF56821C6E13}" presName="LevelTwoTextNode" presStyleLbl="node4" presStyleIdx="22" presStyleCnt="54" custLinFactY="-180373" custLinFactNeighborX="-11980" custLinFactNeighborY="-200000">
         <dgm:presLayoutVars>
           <dgm:chPref val="3"/>
         </dgm:presLayoutVars>
@@ -4189,11 +4239,11 @@
       <dgm:spPr/>
     </dgm:pt>
     <dgm:pt modelId="{0944545F-BE28-CB41-9FE0-CB8029CA4E05}" type="pres">
-      <dgm:prSet presAssocID="{4A3BD0D8-5773-6C4C-A796-C027AC6F30B5}" presName="conn2-1" presStyleLbl="parChTrans1D4" presStyleIdx="22" presStyleCnt="53"/>
+      <dgm:prSet presAssocID="{4A3BD0D8-5773-6C4C-A796-C027AC6F30B5}" presName="conn2-1" presStyleLbl="parChTrans1D4" presStyleIdx="23" presStyleCnt="54"/>
       <dgm:spPr/>
     </dgm:pt>
     <dgm:pt modelId="{B9DF7744-0386-3343-9BD2-F1987F5C2504}" type="pres">
-      <dgm:prSet presAssocID="{4A3BD0D8-5773-6C4C-A796-C027AC6F30B5}" presName="connTx" presStyleLbl="parChTrans1D4" presStyleIdx="22" presStyleCnt="53"/>
+      <dgm:prSet presAssocID="{4A3BD0D8-5773-6C4C-A796-C027AC6F30B5}" presName="connTx" presStyleLbl="parChTrans1D4" presStyleIdx="23" presStyleCnt="54"/>
       <dgm:spPr/>
     </dgm:pt>
     <dgm:pt modelId="{39F3B461-72C8-0145-ACF2-28565415C7A1}" type="pres">
@@ -4201,7 +4251,7 @@
       <dgm:spPr/>
     </dgm:pt>
     <dgm:pt modelId="{F84751BB-FB2D-0A40-88BA-778CB80F14B3}" type="pres">
-      <dgm:prSet presAssocID="{ADE03602-EDA6-E54F-944C-C5A5CD460E25}" presName="LevelTwoTextNode" presStyleLbl="node4" presStyleIdx="22" presStyleCnt="53" custLinFactNeighborX="-19799" custLinFactNeighborY="-82916">
+      <dgm:prSet presAssocID="{ADE03602-EDA6-E54F-944C-C5A5CD460E25}" presName="LevelTwoTextNode" presStyleLbl="node4" presStyleIdx="23" presStyleCnt="54" custLinFactNeighborX="-19799" custLinFactNeighborY="-82916">
         <dgm:presLayoutVars>
           <dgm:chPref val="3"/>
         </dgm:presLayoutVars>
@@ -4213,11 +4263,11 @@
       <dgm:spPr/>
     </dgm:pt>
     <dgm:pt modelId="{F03D0C19-6DF7-B64A-9FD1-2A1A5EF6D7CA}" type="pres">
-      <dgm:prSet presAssocID="{B1F69F30-1C90-EE4E-9B90-76ECA483DE49}" presName="conn2-1" presStyleLbl="parChTrans1D4" presStyleIdx="23" presStyleCnt="53"/>
+      <dgm:prSet presAssocID="{B1F69F30-1C90-EE4E-9B90-76ECA483DE49}" presName="conn2-1" presStyleLbl="parChTrans1D4" presStyleIdx="24" presStyleCnt="54"/>
       <dgm:spPr/>
     </dgm:pt>
     <dgm:pt modelId="{0DFBADBC-4685-304B-87B0-BD0C0A75C57C}" type="pres">
-      <dgm:prSet presAssocID="{B1F69F30-1C90-EE4E-9B90-76ECA483DE49}" presName="connTx" presStyleLbl="parChTrans1D4" presStyleIdx="23" presStyleCnt="53"/>
+      <dgm:prSet presAssocID="{B1F69F30-1C90-EE4E-9B90-76ECA483DE49}" presName="connTx" presStyleLbl="parChTrans1D4" presStyleIdx="24" presStyleCnt="54"/>
       <dgm:spPr/>
     </dgm:pt>
     <dgm:pt modelId="{275D3635-4C9C-434E-9619-C93CEC2EFD77}" type="pres">
@@ -4225,7 +4275,7 @@
       <dgm:spPr/>
     </dgm:pt>
     <dgm:pt modelId="{BBF96CC7-6B2B-D546-B69E-E97D847B5E45}" type="pres">
-      <dgm:prSet presAssocID="{C878F5E1-AD43-1948-A44A-CFB976113450}" presName="LevelTwoTextNode" presStyleLbl="node4" presStyleIdx="23" presStyleCnt="53" custScaleX="155512" custScaleY="229400">
+      <dgm:prSet presAssocID="{C878F5E1-AD43-1948-A44A-CFB976113450}" presName="LevelTwoTextNode" presStyleLbl="node4" presStyleIdx="24" presStyleCnt="54" custScaleX="155512" custScaleY="229400">
         <dgm:presLayoutVars>
           <dgm:chPref val="3"/>
         </dgm:presLayoutVars>
@@ -4237,11 +4287,11 @@
       <dgm:spPr/>
     </dgm:pt>
     <dgm:pt modelId="{B0460EF9-21D3-F84E-BBFA-46763C9AE876}" type="pres">
-      <dgm:prSet presAssocID="{37687930-03B2-6149-8735-77877F9E8006}" presName="conn2-1" presStyleLbl="parChTrans1D4" presStyleIdx="24" presStyleCnt="53"/>
+      <dgm:prSet presAssocID="{37687930-03B2-6149-8735-77877F9E8006}" presName="conn2-1" presStyleLbl="parChTrans1D4" presStyleIdx="25" presStyleCnt="54"/>
       <dgm:spPr/>
     </dgm:pt>
     <dgm:pt modelId="{9F8B70A0-32E5-A14F-B6F2-42409C13EE93}" type="pres">
-      <dgm:prSet presAssocID="{37687930-03B2-6149-8735-77877F9E8006}" presName="connTx" presStyleLbl="parChTrans1D4" presStyleIdx="24" presStyleCnt="53"/>
+      <dgm:prSet presAssocID="{37687930-03B2-6149-8735-77877F9E8006}" presName="connTx" presStyleLbl="parChTrans1D4" presStyleIdx="25" presStyleCnt="54"/>
       <dgm:spPr/>
     </dgm:pt>
     <dgm:pt modelId="{DA24A719-148D-1546-8E68-CD4A35F46D3E}" type="pres">
@@ -4249,7 +4299,7 @@
       <dgm:spPr/>
     </dgm:pt>
     <dgm:pt modelId="{C1AD9849-C58B-0841-853D-61235BCF9197}" type="pres">
-      <dgm:prSet presAssocID="{BBB0582E-A825-A24F-97CF-C5EE1D6155DA}" presName="LevelTwoTextNode" presStyleLbl="node4" presStyleIdx="24" presStyleCnt="53">
+      <dgm:prSet presAssocID="{BBB0582E-A825-A24F-97CF-C5EE1D6155DA}" presName="LevelTwoTextNode" presStyleLbl="node4" presStyleIdx="25" presStyleCnt="54">
         <dgm:presLayoutVars>
           <dgm:chPref val="3"/>
         </dgm:presLayoutVars>
@@ -4261,11 +4311,11 @@
       <dgm:spPr/>
     </dgm:pt>
     <dgm:pt modelId="{AE09F7FF-7720-0E4F-A409-200B111906F7}" type="pres">
-      <dgm:prSet presAssocID="{C42AF61D-E72F-D440-86F7-95279F71EDF5}" presName="conn2-1" presStyleLbl="parChTrans1D4" presStyleIdx="25" presStyleCnt="53"/>
+      <dgm:prSet presAssocID="{C42AF61D-E72F-D440-86F7-95279F71EDF5}" presName="conn2-1" presStyleLbl="parChTrans1D4" presStyleIdx="26" presStyleCnt="54"/>
       <dgm:spPr/>
     </dgm:pt>
     <dgm:pt modelId="{C7F54069-F85F-C24F-B7E5-A79C8F7CF7A2}" type="pres">
-      <dgm:prSet presAssocID="{C42AF61D-E72F-D440-86F7-95279F71EDF5}" presName="connTx" presStyleLbl="parChTrans1D4" presStyleIdx="25" presStyleCnt="53"/>
+      <dgm:prSet presAssocID="{C42AF61D-E72F-D440-86F7-95279F71EDF5}" presName="connTx" presStyleLbl="parChTrans1D4" presStyleIdx="26" presStyleCnt="54"/>
       <dgm:spPr/>
     </dgm:pt>
     <dgm:pt modelId="{D4BEEA34-09B6-2F46-9BEC-1EEBB06552F3}" type="pres">
@@ -4273,7 +4323,7 @@
       <dgm:spPr/>
     </dgm:pt>
     <dgm:pt modelId="{CD3E6B27-7BAA-1A4F-A778-AAC952E047EB}" type="pres">
-      <dgm:prSet presAssocID="{D852DDE2-48EC-C949-AD66-1E4551A9BBE8}" presName="LevelTwoTextNode" presStyleLbl="node4" presStyleIdx="25" presStyleCnt="53" custScaleY="546388" custLinFactY="-34013" custLinFactNeighborX="-1289" custLinFactNeighborY="-100000">
+      <dgm:prSet presAssocID="{D852DDE2-48EC-C949-AD66-1E4551A9BBE8}" presName="LevelTwoTextNode" presStyleLbl="node4" presStyleIdx="26" presStyleCnt="54" custScaleY="546388" custLinFactY="-34013" custLinFactNeighborX="-1289" custLinFactNeighborY="-100000">
         <dgm:presLayoutVars>
           <dgm:chPref val="3"/>
         </dgm:presLayoutVars>
@@ -4285,11 +4335,11 @@
       <dgm:spPr/>
     </dgm:pt>
     <dgm:pt modelId="{579EAB07-4F83-F743-9508-5D825E6D182C}" type="pres">
-      <dgm:prSet presAssocID="{A8ADB7F8-470C-734E-B971-8E83D18BAA41}" presName="conn2-1" presStyleLbl="parChTrans1D4" presStyleIdx="26" presStyleCnt="53"/>
+      <dgm:prSet presAssocID="{A8ADB7F8-470C-734E-B971-8E83D18BAA41}" presName="conn2-1" presStyleLbl="parChTrans1D4" presStyleIdx="27" presStyleCnt="54"/>
       <dgm:spPr/>
     </dgm:pt>
     <dgm:pt modelId="{3455402C-0615-5140-883D-2091BEC57060}" type="pres">
-      <dgm:prSet presAssocID="{A8ADB7F8-470C-734E-B971-8E83D18BAA41}" presName="connTx" presStyleLbl="parChTrans1D4" presStyleIdx="26" presStyleCnt="53"/>
+      <dgm:prSet presAssocID="{A8ADB7F8-470C-734E-B971-8E83D18BAA41}" presName="connTx" presStyleLbl="parChTrans1D4" presStyleIdx="27" presStyleCnt="54"/>
       <dgm:spPr/>
     </dgm:pt>
     <dgm:pt modelId="{4D159BF9-163C-BD48-8527-9D25AAAAA168}" type="pres">
@@ -4297,7 +4347,7 @@
       <dgm:spPr/>
     </dgm:pt>
     <dgm:pt modelId="{EEF9B519-006B-D64A-A894-6F7AC9155FD9}" type="pres">
-      <dgm:prSet presAssocID="{434E16C0-9111-9A46-ABAF-8042E7E425A0}" presName="LevelTwoTextNode" presStyleLbl="node4" presStyleIdx="26" presStyleCnt="53" custScaleY="195741" custLinFactNeighborX="3511" custLinFactNeighborY="-60849">
+      <dgm:prSet presAssocID="{434E16C0-9111-9A46-ABAF-8042E7E425A0}" presName="LevelTwoTextNode" presStyleLbl="node4" presStyleIdx="27" presStyleCnt="54" custScaleY="195741" custLinFactNeighborX="3511" custLinFactNeighborY="-60849">
         <dgm:presLayoutVars>
           <dgm:chPref val="3"/>
         </dgm:presLayoutVars>
@@ -4309,11 +4359,11 @@
       <dgm:spPr/>
     </dgm:pt>
     <dgm:pt modelId="{FF0504E2-FEC3-884B-B595-DCBAEFD33946}" type="pres">
-      <dgm:prSet presAssocID="{182251B1-5437-8F47-809E-BCFE0BD3D911}" presName="conn2-1" presStyleLbl="parChTrans1D4" presStyleIdx="27" presStyleCnt="53"/>
+      <dgm:prSet presAssocID="{182251B1-5437-8F47-809E-BCFE0BD3D911}" presName="conn2-1" presStyleLbl="parChTrans1D4" presStyleIdx="28" presStyleCnt="54"/>
       <dgm:spPr/>
     </dgm:pt>
     <dgm:pt modelId="{A99DEBE2-A9C8-9640-947F-1F27481BC737}" type="pres">
-      <dgm:prSet presAssocID="{182251B1-5437-8F47-809E-BCFE0BD3D911}" presName="connTx" presStyleLbl="parChTrans1D4" presStyleIdx="27" presStyleCnt="53"/>
+      <dgm:prSet presAssocID="{182251B1-5437-8F47-809E-BCFE0BD3D911}" presName="connTx" presStyleLbl="parChTrans1D4" presStyleIdx="28" presStyleCnt="54"/>
       <dgm:spPr/>
     </dgm:pt>
     <dgm:pt modelId="{E4F67987-96F8-6A4A-A2FB-CBA1B366E3C5}" type="pres">
@@ -4321,7 +4371,7 @@
       <dgm:spPr/>
     </dgm:pt>
     <dgm:pt modelId="{87A01F3E-6C55-844D-A489-6FE6695CB6F7}" type="pres">
-      <dgm:prSet presAssocID="{B262C4D5-4CB3-B24D-AA92-A44ED0902194}" presName="LevelTwoTextNode" presStyleLbl="node4" presStyleIdx="27" presStyleCnt="53" custScaleX="185368" custScaleY="180468" custLinFactNeighborX="-1500" custLinFactNeighborY="-57686">
+      <dgm:prSet presAssocID="{B262C4D5-4CB3-B24D-AA92-A44ED0902194}" presName="LevelTwoTextNode" presStyleLbl="node4" presStyleIdx="28" presStyleCnt="54" custScaleX="185368" custScaleY="180468" custLinFactNeighborX="-1500" custLinFactNeighborY="-57686">
         <dgm:presLayoutVars>
           <dgm:chPref val="3"/>
         </dgm:presLayoutVars>
@@ -4333,11 +4383,11 @@
       <dgm:spPr/>
     </dgm:pt>
     <dgm:pt modelId="{180BC466-B29A-4F46-A85D-CA4AB8E5E528}" type="pres">
-      <dgm:prSet presAssocID="{5A16902D-83DE-B04B-A3E6-8FE700D2F549}" presName="conn2-1" presStyleLbl="parChTrans1D4" presStyleIdx="28" presStyleCnt="53"/>
+      <dgm:prSet presAssocID="{5A16902D-83DE-B04B-A3E6-8FE700D2F549}" presName="conn2-1" presStyleLbl="parChTrans1D4" presStyleIdx="29" presStyleCnt="54"/>
       <dgm:spPr/>
     </dgm:pt>
     <dgm:pt modelId="{A37D193D-BA8D-D841-BBF6-8B93ACA9CA93}" type="pres">
-      <dgm:prSet presAssocID="{5A16902D-83DE-B04B-A3E6-8FE700D2F549}" presName="connTx" presStyleLbl="parChTrans1D4" presStyleIdx="28" presStyleCnt="53"/>
+      <dgm:prSet presAssocID="{5A16902D-83DE-B04B-A3E6-8FE700D2F549}" presName="connTx" presStyleLbl="parChTrans1D4" presStyleIdx="29" presStyleCnt="54"/>
       <dgm:spPr/>
     </dgm:pt>
     <dgm:pt modelId="{AFE36984-70CB-5743-868B-9D1AACD819F9}" type="pres">
@@ -4345,7 +4395,7 @@
       <dgm:spPr/>
     </dgm:pt>
     <dgm:pt modelId="{9EADF938-02B1-2C43-8A93-4A4A378C8BDB}" type="pres">
-      <dgm:prSet presAssocID="{B898F6DC-BA66-A34E-9448-6CD8798FA52C}" presName="LevelTwoTextNode" presStyleLbl="node4" presStyleIdx="28" presStyleCnt="53">
+      <dgm:prSet presAssocID="{B898F6DC-BA66-A34E-9448-6CD8798FA52C}" presName="LevelTwoTextNode" presStyleLbl="node4" presStyleIdx="29" presStyleCnt="54">
         <dgm:presLayoutVars>
           <dgm:chPref val="3"/>
         </dgm:presLayoutVars>
@@ -4357,11 +4407,11 @@
       <dgm:spPr/>
     </dgm:pt>
     <dgm:pt modelId="{DD49C87D-B15D-704F-8833-A4B4C4143ED4}" type="pres">
-      <dgm:prSet presAssocID="{074D98B8-B5C2-B146-B55F-21A9505F4994}" presName="conn2-1" presStyleLbl="parChTrans1D4" presStyleIdx="29" presStyleCnt="53"/>
+      <dgm:prSet presAssocID="{074D98B8-B5C2-B146-B55F-21A9505F4994}" presName="conn2-1" presStyleLbl="parChTrans1D4" presStyleIdx="30" presStyleCnt="54"/>
       <dgm:spPr/>
     </dgm:pt>
     <dgm:pt modelId="{42039CC0-63F7-F24E-99BE-507AD122C4A6}" type="pres">
-      <dgm:prSet presAssocID="{074D98B8-B5C2-B146-B55F-21A9505F4994}" presName="connTx" presStyleLbl="parChTrans1D4" presStyleIdx="29" presStyleCnt="53"/>
+      <dgm:prSet presAssocID="{074D98B8-B5C2-B146-B55F-21A9505F4994}" presName="connTx" presStyleLbl="parChTrans1D4" presStyleIdx="30" presStyleCnt="54"/>
       <dgm:spPr/>
     </dgm:pt>
     <dgm:pt modelId="{E1D6F75D-5D8D-4A43-9AD9-B6051EE89439}" type="pres">
@@ -4369,7 +4419,7 @@
       <dgm:spPr/>
     </dgm:pt>
     <dgm:pt modelId="{B371D0DB-D4F9-F54E-B9CA-FAFBC9F2E03D}" type="pres">
-      <dgm:prSet presAssocID="{8E4E75CB-8ECD-5946-9B34-A0BF488DBE97}" presName="LevelTwoTextNode" presStyleLbl="node4" presStyleIdx="29" presStyleCnt="53">
+      <dgm:prSet presAssocID="{8E4E75CB-8ECD-5946-9B34-A0BF488DBE97}" presName="LevelTwoTextNode" presStyleLbl="node4" presStyleIdx="30" presStyleCnt="54">
         <dgm:presLayoutVars>
           <dgm:chPref val="3"/>
         </dgm:presLayoutVars>
@@ -4381,11 +4431,11 @@
       <dgm:spPr/>
     </dgm:pt>
     <dgm:pt modelId="{2D1E9B71-E05F-414C-9C94-D01927894E96}" type="pres">
-      <dgm:prSet presAssocID="{60A94D8F-EC8A-CA43-AC88-34395F8CC022}" presName="conn2-1" presStyleLbl="parChTrans1D4" presStyleIdx="30" presStyleCnt="53"/>
+      <dgm:prSet presAssocID="{60A94D8F-EC8A-CA43-AC88-34395F8CC022}" presName="conn2-1" presStyleLbl="parChTrans1D4" presStyleIdx="31" presStyleCnt="54"/>
       <dgm:spPr/>
     </dgm:pt>
     <dgm:pt modelId="{DF081D17-BB5A-8841-8B93-BD4D83616D20}" type="pres">
-      <dgm:prSet presAssocID="{60A94D8F-EC8A-CA43-AC88-34395F8CC022}" presName="connTx" presStyleLbl="parChTrans1D4" presStyleIdx="30" presStyleCnt="53"/>
+      <dgm:prSet presAssocID="{60A94D8F-EC8A-CA43-AC88-34395F8CC022}" presName="connTx" presStyleLbl="parChTrans1D4" presStyleIdx="31" presStyleCnt="54"/>
       <dgm:spPr/>
     </dgm:pt>
     <dgm:pt modelId="{2184EBE1-C0CA-CF4A-9AAA-18BF18AE5881}" type="pres">
@@ -4393,7 +4443,7 @@
       <dgm:spPr/>
     </dgm:pt>
     <dgm:pt modelId="{F46DFD37-2A53-3145-8804-1FE00FF9EE35}" type="pres">
-      <dgm:prSet presAssocID="{018C868C-7E88-1341-95C7-A4A040A901F0}" presName="LevelTwoTextNode" presStyleLbl="node4" presStyleIdx="30" presStyleCnt="53" custScaleY="495305" custLinFactY="-95897" custLinFactNeighborX="-7733" custLinFactNeighborY="-100000">
+      <dgm:prSet presAssocID="{018C868C-7E88-1341-95C7-A4A040A901F0}" presName="LevelTwoTextNode" presStyleLbl="node4" presStyleIdx="31" presStyleCnt="54" custScaleY="495305" custLinFactY="-95897" custLinFactNeighborX="-7733" custLinFactNeighborY="-100000">
         <dgm:presLayoutVars>
           <dgm:chPref val="3"/>
         </dgm:presLayoutVars>
@@ -4405,11 +4455,11 @@
       <dgm:spPr/>
     </dgm:pt>
     <dgm:pt modelId="{869EE02D-617D-B44A-B5B1-15C6745F808C}" type="pres">
-      <dgm:prSet presAssocID="{AC34A3B1-F415-024F-B362-364031611F5C}" presName="conn2-1" presStyleLbl="parChTrans1D4" presStyleIdx="31" presStyleCnt="53"/>
+      <dgm:prSet presAssocID="{AC34A3B1-F415-024F-B362-364031611F5C}" presName="conn2-1" presStyleLbl="parChTrans1D4" presStyleIdx="32" presStyleCnt="54"/>
       <dgm:spPr/>
     </dgm:pt>
     <dgm:pt modelId="{15390832-3CB7-A648-B93F-B9552C39E0C7}" type="pres">
-      <dgm:prSet presAssocID="{AC34A3B1-F415-024F-B362-364031611F5C}" presName="connTx" presStyleLbl="parChTrans1D4" presStyleIdx="31" presStyleCnt="53"/>
+      <dgm:prSet presAssocID="{AC34A3B1-F415-024F-B362-364031611F5C}" presName="connTx" presStyleLbl="parChTrans1D4" presStyleIdx="32" presStyleCnt="54"/>
       <dgm:spPr/>
     </dgm:pt>
     <dgm:pt modelId="{1AF0473B-AA8E-214D-93A2-63C6C783545F}" type="pres">
@@ -4417,7 +4467,7 @@
       <dgm:spPr/>
     </dgm:pt>
     <dgm:pt modelId="{BC80C050-C05C-EE4F-8A85-26778F146866}" type="pres">
-      <dgm:prSet presAssocID="{144CAF6C-11F4-4A45-A27E-911591B0011B}" presName="LevelTwoTextNode" presStyleLbl="node4" presStyleIdx="31" presStyleCnt="53" custScaleX="456449" custScaleY="75856" custLinFactY="-8105" custLinFactNeighborX="69485" custLinFactNeighborY="-100000">
+      <dgm:prSet presAssocID="{144CAF6C-11F4-4A45-A27E-911591B0011B}" presName="LevelTwoTextNode" presStyleLbl="node4" presStyleIdx="32" presStyleCnt="54" custScaleX="456449" custScaleY="75856" custLinFactY="-8105" custLinFactNeighborX="69485" custLinFactNeighborY="-100000">
         <dgm:presLayoutVars>
           <dgm:chPref val="3"/>
         </dgm:presLayoutVars>
@@ -4429,11 +4479,11 @@
       <dgm:spPr/>
     </dgm:pt>
     <dgm:pt modelId="{6720575C-1BAC-0144-BC7F-01F88A777532}" type="pres">
-      <dgm:prSet presAssocID="{F8C66127-9041-504C-B84A-E6CE4A67BFEF}" presName="conn2-1" presStyleLbl="parChTrans1D4" presStyleIdx="32" presStyleCnt="53"/>
+      <dgm:prSet presAssocID="{F8C66127-9041-504C-B84A-E6CE4A67BFEF}" presName="conn2-1" presStyleLbl="parChTrans1D4" presStyleIdx="33" presStyleCnt="54"/>
       <dgm:spPr/>
     </dgm:pt>
     <dgm:pt modelId="{BFFD3F83-879B-344E-9F97-BBFA92EBA5A1}" type="pres">
-      <dgm:prSet presAssocID="{F8C66127-9041-504C-B84A-E6CE4A67BFEF}" presName="connTx" presStyleLbl="parChTrans1D4" presStyleIdx="32" presStyleCnt="53"/>
+      <dgm:prSet presAssocID="{F8C66127-9041-504C-B84A-E6CE4A67BFEF}" presName="connTx" presStyleLbl="parChTrans1D4" presStyleIdx="33" presStyleCnt="54"/>
       <dgm:spPr/>
     </dgm:pt>
     <dgm:pt modelId="{28F8F523-F5B1-3548-AEA4-6A99D9B09239}" type="pres">
@@ -4441,7 +4491,7 @@
       <dgm:spPr/>
     </dgm:pt>
     <dgm:pt modelId="{D54C132A-9E8C-C649-BA54-66D04BA9F9D2}" type="pres">
-      <dgm:prSet presAssocID="{F0968169-2C1A-DA4D-AB54-B2821E5D2EC9}" presName="LevelTwoTextNode" presStyleLbl="node4" presStyleIdx="32" presStyleCnt="53" custScaleX="520955" custLinFactNeighborX="-22466" custLinFactNeighborY="-95631">
+      <dgm:prSet presAssocID="{F0968169-2C1A-DA4D-AB54-B2821E5D2EC9}" presName="LevelTwoTextNode" presStyleLbl="node4" presStyleIdx="33" presStyleCnt="54" custScaleX="520955" custLinFactNeighborX="-22466" custLinFactNeighborY="-95631">
         <dgm:presLayoutVars>
           <dgm:chPref val="3"/>
         </dgm:presLayoutVars>
@@ -4501,11 +4551,11 @@
       <dgm:spPr/>
     </dgm:pt>
     <dgm:pt modelId="{22F37B2C-0144-4B42-B610-EDE869332C91}" type="pres">
-      <dgm:prSet presAssocID="{A0A81C7A-A077-E44D-9674-817A7E10C553}" presName="conn2-1" presStyleLbl="parChTrans1D4" presStyleIdx="33" presStyleCnt="53"/>
+      <dgm:prSet presAssocID="{A0A81C7A-A077-E44D-9674-817A7E10C553}" presName="conn2-1" presStyleLbl="parChTrans1D4" presStyleIdx="34" presStyleCnt="54"/>
       <dgm:spPr/>
     </dgm:pt>
     <dgm:pt modelId="{3A7EA8F2-16F7-6D4B-B19E-6E24918EA42B}" type="pres">
-      <dgm:prSet presAssocID="{A0A81C7A-A077-E44D-9674-817A7E10C553}" presName="connTx" presStyleLbl="parChTrans1D4" presStyleIdx="33" presStyleCnt="53"/>
+      <dgm:prSet presAssocID="{A0A81C7A-A077-E44D-9674-817A7E10C553}" presName="connTx" presStyleLbl="parChTrans1D4" presStyleIdx="34" presStyleCnt="54"/>
       <dgm:spPr/>
     </dgm:pt>
     <dgm:pt modelId="{84E57F8A-7884-7447-990E-1633FF21CF70}" type="pres">
@@ -4513,7 +4563,7 @@
       <dgm:spPr/>
     </dgm:pt>
     <dgm:pt modelId="{DA5BF4BB-05E1-0E46-B48F-BE2DEE98665B}" type="pres">
-      <dgm:prSet presAssocID="{503724C0-4DC0-614D-A895-CD9721E0505E}" presName="LevelTwoTextNode" presStyleLbl="node4" presStyleIdx="33" presStyleCnt="53" custLinFactY="-100000" custLinFactNeighborX="-3070" custLinFactNeighborY="-145618">
+      <dgm:prSet presAssocID="{503724C0-4DC0-614D-A895-CD9721E0505E}" presName="LevelTwoTextNode" presStyleLbl="node4" presStyleIdx="34" presStyleCnt="54" custLinFactY="-100000" custLinFactNeighborX="-3070" custLinFactNeighborY="-145618">
         <dgm:presLayoutVars>
           <dgm:chPref val="3"/>
         </dgm:presLayoutVars>
@@ -4525,11 +4575,11 @@
       <dgm:spPr/>
     </dgm:pt>
     <dgm:pt modelId="{622CDB72-9FE3-E446-8D99-51F2FE63E17B}" type="pres">
-      <dgm:prSet presAssocID="{02BB8850-2D09-3B41-BEE2-0D51EE7AAAE4}" presName="conn2-1" presStyleLbl="parChTrans1D4" presStyleIdx="34" presStyleCnt="53"/>
+      <dgm:prSet presAssocID="{02BB8850-2D09-3B41-BEE2-0D51EE7AAAE4}" presName="conn2-1" presStyleLbl="parChTrans1D4" presStyleIdx="35" presStyleCnt="54"/>
       <dgm:spPr/>
     </dgm:pt>
     <dgm:pt modelId="{999F5CA8-9E6C-F741-B72D-1CBCFB0A9AFA}" type="pres">
-      <dgm:prSet presAssocID="{02BB8850-2D09-3B41-BEE2-0D51EE7AAAE4}" presName="connTx" presStyleLbl="parChTrans1D4" presStyleIdx="34" presStyleCnt="53"/>
+      <dgm:prSet presAssocID="{02BB8850-2D09-3B41-BEE2-0D51EE7AAAE4}" presName="connTx" presStyleLbl="parChTrans1D4" presStyleIdx="35" presStyleCnt="54"/>
       <dgm:spPr/>
     </dgm:pt>
     <dgm:pt modelId="{C54DEB9E-51D0-3540-92C2-4820C63F494E}" type="pres">
@@ -4537,7 +4587,7 @@
       <dgm:spPr/>
     </dgm:pt>
     <dgm:pt modelId="{64730E10-34D9-EB40-9A15-71653BD55138}" type="pres">
-      <dgm:prSet presAssocID="{B0AB63BB-9919-1E4C-AFFD-8279A2D23113}" presName="LevelTwoTextNode" presStyleLbl="node4" presStyleIdx="34" presStyleCnt="53" custScaleY="461077" custLinFactY="-15962" custLinFactNeighborX="-6012" custLinFactNeighborY="-100000">
+      <dgm:prSet presAssocID="{B0AB63BB-9919-1E4C-AFFD-8279A2D23113}" presName="LevelTwoTextNode" presStyleLbl="node4" presStyleIdx="35" presStyleCnt="54" custScaleY="461077" custLinFactY="-15962" custLinFactNeighborX="-6012" custLinFactNeighborY="-100000">
         <dgm:presLayoutVars>
           <dgm:chPref val="3"/>
         </dgm:presLayoutVars>
@@ -4549,11 +4599,11 @@
       <dgm:spPr/>
     </dgm:pt>
     <dgm:pt modelId="{AE527926-7596-084F-836D-CE44E210925D}" type="pres">
-      <dgm:prSet presAssocID="{64AC65DF-19E6-0F4E-A1E6-DCD2D506B56A}" presName="conn2-1" presStyleLbl="parChTrans1D4" presStyleIdx="35" presStyleCnt="53"/>
+      <dgm:prSet presAssocID="{64AC65DF-19E6-0F4E-A1E6-DCD2D506B56A}" presName="conn2-1" presStyleLbl="parChTrans1D4" presStyleIdx="36" presStyleCnt="54"/>
       <dgm:spPr/>
     </dgm:pt>
     <dgm:pt modelId="{E20C8D68-D800-1B40-A349-E4C52EEA6DBB}" type="pres">
-      <dgm:prSet presAssocID="{64AC65DF-19E6-0F4E-A1E6-DCD2D506B56A}" presName="connTx" presStyleLbl="parChTrans1D4" presStyleIdx="35" presStyleCnt="53"/>
+      <dgm:prSet presAssocID="{64AC65DF-19E6-0F4E-A1E6-DCD2D506B56A}" presName="connTx" presStyleLbl="parChTrans1D4" presStyleIdx="36" presStyleCnt="54"/>
       <dgm:spPr/>
     </dgm:pt>
     <dgm:pt modelId="{8D15DFB1-6BB6-264C-97B2-E08857AECF60}" type="pres">
@@ -4561,7 +4611,7 @@
       <dgm:spPr/>
     </dgm:pt>
     <dgm:pt modelId="{1AC5AEE2-E726-6949-8FEB-26946D8A5549}" type="pres">
-      <dgm:prSet presAssocID="{75B42418-0B78-E744-853C-EAC114FC3471}" presName="LevelTwoTextNode" presStyleLbl="node4" presStyleIdx="35" presStyleCnt="53" custScaleY="354680" custLinFactY="-8847" custLinFactNeighborX="-6050" custLinFactNeighborY="-100000">
+      <dgm:prSet presAssocID="{75B42418-0B78-E744-853C-EAC114FC3471}" presName="LevelTwoTextNode" presStyleLbl="node4" presStyleIdx="36" presStyleCnt="54" custScaleY="354680" custLinFactY="-8847" custLinFactNeighborX="-6050" custLinFactNeighborY="-100000">
         <dgm:presLayoutVars>
           <dgm:chPref val="3"/>
         </dgm:presLayoutVars>
@@ -4573,11 +4623,11 @@
       <dgm:spPr/>
     </dgm:pt>
     <dgm:pt modelId="{0B37985A-F439-1845-B8DC-86E79F8066D1}" type="pres">
-      <dgm:prSet presAssocID="{E7021709-E071-B94E-B8AA-7E8AB290C85B}" presName="conn2-1" presStyleLbl="parChTrans1D4" presStyleIdx="36" presStyleCnt="53"/>
+      <dgm:prSet presAssocID="{E7021709-E071-B94E-B8AA-7E8AB290C85B}" presName="conn2-1" presStyleLbl="parChTrans1D4" presStyleIdx="37" presStyleCnt="54"/>
       <dgm:spPr/>
     </dgm:pt>
     <dgm:pt modelId="{89D62D01-044A-5E49-BF87-E08569D899ED}" type="pres">
-      <dgm:prSet presAssocID="{E7021709-E071-B94E-B8AA-7E8AB290C85B}" presName="connTx" presStyleLbl="parChTrans1D4" presStyleIdx="36" presStyleCnt="53"/>
+      <dgm:prSet presAssocID="{E7021709-E071-B94E-B8AA-7E8AB290C85B}" presName="connTx" presStyleLbl="parChTrans1D4" presStyleIdx="37" presStyleCnt="54"/>
       <dgm:spPr/>
     </dgm:pt>
     <dgm:pt modelId="{066E29CF-6128-0648-B8F7-1B6E27951783}" type="pres">
@@ -4585,7 +4635,7 @@
       <dgm:spPr/>
     </dgm:pt>
     <dgm:pt modelId="{D6692AF1-A2BC-EF40-9178-4475E39B2EF6}" type="pres">
-      <dgm:prSet presAssocID="{4ECB8E11-E0AC-184C-86D0-7D6C5E4DB6BE}" presName="LevelTwoTextNode" presStyleLbl="node4" presStyleIdx="36" presStyleCnt="53">
+      <dgm:prSet presAssocID="{4ECB8E11-E0AC-184C-86D0-7D6C5E4DB6BE}" presName="LevelTwoTextNode" presStyleLbl="node4" presStyleIdx="37" presStyleCnt="54">
         <dgm:presLayoutVars>
           <dgm:chPref val="3"/>
         </dgm:presLayoutVars>
@@ -4597,11 +4647,11 @@
       <dgm:spPr/>
     </dgm:pt>
     <dgm:pt modelId="{6C711774-F7B9-7448-AFA4-AA549455F4F8}" type="pres">
-      <dgm:prSet presAssocID="{1E5F3203-0DED-6643-9C6B-FD536231F97A}" presName="conn2-1" presStyleLbl="parChTrans1D4" presStyleIdx="37" presStyleCnt="53"/>
+      <dgm:prSet presAssocID="{1E5F3203-0DED-6643-9C6B-FD536231F97A}" presName="conn2-1" presStyleLbl="parChTrans1D4" presStyleIdx="38" presStyleCnt="54"/>
       <dgm:spPr/>
     </dgm:pt>
     <dgm:pt modelId="{B8FA6677-848E-B341-89B2-AB26EA8F8983}" type="pres">
-      <dgm:prSet presAssocID="{1E5F3203-0DED-6643-9C6B-FD536231F97A}" presName="connTx" presStyleLbl="parChTrans1D4" presStyleIdx="37" presStyleCnt="53"/>
+      <dgm:prSet presAssocID="{1E5F3203-0DED-6643-9C6B-FD536231F97A}" presName="connTx" presStyleLbl="parChTrans1D4" presStyleIdx="38" presStyleCnt="54"/>
       <dgm:spPr/>
     </dgm:pt>
     <dgm:pt modelId="{43856134-03E5-A14E-A8FE-D4291140F40F}" type="pres">
@@ -4609,7 +4659,7 @@
       <dgm:spPr/>
     </dgm:pt>
     <dgm:pt modelId="{B8C27370-6C50-BC4C-B96A-F7009FCE9B29}" type="pres">
-      <dgm:prSet presAssocID="{F846C330-0900-864C-AFE7-47A6B1C94F7A}" presName="LevelTwoTextNode" presStyleLbl="node4" presStyleIdx="37" presStyleCnt="53" custScaleX="190925" custScaleY="430213">
+      <dgm:prSet presAssocID="{F846C330-0900-864C-AFE7-47A6B1C94F7A}" presName="LevelTwoTextNode" presStyleLbl="node4" presStyleIdx="38" presStyleCnt="54" custScaleX="190925" custScaleY="430213">
         <dgm:presLayoutVars>
           <dgm:chPref val="3"/>
         </dgm:presLayoutVars>
@@ -4621,11 +4671,11 @@
       <dgm:spPr/>
     </dgm:pt>
     <dgm:pt modelId="{CDF88616-E8B3-974C-B110-36BD4AC3B825}" type="pres">
-      <dgm:prSet presAssocID="{E652B916-7C94-A442-94DD-868984C90584}" presName="conn2-1" presStyleLbl="parChTrans1D4" presStyleIdx="38" presStyleCnt="53"/>
+      <dgm:prSet presAssocID="{E652B916-7C94-A442-94DD-868984C90584}" presName="conn2-1" presStyleLbl="parChTrans1D4" presStyleIdx="39" presStyleCnt="54"/>
       <dgm:spPr/>
     </dgm:pt>
     <dgm:pt modelId="{6A216B04-6334-174E-8CE0-43440AFADB3F}" type="pres">
-      <dgm:prSet presAssocID="{E652B916-7C94-A442-94DD-868984C90584}" presName="connTx" presStyleLbl="parChTrans1D4" presStyleIdx="38" presStyleCnt="53"/>
+      <dgm:prSet presAssocID="{E652B916-7C94-A442-94DD-868984C90584}" presName="connTx" presStyleLbl="parChTrans1D4" presStyleIdx="39" presStyleCnt="54"/>
       <dgm:spPr/>
     </dgm:pt>
     <dgm:pt modelId="{CC3E32CD-2A44-6A45-A849-8BC305DB350A}" type="pres">
@@ -4633,7 +4683,7 @@
       <dgm:spPr/>
     </dgm:pt>
     <dgm:pt modelId="{4CBA9568-78F6-874F-BAE1-422DBB36998B}" type="pres">
-      <dgm:prSet presAssocID="{490DDFD4-19FA-8A41-8884-FA94CEB7FC79}" presName="LevelTwoTextNode" presStyleLbl="node4" presStyleIdx="38" presStyleCnt="53" custLinFactNeighborX="-4849" custLinFactNeighborY="-96974">
+      <dgm:prSet presAssocID="{490DDFD4-19FA-8A41-8884-FA94CEB7FC79}" presName="LevelTwoTextNode" presStyleLbl="node4" presStyleIdx="39" presStyleCnt="54" custLinFactNeighborX="-4849" custLinFactNeighborY="-96974">
         <dgm:presLayoutVars>
           <dgm:chPref val="3"/>
         </dgm:presLayoutVars>
@@ -4645,11 +4695,11 @@
       <dgm:spPr/>
     </dgm:pt>
     <dgm:pt modelId="{178DCFF1-CC55-904C-80A7-201C4962CD0C}" type="pres">
-      <dgm:prSet presAssocID="{85DFC1C0-544D-1E49-A2B5-A5044611C851}" presName="conn2-1" presStyleLbl="parChTrans1D4" presStyleIdx="39" presStyleCnt="53"/>
+      <dgm:prSet presAssocID="{85DFC1C0-544D-1E49-A2B5-A5044611C851}" presName="conn2-1" presStyleLbl="parChTrans1D4" presStyleIdx="40" presStyleCnt="54"/>
       <dgm:spPr/>
     </dgm:pt>
     <dgm:pt modelId="{188FEBA0-2EEA-BF48-BFFD-9861C935AD27}" type="pres">
-      <dgm:prSet presAssocID="{85DFC1C0-544D-1E49-A2B5-A5044611C851}" presName="connTx" presStyleLbl="parChTrans1D4" presStyleIdx="39" presStyleCnt="53"/>
+      <dgm:prSet presAssocID="{85DFC1C0-544D-1E49-A2B5-A5044611C851}" presName="connTx" presStyleLbl="parChTrans1D4" presStyleIdx="40" presStyleCnt="54"/>
       <dgm:spPr/>
     </dgm:pt>
     <dgm:pt modelId="{47110B4E-EB42-BA47-957D-4C32AAE3E1AE}" type="pres">
@@ -4657,7 +4707,7 @@
       <dgm:spPr/>
     </dgm:pt>
     <dgm:pt modelId="{E82A36AA-0C9C-1243-965F-505DB32A7A7C}" type="pres">
-      <dgm:prSet presAssocID="{4428AE58-F45E-9F41-8B2F-A830CD04C877}" presName="LevelTwoTextNode" presStyleLbl="node4" presStyleIdx="39" presStyleCnt="53" custScaleX="99018" custScaleY="226097">
+      <dgm:prSet presAssocID="{4428AE58-F45E-9F41-8B2F-A830CD04C877}" presName="LevelTwoTextNode" presStyleLbl="node4" presStyleIdx="40" presStyleCnt="54" custScaleX="99018" custScaleY="226097">
         <dgm:presLayoutVars>
           <dgm:chPref val="3"/>
         </dgm:presLayoutVars>
@@ -4669,11 +4719,11 @@
       <dgm:spPr/>
     </dgm:pt>
     <dgm:pt modelId="{F6FDF62A-4F89-A044-8B79-891849B97CC4}" type="pres">
-      <dgm:prSet presAssocID="{473AEA83-E48D-2743-8B8D-2B43A8D4B519}" presName="conn2-1" presStyleLbl="parChTrans1D4" presStyleIdx="40" presStyleCnt="53"/>
+      <dgm:prSet presAssocID="{473AEA83-E48D-2743-8B8D-2B43A8D4B519}" presName="conn2-1" presStyleLbl="parChTrans1D4" presStyleIdx="41" presStyleCnt="54"/>
       <dgm:spPr/>
     </dgm:pt>
     <dgm:pt modelId="{41B3D365-4B97-A64F-B00F-8B4601200E94}" type="pres">
-      <dgm:prSet presAssocID="{473AEA83-E48D-2743-8B8D-2B43A8D4B519}" presName="connTx" presStyleLbl="parChTrans1D4" presStyleIdx="40" presStyleCnt="53"/>
+      <dgm:prSet presAssocID="{473AEA83-E48D-2743-8B8D-2B43A8D4B519}" presName="connTx" presStyleLbl="parChTrans1D4" presStyleIdx="41" presStyleCnt="54"/>
       <dgm:spPr/>
     </dgm:pt>
     <dgm:pt modelId="{9A82C880-6A7D-9742-A14A-486B5C72D281}" type="pres">
@@ -4681,7 +4731,7 @@
       <dgm:spPr/>
     </dgm:pt>
     <dgm:pt modelId="{5B9880E6-BA2C-2E4D-838B-9DD0423AE609}" type="pres">
-      <dgm:prSet presAssocID="{A6728F54-B1E3-494A-9F16-51DE271822AC}" presName="LevelTwoTextNode" presStyleLbl="node4" presStyleIdx="40" presStyleCnt="53">
+      <dgm:prSet presAssocID="{A6728F54-B1E3-494A-9F16-51DE271822AC}" presName="LevelTwoTextNode" presStyleLbl="node4" presStyleIdx="41" presStyleCnt="54">
         <dgm:presLayoutVars>
           <dgm:chPref val="3"/>
         </dgm:presLayoutVars>
@@ -4693,11 +4743,11 @@
       <dgm:spPr/>
     </dgm:pt>
     <dgm:pt modelId="{1A3852B0-3C08-8346-B30F-DB387753D752}" type="pres">
-      <dgm:prSet presAssocID="{2EE738A1-A1A7-EC4D-BDD6-0DF0DCF2A2FE}" presName="conn2-1" presStyleLbl="parChTrans1D4" presStyleIdx="41" presStyleCnt="53"/>
+      <dgm:prSet presAssocID="{2EE738A1-A1A7-EC4D-BDD6-0DF0DCF2A2FE}" presName="conn2-1" presStyleLbl="parChTrans1D4" presStyleIdx="42" presStyleCnt="54"/>
       <dgm:spPr/>
     </dgm:pt>
     <dgm:pt modelId="{41A60FF1-F20F-0448-80F5-03D17D8A4922}" type="pres">
-      <dgm:prSet presAssocID="{2EE738A1-A1A7-EC4D-BDD6-0DF0DCF2A2FE}" presName="connTx" presStyleLbl="parChTrans1D4" presStyleIdx="41" presStyleCnt="53"/>
+      <dgm:prSet presAssocID="{2EE738A1-A1A7-EC4D-BDD6-0DF0DCF2A2FE}" presName="connTx" presStyleLbl="parChTrans1D4" presStyleIdx="42" presStyleCnt="54"/>
       <dgm:spPr/>
     </dgm:pt>
     <dgm:pt modelId="{BBCAC040-E2DB-AB4A-8AF0-10C15525D014}" type="pres">
@@ -4705,7 +4755,7 @@
       <dgm:spPr/>
     </dgm:pt>
     <dgm:pt modelId="{225564EB-75DD-F042-994E-EC3A2D54F08F}" type="pres">
-      <dgm:prSet presAssocID="{4EA8F41C-77E3-EF4B-8115-4F46241C5879}" presName="LevelTwoTextNode" presStyleLbl="node4" presStyleIdx="41" presStyleCnt="53" custLinFactY="-35974" custLinFactNeighborX="-35840" custLinFactNeighborY="-100000">
+      <dgm:prSet presAssocID="{4EA8F41C-77E3-EF4B-8115-4F46241C5879}" presName="LevelTwoTextNode" presStyleLbl="node4" presStyleIdx="42" presStyleCnt="54" custLinFactY="-35974" custLinFactNeighborX="-35840" custLinFactNeighborY="-100000">
         <dgm:presLayoutVars>
           <dgm:chPref val="3"/>
         </dgm:presLayoutVars>
@@ -4717,11 +4767,11 @@
       <dgm:spPr/>
     </dgm:pt>
     <dgm:pt modelId="{A5B33E4E-336A-0B40-8C52-A2221287F345}" type="pres">
-      <dgm:prSet presAssocID="{B6C94DEE-A1F0-8F4F-9468-AE18F379FBD4}" presName="conn2-1" presStyleLbl="parChTrans1D4" presStyleIdx="42" presStyleCnt="53"/>
+      <dgm:prSet presAssocID="{B6C94DEE-A1F0-8F4F-9468-AE18F379FBD4}" presName="conn2-1" presStyleLbl="parChTrans1D4" presStyleIdx="43" presStyleCnt="54"/>
       <dgm:spPr/>
     </dgm:pt>
     <dgm:pt modelId="{BE34ED06-A23A-F749-8104-B508C9262FDE}" type="pres">
-      <dgm:prSet presAssocID="{B6C94DEE-A1F0-8F4F-9468-AE18F379FBD4}" presName="connTx" presStyleLbl="parChTrans1D4" presStyleIdx="42" presStyleCnt="53"/>
+      <dgm:prSet presAssocID="{B6C94DEE-A1F0-8F4F-9468-AE18F379FBD4}" presName="connTx" presStyleLbl="parChTrans1D4" presStyleIdx="43" presStyleCnt="54"/>
       <dgm:spPr/>
     </dgm:pt>
     <dgm:pt modelId="{985744FB-7BAB-1A44-9722-4113A2C373BD}" type="pres">
@@ -4729,7 +4779,7 @@
       <dgm:spPr/>
     </dgm:pt>
     <dgm:pt modelId="{07354C4D-1110-8245-ACDF-A7DFEEBFD7F3}" type="pres">
-      <dgm:prSet presAssocID="{E6CFDD7F-DAE3-1B45-9BB9-A83A4751734A}" presName="LevelTwoTextNode" presStyleLbl="node4" presStyleIdx="42" presStyleCnt="53" custLinFactNeighborX="7447" custLinFactNeighborY="-59019">
+      <dgm:prSet presAssocID="{E6CFDD7F-DAE3-1B45-9BB9-A83A4751734A}" presName="LevelTwoTextNode" presStyleLbl="node4" presStyleIdx="43" presStyleCnt="54" custLinFactNeighborX="7447" custLinFactNeighborY="-59019">
         <dgm:presLayoutVars>
           <dgm:chPref val="3"/>
         </dgm:presLayoutVars>
@@ -4741,11 +4791,11 @@
       <dgm:spPr/>
     </dgm:pt>
     <dgm:pt modelId="{5230EDD4-2155-4C4B-9D01-61125A45B27E}" type="pres">
-      <dgm:prSet presAssocID="{7208B522-2B5D-3849-868F-9EC270B7FB7F}" presName="conn2-1" presStyleLbl="parChTrans1D4" presStyleIdx="43" presStyleCnt="53"/>
+      <dgm:prSet presAssocID="{7208B522-2B5D-3849-868F-9EC270B7FB7F}" presName="conn2-1" presStyleLbl="parChTrans1D4" presStyleIdx="44" presStyleCnt="54"/>
       <dgm:spPr/>
     </dgm:pt>
     <dgm:pt modelId="{062A7194-78C8-F943-A247-3B3F469D7F62}" type="pres">
-      <dgm:prSet presAssocID="{7208B522-2B5D-3849-868F-9EC270B7FB7F}" presName="connTx" presStyleLbl="parChTrans1D4" presStyleIdx="43" presStyleCnt="53"/>
+      <dgm:prSet presAssocID="{7208B522-2B5D-3849-868F-9EC270B7FB7F}" presName="connTx" presStyleLbl="parChTrans1D4" presStyleIdx="44" presStyleCnt="54"/>
       <dgm:spPr/>
     </dgm:pt>
     <dgm:pt modelId="{68685D26-F45A-0249-8C44-58A68F4E8E41}" type="pres">
@@ -4753,7 +4803,7 @@
       <dgm:spPr/>
     </dgm:pt>
     <dgm:pt modelId="{74606542-DF75-9244-9F75-2B19D3C6F8C9}" type="pres">
-      <dgm:prSet presAssocID="{9086BAEE-F952-EA4B-9CE3-C10B8AA8DE51}" presName="LevelTwoTextNode" presStyleLbl="node4" presStyleIdx="43" presStyleCnt="53">
+      <dgm:prSet presAssocID="{9086BAEE-F952-EA4B-9CE3-C10B8AA8DE51}" presName="LevelTwoTextNode" presStyleLbl="node4" presStyleIdx="44" presStyleCnt="54">
         <dgm:presLayoutVars>
           <dgm:chPref val="3"/>
         </dgm:presLayoutVars>
@@ -4765,11 +4815,11 @@
       <dgm:spPr/>
     </dgm:pt>
     <dgm:pt modelId="{2C48A912-7C0B-D34F-8BCD-E79759DED104}" type="pres">
-      <dgm:prSet presAssocID="{059199F1-FACB-424A-BC60-4F36514A7088}" presName="conn2-1" presStyleLbl="parChTrans1D4" presStyleIdx="44" presStyleCnt="53"/>
+      <dgm:prSet presAssocID="{059199F1-FACB-424A-BC60-4F36514A7088}" presName="conn2-1" presStyleLbl="parChTrans1D4" presStyleIdx="45" presStyleCnt="54"/>
       <dgm:spPr/>
     </dgm:pt>
     <dgm:pt modelId="{3C75570A-8614-8C43-96B0-36C4AA3C4F70}" type="pres">
-      <dgm:prSet presAssocID="{059199F1-FACB-424A-BC60-4F36514A7088}" presName="connTx" presStyleLbl="parChTrans1D4" presStyleIdx="44" presStyleCnt="53"/>
+      <dgm:prSet presAssocID="{059199F1-FACB-424A-BC60-4F36514A7088}" presName="connTx" presStyleLbl="parChTrans1D4" presStyleIdx="45" presStyleCnt="54"/>
       <dgm:spPr/>
     </dgm:pt>
     <dgm:pt modelId="{B6CD3AB0-EB80-754C-8255-700DE8BD8608}" type="pres">
@@ -4777,7 +4827,7 @@
       <dgm:spPr/>
     </dgm:pt>
     <dgm:pt modelId="{19E436B0-A0B1-4242-BFBA-BB12B5B5F574}" type="pres">
-      <dgm:prSet presAssocID="{53F4F2E1-85A6-0544-8CB0-CF4F62FAD169}" presName="LevelTwoTextNode" presStyleLbl="node4" presStyleIdx="44" presStyleCnt="53" custLinFactNeighborX="-1914" custLinFactNeighborY="50465">
+      <dgm:prSet presAssocID="{53F4F2E1-85A6-0544-8CB0-CF4F62FAD169}" presName="LevelTwoTextNode" presStyleLbl="node4" presStyleIdx="45" presStyleCnt="54" custLinFactNeighborX="-1914" custLinFactNeighborY="50465">
         <dgm:presLayoutVars>
           <dgm:chPref val="3"/>
         </dgm:presLayoutVars>
@@ -4789,11 +4839,11 @@
       <dgm:spPr/>
     </dgm:pt>
     <dgm:pt modelId="{1EB97A9B-9DB3-9746-B7CA-25A9127E658D}" type="pres">
-      <dgm:prSet presAssocID="{C88F80E9-D72C-FE40-A234-5BCA8DA5BF97}" presName="conn2-1" presStyleLbl="parChTrans1D4" presStyleIdx="45" presStyleCnt="53"/>
+      <dgm:prSet presAssocID="{C88F80E9-D72C-FE40-A234-5BCA8DA5BF97}" presName="conn2-1" presStyleLbl="parChTrans1D4" presStyleIdx="46" presStyleCnt="54"/>
       <dgm:spPr/>
     </dgm:pt>
     <dgm:pt modelId="{5BDCA2FD-50B3-DD41-B739-4C6FB692068F}" type="pres">
-      <dgm:prSet presAssocID="{C88F80E9-D72C-FE40-A234-5BCA8DA5BF97}" presName="connTx" presStyleLbl="parChTrans1D4" presStyleIdx="45" presStyleCnt="53"/>
+      <dgm:prSet presAssocID="{C88F80E9-D72C-FE40-A234-5BCA8DA5BF97}" presName="connTx" presStyleLbl="parChTrans1D4" presStyleIdx="46" presStyleCnt="54"/>
       <dgm:spPr/>
     </dgm:pt>
     <dgm:pt modelId="{1A766636-ACA3-5343-8F20-EA71F3F235B2}" type="pres">
@@ -4801,7 +4851,7 @@
       <dgm:spPr/>
     </dgm:pt>
     <dgm:pt modelId="{EE1464C4-316F-E04B-8F78-14DC107A8C10}" type="pres">
-      <dgm:prSet presAssocID="{1D127EAA-B7A9-414C-8B63-A85FAAA8474B}" presName="LevelTwoTextNode" presStyleLbl="node4" presStyleIdx="45" presStyleCnt="53" custLinFactNeighborX="-19358" custLinFactNeighborY="65762">
+      <dgm:prSet presAssocID="{1D127EAA-B7A9-414C-8B63-A85FAAA8474B}" presName="LevelTwoTextNode" presStyleLbl="node4" presStyleIdx="46" presStyleCnt="54" custLinFactNeighborX="-19358" custLinFactNeighborY="65762">
         <dgm:presLayoutVars>
           <dgm:chPref val="3"/>
         </dgm:presLayoutVars>
@@ -4813,11 +4863,11 @@
       <dgm:spPr/>
     </dgm:pt>
     <dgm:pt modelId="{BFED5B89-8694-FF4F-9CB3-2BB9C40DD18B}" type="pres">
-      <dgm:prSet presAssocID="{0BA4C58A-447C-8A41-A46B-B6EC1E557052}" presName="conn2-1" presStyleLbl="parChTrans1D4" presStyleIdx="46" presStyleCnt="53"/>
+      <dgm:prSet presAssocID="{0BA4C58A-447C-8A41-A46B-B6EC1E557052}" presName="conn2-1" presStyleLbl="parChTrans1D4" presStyleIdx="47" presStyleCnt="54"/>
       <dgm:spPr/>
     </dgm:pt>
     <dgm:pt modelId="{B814019D-DF4F-304F-8975-6C097F6D3E30}" type="pres">
-      <dgm:prSet presAssocID="{0BA4C58A-447C-8A41-A46B-B6EC1E557052}" presName="connTx" presStyleLbl="parChTrans1D4" presStyleIdx="46" presStyleCnt="53"/>
+      <dgm:prSet presAssocID="{0BA4C58A-447C-8A41-A46B-B6EC1E557052}" presName="connTx" presStyleLbl="parChTrans1D4" presStyleIdx="47" presStyleCnt="54"/>
       <dgm:spPr/>
     </dgm:pt>
     <dgm:pt modelId="{C3B2522B-FEE8-7541-8BCE-20AEEEF84FA9}" type="pres">
@@ -4825,7 +4875,7 @@
       <dgm:spPr/>
     </dgm:pt>
     <dgm:pt modelId="{CB80B394-5FA1-F64A-8C46-262DC0EAFF0C}" type="pres">
-      <dgm:prSet presAssocID="{DB23E341-40FA-6743-A94A-2845D3A63174}" presName="LevelTwoTextNode" presStyleLbl="node4" presStyleIdx="46" presStyleCnt="53" custScaleX="150604" custScaleY="226474" custLinFactY="33969" custLinFactNeighborX="-5006" custLinFactNeighborY="100000">
+      <dgm:prSet presAssocID="{DB23E341-40FA-6743-A94A-2845D3A63174}" presName="LevelTwoTextNode" presStyleLbl="node4" presStyleIdx="47" presStyleCnt="54" custScaleX="150604" custScaleY="226474" custLinFactY="33969" custLinFactNeighborX="-5006" custLinFactNeighborY="100000">
         <dgm:presLayoutVars>
           <dgm:chPref val="3"/>
         </dgm:presLayoutVars>
@@ -4837,11 +4887,11 @@
       <dgm:spPr/>
     </dgm:pt>
     <dgm:pt modelId="{9D8B8718-1219-3340-BF7B-D6462FA11EE9}" type="pres">
-      <dgm:prSet presAssocID="{26628364-25FD-7748-B852-E2423190B99C}" presName="conn2-1" presStyleLbl="parChTrans1D4" presStyleIdx="47" presStyleCnt="53"/>
+      <dgm:prSet presAssocID="{26628364-25FD-7748-B852-E2423190B99C}" presName="conn2-1" presStyleLbl="parChTrans1D4" presStyleIdx="48" presStyleCnt="54"/>
       <dgm:spPr/>
     </dgm:pt>
     <dgm:pt modelId="{61440551-8B50-B440-BAAC-4ACBEC254999}" type="pres">
-      <dgm:prSet presAssocID="{26628364-25FD-7748-B852-E2423190B99C}" presName="connTx" presStyleLbl="parChTrans1D4" presStyleIdx="47" presStyleCnt="53"/>
+      <dgm:prSet presAssocID="{26628364-25FD-7748-B852-E2423190B99C}" presName="connTx" presStyleLbl="parChTrans1D4" presStyleIdx="48" presStyleCnt="54"/>
       <dgm:spPr/>
     </dgm:pt>
     <dgm:pt modelId="{40220438-574A-934A-B52A-D4C09F85442C}" type="pres">
@@ -4849,7 +4899,7 @@
       <dgm:spPr/>
     </dgm:pt>
     <dgm:pt modelId="{2AE2315F-57A1-0141-ABF0-D00525BED9D7}" type="pres">
-      <dgm:prSet presAssocID="{41B2A725-728B-E444-BC64-82E7AAFB531F}" presName="LevelTwoTextNode" presStyleLbl="node4" presStyleIdx="47" presStyleCnt="53" custLinFactY="100000" custLinFactNeighborX="57021" custLinFactNeighborY="143559">
+      <dgm:prSet presAssocID="{41B2A725-728B-E444-BC64-82E7AAFB531F}" presName="LevelTwoTextNode" presStyleLbl="node4" presStyleIdx="48" presStyleCnt="54" custLinFactY="100000" custLinFactNeighborX="57021" custLinFactNeighborY="143559">
         <dgm:presLayoutVars>
           <dgm:chPref val="3"/>
         </dgm:presLayoutVars>
@@ -4861,11 +4911,11 @@
       <dgm:spPr/>
     </dgm:pt>
     <dgm:pt modelId="{F43BDDDF-1CEF-A047-B3B4-F67711ADE7A9}" type="pres">
-      <dgm:prSet presAssocID="{72F39106-3957-544D-AB86-65E8EFCE07A3}" presName="conn2-1" presStyleLbl="parChTrans1D4" presStyleIdx="48" presStyleCnt="53"/>
+      <dgm:prSet presAssocID="{72F39106-3957-544D-AB86-65E8EFCE07A3}" presName="conn2-1" presStyleLbl="parChTrans1D4" presStyleIdx="49" presStyleCnt="54"/>
       <dgm:spPr/>
     </dgm:pt>
     <dgm:pt modelId="{B8131463-CBB7-BD48-AC92-13CAB2DC079F}" type="pres">
-      <dgm:prSet presAssocID="{72F39106-3957-544D-AB86-65E8EFCE07A3}" presName="connTx" presStyleLbl="parChTrans1D4" presStyleIdx="48" presStyleCnt="53"/>
+      <dgm:prSet presAssocID="{72F39106-3957-544D-AB86-65E8EFCE07A3}" presName="connTx" presStyleLbl="parChTrans1D4" presStyleIdx="49" presStyleCnt="54"/>
       <dgm:spPr/>
     </dgm:pt>
     <dgm:pt modelId="{2DD5DBEC-061A-F846-B506-540124A97D51}" type="pres">
@@ -4873,7 +4923,7 @@
       <dgm:spPr/>
     </dgm:pt>
     <dgm:pt modelId="{D6F167D2-280C-2549-A642-C1FAA099010E}" type="pres">
-      <dgm:prSet presAssocID="{B9E28FDD-16EB-F74E-9AD7-49CA7C1D6C6D}" presName="LevelTwoTextNode" presStyleLbl="node4" presStyleIdx="48" presStyleCnt="53" custLinFactNeighborX="53335" custLinFactNeighborY="563">
+      <dgm:prSet presAssocID="{B9E28FDD-16EB-F74E-9AD7-49CA7C1D6C6D}" presName="LevelTwoTextNode" presStyleLbl="node4" presStyleIdx="49" presStyleCnt="54" custLinFactNeighborX="53335" custLinFactNeighborY="563">
         <dgm:presLayoutVars>
           <dgm:chPref val="3"/>
         </dgm:presLayoutVars>
@@ -4885,11 +4935,11 @@
       <dgm:spPr/>
     </dgm:pt>
     <dgm:pt modelId="{F97F2B5C-A310-FE4C-A812-DB282E261D0A}" type="pres">
-      <dgm:prSet presAssocID="{276ECC95-5CB2-9F47-BBC9-1F15D08915F6}" presName="conn2-1" presStyleLbl="parChTrans1D4" presStyleIdx="49" presStyleCnt="53"/>
+      <dgm:prSet presAssocID="{276ECC95-5CB2-9F47-BBC9-1F15D08915F6}" presName="conn2-1" presStyleLbl="parChTrans1D4" presStyleIdx="50" presStyleCnt="54"/>
       <dgm:spPr/>
     </dgm:pt>
     <dgm:pt modelId="{1A5A45C4-44F9-B14B-8DA5-D65DFB02E004}" type="pres">
-      <dgm:prSet presAssocID="{276ECC95-5CB2-9F47-BBC9-1F15D08915F6}" presName="connTx" presStyleLbl="parChTrans1D4" presStyleIdx="49" presStyleCnt="53"/>
+      <dgm:prSet presAssocID="{276ECC95-5CB2-9F47-BBC9-1F15D08915F6}" presName="connTx" presStyleLbl="parChTrans1D4" presStyleIdx="50" presStyleCnt="54"/>
       <dgm:spPr/>
     </dgm:pt>
     <dgm:pt modelId="{39F7DEB9-7822-E542-83AE-1253A185C07F}" type="pres">
@@ -4897,7 +4947,7 @@
       <dgm:spPr/>
     </dgm:pt>
     <dgm:pt modelId="{6D8ECEBA-B209-6749-B193-A8A22E6346C1}" type="pres">
-      <dgm:prSet presAssocID="{53EA4913-126A-244C-BD5D-7B52A63521C9}" presName="LevelTwoTextNode" presStyleLbl="node4" presStyleIdx="49" presStyleCnt="53" custLinFactY="-47494" custLinFactNeighborX="-6413" custLinFactNeighborY="-100000">
+      <dgm:prSet presAssocID="{53EA4913-126A-244C-BD5D-7B52A63521C9}" presName="LevelTwoTextNode" presStyleLbl="node4" presStyleIdx="50" presStyleCnt="54" custLinFactY="-47494" custLinFactNeighborX="-6413" custLinFactNeighborY="-100000">
         <dgm:presLayoutVars>
           <dgm:chPref val="3"/>
         </dgm:presLayoutVars>
@@ -4909,11 +4959,11 @@
       <dgm:spPr/>
     </dgm:pt>
     <dgm:pt modelId="{C5DF0D25-D767-8B42-BF93-5162DFF05855}" type="pres">
-      <dgm:prSet presAssocID="{813B1D9A-25C7-DF46-8C94-0BBAC6292275}" presName="conn2-1" presStyleLbl="parChTrans1D4" presStyleIdx="50" presStyleCnt="53"/>
+      <dgm:prSet presAssocID="{813B1D9A-25C7-DF46-8C94-0BBAC6292275}" presName="conn2-1" presStyleLbl="parChTrans1D4" presStyleIdx="51" presStyleCnt="54"/>
       <dgm:spPr/>
     </dgm:pt>
     <dgm:pt modelId="{3ADF03C0-B77F-EF41-BE57-79DF4D231738}" type="pres">
-      <dgm:prSet presAssocID="{813B1D9A-25C7-DF46-8C94-0BBAC6292275}" presName="connTx" presStyleLbl="parChTrans1D4" presStyleIdx="50" presStyleCnt="53"/>
+      <dgm:prSet presAssocID="{813B1D9A-25C7-DF46-8C94-0BBAC6292275}" presName="connTx" presStyleLbl="parChTrans1D4" presStyleIdx="51" presStyleCnt="54"/>
       <dgm:spPr/>
     </dgm:pt>
     <dgm:pt modelId="{0AA4E00B-8AE2-6F48-A1E1-39B09B4D9A17}" type="pres">
@@ -4921,7 +4971,7 @@
       <dgm:spPr/>
     </dgm:pt>
     <dgm:pt modelId="{95415AAC-B97B-3E4C-95D1-E26D4A47F854}" type="pres">
-      <dgm:prSet presAssocID="{C3CCA1E9-342B-1B46-82BF-85B68CA8D3EF}" presName="LevelTwoTextNode" presStyleLbl="node4" presStyleIdx="50" presStyleCnt="53" custScaleX="393998" custScaleY="157528" custLinFactX="-52652" custLinFactNeighborX="-100000" custLinFactNeighborY="50922">
+      <dgm:prSet presAssocID="{C3CCA1E9-342B-1B46-82BF-85B68CA8D3EF}" presName="LevelTwoTextNode" presStyleLbl="node4" presStyleIdx="51" presStyleCnt="54" custScaleX="393998" custScaleY="157528" custLinFactX="-52652" custLinFactNeighborX="-100000" custLinFactNeighborY="50922">
         <dgm:presLayoutVars>
           <dgm:chPref val="3"/>
         </dgm:presLayoutVars>
@@ -4957,11 +5007,11 @@
       <dgm:spPr/>
     </dgm:pt>
     <dgm:pt modelId="{AFFBA743-03F7-5F4C-8E88-C1E1454AED05}" type="pres">
-      <dgm:prSet presAssocID="{E709B3A6-6ADF-C64F-8A7C-41FF2B111220}" presName="conn2-1" presStyleLbl="parChTrans1D4" presStyleIdx="51" presStyleCnt="53"/>
+      <dgm:prSet presAssocID="{E709B3A6-6ADF-C64F-8A7C-41FF2B111220}" presName="conn2-1" presStyleLbl="parChTrans1D4" presStyleIdx="52" presStyleCnt="54"/>
       <dgm:spPr/>
     </dgm:pt>
     <dgm:pt modelId="{10FFB18E-4AFA-344C-9BC1-AD34B4676854}" type="pres">
-      <dgm:prSet presAssocID="{E709B3A6-6ADF-C64F-8A7C-41FF2B111220}" presName="connTx" presStyleLbl="parChTrans1D4" presStyleIdx="51" presStyleCnt="53"/>
+      <dgm:prSet presAssocID="{E709B3A6-6ADF-C64F-8A7C-41FF2B111220}" presName="connTx" presStyleLbl="parChTrans1D4" presStyleIdx="52" presStyleCnt="54"/>
       <dgm:spPr/>
     </dgm:pt>
     <dgm:pt modelId="{39BCB3DC-885B-2441-A34B-335D8FC1992C}" type="pres">
@@ -4969,7 +5019,7 @@
       <dgm:spPr/>
     </dgm:pt>
     <dgm:pt modelId="{80107EDB-8FCD-2346-A353-02A87C9089DE}" type="pres">
-      <dgm:prSet presAssocID="{8CB9C1D1-1504-2247-A079-C10F1E47D2F9}" presName="LevelTwoTextNode" presStyleLbl="node4" presStyleIdx="51" presStyleCnt="53" custFlipHor="1" custScaleX="227969" custScaleY="325870" custLinFactY="-41890" custLinFactNeighborX="-20069" custLinFactNeighborY="-100000">
+      <dgm:prSet presAssocID="{8CB9C1D1-1504-2247-A079-C10F1E47D2F9}" presName="LevelTwoTextNode" presStyleLbl="node4" presStyleIdx="52" presStyleCnt="54" custFlipHor="1" custScaleX="227969" custScaleY="325870" custLinFactY="-41890" custLinFactNeighborX="-20069" custLinFactNeighborY="-100000">
         <dgm:presLayoutVars>
           <dgm:chPref val="3"/>
         </dgm:presLayoutVars>
@@ -4981,11 +5031,11 @@
       <dgm:spPr/>
     </dgm:pt>
     <dgm:pt modelId="{9B21400C-BC60-6743-A106-FEAA64B5ACA7}" type="pres">
-      <dgm:prSet presAssocID="{A0EAD666-74BC-3E49-9167-F107A8C9C557}" presName="conn2-1" presStyleLbl="parChTrans1D4" presStyleIdx="52" presStyleCnt="53"/>
+      <dgm:prSet presAssocID="{A0EAD666-74BC-3E49-9167-F107A8C9C557}" presName="conn2-1" presStyleLbl="parChTrans1D4" presStyleIdx="53" presStyleCnt="54"/>
       <dgm:spPr/>
     </dgm:pt>
     <dgm:pt modelId="{F55BCE5E-1DB2-264E-8E89-E7825D9D3A45}" type="pres">
-      <dgm:prSet presAssocID="{A0EAD666-74BC-3E49-9167-F107A8C9C557}" presName="connTx" presStyleLbl="parChTrans1D4" presStyleIdx="52" presStyleCnt="53"/>
+      <dgm:prSet presAssocID="{A0EAD666-74BC-3E49-9167-F107A8C9C557}" presName="connTx" presStyleLbl="parChTrans1D4" presStyleIdx="53" presStyleCnt="54"/>
       <dgm:spPr/>
     </dgm:pt>
     <dgm:pt modelId="{7F60B46B-B2A5-254A-9873-C072F7FA4725}" type="pres">
@@ -4993,7 +5043,7 @@
       <dgm:spPr/>
     </dgm:pt>
     <dgm:pt modelId="{4BB2793D-87B3-EF41-9A4F-7716D66373B1}" type="pres">
-      <dgm:prSet presAssocID="{52BD7005-F2C8-E24C-A657-999465ED806F}" presName="LevelTwoTextNode" presStyleLbl="node4" presStyleIdx="52" presStyleCnt="53" custScaleY="142606" custLinFactNeighborX="-23307" custLinFactNeighborY="-98591">
+      <dgm:prSet presAssocID="{52BD7005-F2C8-E24C-A657-999465ED806F}" presName="LevelTwoTextNode" presStyleLbl="node4" presStyleIdx="53" presStyleCnt="54" custScaleY="142606" custLinFactNeighborX="-23307" custLinFactNeighborY="-98591">
         <dgm:presLayoutVars>
           <dgm:chPref val="3"/>
         </dgm:presLayoutVars>
@@ -5006,543 +5056,552 @@
     </dgm:pt>
   </dgm:ptLst>
   <dgm:cxnLst>
+    <dgm:cxn modelId="{2DFF2800-9B40-B043-8C96-F516EBBF7E2C}" type="presOf" srcId="{BBB0582E-A825-A24F-97CF-C5EE1D6155DA}" destId="{C1AD9849-C58B-0841-853D-61235BCF9197}" srcOrd="0" destOrd="0" presId="urn:microsoft.com/office/officeart/2005/8/layout/hierarchy2"/>
+    <dgm:cxn modelId="{96488400-B7E5-D243-A377-3307C446CEE2}" type="presOf" srcId="{4ECB8E11-E0AC-184C-86D0-7D6C5E4DB6BE}" destId="{D6692AF1-A2BC-EF40-9178-4475E39B2EF6}" srcOrd="0" destOrd="0" presId="urn:microsoft.com/office/officeart/2005/8/layout/hierarchy2"/>
     <dgm:cxn modelId="{7A546403-EE51-954A-AE64-C6C0EB570168}" srcId="{10F4BF1A-E0E8-5247-98A6-E82AA7A267C9}" destId="{7FCE5DCC-58C9-D741-9FAE-6CD0D5FD2F94}" srcOrd="1" destOrd="0" parTransId="{35D887D7-33BF-1949-B929-3C1A5F9EBA0E}" sibTransId="{E8B25BF8-4C9D-814D-9F9E-B072997BDA72}"/>
-    <dgm:cxn modelId="{B2DBF703-1F37-3C4E-8A9E-45999FB6C720}" type="presOf" srcId="{CD5A3357-FB5B-E644-82F7-D0F9608221E7}" destId="{DF2248CE-7D7C-5D4B-8277-D213DA6DD3EB}" srcOrd="0" destOrd="0" presId="urn:microsoft.com/office/officeart/2005/8/layout/hierarchy2"/>
-    <dgm:cxn modelId="{EF617304-F356-B44C-9118-090A938257D2}" type="presOf" srcId="{B9D6EB9F-5A0E-B94C-B310-2355C0FB920D}" destId="{82082EF3-F943-6040-8F27-9EE49BF77273}" srcOrd="1" destOrd="0" presId="urn:microsoft.com/office/officeart/2005/8/layout/hierarchy2"/>
+    <dgm:cxn modelId="{5369DE04-9DB9-A64E-9734-79BB7F850A41}" type="presOf" srcId="{A765A028-38A0-1747-9403-399C5667C12D}" destId="{5F1839EB-4F8F-774B-AED9-9D68D74DC9BF}" srcOrd="1" destOrd="0" presId="urn:microsoft.com/office/officeart/2005/8/layout/hierarchy2"/>
+    <dgm:cxn modelId="{6E977106-EF28-5142-978B-B85AEC4CDF48}" type="presOf" srcId="{059199F1-FACB-424A-BC60-4F36514A7088}" destId="{2C48A912-7C0B-D34F-8BCD-E79759DED104}" srcOrd="0" destOrd="0" presId="urn:microsoft.com/office/officeart/2005/8/layout/hierarchy2"/>
     <dgm:cxn modelId="{9BF6A707-BB10-5C43-8D2B-BBFC5A28BBB5}" srcId="{3ECA71C2-7B10-C24A-8256-9BBBEBA76CC4}" destId="{D852DDE2-48EC-C949-AD66-1E4551A9BBE8}" srcOrd="1" destOrd="0" parTransId="{C42AF61D-E72F-D440-86F7-95279F71EDF5}" sibTransId="{BEC3E3CE-2AB1-344C-B541-71D300831E6A}"/>
-    <dgm:cxn modelId="{7F286F08-629C-8C4A-9002-9D1569A1020B}" type="presOf" srcId="{6B79D810-F8DD-BC40-A9B1-5D821F1FBA6D}" destId="{020ECFE7-D082-9944-8AD2-DBD727F66CA5}" srcOrd="0" destOrd="0" presId="urn:microsoft.com/office/officeart/2005/8/layout/hierarchy2"/>
     <dgm:cxn modelId="{882BA108-CDE6-6E43-9341-CF3ED3E64EC3}" srcId="{75B42418-0B78-E744-853C-EAC114FC3471}" destId="{4ECB8E11-E0AC-184C-86D0-7D6C5E4DB6BE}" srcOrd="0" destOrd="0" parTransId="{E7021709-E071-B94E-B8AA-7E8AB290C85B}" sibTransId="{7853A0EA-1F94-4F47-8F56-E5B8DE380B04}"/>
-    <dgm:cxn modelId="{89E80209-E3F8-D942-BC29-12F82D822F51}" type="presOf" srcId="{074D98B8-B5C2-B146-B55F-21A9505F4994}" destId="{DD49C87D-B15D-704F-8833-A4B4C4143ED4}" srcOrd="0" destOrd="0" presId="urn:microsoft.com/office/officeart/2005/8/layout/hierarchy2"/>
-    <dgm:cxn modelId="{5A9F680A-7F6C-FE48-A6FF-C7F6AF7BB1B3}" type="presOf" srcId="{53EA4913-126A-244C-BD5D-7B52A63521C9}" destId="{6D8ECEBA-B209-6749-B193-A8A22E6346C1}" srcOrd="0" destOrd="0" presId="urn:microsoft.com/office/officeart/2005/8/layout/hierarchy2"/>
-    <dgm:cxn modelId="{011A860B-00FF-0240-B167-EC2B7C5F66C6}" type="presOf" srcId="{26628364-25FD-7748-B852-E2423190B99C}" destId="{61440551-8B50-B440-BAAC-4ACBEC254999}" srcOrd="1" destOrd="0" presId="urn:microsoft.com/office/officeart/2005/8/layout/hierarchy2"/>
-    <dgm:cxn modelId="{55B0C20B-C2F4-914F-A802-204BEB6F2E2A}" type="presOf" srcId="{837D2806-A598-914C-9E7E-530603CC9694}" destId="{973B5C1F-9A88-FA43-9797-E750A0514CF6}" srcOrd="0" destOrd="0" presId="urn:microsoft.com/office/officeart/2005/8/layout/hierarchy2"/>
-    <dgm:cxn modelId="{A9EB630C-132A-904E-96AA-7A040BED3557}" type="presOf" srcId="{B1F69F30-1C90-EE4E-9B90-76ECA483DE49}" destId="{0DFBADBC-4685-304B-87B0-BD0C0A75C57C}" srcOrd="1" destOrd="0" presId="urn:microsoft.com/office/officeart/2005/8/layout/hierarchy2"/>
-    <dgm:cxn modelId="{66CA1311-163C-644F-B8CF-F85F739E5E48}" type="presOf" srcId="{A765A028-38A0-1747-9403-399C5667C12D}" destId="{5F1839EB-4F8F-774B-AED9-9D68D74DC9BF}" srcOrd="1" destOrd="0" presId="urn:microsoft.com/office/officeart/2005/8/layout/hierarchy2"/>
-    <dgm:cxn modelId="{C256C111-2B2C-0445-8FC8-F7C8185DF787}" type="presOf" srcId="{E5C55A35-ED3B-F147-A326-B9256B7FAB23}" destId="{2915A037-971F-304E-9764-FAB284167672}" srcOrd="0" destOrd="0" presId="urn:microsoft.com/office/officeart/2005/8/layout/hierarchy2"/>
+    <dgm:cxn modelId="{9765D408-E1DF-4E41-B245-52EFEC8E56CF}" type="presOf" srcId="{A0A81C7A-A077-E44D-9674-817A7E10C553}" destId="{3A7EA8F2-16F7-6D4B-B19E-6E24918EA42B}" srcOrd="1" destOrd="0" presId="urn:microsoft.com/office/officeart/2005/8/layout/hierarchy2"/>
+    <dgm:cxn modelId="{99D56D09-40D1-A84E-9F27-CCC5E45A2802}" type="presOf" srcId="{A6728F54-B1E3-494A-9F16-51DE271822AC}" destId="{5B9880E6-BA2C-2E4D-838B-9DD0423AE609}" srcOrd="0" destOrd="0" presId="urn:microsoft.com/office/officeart/2005/8/layout/hierarchy2"/>
+    <dgm:cxn modelId="{66F52F0B-92F5-4D4B-9569-5157AE60EA96}" type="presOf" srcId="{99B9F1DD-A4C8-824C-8A75-F8555EA0A282}" destId="{6D61A4E9-20E0-724F-8506-4AF9CF093D61}" srcOrd="0" destOrd="0" presId="urn:microsoft.com/office/officeart/2005/8/layout/hierarchy2"/>
+    <dgm:cxn modelId="{A0F1F30B-D6C8-C64D-AC25-55D2F4169CC9}" type="presOf" srcId="{A8ADB7F8-470C-734E-B971-8E83D18BAA41}" destId="{3455402C-0615-5140-883D-2091BEC57060}" srcOrd="1" destOrd="0" presId="urn:microsoft.com/office/officeart/2005/8/layout/hierarchy2"/>
+    <dgm:cxn modelId="{6D15760D-9368-4545-85F0-52C515819E79}" type="presOf" srcId="{4A13B86B-A1BF-F54F-9C92-2FA2F42AAD36}" destId="{8B4760E7-4D8A-8B41-A8D7-171FBE42BA05}" srcOrd="0" destOrd="0" presId="urn:microsoft.com/office/officeart/2005/8/layout/hierarchy2"/>
+    <dgm:cxn modelId="{A0B0650F-508A-F242-BB59-870212D73759}" type="presOf" srcId="{C42AF61D-E72F-D440-86F7-95279F71EDF5}" destId="{AE09F7FF-7720-0E4F-A409-200B111906F7}" srcOrd="0" destOrd="0" presId="urn:microsoft.com/office/officeart/2005/8/layout/hierarchy2"/>
+    <dgm:cxn modelId="{204EE10F-0E47-B141-9FD2-CD148184168A}" type="presOf" srcId="{8CB9C1D1-1504-2247-A079-C10F1E47D2F9}" destId="{80107EDB-8FCD-2346-A353-02A87C9089DE}" srcOrd="0" destOrd="0" presId="urn:microsoft.com/office/officeart/2005/8/layout/hierarchy2"/>
+    <dgm:cxn modelId="{215F7C11-AAD7-4F4B-8A41-84EC25438A6D}" type="presOf" srcId="{E38F7A21-DD2B-5241-87A5-82A96C564D58}" destId="{37DEF7A6-F983-8642-9B6E-B3CCE7EA354A}" srcOrd="0" destOrd="0" presId="urn:microsoft.com/office/officeart/2005/8/layout/hierarchy2"/>
+    <dgm:cxn modelId="{0B34AD11-3F48-C54E-AABE-8FFC9E18FA6F}" type="presOf" srcId="{F46CFE8E-B9D8-1F43-BAE5-C0EBA300E1AE}" destId="{01AE4A20-5465-E046-9D6A-4C2689ECEBB2}" srcOrd="0" destOrd="0" presId="urn:microsoft.com/office/officeart/2005/8/layout/hierarchy2"/>
     <dgm:cxn modelId="{4981C411-3FEF-1F41-A5E5-2EB142338E17}" srcId="{ADE03602-EDA6-E54F-944C-C5A5CD460E25}" destId="{BBB0582E-A825-A24F-97CF-C5EE1D6155DA}" srcOrd="1" destOrd="0" parTransId="{37687930-03B2-6149-8735-77877F9E8006}" sibTransId="{10FDF4C9-68F5-C74B-BB0F-875AB5945679}"/>
     <dgm:cxn modelId="{03A89712-B207-DF47-AB30-4D897ACB1F66}" srcId="{A6728F54-B1E3-494A-9F16-51DE271822AC}" destId="{4EA8F41C-77E3-EF4B-8115-4F46241C5879}" srcOrd="0" destOrd="0" parTransId="{2EE738A1-A1A7-EC4D-BDD6-0DF0DCF2A2FE}" sibTransId="{FC5D20FB-2669-FC45-841D-14951727F97A}"/>
-    <dgm:cxn modelId="{3492F712-7E88-D040-B0E6-D87A9FAE3D7B}" type="presOf" srcId="{4FBF82B5-C669-CA4C-A43F-FC7BB5DF2751}" destId="{A4EEFD49-E628-3740-A93E-6D11E409D24D}" srcOrd="1" destOrd="0" presId="urn:microsoft.com/office/officeart/2005/8/layout/hierarchy2"/>
-    <dgm:cxn modelId="{3F706413-7170-3647-84E8-AEB34675B1EB}" type="presOf" srcId="{276ECC95-5CB2-9F47-BBC9-1F15D08915F6}" destId="{F97F2B5C-A310-FE4C-A812-DB282E261D0A}" srcOrd="0" destOrd="0" presId="urn:microsoft.com/office/officeart/2005/8/layout/hierarchy2"/>
     <dgm:cxn modelId="{C5C9BF13-881F-7942-B1CC-7E575EB9DD88}" srcId="{ADE03602-EDA6-E54F-944C-C5A5CD460E25}" destId="{C878F5E1-AD43-1948-A44A-CFB976113450}" srcOrd="0" destOrd="0" parTransId="{B1F69F30-1C90-EE4E-9B90-76ECA483DE49}" sibTransId="{E6D8CBA0-24E0-BC46-AB1C-97609F259F1E}"/>
-    <dgm:cxn modelId="{295AD813-78F9-B04E-AA73-D5F7A5E3C21E}" type="presOf" srcId="{E38F7A21-DD2B-5241-87A5-82A96C564D58}" destId="{37DEF7A6-F983-8642-9B6E-B3CCE7EA354A}" srcOrd="0" destOrd="0" presId="urn:microsoft.com/office/officeart/2005/8/layout/hierarchy2"/>
-    <dgm:cxn modelId="{00645A15-7B95-A84F-9116-FAE49CE35E55}" type="presOf" srcId="{50A98565-4DA9-C14B-9F93-63779A96F28A}" destId="{1530674F-400B-AA4E-BAF1-41A723567EF5}" srcOrd="0" destOrd="0" presId="urn:microsoft.com/office/officeart/2005/8/layout/hierarchy2"/>
-    <dgm:cxn modelId="{A9979715-B626-0444-B6DD-AC3D42DEEC9E}" type="presOf" srcId="{144CAF6C-11F4-4A45-A27E-911591B0011B}" destId="{BC80C050-C05C-EE4F-8A85-26778F146866}" srcOrd="0" destOrd="0" presId="urn:microsoft.com/office/officeart/2005/8/layout/hierarchy2"/>
-    <dgm:cxn modelId="{478F7E17-02C4-D14E-AC7A-FC21FA1906CA}" type="presOf" srcId="{CDC15278-99AA-3E4F-831E-5A7AD3E5E1FE}" destId="{0904125F-8547-564B-8B1D-703FF6EDB6C9}" srcOrd="0" destOrd="0" presId="urn:microsoft.com/office/officeart/2005/8/layout/hierarchy2"/>
+    <dgm:cxn modelId="{AF20B615-BC79-0449-9373-11D8264E6051}" type="presOf" srcId="{813B1D9A-25C7-DF46-8C94-0BBAC6292275}" destId="{C5DF0D25-D767-8B42-BF93-5162DFF05855}" srcOrd="0" destOrd="0" presId="urn:microsoft.com/office/officeart/2005/8/layout/hierarchy2"/>
+    <dgm:cxn modelId="{9D82BD16-4A6D-7741-BF59-1773D23AA6D6}" type="presOf" srcId="{DEC33D82-86DE-144B-A01C-CB3C301AB057}" destId="{F2F73D55-5C37-CD44-BC1E-CDBC3CD0F101}" srcOrd="0" destOrd="0" presId="urn:microsoft.com/office/officeart/2005/8/layout/hierarchy2"/>
+    <dgm:cxn modelId="{A1D9A019-C44A-4C4E-AB85-8FEDA3E76024}" type="presOf" srcId="{D67B605D-1D92-354B-A719-EF56821C6E13}" destId="{6EB62837-1E38-C84D-ACB4-94B49AFC73CE}" srcOrd="0" destOrd="0" presId="urn:microsoft.com/office/officeart/2005/8/layout/hierarchy2"/>
     <dgm:cxn modelId="{E051431A-2930-244D-9CB7-D114E0C28C6D}" srcId="{434E16C0-9111-9A46-ABAF-8042E7E425A0}" destId="{B262C4D5-4CB3-B24D-AA92-A44ED0902194}" srcOrd="0" destOrd="0" parTransId="{182251B1-5437-8F47-809E-BCFE0BD3D911}" sibTransId="{504AF6C5-4049-2C43-91BC-6AC8DB51F6D8}"/>
-    <dgm:cxn modelId="{19DA671A-7F6D-7C47-BEF5-8A6119CF879A}" type="presOf" srcId="{B84B88EC-21E0-6348-9457-4C6CD50C8F83}" destId="{B0BA1A94-5289-E747-92C5-8031204115B7}" srcOrd="0" destOrd="0" presId="urn:microsoft.com/office/officeart/2005/8/layout/hierarchy2"/>
-    <dgm:cxn modelId="{036B7A1A-36FA-4842-BEE2-A94E6BDF2C65}" type="presOf" srcId="{9086BAEE-F952-EA4B-9CE3-C10B8AA8DE51}" destId="{74606542-DF75-9244-9F75-2B19D3C6F8C9}" srcOrd="0" destOrd="0" presId="urn:microsoft.com/office/officeart/2005/8/layout/hierarchy2"/>
-    <dgm:cxn modelId="{5949BD1A-ED15-DA45-8DF6-7EA36ACBEA01}" type="presOf" srcId="{53F4F2E1-85A6-0544-8CB0-CF4F62FAD169}" destId="{19E436B0-A0B1-4242-BFBA-BB12B5B5F574}" srcOrd="0" destOrd="0" presId="urn:microsoft.com/office/officeart/2005/8/layout/hierarchy2"/>
+    <dgm:cxn modelId="{03EBA51B-0083-5F4F-9B3C-42577FEB3FA0}" type="presOf" srcId="{4EA8F41C-77E3-EF4B-8115-4F46241C5879}" destId="{225564EB-75DD-F042-994E-EC3A2D54F08F}" srcOrd="0" destOrd="0" presId="urn:microsoft.com/office/officeart/2005/8/layout/hierarchy2"/>
+    <dgm:cxn modelId="{2133691C-B8DC-AF42-9396-46CF02AD53B9}" type="presOf" srcId="{2E1432B9-2340-7B4F-A4FB-3C8F85A920DA}" destId="{EAF5B26D-7BCE-5249-BEA2-027D32033BF5}" srcOrd="0" destOrd="0" presId="urn:microsoft.com/office/officeart/2005/8/layout/hierarchy2"/>
+    <dgm:cxn modelId="{02B33F1F-8F12-7E4D-A876-112CDCD6C6A3}" type="presOf" srcId="{A8ADB7F8-470C-734E-B971-8E83D18BAA41}" destId="{579EAB07-4F83-F743-9508-5D825E6D182C}" srcOrd="0" destOrd="0" presId="urn:microsoft.com/office/officeart/2005/8/layout/hierarchy2"/>
     <dgm:cxn modelId="{53255020-3737-144C-B74D-C2F7B4B6E292}" type="presOf" srcId="{DC3FA29B-C79A-184D-93E5-2555F2F344A6}" destId="{AAEAF223-4AC7-9243-834C-30AD905AC5ED}" srcOrd="0" destOrd="0" presId="urn:microsoft.com/office/officeart/2005/8/layout/hierarchy2"/>
+    <dgm:cxn modelId="{A5545A20-73F2-E14C-BC48-D525965561FE}" type="presOf" srcId="{069ACE56-904A-2546-AF9F-F8DFD1A5DA59}" destId="{C4443B60-ECB6-1343-A45F-07FEEC62928B}" srcOrd="1" destOrd="0" presId="urn:microsoft.com/office/officeart/2005/8/layout/hierarchy2"/>
+    <dgm:cxn modelId="{DA56CC23-48EE-B84D-8CD6-44A737F73B4F}" type="presOf" srcId="{2A1D79E9-5180-CD44-A6E4-DF75859017DD}" destId="{679B93C1-DE35-6440-84FA-556B81DC0458}" srcOrd="0" destOrd="0" presId="urn:microsoft.com/office/officeart/2005/8/layout/hierarchy2"/>
     <dgm:cxn modelId="{CEA9D324-FE99-9943-82FF-8645B3FB9D34}" srcId="{9086BAEE-F952-EA4B-9CE3-C10B8AA8DE51}" destId="{53F4F2E1-85A6-0544-8CB0-CF4F62FAD169}" srcOrd="0" destOrd="0" parTransId="{059199F1-FACB-424A-BC60-4F36514A7088}" sibTransId="{DBABB061-10A7-3440-A1D2-2C1F9ED7A69F}"/>
-    <dgm:cxn modelId="{A77C6029-5F7B-3C4A-9FD3-F7B54058F6DB}" type="presOf" srcId="{0BA4C58A-447C-8A41-A46B-B6EC1E557052}" destId="{B814019D-DF4F-304F-8975-6C097F6D3E30}" srcOrd="1" destOrd="0" presId="urn:microsoft.com/office/officeart/2005/8/layout/hierarchy2"/>
-    <dgm:cxn modelId="{852C532B-694C-E848-BB5D-6C567FF4C4CC}" type="presOf" srcId="{813B1D9A-25C7-DF46-8C94-0BBAC6292275}" destId="{C5DF0D25-D767-8B42-BF93-5162DFF05855}" srcOrd="0" destOrd="0" presId="urn:microsoft.com/office/officeart/2005/8/layout/hierarchy2"/>
-    <dgm:cxn modelId="{4017082C-82E3-564C-9BC3-B71B83B91482}" type="presOf" srcId="{55836E6C-FEC0-0A4F-9D46-6320613A632B}" destId="{ADC457D0-4675-8749-9954-B3A7E3C7E138}" srcOrd="1" destOrd="0" presId="urn:microsoft.com/office/officeart/2005/8/layout/hierarchy2"/>
-    <dgm:cxn modelId="{EE80A02C-E5DF-0C4D-B153-9EBC2D966050}" type="presOf" srcId="{89AA8F52-95A6-0A42-B8DB-917B4D349CF6}" destId="{39E3DC0E-53C8-5144-B0B1-07F4E7334A85}" srcOrd="0" destOrd="0" presId="urn:microsoft.com/office/officeart/2005/8/layout/hierarchy2"/>
-    <dgm:cxn modelId="{0B9E2F2D-7702-0040-AE69-94C0EAAF72CF}" type="presOf" srcId="{473AEA83-E48D-2743-8B8D-2B43A8D4B519}" destId="{F6FDF62A-4F89-A044-8B79-891849B97CC4}" srcOrd="0" destOrd="0" presId="urn:microsoft.com/office/officeart/2005/8/layout/hierarchy2"/>
-    <dgm:cxn modelId="{B4A83E2D-3808-6F4C-80DF-A260979BA278}" type="presOf" srcId="{30E67414-1EDC-E747-94E6-77002BE10CB6}" destId="{48C1939D-7F8F-224A-89D3-D240B4AD4863}" srcOrd="0" destOrd="0" presId="urn:microsoft.com/office/officeart/2005/8/layout/hierarchy2"/>
-    <dgm:cxn modelId="{3C90042E-21F4-374B-98C7-9B73A916E4B1}" type="presOf" srcId="{2EE738A1-A1A7-EC4D-BDD6-0DF0DCF2A2FE}" destId="{41A60FF1-F20F-0448-80F5-03D17D8A4922}" srcOrd="1" destOrd="0" presId="urn:microsoft.com/office/officeart/2005/8/layout/hierarchy2"/>
-    <dgm:cxn modelId="{F3B4512F-79E2-8448-A948-7FC63ED4CC40}" type="presOf" srcId="{B6C94DEE-A1F0-8F4F-9468-AE18F379FBD4}" destId="{BE34ED06-A23A-F749-8104-B508C9262FDE}" srcOrd="1" destOrd="0" presId="urn:microsoft.com/office/officeart/2005/8/layout/hierarchy2"/>
+    <dgm:cxn modelId="{B3BB8325-468C-D04F-A2B1-23035DEDE948}" type="presOf" srcId="{35D887D7-33BF-1949-B929-3C1A5F9EBA0E}" destId="{D7596022-8BF6-2F44-B88B-8E372A8354ED}" srcOrd="0" destOrd="0" presId="urn:microsoft.com/office/officeart/2005/8/layout/hierarchy2"/>
+    <dgm:cxn modelId="{FDF7F025-3E04-A649-B6EC-EB22B3C3B469}" type="presOf" srcId="{D06F829E-D606-FF46-A42D-A54189EDC959}" destId="{FBF4C144-F351-7546-9706-1D522BDDE758}" srcOrd="1" destOrd="0" presId="urn:microsoft.com/office/officeart/2005/8/layout/hierarchy2"/>
+    <dgm:cxn modelId="{1142FD26-F35F-5B46-A83D-1D1708AB3208}" type="presOf" srcId="{4428AE58-F45E-9F41-8B2F-A830CD04C877}" destId="{E82A36AA-0C9C-1243-965F-505DB32A7A7C}" srcOrd="0" destOrd="0" presId="urn:microsoft.com/office/officeart/2005/8/layout/hierarchy2"/>
+    <dgm:cxn modelId="{7C441B27-9B17-F84A-B5C6-FB5BEC213F39}" type="presOf" srcId="{4FBF82B5-C669-CA4C-A43F-FC7BB5DF2751}" destId="{D5E03AE9-CD36-1E45-8924-A89701186EA4}" srcOrd="0" destOrd="0" presId="urn:microsoft.com/office/officeart/2005/8/layout/hierarchy2"/>
+    <dgm:cxn modelId="{E685AB28-8AE8-8C46-B4B9-B7413BD9C542}" type="presOf" srcId="{FD3B25B1-A208-984D-9C0E-E986BA7CB932}" destId="{231E55CB-9002-9944-B177-034B990C250F}" srcOrd="1" destOrd="0" presId="urn:microsoft.com/office/officeart/2005/8/layout/hierarchy2"/>
+    <dgm:cxn modelId="{01C37329-644E-1F4D-AE0D-BFFAA3B8308C}" type="presOf" srcId="{018C868C-7E88-1341-95C7-A4A040A901F0}" destId="{F46DFD37-2A53-3145-8804-1FE00FF9EE35}" srcOrd="0" destOrd="0" presId="urn:microsoft.com/office/officeart/2005/8/layout/hierarchy2"/>
+    <dgm:cxn modelId="{FB11032B-D24F-2F4B-BBDA-914321EC8665}" type="presOf" srcId="{1E5F3203-0DED-6643-9C6B-FD536231F97A}" destId="{6C711774-F7B9-7448-AFA4-AA549455F4F8}" srcOrd="0" destOrd="0" presId="urn:microsoft.com/office/officeart/2005/8/layout/hierarchy2"/>
+    <dgm:cxn modelId="{06BE7C2C-C27E-5145-BE60-B0864C5E46CD}" type="presOf" srcId="{B9E28FDD-16EB-F74E-9AD7-49CA7C1D6C6D}" destId="{D6F167D2-280C-2549-A642-C1FAA099010E}" srcOrd="0" destOrd="0" presId="urn:microsoft.com/office/officeart/2005/8/layout/hierarchy2"/>
+    <dgm:cxn modelId="{B6C2962E-2ECC-2048-8E61-40C5B5183D33}" type="presOf" srcId="{182251B1-5437-8F47-809E-BCFE0BD3D911}" destId="{FF0504E2-FEC3-884B-B595-DCBAEFD33946}" srcOrd="0" destOrd="0" presId="urn:microsoft.com/office/officeart/2005/8/layout/hierarchy2"/>
     <dgm:cxn modelId="{BCBF3C30-13D6-F84E-95A3-F59EDE7E46DC}" srcId="{99B9F1DD-A4C8-824C-8A75-F8555EA0A282}" destId="{6B79D810-F8DD-BC40-A9B1-5D821F1FBA6D}" srcOrd="0" destOrd="0" parTransId="{4FBF82B5-C669-CA4C-A43F-FC7BB5DF2751}" sibTransId="{9575F654-C1C8-1B4A-9387-E2FAD15D9F7F}"/>
-    <dgm:cxn modelId="{DAB2B033-97E8-0A4F-9795-8D9FAE208C8E}" type="presOf" srcId="{C42AF61D-E72F-D440-86F7-95279F71EDF5}" destId="{C7F54069-F85F-C24F-B7E5-A79C8F7CF7A2}" srcOrd="1" destOrd="0" presId="urn:microsoft.com/office/officeart/2005/8/layout/hierarchy2"/>
-    <dgm:cxn modelId="{903C9F34-F010-484D-9DF0-CE4F863105D7}" type="presOf" srcId="{AC34A3B1-F415-024F-B362-364031611F5C}" destId="{869EE02D-617D-B44A-B5B1-15C6745F808C}" srcOrd="0" destOrd="0" presId="urn:microsoft.com/office/officeart/2005/8/layout/hierarchy2"/>
-    <dgm:cxn modelId="{B7D46936-07B4-3948-A24B-D3C72F77FD7D}" type="presOf" srcId="{6575138D-D60D-6742-BB52-DC29084B29E3}" destId="{340D38DE-40A2-C548-959C-EA21A68DC045}" srcOrd="1" destOrd="0" presId="urn:microsoft.com/office/officeart/2005/8/layout/hierarchy2"/>
-    <dgm:cxn modelId="{B3ABD236-4DFB-994B-8026-AFAFABFAC202}" type="presOf" srcId="{75B42418-0B78-E744-853C-EAC114FC3471}" destId="{1AC5AEE2-E726-6949-8FEB-26946D8A5549}" srcOrd="0" destOrd="0" presId="urn:microsoft.com/office/officeart/2005/8/layout/hierarchy2"/>
-    <dgm:cxn modelId="{0B58FB39-F9CC-2F4A-A070-AF70BB97DB6B}" type="presOf" srcId="{DB23E341-40FA-6743-A94A-2845D3A63174}" destId="{CB80B394-5FA1-F64A-8C46-262DC0EAFF0C}" srcOrd="0" destOrd="0" presId="urn:microsoft.com/office/officeart/2005/8/layout/hierarchy2"/>
-    <dgm:cxn modelId="{20444E3A-D1C2-404C-8E18-E0F718C32B5E}" type="presOf" srcId="{059199F1-FACB-424A-BC60-4F36514A7088}" destId="{3C75570A-8614-8C43-96B0-36C4AA3C4F70}" srcOrd="1" destOrd="0" presId="urn:microsoft.com/office/officeart/2005/8/layout/hierarchy2"/>
-    <dgm:cxn modelId="{274BD13B-712F-0C43-B85C-7B5A4E24D9CF}" type="presOf" srcId="{B743AEA8-216B-2E46-9601-0AD3641A5E9E}" destId="{4488718A-C95B-7B4D-8FA2-82EDC2308CB4}" srcOrd="1" destOrd="0" presId="urn:microsoft.com/office/officeart/2005/8/layout/hierarchy2"/>
+    <dgm:cxn modelId="{22413131-09AF-5845-9EE1-7483EA91FF62}" type="presOf" srcId="{074D98B8-B5C2-B146-B55F-21A9505F4994}" destId="{42039CC0-63F7-F24E-99BE-507AD122C4A6}" srcOrd="1" destOrd="0" presId="urn:microsoft.com/office/officeart/2005/8/layout/hierarchy2"/>
+    <dgm:cxn modelId="{B3653231-7D9D-AE44-B782-B81EFAE17A39}" type="presOf" srcId="{72F39106-3957-544D-AB86-65E8EFCE07A3}" destId="{B8131463-CBB7-BD48-AC92-13CAB2DC079F}" srcOrd="1" destOrd="0" presId="urn:microsoft.com/office/officeart/2005/8/layout/hierarchy2"/>
+    <dgm:cxn modelId="{60BC8931-C8DA-9B4E-81A6-4BD0EC5F5A54}" type="presOf" srcId="{1100FF0A-B281-C24B-933C-4A94BA74F661}" destId="{E1CC1DA7-E052-D145-8E3D-02E51BEAF7D1}" srcOrd="0" destOrd="0" presId="urn:microsoft.com/office/officeart/2005/8/layout/hierarchy2"/>
+    <dgm:cxn modelId="{7943C234-47BA-C348-AFE7-07EE2B84D45A}" type="presOf" srcId="{E6CFDD7F-DAE3-1B45-9BB9-A83A4751734A}" destId="{07354C4D-1110-8245-ACDF-A7DFEEBFD7F3}" srcOrd="0" destOrd="0" presId="urn:microsoft.com/office/officeart/2005/8/layout/hierarchy2"/>
+    <dgm:cxn modelId="{EF45DD35-4F3D-914C-8C60-5F0C6846D7C2}" type="presOf" srcId="{E652B916-7C94-A442-94DD-868984C90584}" destId="{CDF88616-E8B3-974C-B110-36BD4AC3B825}" srcOrd="0" destOrd="0" presId="urn:microsoft.com/office/officeart/2005/8/layout/hierarchy2"/>
+    <dgm:cxn modelId="{6386DC36-9116-DD4F-88FD-C437AD7B43E3}" type="presOf" srcId="{4A3BD0D8-5773-6C4C-A796-C027AC6F30B5}" destId="{B9DF7744-0386-3343-9BD2-F1987F5C2504}" srcOrd="1" destOrd="0" presId="urn:microsoft.com/office/officeart/2005/8/layout/hierarchy2"/>
+    <dgm:cxn modelId="{CF8B4D37-BEF1-E943-9988-5FDD6496D19B}" type="presOf" srcId="{A0EAD666-74BC-3E49-9167-F107A8C9C557}" destId="{F55BCE5E-1DB2-264E-8E89-E7825D9D3A45}" srcOrd="1" destOrd="0" presId="urn:microsoft.com/office/officeart/2005/8/layout/hierarchy2"/>
+    <dgm:cxn modelId="{A800C738-5A80-3A43-A3A2-3DCFAB99C04B}" type="presOf" srcId="{64AC65DF-19E6-0F4E-A1E6-DCD2D506B56A}" destId="{E20C8D68-D800-1B40-A349-E4C52EEA6DBB}" srcOrd="1" destOrd="0" presId="urn:microsoft.com/office/officeart/2005/8/layout/hierarchy2"/>
+    <dgm:cxn modelId="{A2EF3E3B-9BA2-6C4B-AD57-772B9D3A123D}" type="presOf" srcId="{41B2A725-728B-E444-BC64-82E7AAFB531F}" destId="{2AE2315F-57A1-0141-ABF0-D00525BED9D7}" srcOrd="0" destOrd="0" presId="urn:microsoft.com/office/officeart/2005/8/layout/hierarchy2"/>
     <dgm:cxn modelId="{5BDE883C-B584-C04C-9161-B2434208903B}" srcId="{9FF37F7A-1838-EB46-B9B6-3A9CF88DE34F}" destId="{0CC64CDE-03F3-5145-9992-9CBD8640F750}" srcOrd="1" destOrd="0" parTransId="{E38F7A21-DD2B-5241-87A5-82A96C564D58}" sibTransId="{FD5BB433-046C-8F4D-84C3-F9873146841B}"/>
-    <dgm:cxn modelId="{06E9363D-C80E-D34A-937E-8E22437E7E94}" type="presOf" srcId="{059199F1-FACB-424A-BC60-4F36514A7088}" destId="{2C48A912-7C0B-D34F-8BCD-E79759DED104}" srcOrd="0" destOrd="0" presId="urn:microsoft.com/office/officeart/2005/8/layout/hierarchy2"/>
-    <dgm:cxn modelId="{1968933D-7E7F-894F-8FA6-7A676A1B5BCB}" type="presOf" srcId="{CCEAFC7A-D65A-504C-A795-E458869A94AA}" destId="{514A0DE5-E2F7-1642-9C22-82D2271D99DD}" srcOrd="1" destOrd="0" presId="urn:microsoft.com/office/officeart/2005/8/layout/hierarchy2"/>
-    <dgm:cxn modelId="{C8580241-3992-914E-A6BE-B9A841F2EC1D}" type="presOf" srcId="{E7021709-E071-B94E-B8AA-7E8AB290C85B}" destId="{0B37985A-F439-1845-B8DC-86E79F8066D1}" srcOrd="0" destOrd="0" presId="urn:microsoft.com/office/officeart/2005/8/layout/hierarchy2"/>
+    <dgm:cxn modelId="{8E12203E-B306-CD47-B514-B7F6C0FEDBED}" type="presOf" srcId="{CCEAFC7A-D65A-504C-A795-E458869A94AA}" destId="{30C20B8D-B9DE-FC4A-A8FC-F855AACFD13C}" srcOrd="0" destOrd="0" presId="urn:microsoft.com/office/officeart/2005/8/layout/hierarchy2"/>
+    <dgm:cxn modelId="{59FE1240-1C23-1845-9307-3299C16C309C}" type="presOf" srcId="{75B42418-0B78-E744-853C-EAC114FC3471}" destId="{1AC5AEE2-E726-6949-8FEB-26946D8A5549}" srcOrd="0" destOrd="0" presId="urn:microsoft.com/office/officeart/2005/8/layout/hierarchy2"/>
+    <dgm:cxn modelId="{147C3C40-65A3-8946-886B-915655E9394F}" type="presOf" srcId="{30E67414-1EDC-E747-94E6-77002BE10CB6}" destId="{9D8B57B8-631C-FB43-A057-C6F4840439BB}" srcOrd="1" destOrd="0" presId="urn:microsoft.com/office/officeart/2005/8/layout/hierarchy2"/>
+    <dgm:cxn modelId="{07097E40-8DDA-E840-A255-67E4DA230B05}" type="presOf" srcId="{85DFC1C0-544D-1E49-A2B5-A5044611C851}" destId="{178DCFF1-CC55-904C-80A7-201C4962CD0C}" srcOrd="0" destOrd="0" presId="urn:microsoft.com/office/officeart/2005/8/layout/hierarchy2"/>
+    <dgm:cxn modelId="{3611DB40-D783-A94B-A73B-3940EBAC0CE8}" type="presOf" srcId="{72F39106-3957-544D-AB86-65E8EFCE07A3}" destId="{F43BDDDF-1CEF-A047-B3B4-F67711ADE7A9}" srcOrd="0" destOrd="0" presId="urn:microsoft.com/office/officeart/2005/8/layout/hierarchy2"/>
     <dgm:cxn modelId="{92833841-43CF-8547-B093-994ED29A0C36}" srcId="{F2515F6F-2FC4-6043-BE11-A587AFEA6F81}" destId="{50A98565-4DA9-C14B-9F93-63779A96F28A}" srcOrd="0" destOrd="0" parTransId="{FD3B25B1-A208-984D-9C0E-E986BA7CB932}" sibTransId="{FD8DEBCD-B2D1-6742-9942-E649503AD14A}"/>
-    <dgm:cxn modelId="{C9F6A941-1E29-1E41-83F6-57FD7E360024}" type="presOf" srcId="{F2515F6F-2FC4-6043-BE11-A587AFEA6F81}" destId="{FFFF1321-B119-DD44-91BC-A8BB725CB204}" srcOrd="0" destOrd="0" presId="urn:microsoft.com/office/officeart/2005/8/layout/hierarchy2"/>
-    <dgm:cxn modelId="{CFA2C042-63AA-9943-9AB9-70FAE301C405}" type="presOf" srcId="{37687930-03B2-6149-8735-77877F9E8006}" destId="{9F8B70A0-32E5-A14F-B6F2-42409C13EE93}" srcOrd="1" destOrd="0" presId="urn:microsoft.com/office/officeart/2005/8/layout/hierarchy2"/>
-    <dgm:cxn modelId="{65A82E44-0F3D-6546-9A7D-4F09EF63F61D}" type="presOf" srcId="{CB106D45-EF6B-A24A-B9D6-C5EBA4B563E2}" destId="{E08C38C7-38ED-BA4D-84A9-FF9D24B54B0A}" srcOrd="1" destOrd="0" presId="urn:microsoft.com/office/officeart/2005/8/layout/hierarchy2"/>
-    <dgm:cxn modelId="{CA13CF46-C48B-6448-B446-670E77E645FB}" type="presOf" srcId="{37687930-03B2-6149-8735-77877F9E8006}" destId="{B0460EF9-21D3-F84E-BBFA-46763C9AE876}" srcOrd="0" destOrd="0" presId="urn:microsoft.com/office/officeart/2005/8/layout/hierarchy2"/>
+    <dgm:cxn modelId="{604FB541-38D9-5A4B-8B54-78D2B827B685}" type="presOf" srcId="{FD3B25B1-A208-984D-9C0E-E986BA7CB932}" destId="{8C192C57-F760-C64F-93E5-9832B628B4B9}" srcOrd="0" destOrd="0" presId="urn:microsoft.com/office/officeart/2005/8/layout/hierarchy2"/>
+    <dgm:cxn modelId="{403CCC42-3BF5-C84C-876B-956C48BF4456}" type="presOf" srcId="{37687930-03B2-6149-8735-77877F9E8006}" destId="{9F8B70A0-32E5-A14F-B6F2-42409C13EE93}" srcOrd="1" destOrd="0" presId="urn:microsoft.com/office/officeart/2005/8/layout/hierarchy2"/>
+    <dgm:cxn modelId="{19297B44-86F1-4A46-BDC1-010F9FB8208F}" type="presOf" srcId="{AC34A3B1-F415-024F-B362-364031611F5C}" destId="{869EE02D-617D-B44A-B5B1-15C6745F808C}" srcOrd="0" destOrd="0" presId="urn:microsoft.com/office/officeart/2005/8/layout/hierarchy2"/>
+    <dgm:cxn modelId="{0A751845-809A-3C40-83E8-31E6CE5D21D5}" type="presOf" srcId="{490DDFD4-19FA-8A41-8884-FA94CEB7FC79}" destId="{4CBA9568-78F6-874F-BAE1-422DBB36998B}" srcOrd="0" destOrd="0" presId="urn:microsoft.com/office/officeart/2005/8/layout/hierarchy2"/>
+    <dgm:cxn modelId="{2A364546-EF02-4542-B0B8-7B3A29E30DF9}" type="presOf" srcId="{182251B1-5437-8F47-809E-BCFE0BD3D911}" destId="{A99DEBE2-A9C8-9640-947F-1F27481BC737}" srcOrd="1" destOrd="0" presId="urn:microsoft.com/office/officeart/2005/8/layout/hierarchy2"/>
+    <dgm:cxn modelId="{B292FB48-93B1-C449-AF94-B7208B6F2513}" type="presOf" srcId="{A2AFE9BF-4648-8847-9B35-BF89E09D0D1C}" destId="{2E029F71-35C9-9044-867B-C62FC8CEDC2C}" srcOrd="0" destOrd="0" presId="urn:microsoft.com/office/officeart/2005/8/layout/hierarchy2"/>
+    <dgm:cxn modelId="{7AE44A4A-EC24-C844-BF27-59EFFDD094A3}" type="presOf" srcId="{B9D6EB9F-5A0E-B94C-B310-2355C0FB920D}" destId="{82082EF3-F943-6040-8F27-9EE49BF77273}" srcOrd="1" destOrd="0" presId="urn:microsoft.com/office/officeart/2005/8/layout/hierarchy2"/>
     <dgm:cxn modelId="{9C17904A-A5C3-784B-84A6-7588B63835CC}" srcId="{434E16C0-9111-9A46-ABAF-8042E7E425A0}" destId="{B898F6DC-BA66-A34E-9448-6CD8798FA52C}" srcOrd="1" destOrd="0" parTransId="{5A16902D-83DE-B04B-A3E6-8FE700D2F549}" sibTransId="{A9BDACDC-AE5B-8D40-AAB1-B40A05D9A658}"/>
     <dgm:cxn modelId="{4F632C4B-4552-ED40-AC48-903A598B5246}" srcId="{DC3FA29B-C79A-184D-93E5-2555F2F344A6}" destId="{10F4BF1A-E0E8-5247-98A6-E82AA7A267C9}" srcOrd="0" destOrd="0" parTransId="{CB059A76-1DAB-834F-8DF9-EEDE1D68160E}" sibTransId="{218DDB5D-1D61-C348-9570-4E37660531CE}"/>
-    <dgm:cxn modelId="{AE3CF24B-9A83-B644-B219-F6EE071DF419}" type="presOf" srcId="{E0B2355D-B76E-5347-8DE3-514FFB509C79}" destId="{ABF00753-ADCF-6A42-88C3-5F8E14C158F3}" srcOrd="0" destOrd="0" presId="urn:microsoft.com/office/officeart/2005/8/layout/hierarchy2"/>
-    <dgm:cxn modelId="{D5D0914C-9190-9642-BC6D-358BDC44F578}" type="presOf" srcId="{E652B916-7C94-A442-94DD-868984C90584}" destId="{CDF88616-E8B3-974C-B110-36BD4AC3B825}" srcOrd="0" destOrd="0" presId="urn:microsoft.com/office/officeart/2005/8/layout/hierarchy2"/>
-    <dgm:cxn modelId="{046BC54C-520B-4E4F-A742-79ED522C5FCD}" type="presOf" srcId="{B743AEA8-216B-2E46-9601-0AD3641A5E9E}" destId="{2B20767A-1A33-C248-85FD-1D93D89083D2}" srcOrd="0" destOrd="0" presId="urn:microsoft.com/office/officeart/2005/8/layout/hierarchy2"/>
-    <dgm:cxn modelId="{93342B4D-9BD8-DF43-9AE8-E7FBFA64BF55}" type="presOf" srcId="{2A1D79E9-5180-CD44-A6E4-DF75859017DD}" destId="{679B93C1-DE35-6440-84FA-556B81DC0458}" srcOrd="0" destOrd="0" presId="urn:microsoft.com/office/officeart/2005/8/layout/hierarchy2"/>
+    <dgm:cxn modelId="{7439384B-8621-4244-95C3-D7F5B4CA9346}" type="presOf" srcId="{C3CCA1E9-342B-1B46-82BF-85B68CA8D3EF}" destId="{95415AAC-B97B-3E4C-95D1-E26D4A47F854}" srcOrd="0" destOrd="0" presId="urn:microsoft.com/office/officeart/2005/8/layout/hierarchy2"/>
     <dgm:cxn modelId="{C243454D-4C04-E34F-84DD-A8DB4949B20A}" srcId="{503724C0-4DC0-614D-A895-CD9721E0505E}" destId="{B0AB63BB-9919-1E4C-AFFD-8279A2D23113}" srcOrd="0" destOrd="0" parTransId="{02BB8850-2D09-3B41-BEE2-0D51EE7AAAE4}" sibTransId="{3D4C7F26-3697-8A4B-80EF-CBB17BC8338F}"/>
-    <dgm:cxn modelId="{E2857851-0AEC-3041-A7B8-428D1CDD34A4}" type="presOf" srcId="{1E5F3203-0DED-6643-9C6B-FD536231F97A}" destId="{6C711774-F7B9-7448-AFA4-AA549455F4F8}" srcOrd="0" destOrd="0" presId="urn:microsoft.com/office/officeart/2005/8/layout/hierarchy2"/>
-    <dgm:cxn modelId="{F5979851-0DEE-D840-A609-3783B12574BE}" type="presOf" srcId="{4A3BD0D8-5773-6C4C-A796-C027AC6F30B5}" destId="{0944545F-BE28-CB41-9FE0-CB8029CA4E05}" srcOrd="0" destOrd="0" presId="urn:microsoft.com/office/officeart/2005/8/layout/hierarchy2"/>
+    <dgm:cxn modelId="{69B1EB4E-B3AE-624F-8CFD-A8390E862A94}" type="presOf" srcId="{D852DDE2-48EC-C949-AD66-1E4551A9BBE8}" destId="{CD3E6B27-7BAA-1A4F-A778-AAC952E047EB}" srcOrd="0" destOrd="0" presId="urn:microsoft.com/office/officeart/2005/8/layout/hierarchy2"/>
+    <dgm:cxn modelId="{DB8B6852-4A40-B94F-ABE8-FCA395F54104}" type="presOf" srcId="{B84B88EC-21E0-6348-9457-4C6CD50C8F83}" destId="{B0BA1A94-5289-E747-92C5-8031204115B7}" srcOrd="0" destOrd="0" presId="urn:microsoft.com/office/officeart/2005/8/layout/hierarchy2"/>
     <dgm:cxn modelId="{D399BC52-ECD4-0E4D-AE89-742670CB2D12}" srcId="{0CC64CDE-03F3-5145-9992-9CBD8640F750}" destId="{F2515F6F-2FC4-6043-BE11-A587AFEA6F81}" srcOrd="1" destOrd="0" parTransId="{2A1D79E9-5180-CD44-A6E4-DF75859017DD}" sibTransId="{F4E6542C-FE6D-0541-A62C-BBB450EDAC45}"/>
-    <dgm:cxn modelId="{AA668B56-95E4-0D48-BFE0-05E8F1A2DED6}" type="presOf" srcId="{4A3BD0D8-5773-6C4C-A796-C027AC6F30B5}" destId="{B9DF7744-0386-3343-9BD2-F1987F5C2504}" srcOrd="1" destOrd="0" presId="urn:microsoft.com/office/officeart/2005/8/layout/hierarchy2"/>
-    <dgm:cxn modelId="{E4F92257-1062-FE43-A09E-726A489DEF83}" type="presOf" srcId="{DEC33D82-86DE-144B-A01C-CB3C301AB057}" destId="{F2F73D55-5C37-CD44-BC1E-CDBC3CD0F101}" srcOrd="0" destOrd="0" presId="urn:microsoft.com/office/officeart/2005/8/layout/hierarchy2"/>
-    <dgm:cxn modelId="{F4E02A57-7030-6F42-B3DF-C09EA0B50F7B}" type="presOf" srcId="{CDC15278-99AA-3E4F-831E-5A7AD3E5E1FE}" destId="{B5BF25CD-8BF1-5048-868C-30217B5C9A24}" srcOrd="1" destOrd="0" presId="urn:microsoft.com/office/officeart/2005/8/layout/hierarchy2"/>
-    <dgm:cxn modelId="{4F1BC958-7B00-CB4C-9144-9E8B243AB8E1}" type="presOf" srcId="{8CB9C1D1-1504-2247-A079-C10F1E47D2F9}" destId="{80107EDB-8FCD-2346-A353-02A87C9089DE}" srcOrd="0" destOrd="0" presId="urn:microsoft.com/office/officeart/2005/8/layout/hierarchy2"/>
-    <dgm:cxn modelId="{3EB4F458-BC09-5E4F-86D8-5A0608D7B8B6}" type="presOf" srcId="{A0A81C7A-A077-E44D-9674-817A7E10C553}" destId="{3A7EA8F2-16F7-6D4B-B19E-6E24918EA42B}" srcOrd="1" destOrd="0" presId="urn:microsoft.com/office/officeart/2005/8/layout/hierarchy2"/>
-    <dgm:cxn modelId="{B1D4B15A-177F-994B-9FAA-669ED81DBB0C}" type="presOf" srcId="{26628364-25FD-7748-B852-E2423190B99C}" destId="{9D8B8718-1219-3340-BF7B-D6462FA11EE9}" srcOrd="0" destOrd="0" presId="urn:microsoft.com/office/officeart/2005/8/layout/hierarchy2"/>
-    <dgm:cxn modelId="{5173CA5B-525D-4442-9A67-828816DD9469}" type="presOf" srcId="{1E5F3203-0DED-6643-9C6B-FD536231F97A}" destId="{B8FA6677-848E-B341-89B2-AB26EA8F8983}" srcOrd="1" destOrd="0" presId="urn:microsoft.com/office/officeart/2005/8/layout/hierarchy2"/>
-    <dgm:cxn modelId="{933CE15D-DBA7-7944-897C-FC8B367A49FC}" type="presOf" srcId="{7208B522-2B5D-3849-868F-9EC270B7FB7F}" destId="{062A7194-78C8-F943-A247-3B3F469D7F62}" srcOrd="1" destOrd="0" presId="urn:microsoft.com/office/officeart/2005/8/layout/hierarchy2"/>
-    <dgm:cxn modelId="{70EBFF5E-D830-6340-8096-7F3ECB41BC79}" type="presOf" srcId="{E9BDD8FF-3087-B34B-A2D2-0F54F0737280}" destId="{A3A57E5D-303D-C64F-A1DC-0E0FF1D6C828}" srcOrd="0" destOrd="0" presId="urn:microsoft.com/office/officeart/2005/8/layout/hierarchy2"/>
+    <dgm:cxn modelId="{A4F05B55-E1D5-FD44-A4AA-0DE1A5DC9F23}" type="presOf" srcId="{9FF37F7A-1838-EB46-B9B6-3A9CF88DE34F}" destId="{23076C38-17B5-7A42-97BC-A3169834B242}" srcOrd="0" destOrd="0" presId="urn:microsoft.com/office/officeart/2005/8/layout/hierarchy2"/>
+    <dgm:cxn modelId="{6F334E58-D181-AA4F-819D-8A5E5920DC08}" type="presOf" srcId="{26628364-25FD-7748-B852-E2423190B99C}" destId="{61440551-8B50-B440-BAAC-4ACBEC254999}" srcOrd="1" destOrd="0" presId="urn:microsoft.com/office/officeart/2005/8/layout/hierarchy2"/>
+    <dgm:cxn modelId="{42470F59-268F-9E43-86F2-FDC8C9CAE510}" type="presOf" srcId="{CD5A3357-FB5B-E644-82F7-D0F9608221E7}" destId="{DF2248CE-7D7C-5D4B-8277-D213DA6DD3EB}" srcOrd="0" destOrd="0" presId="urn:microsoft.com/office/officeart/2005/8/layout/hierarchy2"/>
+    <dgm:cxn modelId="{DB07F459-0FD6-8A43-941D-08503D77B6FC}" type="presOf" srcId="{4A13B86B-A1BF-F54F-9C92-2FA2F42AAD36}" destId="{7F275FDA-DE69-2B4A-84AB-2462E309FB00}" srcOrd="1" destOrd="0" presId="urn:microsoft.com/office/officeart/2005/8/layout/hierarchy2"/>
+    <dgm:cxn modelId="{7DE5375A-7EDC-F641-AC03-7EDAD641315D}" type="presOf" srcId="{2A1D79E9-5180-CD44-A6E4-DF75859017DD}" destId="{17969B6C-27C4-594D-AD5E-6F5032B8027F}" srcOrd="1" destOrd="0" presId="urn:microsoft.com/office/officeart/2005/8/layout/hierarchy2"/>
+    <dgm:cxn modelId="{E3B48B5C-CDDE-C94C-90FE-82483CEA39C8}" type="presOf" srcId="{E709B3A6-6ADF-C64F-8A7C-41FF2B111220}" destId="{AFFBA743-03F7-5F4C-8E88-C1E1454AED05}" srcOrd="0" destOrd="0" presId="urn:microsoft.com/office/officeart/2005/8/layout/hierarchy2"/>
+    <dgm:cxn modelId="{C4744F5E-A671-FD49-A714-D551477A1C9E}" type="presOf" srcId="{187244EF-C31E-6344-8FCF-96AF4AF3BC2A}" destId="{E4AA040D-31C5-5D46-845E-005448A40686}" srcOrd="0" destOrd="0" presId="urn:microsoft.com/office/officeart/2005/8/layout/hierarchy2"/>
+    <dgm:cxn modelId="{6F73BB5E-75B6-374D-862B-DB1568FA28F8}" type="presOf" srcId="{03BEA625-8334-C148-B76E-B4B95225C8F2}" destId="{4AC7893F-6937-5446-9898-4892D379DA93}" srcOrd="0" destOrd="0" presId="urn:microsoft.com/office/officeart/2005/8/layout/hierarchy2"/>
     <dgm:cxn modelId="{4D0C515F-62FF-F541-809D-2FD82553FEEF}" srcId="{7FCE5DCC-58C9-D741-9FAE-6CD0D5FD2F94}" destId="{E0B2355D-B76E-5347-8DE3-514FFB509C79}" srcOrd="0" destOrd="0" parTransId="{069ACE56-904A-2546-AF9F-F8DFD1A5DA59}" sibTransId="{0584D649-3E54-FC4F-9473-4E68053CCE0D}"/>
-    <dgm:cxn modelId="{9983835F-7CD5-6042-B6D3-D9CE1DF5AD3F}" type="presOf" srcId="{A0A62DC7-4D31-8249-B14F-D2C78956C1B4}" destId="{10CA0EB9-E970-1C4C-B964-68E6097168BF}" srcOrd="1" destOrd="0" presId="urn:microsoft.com/office/officeart/2005/8/layout/hierarchy2"/>
+    <dgm:cxn modelId="{AF562A60-C7BA-B44C-9330-345432D678EB}" type="presOf" srcId="{10F4BF1A-E0E8-5247-98A6-E82AA7A267C9}" destId="{AE9EA0A6-8921-0A4B-B22A-4033ECDF8CEB}" srcOrd="0" destOrd="0" presId="urn:microsoft.com/office/officeart/2005/8/layout/hierarchy2"/>
     <dgm:cxn modelId="{8E01CA61-333B-2141-9BEA-E066FE599ED5}" srcId="{75B42418-0B78-E744-853C-EAC114FC3471}" destId="{9086BAEE-F952-EA4B-9CE3-C10B8AA8DE51}" srcOrd="1" destOrd="0" parTransId="{7208B522-2B5D-3849-868F-9EC270B7FB7F}" sibTransId="{32237F5F-1C61-8E44-8B69-AE104DC4051F}"/>
     <dgm:cxn modelId="{5C6D1162-D556-684D-985B-9388FBA9D097}" srcId="{D852DDE2-48EC-C949-AD66-1E4551A9BBE8}" destId="{434E16C0-9111-9A46-ABAF-8042E7E425A0}" srcOrd="0" destOrd="0" parTransId="{A8ADB7F8-470C-734E-B971-8E83D18BAA41}" sibTransId="{6A45DD41-6433-3549-8D09-6230CE7AB437}"/>
-    <dgm:cxn modelId="{57E59863-1230-A047-A5FC-7ED2285BC74B}" type="presOf" srcId="{D852DDE2-48EC-C949-AD66-1E4551A9BBE8}" destId="{CD3E6B27-7BAA-1A4F-A778-AAC952E047EB}" srcOrd="0" destOrd="0" presId="urn:microsoft.com/office/officeart/2005/8/layout/hierarchy2"/>
-    <dgm:cxn modelId="{174E3B64-F491-5041-915F-91D119B56602}" type="presOf" srcId="{F846C330-0900-864C-AFE7-47A6B1C94F7A}" destId="{B8C27370-6C50-BC4C-B96A-F7009FCE9B29}" srcOrd="0" destOrd="0" presId="urn:microsoft.com/office/officeart/2005/8/layout/hierarchy2"/>
-    <dgm:cxn modelId="{A3B9DC65-03BC-AE42-8D2B-5A28B8FC6D1C}" type="presOf" srcId="{CCEAFC7A-D65A-504C-A795-E458869A94AA}" destId="{30C20B8D-B9DE-FC4A-A8FC-F855AACFD13C}" srcOrd="0" destOrd="0" presId="urn:microsoft.com/office/officeart/2005/8/layout/hierarchy2"/>
+    <dgm:cxn modelId="{C91D4F63-2718-404F-BE37-B374E6B9516A}" type="presOf" srcId="{A0A62DC7-4D31-8249-B14F-D2C78956C1B4}" destId="{10CA0EB9-E970-1C4C-B964-68E6097168BF}" srcOrd="1" destOrd="0" presId="urn:microsoft.com/office/officeart/2005/8/layout/hierarchy2"/>
+    <dgm:cxn modelId="{7B8A1F64-23E0-8D4E-8451-B9B80915255C}" type="presOf" srcId="{35D887D7-33BF-1949-B929-3C1A5F9EBA0E}" destId="{17B51E74-34E2-7D49-AA23-10FE3919CFB0}" srcOrd="1" destOrd="0" presId="urn:microsoft.com/office/officeart/2005/8/layout/hierarchy2"/>
+    <dgm:cxn modelId="{CA7D9265-0D2A-AF48-9BE2-F0A479EC2433}" type="presOf" srcId="{BF9C033C-4AFB-A34B-AE36-E0F43283D02E}" destId="{69460287-3B04-F142-8B8F-38364A84B16E}" srcOrd="0" destOrd="0" presId="urn:microsoft.com/office/officeart/2005/8/layout/hierarchy2"/>
     <dgm:cxn modelId="{FBF9BB66-A9BF-264E-851E-3A9E17A16F95}" srcId="{8CB9C1D1-1504-2247-A079-C10F1E47D2F9}" destId="{52BD7005-F2C8-E24C-A657-999465ED806F}" srcOrd="0" destOrd="0" parTransId="{A0EAD666-74BC-3E49-9167-F107A8C9C557}" sibTransId="{57D53BC0-782F-B84A-989B-E9A3EED35952}"/>
-    <dgm:cxn modelId="{60D07867-42C2-C041-A3A6-04DFC67DD15D}" type="presOf" srcId="{52BD7005-F2C8-E24C-A657-999465ED806F}" destId="{4BB2793D-87B3-EF41-9A4F-7716D66373B1}" srcOrd="0" destOrd="0" presId="urn:microsoft.com/office/officeart/2005/8/layout/hierarchy2"/>
-    <dgm:cxn modelId="{F593A567-9614-DA42-84D1-5B3D2EC691C9}" type="presOf" srcId="{D06F829E-D606-FF46-A42D-A54189EDC959}" destId="{FBF4C144-F351-7546-9706-1D522BDDE758}" srcOrd="1" destOrd="0" presId="urn:microsoft.com/office/officeart/2005/8/layout/hierarchy2"/>
-    <dgm:cxn modelId="{021CB169-E36E-5345-A065-2EC8FA128F0D}" type="presOf" srcId="{60A94D8F-EC8A-CA43-AC88-34395F8CC022}" destId="{2D1E9B71-E05F-414C-9C94-D01927894E96}" srcOrd="0" destOrd="0" presId="urn:microsoft.com/office/officeart/2005/8/layout/hierarchy2"/>
-    <dgm:cxn modelId="{2A50066B-3E75-8E44-B593-C4161D57A733}" type="presOf" srcId="{64AC65DF-19E6-0F4E-A1E6-DCD2D506B56A}" destId="{AE527926-7596-084F-836D-CE44E210925D}" srcOrd="0" destOrd="0" presId="urn:microsoft.com/office/officeart/2005/8/layout/hierarchy2"/>
+    <dgm:cxn modelId="{F4793169-6B22-DD4F-BCDB-42EFB3FB91CE}" type="presOf" srcId="{4FBF82B5-C669-CA4C-A43F-FC7BB5DF2751}" destId="{A4EEFD49-E628-3740-A93E-6D11E409D24D}" srcOrd="1" destOrd="0" presId="urn:microsoft.com/office/officeart/2005/8/layout/hierarchy2"/>
     <dgm:cxn modelId="{DA17536B-43A7-624E-B323-C6E42DEA535B}" srcId="{018C868C-7E88-1341-95C7-A4A040A901F0}" destId="{F0968169-2C1A-DA4D-AB54-B2821E5D2EC9}" srcOrd="1" destOrd="0" parTransId="{F8C66127-9041-504C-B84A-E6CE4A67BFEF}" sibTransId="{BA88EDCF-6F4C-574C-B30D-DD65E07F5341}"/>
-    <dgm:cxn modelId="{8939016E-29F0-CF48-BF9F-0BBE036DB553}" type="presOf" srcId="{CB106D45-EF6B-A24A-B9D6-C5EBA4B563E2}" destId="{0FE0DC5E-02A4-B44D-8A14-6E47565AF5D5}" srcOrd="0" destOrd="0" presId="urn:microsoft.com/office/officeart/2005/8/layout/hierarchy2"/>
-    <dgm:cxn modelId="{1BBD7A6E-C073-7045-9CF3-67C968E07947}" type="presOf" srcId="{2E1432B9-2340-7B4F-A4FB-3C8F85A920DA}" destId="{EAF5B26D-7BCE-5249-BEA2-027D32033BF5}" srcOrd="0" destOrd="0" presId="urn:microsoft.com/office/officeart/2005/8/layout/hierarchy2"/>
-    <dgm:cxn modelId="{6E03166F-F828-1D4C-953D-4F33552226C6}" type="presOf" srcId="{B1F69F30-1C90-EE4E-9B90-76ECA483DE49}" destId="{F03D0C19-6DF7-B64A-9FD1-2A1A5EF6D7CA}" srcOrd="0" destOrd="0" presId="urn:microsoft.com/office/officeart/2005/8/layout/hierarchy2"/>
+    <dgm:cxn modelId="{DF033F6E-1987-1F41-85F0-F41A267D1DDE}" type="presOf" srcId="{5B4D6E87-7AAD-9244-B432-B58448146B80}" destId="{00CFE4B8-8832-0246-A40E-11D4FB02AE84}" srcOrd="0" destOrd="0" presId="urn:microsoft.com/office/officeart/2005/8/layout/hierarchy2"/>
+    <dgm:cxn modelId="{0614126F-4816-0A48-B7B5-2625D185A735}" type="presOf" srcId="{56F3205A-6C26-3647-AD88-9D60DDAC1A4F}" destId="{0BB8C1D1-32D5-F247-90B9-6406D7687D76}" srcOrd="1" destOrd="0" presId="urn:microsoft.com/office/officeart/2005/8/layout/hierarchy2"/>
     <dgm:cxn modelId="{D3D69E6F-E7EA-0E49-8CD5-4B946A51F9D7}" srcId="{F846C330-0900-864C-AFE7-47A6B1C94F7A}" destId="{4428AE58-F45E-9F41-8B2F-A830CD04C877}" srcOrd="1" destOrd="0" parTransId="{85DFC1C0-544D-1E49-A2B5-A5044611C851}" sibTransId="{EA7934DA-2DA2-F242-83ED-4A5BF107845B}"/>
-    <dgm:cxn modelId="{22011E70-E3BC-844A-A62E-F102B0C6ED93}" type="presOf" srcId="{85DFC1C0-544D-1E49-A2B5-A5044611C851}" destId="{178DCFF1-CC55-904C-80A7-201C4962CD0C}" srcOrd="0" destOrd="0" presId="urn:microsoft.com/office/officeart/2005/8/layout/hierarchy2"/>
     <dgm:cxn modelId="{F8C26370-4A14-0242-B576-F27E2CEE4E29}" srcId="{837D2806-A598-914C-9E7E-530603CC9694}" destId="{99B9F1DD-A4C8-824C-8A75-F8555EA0A282}" srcOrd="0" destOrd="0" parTransId="{30E67414-1EDC-E747-94E6-77002BE10CB6}" sibTransId="{11377445-79C8-1440-B05B-5E3872264512}"/>
     <dgm:cxn modelId="{1E719270-499E-314C-BA3F-9C1FE894F6EB}" srcId="{4428AE58-F45E-9F41-8B2F-A830CD04C877}" destId="{A6728F54-B1E3-494A-9F16-51DE271822AC}" srcOrd="0" destOrd="0" parTransId="{473AEA83-E48D-2743-8B8D-2B43A8D4B519}" sibTransId="{82389A0E-8E77-6D48-97BD-1A36E6D68AFD}"/>
-    <dgm:cxn modelId="{5EB75573-B713-2840-B2C0-C37D71469ACA}" type="presOf" srcId="{F0968169-2C1A-DA4D-AB54-B2821E5D2EC9}" destId="{D54C132A-9E8C-C649-BA54-66D04BA9F9D2}" srcOrd="0" destOrd="0" presId="urn:microsoft.com/office/officeart/2005/8/layout/hierarchy2"/>
-    <dgm:cxn modelId="{5EB3F875-532E-6E4E-AFE1-021D42C8A485}" type="presOf" srcId="{58D9B40E-196C-F64A-AD54-97A01917AAC3}" destId="{32E1E92B-B747-1945-8244-8375262856A2}" srcOrd="0" destOrd="0" presId="urn:microsoft.com/office/officeart/2005/8/layout/hierarchy2"/>
-    <dgm:cxn modelId="{5F8EFE75-3EC8-9046-8486-3C1A8628F432}" type="presOf" srcId="{187244EF-C31E-6344-8FCF-96AF4AF3BC2A}" destId="{1B19DBDE-7BB1-664E-A05B-426990BEADD2}" srcOrd="1" destOrd="0" presId="urn:microsoft.com/office/officeart/2005/8/layout/hierarchy2"/>
-    <dgm:cxn modelId="{11E2DE76-8E45-A14E-86B8-B6D24144E5AE}" type="presOf" srcId="{CD5A3357-FB5B-E644-82F7-D0F9608221E7}" destId="{A52AB215-CE3B-6540-84CE-C7392438F501}" srcOrd="1" destOrd="0" presId="urn:microsoft.com/office/officeart/2005/8/layout/hierarchy2"/>
-    <dgm:cxn modelId="{F5731977-A2E7-5043-ACE2-4E87F89E96B4}" type="presOf" srcId="{069ACE56-904A-2546-AF9F-F8DFD1A5DA59}" destId="{557D6FDE-1A5F-A343-AAC9-B64134858DAA}" srcOrd="0" destOrd="0" presId="urn:microsoft.com/office/officeart/2005/8/layout/hierarchy2"/>
-    <dgm:cxn modelId="{9E35A677-2B27-784F-9BF9-B7100EE7E3C6}" type="presOf" srcId="{FD3B25B1-A208-984D-9C0E-E986BA7CB932}" destId="{231E55CB-9002-9944-B177-034B990C250F}" srcOrd="1" destOrd="0" presId="urn:microsoft.com/office/officeart/2005/8/layout/hierarchy2"/>
-    <dgm:cxn modelId="{07176D7A-3B08-F14E-9C0C-DFC64F49AD65}" type="presOf" srcId="{B9E28FDD-16EB-F74E-9AD7-49CA7C1D6C6D}" destId="{D6F167D2-280C-2549-A642-C1FAA099010E}" srcOrd="0" destOrd="0" presId="urn:microsoft.com/office/officeart/2005/8/layout/hierarchy2"/>
-    <dgm:cxn modelId="{8E700F7D-22CE-5B4D-8992-07C6BFFED299}" type="presOf" srcId="{F8C66127-9041-504C-B84A-E6CE4A67BFEF}" destId="{BFFD3F83-879B-344E-9F97-BBFA92EBA5A1}" srcOrd="1" destOrd="0" presId="urn:microsoft.com/office/officeart/2005/8/layout/hierarchy2"/>
-    <dgm:cxn modelId="{A6D47D7F-BA0D-0E4E-98F9-F0DA9090FF99}" type="presOf" srcId="{F8C66127-9041-504C-B84A-E6CE4A67BFEF}" destId="{6720575C-1BAC-0144-BC7F-01F88A777532}" srcOrd="0" destOrd="0" presId="urn:microsoft.com/office/officeart/2005/8/layout/hierarchy2"/>
-    <dgm:cxn modelId="{516FBD7F-1CE5-614E-8237-A64188D13079}" type="presOf" srcId="{5A16902D-83DE-B04B-A3E6-8FE700D2F549}" destId="{180BC466-B29A-4F46-A85D-CA4AB8E5E528}" srcOrd="0" destOrd="0" presId="urn:microsoft.com/office/officeart/2005/8/layout/hierarchy2"/>
-    <dgm:cxn modelId="{3822A082-8316-E942-A39D-EE69C50B9E1B}" type="presOf" srcId="{B6C94DEE-A1F0-8F4F-9468-AE18F379FBD4}" destId="{A5B33E4E-336A-0B40-8C52-A2221287F345}" srcOrd="0" destOrd="0" presId="urn:microsoft.com/office/officeart/2005/8/layout/hierarchy2"/>
-    <dgm:cxn modelId="{6E836084-AF56-EA41-BE6E-D3B1D18009D0}" type="presOf" srcId="{473AEA83-E48D-2743-8B8D-2B43A8D4B519}" destId="{41B3D365-4B97-A64F-B00F-8B4601200E94}" srcOrd="1" destOrd="0" presId="urn:microsoft.com/office/officeart/2005/8/layout/hierarchy2"/>
-    <dgm:cxn modelId="{5DE01E87-EE1A-084F-861F-7EA6C1DF6058}" type="presOf" srcId="{A8ADB7F8-470C-734E-B971-8E83D18BAA41}" destId="{579EAB07-4F83-F743-9508-5D825E6D182C}" srcOrd="0" destOrd="0" presId="urn:microsoft.com/office/officeart/2005/8/layout/hierarchy2"/>
-    <dgm:cxn modelId="{6CFC5987-E4B3-C544-B4F4-78DD32C0B864}" type="presOf" srcId="{490DDFD4-19FA-8A41-8884-FA94CEB7FC79}" destId="{4CBA9568-78F6-874F-BAE1-422DBB36998B}" srcOrd="0" destOrd="0" presId="urn:microsoft.com/office/officeart/2005/8/layout/hierarchy2"/>
-    <dgm:cxn modelId="{8F049687-B26F-9345-9C6F-C61A7411016D}" type="presOf" srcId="{813B1D9A-25C7-DF46-8C94-0BBAC6292275}" destId="{3ADF03C0-B77F-EF41-BE57-79DF4D231738}" srcOrd="1" destOrd="0" presId="urn:microsoft.com/office/officeart/2005/8/layout/hierarchy2"/>
-    <dgm:cxn modelId="{14D2D88A-6C93-EC47-A013-D8AD7224B69E}" type="presOf" srcId="{E709B3A6-6ADF-C64F-8A7C-41FF2B111220}" destId="{AFFBA743-03F7-5F4C-8E88-C1E1454AED05}" srcOrd="0" destOrd="0" presId="urn:microsoft.com/office/officeart/2005/8/layout/hierarchy2"/>
-    <dgm:cxn modelId="{16CDE58B-307B-634F-9C1B-348089C8A24D}" type="presOf" srcId="{A0A81C7A-A077-E44D-9674-817A7E10C553}" destId="{22F37B2C-0144-4B42-B610-EDE869332C91}" srcOrd="0" destOrd="0" presId="urn:microsoft.com/office/officeart/2005/8/layout/hierarchy2"/>
+    <dgm:cxn modelId="{36F8A070-D4BC-8541-BAA8-18B15BCA89C4}" type="presOf" srcId="{B6C94DEE-A1F0-8F4F-9468-AE18F379FBD4}" destId="{BE34ED06-A23A-F749-8104-B508C9262FDE}" srcOrd="1" destOrd="0" presId="urn:microsoft.com/office/officeart/2005/8/layout/hierarchy2"/>
+    <dgm:cxn modelId="{089EA870-BF4C-FD48-8564-5D9E2795C62F}" type="presOf" srcId="{ECC38862-6814-954F-80AE-DBF7C83AD452}" destId="{3FE5FC00-5B11-B04A-8DA8-F4959DA3D91E}" srcOrd="0" destOrd="0" presId="urn:microsoft.com/office/officeart/2005/8/layout/hierarchy2"/>
+    <dgm:cxn modelId="{A85FB371-2346-2C40-886E-A3514F246AA7}" type="presOf" srcId="{26628364-25FD-7748-B852-E2423190B99C}" destId="{9D8B8718-1219-3340-BF7B-D6462FA11EE9}" srcOrd="0" destOrd="0" presId="urn:microsoft.com/office/officeart/2005/8/layout/hierarchy2"/>
+    <dgm:cxn modelId="{44D5DE72-12CF-2142-99D7-DF5E9F87ABDA}" type="presOf" srcId="{B898F6DC-BA66-A34E-9448-6CD8798FA52C}" destId="{9EADF938-02B1-2C43-8A93-4A4A378C8BDB}" srcOrd="0" destOrd="0" presId="urn:microsoft.com/office/officeart/2005/8/layout/hierarchy2"/>
+    <dgm:cxn modelId="{B065F573-1E2F-6343-B6AA-45D0610ED3EE}" type="presOf" srcId="{50A98565-4DA9-C14B-9F93-63779A96F28A}" destId="{1530674F-400B-AA4E-BAF1-41A723567EF5}" srcOrd="0" destOrd="0" presId="urn:microsoft.com/office/officeart/2005/8/layout/hierarchy2"/>
+    <dgm:cxn modelId="{F7F31E77-230D-554D-9BE3-F5BCA52778BD}" type="presOf" srcId="{89AA8F52-95A6-0A42-B8DB-917B4D349CF6}" destId="{39E3DC0E-53C8-5144-B0B1-07F4E7334A85}" srcOrd="0" destOrd="0" presId="urn:microsoft.com/office/officeart/2005/8/layout/hierarchy2"/>
+    <dgm:cxn modelId="{1E317578-9B6F-4545-82DD-494D84E15779}" type="presOf" srcId="{CB106D45-EF6B-A24A-B9D6-C5EBA4B563E2}" destId="{E08C38C7-38ED-BA4D-84A9-FF9D24B54B0A}" srcOrd="1" destOrd="0" presId="urn:microsoft.com/office/officeart/2005/8/layout/hierarchy2"/>
+    <dgm:cxn modelId="{9435947B-E61C-C647-8D4A-1AF611573973}" type="presOf" srcId="{B1F69F30-1C90-EE4E-9B90-76ECA483DE49}" destId="{F03D0C19-6DF7-B64A-9FD1-2A1A5EF6D7CA}" srcOrd="0" destOrd="0" presId="urn:microsoft.com/office/officeart/2005/8/layout/hierarchy2"/>
+    <dgm:cxn modelId="{1B2BD77E-937E-B241-AE0B-4F1583B040B4}" type="presOf" srcId="{0BA4C58A-447C-8A41-A46B-B6EC1E557052}" destId="{B814019D-DF4F-304F-8975-6C097F6D3E30}" srcOrd="1" destOrd="0" presId="urn:microsoft.com/office/officeart/2005/8/layout/hierarchy2"/>
+    <dgm:cxn modelId="{700B007F-E39D-7D48-AC31-0421539D74EF}" type="presOf" srcId="{069ACE56-904A-2546-AF9F-F8DFD1A5DA59}" destId="{557D6FDE-1A5F-A343-AAC9-B64134858DAA}" srcOrd="0" destOrd="0" presId="urn:microsoft.com/office/officeart/2005/8/layout/hierarchy2"/>
+    <dgm:cxn modelId="{68A9FC82-A798-8B4C-B77A-A00267E43D61}" type="presOf" srcId="{6575138D-D60D-6742-BB52-DC29084B29E3}" destId="{28940162-CD59-DD4E-88C0-70FA243B6697}" srcOrd="0" destOrd="0" presId="urn:microsoft.com/office/officeart/2005/8/layout/hierarchy2"/>
+    <dgm:cxn modelId="{4545F383-E814-8149-A74D-B86D08E19B1D}" type="presOf" srcId="{F8C66127-9041-504C-B84A-E6CE4A67BFEF}" destId="{BFFD3F83-879B-344E-9F97-BBFA92EBA5A1}" srcOrd="1" destOrd="0" presId="urn:microsoft.com/office/officeart/2005/8/layout/hierarchy2"/>
+    <dgm:cxn modelId="{96499085-1D09-A44D-9C97-4BA642A7D20C}" type="presOf" srcId="{837D2806-A598-914C-9E7E-530603CC9694}" destId="{973B5C1F-9A88-FA43-9797-E750A0514CF6}" srcOrd="0" destOrd="0" presId="urn:microsoft.com/office/officeart/2005/8/layout/hierarchy2"/>
+    <dgm:cxn modelId="{6F37048A-F76A-DD46-8FDB-DCBB8F013849}" type="presOf" srcId="{E7021709-E071-B94E-B8AA-7E8AB290C85B}" destId="{0B37985A-F439-1845-B8DC-86E79F8066D1}" srcOrd="0" destOrd="0" presId="urn:microsoft.com/office/officeart/2005/8/layout/hierarchy2"/>
+    <dgm:cxn modelId="{B7D9A28A-9EFC-2E48-90DF-900D783E1581}" type="presOf" srcId="{A765A028-38A0-1747-9403-399C5667C12D}" destId="{09CB360A-D85F-B742-BBC1-624731FCF678}" srcOrd="0" destOrd="0" presId="urn:microsoft.com/office/officeart/2005/8/layout/hierarchy2"/>
     <dgm:cxn modelId="{66650B8C-408E-8F48-8701-56541760D1B5}" srcId="{335EBAED-2E86-8340-B7AC-8CACBDECEB6C}" destId="{5B4D6E87-7AAD-9244-B432-B58448146B80}" srcOrd="1" destOrd="0" parTransId="{58D9B40E-196C-F64A-AD54-97A01917AAC3}" sibTransId="{54263645-39AC-D541-80A6-8320152977C6}"/>
-    <dgm:cxn modelId="{820F548C-2641-F342-85BF-F6D6F2163251}" type="presOf" srcId="{02BB8850-2D09-3B41-BEE2-0D51EE7AAAE4}" destId="{999F5CA8-9E6C-F741-B72D-1CBCFB0A9AFA}" srcOrd="1" destOrd="0" presId="urn:microsoft.com/office/officeart/2005/8/layout/hierarchy2"/>
-    <dgm:cxn modelId="{93A0828C-CD31-284D-A54E-8137D7A387C7}" type="presOf" srcId="{51F97ACA-887C-BA45-AC49-3418727EBE6B}" destId="{3C252244-F4D5-774C-97FC-9730C3CA15AE}" srcOrd="0" destOrd="0" presId="urn:microsoft.com/office/officeart/2005/8/layout/hierarchy2"/>
-    <dgm:cxn modelId="{C1573B8D-339C-6D42-931D-FFDB4D604EB0}" type="presOf" srcId="{03BEA625-8334-C148-B76E-B4B95225C8F2}" destId="{4AC7893F-6937-5446-9898-4892D379DA93}" srcOrd="0" destOrd="0" presId="urn:microsoft.com/office/officeart/2005/8/layout/hierarchy2"/>
+    <dgm:cxn modelId="{AB12348D-28CF-C844-81B3-31305DA5B67F}" type="presOf" srcId="{144CAF6C-11F4-4A45-A27E-911591B0011B}" destId="{BC80C050-C05C-EE4F-8A85-26778F146866}" srcOrd="0" destOrd="0" presId="urn:microsoft.com/office/officeart/2005/8/layout/hierarchy2"/>
+    <dgm:cxn modelId="{AB556A8D-17E0-FD49-A2B8-EB7DD75E8158}" type="presOf" srcId="{7FCE5DCC-58C9-D741-9FAE-6CD0D5FD2F94}" destId="{9CA221DE-8BA7-C642-A298-1EBC15C1C54E}" srcOrd="0" destOrd="0" presId="urn:microsoft.com/office/officeart/2005/8/layout/hierarchy2"/>
+    <dgm:cxn modelId="{B9BDC58D-3B25-4348-92CA-E21ACF02833A}" type="presOf" srcId="{276ECC95-5CB2-9F47-BBC9-1F15D08915F6}" destId="{1A5A45C4-44F9-B14B-8DA5-D65DFB02E004}" srcOrd="1" destOrd="0" presId="urn:microsoft.com/office/officeart/2005/8/layout/hierarchy2"/>
     <dgm:cxn modelId="{2D27938E-CE22-CC43-9461-5C1F5182A774}" srcId="{F2515F6F-2FC4-6043-BE11-A587AFEA6F81}" destId="{B84B88EC-21E0-6348-9457-4C6CD50C8F83}" srcOrd="1" destOrd="0" parTransId="{A0A62DC7-4D31-8249-B14F-D2C78956C1B4}" sibTransId="{8AD23F63-CD33-EA40-BD12-00409ABDADFE}"/>
     <dgm:cxn modelId="{EC84A78E-23F9-EE4F-B529-E9AA530C6076}" srcId="{A6728F54-B1E3-494A-9F16-51DE271822AC}" destId="{E6CFDD7F-DAE3-1B45-9BB9-A83A4751734A}" srcOrd="1" destOrd="0" parTransId="{B6C94DEE-A1F0-8F4F-9468-AE18F379FBD4}" sibTransId="{CE928C37-05EB-2046-8B41-07131BD88856}"/>
-    <dgm:cxn modelId="{6FCA428F-C23C-0547-A6E3-A185932A23B2}" type="presOf" srcId="{DEC33D82-86DE-144B-A01C-CB3C301AB057}" destId="{8CD01425-6999-1B43-A074-9B4B66D474FE}" srcOrd="1" destOrd="0" presId="urn:microsoft.com/office/officeart/2005/8/layout/hierarchy2"/>
-    <dgm:cxn modelId="{C7C1468F-BA35-2B42-8538-5F644110BBA8}" type="presOf" srcId="{7570DA5B-305E-2D4F-9C43-9143998CD399}" destId="{97208B3F-EBA3-4845-94E7-920477ECF453}" srcOrd="0" destOrd="0" presId="urn:microsoft.com/office/officeart/2005/8/layout/hierarchy2"/>
-    <dgm:cxn modelId="{13D8AA8F-2139-C048-84E8-D78BB4F10D5C}" type="presOf" srcId="{A0EAD666-74BC-3E49-9167-F107A8C9C557}" destId="{F55BCE5E-1DB2-264E-8E89-E7825D9D3A45}" srcOrd="1" destOrd="0" presId="urn:microsoft.com/office/officeart/2005/8/layout/hierarchy2"/>
-    <dgm:cxn modelId="{37C71D91-5081-624F-A06D-6523E3C6E5BB}" type="presOf" srcId="{182251B1-5437-8F47-809E-BCFE0BD3D911}" destId="{A99DEBE2-A9C8-9640-947F-1F27481BC737}" srcOrd="1" destOrd="0" presId="urn:microsoft.com/office/officeart/2005/8/layout/hierarchy2"/>
-    <dgm:cxn modelId="{2B3C4191-32F2-5C49-8B0C-FC107CD6054E}" type="presOf" srcId="{55836E6C-FEC0-0A4F-9D46-6320613A632B}" destId="{6F1542E3-3EE9-7643-98A4-02BB96297F69}" srcOrd="0" destOrd="0" presId="urn:microsoft.com/office/officeart/2005/8/layout/hierarchy2"/>
+    <dgm:cxn modelId="{0A03EF8F-2B2C-3844-9E3D-144E88A3056F}" type="presOf" srcId="{52BD7005-F2C8-E24C-A657-999465ED806F}" destId="{4BB2793D-87B3-EF41-9A4F-7716D66373B1}" srcOrd="0" destOrd="0" presId="urn:microsoft.com/office/officeart/2005/8/layout/hierarchy2"/>
     <dgm:cxn modelId="{2D055A92-3958-B149-B74B-572BCF05D918}" srcId="{E0B2355D-B76E-5347-8DE3-514FFB509C79}" destId="{503724C0-4DC0-614D-A895-CD9721E0505E}" srcOrd="0" destOrd="0" parTransId="{A0A81C7A-A077-E44D-9674-817A7E10C553}" sibTransId="{3B7382C6-30DE-E644-9226-CCBC184A786D}"/>
-    <dgm:cxn modelId="{2B5C6D92-BBF5-944B-9C29-7F40D74798B1}" type="presOf" srcId="{C88F80E9-D72C-FE40-A234-5BCA8DA5BF97}" destId="{5BDCA2FD-50B3-DD41-B739-4C6FB692068F}" srcOrd="1" destOrd="0" presId="urn:microsoft.com/office/officeart/2005/8/layout/hierarchy2"/>
-    <dgm:cxn modelId="{8C4A7595-A0EA-D14C-B77D-6E484C9FAF7E}" type="presOf" srcId="{E7021709-E071-B94E-B8AA-7E8AB290C85B}" destId="{89D62D01-044A-5E49-BF87-E08569D899ED}" srcOrd="1" destOrd="0" presId="urn:microsoft.com/office/officeart/2005/8/layout/hierarchy2"/>
-    <dgm:cxn modelId="{456D8295-3A88-FD49-8279-F30E35F4849D}" type="presOf" srcId="{4EA8F41C-77E3-EF4B-8115-4F46241C5879}" destId="{225564EB-75DD-F042-994E-EC3A2D54F08F}" srcOrd="0" destOrd="0" presId="urn:microsoft.com/office/officeart/2005/8/layout/hierarchy2"/>
-    <dgm:cxn modelId="{C6FC0E97-1BF8-F14D-9343-7B19D735449D}" type="presOf" srcId="{1100FF0A-B281-C24B-933C-4A94BA74F661}" destId="{E1CC1DA7-E052-D145-8E3D-02E51BEAF7D1}" srcOrd="0" destOrd="0" presId="urn:microsoft.com/office/officeart/2005/8/layout/hierarchy2"/>
-    <dgm:cxn modelId="{3E966498-3A95-E448-AEAD-08A327E8FDA6}" type="presOf" srcId="{D083BCCB-23E8-3A40-9DC9-70EB5FEA9DBA}" destId="{641BAAFD-D329-7E42-8738-0A74C231BC0A}" srcOrd="0" destOrd="0" presId="urn:microsoft.com/office/officeart/2005/8/layout/hierarchy2"/>
-    <dgm:cxn modelId="{B9593399-51DA-F147-9794-675DBAB8C654}" type="presOf" srcId="{658FBE69-F69F-494C-A4A4-B9E0D73E2DCF}" destId="{CC7634C0-ED13-644B-9ED7-D06A037B0A09}" srcOrd="0" destOrd="0" presId="urn:microsoft.com/office/officeart/2005/8/layout/hierarchy2"/>
-    <dgm:cxn modelId="{2C42489A-9DD1-AA49-ABEF-AD1F8FD5D78E}" type="presOf" srcId="{BBB0582E-A825-A24F-97CF-C5EE1D6155DA}" destId="{C1AD9849-C58B-0841-853D-61235BCF9197}" srcOrd="0" destOrd="0" presId="urn:microsoft.com/office/officeart/2005/8/layout/hierarchy2"/>
-    <dgm:cxn modelId="{F3F47B9A-7A66-FD41-8B5E-3295489C9852}" type="presOf" srcId="{4A13B86B-A1BF-F54F-9C92-2FA2F42AAD36}" destId="{8B4760E7-4D8A-8B41-A8D7-171FBE42BA05}" srcOrd="0" destOrd="0" presId="urn:microsoft.com/office/officeart/2005/8/layout/hierarchy2"/>
+    <dgm:cxn modelId="{231D6292-A395-6343-9321-008633063949}" type="presOf" srcId="{0CC64CDE-03F3-5145-9992-9CBD8640F750}" destId="{AA6D8249-2433-114B-AD68-5DAD34076478}" srcOrd="0" destOrd="0" presId="urn:microsoft.com/office/officeart/2005/8/layout/hierarchy2"/>
+    <dgm:cxn modelId="{39778792-61B1-5F4F-8B16-5002E7ADC6CE}" type="presOf" srcId="{CDC15278-99AA-3E4F-831E-5A7AD3E5E1FE}" destId="{B5BF25CD-8BF1-5048-868C-30217B5C9A24}" srcOrd="1" destOrd="0" presId="urn:microsoft.com/office/officeart/2005/8/layout/hierarchy2"/>
+    <dgm:cxn modelId="{A24D0293-1CA2-8A40-80F4-507B1FE52F6F}" type="presOf" srcId="{E38F7A21-DD2B-5241-87A5-82A96C564D58}" destId="{D0A01E75-22DA-5643-BFF4-8A726FDEB812}" srcOrd="1" destOrd="0" presId="urn:microsoft.com/office/officeart/2005/8/layout/hierarchy2"/>
+    <dgm:cxn modelId="{63514394-384C-4648-B4CB-A42578CB339B}" type="presOf" srcId="{3E973414-B004-A34E-918A-C6D1765490F5}" destId="{68E9A118-368E-3244-B463-69DB084DF2CF}" srcOrd="0" destOrd="0" presId="urn:microsoft.com/office/officeart/2005/8/layout/hierarchy2"/>
+    <dgm:cxn modelId="{AE4C5894-A098-9D42-8073-3F5AA4952F5A}" type="presOf" srcId="{F8C66127-9041-504C-B84A-E6CE4A67BFEF}" destId="{6720575C-1BAC-0144-BC7F-01F88A777532}" srcOrd="0" destOrd="0" presId="urn:microsoft.com/office/officeart/2005/8/layout/hierarchy2"/>
+    <dgm:cxn modelId="{D1444E95-365B-2249-B813-861981FE0782}" type="presOf" srcId="{CB106D45-EF6B-A24A-B9D6-C5EBA4B563E2}" destId="{0FE0DC5E-02A4-B44D-8A14-6E47565AF5D5}" srcOrd="0" destOrd="0" presId="urn:microsoft.com/office/officeart/2005/8/layout/hierarchy2"/>
+    <dgm:cxn modelId="{D483E997-F74C-5A46-8599-459A875E8756}" type="presOf" srcId="{60A94D8F-EC8A-CA43-AC88-34395F8CC022}" destId="{DF081D17-BB5A-8841-8B93-BD4D83616D20}" srcOrd="1" destOrd="0" presId="urn:microsoft.com/office/officeart/2005/8/layout/hierarchy2"/>
+    <dgm:cxn modelId="{C5B19999-587B-A34E-BE9F-6FCD0C66552A}" type="presOf" srcId="{F0968169-2C1A-DA4D-AB54-B2821E5D2EC9}" destId="{D54C132A-9E8C-C649-BA54-66D04BA9F9D2}" srcOrd="0" destOrd="0" presId="urn:microsoft.com/office/officeart/2005/8/layout/hierarchy2"/>
+    <dgm:cxn modelId="{8FFF5E9B-650C-BF47-8956-27FD57BC647F}" type="presOf" srcId="{B1F69F30-1C90-EE4E-9B90-76ECA483DE49}" destId="{0DFBADBC-4685-304B-87B0-BD0C0A75C57C}" srcOrd="1" destOrd="0" presId="urn:microsoft.com/office/officeart/2005/8/layout/hierarchy2"/>
     <dgm:cxn modelId="{EADF179C-D553-5C4B-AA20-D14433CAB3B9}" srcId="{53F4F2E1-85A6-0544-8CB0-CF4F62FAD169}" destId="{1D127EAA-B7A9-414C-8B63-A85FAAA8474B}" srcOrd="0" destOrd="0" parTransId="{C88F80E9-D72C-FE40-A234-5BCA8DA5BF97}" sibTransId="{E59DFBAE-4918-D344-97FE-06F3CC0B771E}"/>
+    <dgm:cxn modelId="{9AF1259C-B196-2543-919D-5F5B453849C1}" type="presOf" srcId="{335EBAED-2E86-8340-B7AC-8CACBDECEB6C}" destId="{FE860302-7B4F-8444-86E7-3E89E24F2AE0}" srcOrd="0" destOrd="0" presId="urn:microsoft.com/office/officeart/2005/8/layout/hierarchy2"/>
+    <dgm:cxn modelId="{3C48459C-DF58-E64F-A0D2-891FF89AE8A2}" type="presOf" srcId="{B6C94DEE-A1F0-8F4F-9468-AE18F379FBD4}" destId="{A5B33E4E-336A-0B40-8C52-A2221287F345}" srcOrd="0" destOrd="0" presId="urn:microsoft.com/office/officeart/2005/8/layout/hierarchy2"/>
     <dgm:cxn modelId="{94B0CF9C-9A40-904C-8F55-6D7256A7DF04}" srcId="{51F97ACA-887C-BA45-AC49-3418727EBE6B}" destId="{9FF37F7A-1838-EB46-B9B6-3A9CF88DE34F}" srcOrd="0" destOrd="0" parTransId="{92C32607-449A-C244-9487-603D02D93CA0}" sibTransId="{E3C57D78-0601-6B4B-A835-B7C9FFE6A549}"/>
-    <dgm:cxn modelId="{16F6F49D-A04E-E44B-B87D-9528A89E3486}" type="presOf" srcId="{4428AE58-F45E-9F41-8B2F-A830CD04C877}" destId="{E82A36AA-0C9C-1243-965F-505DB32A7A7C}" srcOrd="0" destOrd="0" presId="urn:microsoft.com/office/officeart/2005/8/layout/hierarchy2"/>
-    <dgm:cxn modelId="{CC7A239E-BC5F-844A-879F-917E86B7DE26}" type="presOf" srcId="{D083BCCB-23E8-3A40-9DC9-70EB5FEA9DBA}" destId="{8F379772-4468-2D48-8E1C-02F9C1718421}" srcOrd="1" destOrd="0" presId="urn:microsoft.com/office/officeart/2005/8/layout/hierarchy2"/>
-    <dgm:cxn modelId="{1F1F9C9E-F08D-9A4A-A2E2-0783E6151B12}" type="presOf" srcId="{4FBF82B5-C669-CA4C-A43F-FC7BB5DF2751}" destId="{D5E03AE9-CD36-1E45-8924-A89701186EA4}" srcOrd="0" destOrd="0" presId="urn:microsoft.com/office/officeart/2005/8/layout/hierarchy2"/>
     <dgm:cxn modelId="{224AFB9E-7B32-514B-8C44-DE6274252CFD}" srcId="{E4C021FE-8A7E-294E-B917-3CCED5372D53}" destId="{BF9C033C-4AFB-A34B-AE36-E0F43283D02E}" srcOrd="0" destOrd="0" parTransId="{CDC15278-99AA-3E4F-831E-5A7AD3E5E1FE}" sibTransId="{C661B3B7-AE4D-E545-A0C9-E26C25391343}"/>
-    <dgm:cxn modelId="{B1256E9F-3100-154A-911A-22053638FB04}" type="presOf" srcId="{018C868C-7E88-1341-95C7-A4A040A901F0}" destId="{F46DFD37-2A53-3145-8804-1FE00FF9EE35}" srcOrd="0" destOrd="0" presId="urn:microsoft.com/office/officeart/2005/8/layout/hierarchy2"/>
-    <dgm:cxn modelId="{F938EEA0-9B21-944C-A2A6-CCBE6ECB361E}" type="presOf" srcId="{E6CFDD7F-DAE3-1B45-9BB9-A83A4751734A}" destId="{07354C4D-1110-8245-ACDF-A7DFEEBFD7F3}" srcOrd="0" destOrd="0" presId="urn:microsoft.com/office/officeart/2005/8/layout/hierarchy2"/>
-    <dgm:cxn modelId="{340EF8A0-C0B2-FA46-98FC-6F08F2FED016}" type="presOf" srcId="{074D98B8-B5C2-B146-B55F-21A9505F4994}" destId="{42039CC0-63F7-F24E-99BE-507AD122C4A6}" srcOrd="1" destOrd="0" presId="urn:microsoft.com/office/officeart/2005/8/layout/hierarchy2"/>
-    <dgm:cxn modelId="{476D02A1-0C22-4143-80D1-7761DCC85166}" type="presOf" srcId="{C878F5E1-AD43-1948-A44A-CFB976113450}" destId="{BBF96CC7-6B2B-D546-B69E-E97D847B5E45}" srcOrd="0" destOrd="0" presId="urn:microsoft.com/office/officeart/2005/8/layout/hierarchy2"/>
-    <dgm:cxn modelId="{EAC34FA1-69D9-F246-BC03-46E6CEF43F21}" type="presOf" srcId="{E38F7A21-DD2B-5241-87A5-82A96C564D58}" destId="{D0A01E75-22DA-5643-BFF4-8A726FDEB812}" srcOrd="1" destOrd="0" presId="urn:microsoft.com/office/officeart/2005/8/layout/hierarchy2"/>
-    <dgm:cxn modelId="{6CB0C6A1-871A-FE47-B823-DC51DB86EF85}" type="presOf" srcId="{182251B1-5437-8F47-809E-BCFE0BD3D911}" destId="{FF0504E2-FEC3-884B-B595-DCBAEFD33946}" srcOrd="0" destOrd="0" presId="urn:microsoft.com/office/officeart/2005/8/layout/hierarchy2"/>
-    <dgm:cxn modelId="{74C852A2-74B0-CB4F-8CBB-A11B13F30B0C}" type="presOf" srcId="{A0EAD666-74BC-3E49-9167-F107A8C9C557}" destId="{9B21400C-BC60-6743-A106-FEAA64B5ACA7}" srcOrd="0" destOrd="0" presId="urn:microsoft.com/office/officeart/2005/8/layout/hierarchy2"/>
-    <dgm:cxn modelId="{44FB8DA2-AAD3-6049-AFB4-B0374DEC9D41}" type="presOf" srcId="{E4C021FE-8A7E-294E-B917-3CCED5372D53}" destId="{1FCD5530-9E05-B046-B8ED-0484835169DE}" srcOrd="0" destOrd="0" presId="urn:microsoft.com/office/officeart/2005/8/layout/hierarchy2"/>
+    <dgm:cxn modelId="{4D1CF69F-9F3D-724C-81B3-1BF35DBA7623}" type="presOf" srcId="{7208B522-2B5D-3849-868F-9EC270B7FB7F}" destId="{5230EDD4-2155-4C4B-9D01-61125A45B27E}" srcOrd="0" destOrd="0" presId="urn:microsoft.com/office/officeart/2005/8/layout/hierarchy2"/>
+    <dgm:cxn modelId="{5CE041A0-3B00-8244-B928-9AFB2038BDF8}" type="presOf" srcId="{A0A62DC7-4D31-8249-B14F-D2C78956C1B4}" destId="{882C5457-CC43-4A48-A99D-03D91C22C0F5}" srcOrd="0" destOrd="0" presId="urn:microsoft.com/office/officeart/2005/8/layout/hierarchy2"/>
+    <dgm:cxn modelId="{AAFE25A1-3F1D-7A4A-8DEB-7F0F330968A5}" type="presOf" srcId="{6B79D810-F8DD-BC40-A9B1-5D821F1FBA6D}" destId="{020ECFE7-D082-9944-8AD2-DBD727F66CA5}" srcOrd="0" destOrd="0" presId="urn:microsoft.com/office/officeart/2005/8/layout/hierarchy2"/>
+    <dgm:cxn modelId="{886C04A3-FE72-4A48-9224-6B09D9770E57}" type="presOf" srcId="{7570DA5B-305E-2D4F-9C43-9143998CD399}" destId="{97208B3F-EBA3-4845-94E7-920477ECF453}" srcOrd="0" destOrd="0" presId="urn:microsoft.com/office/officeart/2005/8/layout/hierarchy2"/>
     <dgm:cxn modelId="{3D698AA3-7892-9145-8531-052A27C4BA07}" srcId="{018C868C-7E88-1341-95C7-A4A040A901F0}" destId="{144CAF6C-11F4-4A45-A27E-911591B0011B}" srcOrd="0" destOrd="0" parTransId="{AC34A3B1-F415-024F-B362-364031611F5C}" sibTransId="{CA8EA633-3162-284D-8980-9659EAD46CD7}"/>
     <dgm:cxn modelId="{24401DA4-D2D2-5544-9EB1-5B58DC2DE207}" srcId="{658FBE69-F69F-494C-A4A4-B9E0D73E2DCF}" destId="{335EBAED-2E86-8340-B7AC-8CACBDECEB6C}" srcOrd="1" destOrd="0" parTransId="{187244EF-C31E-6344-8FCF-96AF4AF3BC2A}" sibTransId="{ED7BBCA4-27DA-D640-A0C1-31719CE08ED3}"/>
-    <dgm:cxn modelId="{F14A55A4-8B70-0144-A236-9CE4C0B51231}" type="presOf" srcId="{0CC64CDE-03F3-5145-9992-9CBD8640F750}" destId="{AA6D8249-2433-114B-AD68-5DAD34076478}" srcOrd="0" destOrd="0" presId="urn:microsoft.com/office/officeart/2005/8/layout/hierarchy2"/>
-    <dgm:cxn modelId="{A53D85A6-FD16-2444-9AE3-F929D3FD5212}" type="presOf" srcId="{02BB8850-2D09-3B41-BEE2-0D51EE7AAAE4}" destId="{622CDB72-9FE3-E446-8D99-51F2FE63E17B}" srcOrd="0" destOrd="0" presId="urn:microsoft.com/office/officeart/2005/8/layout/hierarchy2"/>
-    <dgm:cxn modelId="{5A938DA6-BAC0-5A4C-B5AF-16E3BED9E2D4}" type="presOf" srcId="{60A94D8F-EC8A-CA43-AC88-34395F8CC022}" destId="{DF081D17-BB5A-8841-8B93-BD4D83616D20}" srcOrd="1" destOrd="0" presId="urn:microsoft.com/office/officeart/2005/8/layout/hierarchy2"/>
-    <dgm:cxn modelId="{6E02BAA6-5B03-4443-B19E-F25DDA20D7A1}" type="presOf" srcId="{FD3B25B1-A208-984D-9C0E-E986BA7CB932}" destId="{8C192C57-F760-C64F-93E5-9832B628B4B9}" srcOrd="0" destOrd="0" presId="urn:microsoft.com/office/officeart/2005/8/layout/hierarchy2"/>
+    <dgm:cxn modelId="{9AC0CFA4-C901-1343-A41E-3A094070A42B}" type="presOf" srcId="{92C32607-449A-C244-9487-603D02D93CA0}" destId="{ECCEC597-BD45-C34C-A5EB-49A8E6926768}" srcOrd="0" destOrd="0" presId="urn:microsoft.com/office/officeart/2005/8/layout/hierarchy2"/>
+    <dgm:cxn modelId="{5BD45FA7-9D11-CF4E-B547-D2E9E9D16DD7}" type="presOf" srcId="{AC34A3B1-F415-024F-B362-364031611F5C}" destId="{15390832-3CB7-A648-B93F-B9552C39E0C7}" srcOrd="1" destOrd="0" presId="urn:microsoft.com/office/officeart/2005/8/layout/hierarchy2"/>
+    <dgm:cxn modelId="{EBE26AA7-BD04-FF45-AA26-69F0452F615A}" type="presOf" srcId="{276ECC95-5CB2-9F47-BBC9-1F15D08915F6}" destId="{F97F2B5C-A310-FE4C-A812-DB282E261D0A}" srcOrd="0" destOrd="0" presId="urn:microsoft.com/office/officeart/2005/8/layout/hierarchy2"/>
     <dgm:cxn modelId="{7F19C5A7-58F6-F948-86D2-66A304960EE8}" srcId="{2E1432B9-2340-7B4F-A4FB-3C8F85A920DA}" destId="{837D2806-A598-914C-9E7E-530603CC9694}" srcOrd="1" destOrd="0" parTransId="{CD5A3357-FB5B-E644-82F7-D0F9608221E7}" sibTransId="{F1AE193F-8A9D-4144-AF2A-635086674565}"/>
-    <dgm:cxn modelId="{470E44A9-1C55-E142-B928-0F0BD7FDCA9F}" type="presOf" srcId="{30E67414-1EDC-E747-94E6-77002BE10CB6}" destId="{9D8B57B8-631C-FB43-A057-C6F4840439BB}" srcOrd="1" destOrd="0" presId="urn:microsoft.com/office/officeart/2005/8/layout/hierarchy2"/>
-    <dgm:cxn modelId="{E13C7CA9-505F-3842-8224-CA84C222BE06}" type="presOf" srcId="{503724C0-4DC0-614D-A895-CD9721E0505E}" destId="{DA5BF4BB-05E1-0E46-B48F-BE2DEE98665B}" srcOrd="0" destOrd="0" presId="urn:microsoft.com/office/officeart/2005/8/layout/hierarchy2"/>
+    <dgm:cxn modelId="{F3380DA8-34A1-7745-B34B-BF3FEAF6E911}" type="presOf" srcId="{2EE738A1-A1A7-EC4D-BDD6-0DF0DCF2A2FE}" destId="{41A60FF1-F20F-0448-80F5-03D17D8A4922}" srcOrd="1" destOrd="0" presId="urn:microsoft.com/office/officeart/2005/8/layout/hierarchy2"/>
+    <dgm:cxn modelId="{7A5130A9-0F7D-CE47-A163-E4A07E4689E1}" type="presOf" srcId="{55836E6C-FEC0-0A4F-9D46-6320613A632B}" destId="{6F1542E3-3EE9-7643-98A4-02BB96297F69}" srcOrd="0" destOrd="0" presId="urn:microsoft.com/office/officeart/2005/8/layout/hierarchy2"/>
     <dgm:cxn modelId="{E8FF8AA9-EB27-5949-81F4-8816CEA99DC9}" srcId="{2E1432B9-2340-7B4F-A4FB-3C8F85A920DA}" destId="{03BEA625-8334-C148-B76E-B4B95225C8F2}" srcOrd="0" destOrd="0" parTransId="{7570DA5B-305E-2D4F-9C43-9143998CD399}" sibTransId="{CC9AB861-D000-3E47-8535-5A10D2183676}"/>
     <dgm:cxn modelId="{DA9DDDA9-D575-9943-8347-71B59F02C4CB}" srcId="{B0AB63BB-9919-1E4C-AFFD-8279A2D23113}" destId="{53EA4913-126A-244C-BD5D-7B52A63521C9}" srcOrd="1" destOrd="0" parTransId="{276ECC95-5CB2-9F47-BBC9-1F15D08915F6}" sibTransId="{EF55CFA0-1410-AC4B-9DC5-B73566F710C4}"/>
-    <dgm:cxn modelId="{836837AB-52BA-C645-A9C2-1932AF792A27}" type="presOf" srcId="{7208B522-2B5D-3849-868F-9EC270B7FB7F}" destId="{5230EDD4-2155-4C4B-9D01-61125A45B27E}" srcOrd="0" destOrd="0" presId="urn:microsoft.com/office/officeart/2005/8/layout/hierarchy2"/>
-    <dgm:cxn modelId="{FBBD8FAB-E147-D74D-9A66-34207ED7E70C}" type="presOf" srcId="{12EF4AD2-B0C0-334C-9700-49F85A200C9B}" destId="{1EA76DE5-1C8F-FA4D-A04F-5E95F39407AD}" srcOrd="0" destOrd="0" presId="urn:microsoft.com/office/officeart/2005/8/layout/hierarchy2"/>
-    <dgm:cxn modelId="{456050AC-C660-E747-BC38-A77EB1B1E8D6}" type="presOf" srcId="{A6728F54-B1E3-494A-9F16-51DE271822AC}" destId="{5B9880E6-BA2C-2E4D-838B-9DD0423AE609}" srcOrd="0" destOrd="0" presId="urn:microsoft.com/office/officeart/2005/8/layout/hierarchy2"/>
+    <dgm:cxn modelId="{3EBDC9AA-A870-6748-9CFD-91D7B6186A6B}" type="presOf" srcId="{1100FF0A-B281-C24B-933C-4A94BA74F661}" destId="{AD0CB518-2F16-A749-9C97-747B3498BAD9}" srcOrd="1" destOrd="0" presId="urn:microsoft.com/office/officeart/2005/8/layout/hierarchy2"/>
+    <dgm:cxn modelId="{536F8FAC-124F-C947-958E-AFC12687EFED}" type="presOf" srcId="{12EF4AD2-B0C0-334C-9700-49F85A200C9B}" destId="{1EA76DE5-1C8F-FA4D-A04F-5E95F39407AD}" srcOrd="0" destOrd="0" presId="urn:microsoft.com/office/officeart/2005/8/layout/hierarchy2"/>
     <dgm:cxn modelId="{0F782FAD-B922-104F-B08A-CF78A25C4F52}" srcId="{DB23E341-40FA-6743-A94A-2845D3A63174}" destId="{B9E28FDD-16EB-F74E-9AD7-49CA7C1D6C6D}" srcOrd="1" destOrd="0" parTransId="{72F39106-3957-544D-AB86-65E8EFCE07A3}" sibTransId="{CC641FCF-541B-3D42-8D94-C953C1DCFA28}"/>
-    <dgm:cxn modelId="{71A97BAE-C127-CA4B-8321-C8B2407FDC07}" type="presOf" srcId="{B9D6EB9F-5A0E-B94C-B310-2355C0FB920D}" destId="{E0E8B3D1-202F-F448-A89C-7325EF939FBE}" srcOrd="0" destOrd="0" presId="urn:microsoft.com/office/officeart/2005/8/layout/hierarchy2"/>
+    <dgm:cxn modelId="{5FA7C5AD-6879-3640-88F6-358D1F3F192D}" type="presOf" srcId="{074D98B8-B5C2-B146-B55F-21A9505F4994}" destId="{DD49C87D-B15D-704F-8833-A4B4C4143ED4}" srcOrd="0" destOrd="0" presId="urn:microsoft.com/office/officeart/2005/8/layout/hierarchy2"/>
+    <dgm:cxn modelId="{2C60A2AF-41D1-CF4E-B3EB-4217F43F263D}" type="presOf" srcId="{5A16902D-83DE-B04B-A3E6-8FE700D2F549}" destId="{180BC466-B29A-4F46-A85D-CA4AB8E5E528}" srcOrd="0" destOrd="0" presId="urn:microsoft.com/office/officeart/2005/8/layout/hierarchy2"/>
     <dgm:cxn modelId="{CCD040B1-AB57-A642-9A81-8DC2C58F4604}" srcId="{4ECB8E11-E0AC-184C-86D0-7D6C5E4DB6BE}" destId="{F846C330-0900-864C-AFE7-47A6B1C94F7A}" srcOrd="0" destOrd="0" parTransId="{1E5F3203-0DED-6643-9C6B-FD536231F97A}" sibTransId="{2EF9892B-F565-8048-87B9-041E4BC49569}"/>
-    <dgm:cxn modelId="{9DC04CB3-12D1-D344-9946-29A5D740107C}" type="presOf" srcId="{64AC65DF-19E6-0F4E-A1E6-DCD2D506B56A}" destId="{E20C8D68-D800-1B40-A349-E4C52EEA6DBB}" srcOrd="1" destOrd="0" presId="urn:microsoft.com/office/officeart/2005/8/layout/hierarchy2"/>
+    <dgm:cxn modelId="{12EF3FB2-C1A2-254F-A966-CA63DF8F572E}" type="presOf" srcId="{B0AB63BB-9919-1E4C-AFFD-8279A2D23113}" destId="{64730E10-34D9-EB40-9A15-71653BD55138}" srcOrd="0" destOrd="0" presId="urn:microsoft.com/office/officeart/2005/8/layout/hierarchy2"/>
+    <dgm:cxn modelId="{5D42BAB2-E297-6244-8A93-42CCA59266BB}" type="presOf" srcId="{473AEA83-E48D-2743-8B8D-2B43A8D4B519}" destId="{41B3D365-4B97-A64F-B00F-8B4601200E94}" srcOrd="1" destOrd="0" presId="urn:microsoft.com/office/officeart/2005/8/layout/hierarchy2"/>
     <dgm:cxn modelId="{94CF84B3-D340-3C40-B444-25E5FB5650E1}" srcId="{7FCE5DCC-58C9-D741-9FAE-6CD0D5FD2F94}" destId="{E9BDD8FF-3087-B34B-A2D2-0F54F0737280}" srcOrd="1" destOrd="0" parTransId="{4A13B86B-A1BF-F54F-9C92-2FA2F42AAD36}" sibTransId="{3751C444-D5E4-BF43-9FFE-E8BDCA74A32B}"/>
-    <dgm:cxn modelId="{8730E1B9-E38D-1841-B3CD-4E7DD261F257}" type="presOf" srcId="{8E4E75CB-8ECD-5946-9B34-A0BF488DBE97}" destId="{B371D0DB-D4F9-F54E-B9CA-FAFBC9F2E03D}" srcOrd="0" destOrd="0" presId="urn:microsoft.com/office/officeart/2005/8/layout/hierarchy2"/>
+    <dgm:cxn modelId="{02898FB4-B53A-0B4D-A6B7-70674A944D85}" type="presOf" srcId="{F2515F6F-2FC4-6043-BE11-A587AFEA6F81}" destId="{FFFF1321-B119-DD44-91BC-A8BB725CB204}" srcOrd="0" destOrd="0" presId="urn:microsoft.com/office/officeart/2005/8/layout/hierarchy2"/>
+    <dgm:cxn modelId="{D7E62BB5-6846-4246-A643-FE168B1D14EF}" type="presOf" srcId="{02BB8850-2D09-3B41-BEE2-0D51EE7AAAE4}" destId="{999F5CA8-9E6C-F741-B72D-1CBCFB0A9AFA}" srcOrd="1" destOrd="0" presId="urn:microsoft.com/office/officeart/2005/8/layout/hierarchy2"/>
+    <dgm:cxn modelId="{16C387B8-1F74-C445-8298-A20CB54F8708}" type="presOf" srcId="{C878F5E1-AD43-1948-A44A-CFB976113450}" destId="{BBF96CC7-6B2B-D546-B69E-E97D847B5E45}" srcOrd="0" destOrd="0" presId="urn:microsoft.com/office/officeart/2005/8/layout/hierarchy2"/>
+    <dgm:cxn modelId="{093290B9-7FAC-6941-81FA-7E92391405AE}" type="presOf" srcId="{30E67414-1EDC-E747-94E6-77002BE10CB6}" destId="{48C1939D-7F8F-224A-89D3-D240B4AD4863}" srcOrd="0" destOrd="0" presId="urn:microsoft.com/office/officeart/2005/8/layout/hierarchy2"/>
+    <dgm:cxn modelId="{202AEDBA-FE7F-CE43-A24A-F94EED192B6C}" type="presOf" srcId="{E652B916-7C94-A442-94DD-868984C90584}" destId="{6A216B04-6334-174E-8CE0-43440AFADB3F}" srcOrd="1" destOrd="0" presId="urn:microsoft.com/office/officeart/2005/8/layout/hierarchy2"/>
+    <dgm:cxn modelId="{24F686BB-C6F2-674F-9CAF-0234CF46D505}" type="presOf" srcId="{CCEAFC7A-D65A-504C-A795-E458869A94AA}" destId="{514A0DE5-E2F7-1642-9C22-82D2271D99DD}" srcOrd="1" destOrd="0" presId="urn:microsoft.com/office/officeart/2005/8/layout/hierarchy2"/>
     <dgm:cxn modelId="{8C4FA6BB-A650-5642-BAF3-C454CD07334F}" srcId="{53EA4913-126A-244C-BD5D-7B52A63521C9}" destId="{C3CCA1E9-342B-1B46-82BF-85B68CA8D3EF}" srcOrd="0" destOrd="0" parTransId="{813B1D9A-25C7-DF46-8C94-0BBAC6292275}" sibTransId="{D9C6CD58-4586-F848-9D7E-93869DCD8BBA}"/>
+    <dgm:cxn modelId="{4E85ABBB-8E3B-B348-868E-6ACDAFF02366}" type="presOf" srcId="{3E973414-B004-A34E-918A-C6D1765490F5}" destId="{2C1E44BD-A489-2646-AD2D-FB438B53D6D4}" srcOrd="1" destOrd="0" presId="urn:microsoft.com/office/officeart/2005/8/layout/hierarchy2"/>
+    <dgm:cxn modelId="{0B38D2BB-9E72-B34E-9A62-CB7ABBC88A01}" type="presOf" srcId="{E7021709-E071-B94E-B8AA-7E8AB290C85B}" destId="{89D62D01-044A-5E49-BF87-E08569D899ED}" srcOrd="1" destOrd="0" presId="urn:microsoft.com/office/officeart/2005/8/layout/hierarchy2"/>
+    <dgm:cxn modelId="{EDE0D6BB-6C84-F241-838D-6F7F537AEF4F}" type="presOf" srcId="{E709B3A6-6ADF-C64F-8A7C-41FF2B111220}" destId="{10FFB18E-4AFA-344C-9BC1-AD34B4676854}" srcOrd="1" destOrd="0" presId="urn:microsoft.com/office/officeart/2005/8/layout/hierarchy2"/>
     <dgm:cxn modelId="{7C5537BC-954F-8447-AEB2-0C7B736762EC}" srcId="{BF9C033C-4AFB-A34B-AE36-E0F43283D02E}" destId="{E5C55A35-ED3B-F147-A326-B9256B7FAB23}" srcOrd="1" destOrd="0" parTransId="{B743AEA8-216B-2E46-9601-0AD3641A5E9E}" sibTransId="{DE1EC30B-B358-5F4C-B35B-BDD0633EC860}"/>
-    <dgm:cxn modelId="{AA67BFBC-E448-6F4E-8A4C-F019B2B00164}" type="presOf" srcId="{A0A62DC7-4D31-8249-B14F-D2C78956C1B4}" destId="{882C5457-CC43-4A48-A99D-03D91C22C0F5}" srcOrd="0" destOrd="0" presId="urn:microsoft.com/office/officeart/2005/8/layout/hierarchy2"/>
-    <dgm:cxn modelId="{654D02BD-9CF4-684B-97FF-401CDDE3720E}" type="presOf" srcId="{56F3205A-6C26-3647-AD88-9D60DDAC1A4F}" destId="{6B63E564-88B8-E64A-B9FB-CD4F663F06C4}" srcOrd="0" destOrd="0" presId="urn:microsoft.com/office/officeart/2005/8/layout/hierarchy2"/>
-    <dgm:cxn modelId="{704DC3BE-B920-054C-9C64-13813C182C4D}" type="presOf" srcId="{1D127EAA-B7A9-414C-8B63-A85FAAA8474B}" destId="{EE1464C4-316F-E04B-8F78-14DC107A8C10}" srcOrd="0" destOrd="0" presId="urn:microsoft.com/office/officeart/2005/8/layout/hierarchy2"/>
+    <dgm:cxn modelId="{443552BC-99CD-814D-9C5E-DB650458B8FC}" type="presOf" srcId="{CD5A3357-FB5B-E644-82F7-D0F9608221E7}" destId="{A52AB215-CE3B-6540-84CE-C7392438F501}" srcOrd="1" destOrd="0" presId="urn:microsoft.com/office/officeart/2005/8/layout/hierarchy2"/>
+    <dgm:cxn modelId="{F107FEBC-D987-7D4E-B1CB-27E3831DD5AC}" type="presOf" srcId="{CDC15278-99AA-3E4F-831E-5A7AD3E5E1FE}" destId="{0904125F-8547-564B-8B1D-703FF6EDB6C9}" srcOrd="0" destOrd="0" presId="urn:microsoft.com/office/officeart/2005/8/layout/hierarchy2"/>
+    <dgm:cxn modelId="{BA975CBE-FAAA-EF40-9EEF-9BA642DE554D}" type="presOf" srcId="{D06F829E-D606-FF46-A42D-A54189EDC959}" destId="{AE66067E-8C8F-C146-AE9F-FD6D23D7EA7D}" srcOrd="0" destOrd="0" presId="urn:microsoft.com/office/officeart/2005/8/layout/hierarchy2"/>
+    <dgm:cxn modelId="{801015C0-0AC3-6F4B-B9C4-08B2526EF233}" type="presOf" srcId="{58D9B40E-196C-F64A-AD54-97A01917AAC3}" destId="{32E1E92B-B747-1945-8244-8375262856A2}" srcOrd="0" destOrd="0" presId="urn:microsoft.com/office/officeart/2005/8/layout/hierarchy2"/>
     <dgm:cxn modelId="{8A2930C0-0887-774A-8573-570A102131CA}" srcId="{E9BDD8FF-3087-B34B-A2D2-0F54F0737280}" destId="{8CB9C1D1-1504-2247-A079-C10F1E47D2F9}" srcOrd="0" destOrd="0" parTransId="{E709B3A6-6ADF-C64F-8A7C-41FF2B111220}" sibTransId="{4C75D2B5-1C54-B947-BAFF-BFC8A70C55B2}"/>
-    <dgm:cxn modelId="{DDCC10C1-1506-514E-B67A-1BDEDB237B7C}" type="presOf" srcId="{B0AB63BB-9919-1E4C-AFFD-8279A2D23113}" destId="{64730E10-34D9-EB40-9A15-71653BD55138}" srcOrd="0" destOrd="0" presId="urn:microsoft.com/office/officeart/2005/8/layout/hierarchy2"/>
-    <dgm:cxn modelId="{17AF33C1-08B6-524C-9C54-A1BFF0597D43}" type="presOf" srcId="{9FF37F7A-1838-EB46-B9B6-3A9CF88DE34F}" destId="{23076C38-17B5-7A42-97BC-A3169834B242}" srcOrd="0" destOrd="0" presId="urn:microsoft.com/office/officeart/2005/8/layout/hierarchy2"/>
-    <dgm:cxn modelId="{6EE944C1-5516-7640-BF0C-2FF576717C0F}" type="presOf" srcId="{0BA4C58A-447C-8A41-A46B-B6EC1E557052}" destId="{BFED5B89-8694-FF4F-9CB3-2BB9C40DD18B}" srcOrd="0" destOrd="0" presId="urn:microsoft.com/office/officeart/2005/8/layout/hierarchy2"/>
+    <dgm:cxn modelId="{F441FFC0-6BAC-5D4A-BC98-34662DD693D9}" type="presOf" srcId="{813B1D9A-25C7-DF46-8C94-0BBAC6292275}" destId="{3ADF03C0-B77F-EF41-BE57-79DF4D231738}" srcOrd="1" destOrd="0" presId="urn:microsoft.com/office/officeart/2005/8/layout/hierarchy2"/>
+    <dgm:cxn modelId="{485999C1-7D93-1943-98FB-40876AC428D7}" type="presOf" srcId="{A0A81C7A-A077-E44D-9674-817A7E10C553}" destId="{22F37B2C-0144-4B42-B610-EDE869332C91}" srcOrd="0" destOrd="0" presId="urn:microsoft.com/office/officeart/2005/8/layout/hierarchy2"/>
+    <dgm:cxn modelId="{F58DA2C1-E2B5-8649-A185-9EF84F20D61E}" type="presOf" srcId="{02BB8850-2D09-3B41-BEE2-0D51EE7AAAE4}" destId="{622CDB72-9FE3-E446-8D99-51F2FE63E17B}" srcOrd="0" destOrd="0" presId="urn:microsoft.com/office/officeart/2005/8/layout/hierarchy2"/>
     <dgm:cxn modelId="{278859C2-4570-D94B-AAC1-5BE249D7A3F9}" srcId="{9FF37F7A-1838-EB46-B9B6-3A9CF88DE34F}" destId="{12EF4AD2-B0C0-334C-9700-49F85A200C9B}" srcOrd="0" destOrd="0" parTransId="{CB106D45-EF6B-A24A-B9D6-C5EBA4B563E2}" sibTransId="{167E7169-209F-6B4B-B6BD-FD663A621DA3}"/>
-    <dgm:cxn modelId="{DEE483C3-5636-164B-8E15-F23EBD513AC5}" type="presOf" srcId="{99B9F1DD-A4C8-824C-8A75-F8555EA0A282}" destId="{6D61A4E9-20E0-724F-8506-4AF9CF093D61}" srcOrd="0" destOrd="0" presId="urn:microsoft.com/office/officeart/2005/8/layout/hierarchy2"/>
-    <dgm:cxn modelId="{BB11CFC3-5E49-684C-A674-FFDCC1EAA971}" type="presOf" srcId="{92C32607-449A-C244-9487-603D02D93CA0}" destId="{ECCEC597-BD45-C34C-A5EB-49A8E6926768}" srcOrd="0" destOrd="0" presId="urn:microsoft.com/office/officeart/2005/8/layout/hierarchy2"/>
+    <dgm:cxn modelId="{664A96C2-C7CA-544E-9FF6-C7F70AF1FB0A}" type="presOf" srcId="{F846C330-0900-864C-AFE7-47A6B1C94F7A}" destId="{B8C27370-6C50-BC4C-B96A-F7009FCE9B29}" srcOrd="0" destOrd="0" presId="urn:microsoft.com/office/officeart/2005/8/layout/hierarchy2"/>
+    <dgm:cxn modelId="{F8D718C3-E4B0-2541-9315-48933884A669}" type="presOf" srcId="{85DFC1C0-544D-1E49-A2B5-A5044611C851}" destId="{188FEBA0-2EEA-BF48-BFFD-9861C935AD27}" srcOrd="1" destOrd="0" presId="urn:microsoft.com/office/officeart/2005/8/layout/hierarchy2"/>
+    <dgm:cxn modelId="{A4A244C4-9997-1940-AC3A-1C7302F6A16F}" type="presOf" srcId="{7BEBD233-7B02-8147-AE4D-E4DD0C76C806}" destId="{078132C5-A031-0748-9C75-15F7D2568E9E}" srcOrd="1" destOrd="0" presId="urn:microsoft.com/office/officeart/2005/8/layout/hierarchy2"/>
+    <dgm:cxn modelId="{EDCA67C5-B2F9-AF46-BB71-EADE6B3C72E6}" type="presOf" srcId="{7208B522-2B5D-3849-868F-9EC270B7FB7F}" destId="{062A7194-78C8-F943-A247-3B3F469D7F62}" srcOrd="1" destOrd="0" presId="urn:microsoft.com/office/officeart/2005/8/layout/hierarchy2"/>
     <dgm:cxn modelId="{4A0ABDC6-59E7-CA48-B743-1089D6B7ACDE}" srcId="{DB23E341-40FA-6743-A94A-2845D3A63174}" destId="{41B2A725-728B-E444-BC64-82E7AAFB531F}" srcOrd="0" destOrd="0" parTransId="{26628364-25FD-7748-B852-E2423190B99C}" sibTransId="{32D985C5-810E-7F46-A0A4-86D32FD7D3D6}"/>
-    <dgm:cxn modelId="{119237C8-D636-FD4D-8E8E-7298F7F72E40}" type="presOf" srcId="{6575138D-D60D-6742-BB52-DC29084B29E3}" destId="{28940162-CD59-DD4E-88C0-70FA243B6697}" srcOrd="0" destOrd="0" presId="urn:microsoft.com/office/officeart/2005/8/layout/hierarchy2"/>
-    <dgm:cxn modelId="{FD83A1C8-992F-124F-BBE9-68FA2BD01CC3}" type="presOf" srcId="{92C32607-449A-C244-9487-603D02D93CA0}" destId="{011CB822-2D4A-7B42-AE71-43EB941EC0B3}" srcOrd="1" destOrd="0" presId="urn:microsoft.com/office/officeart/2005/8/layout/hierarchy2"/>
+    <dgm:cxn modelId="{779893C8-535A-2E4A-B705-B1A7244EABDD}" type="presOf" srcId="{9086BAEE-F952-EA4B-9CE3-C10B8AA8DE51}" destId="{74606542-DF75-9244-9F75-2B19D3C6F8C9}" srcOrd="0" destOrd="0" presId="urn:microsoft.com/office/officeart/2005/8/layout/hierarchy2"/>
+    <dgm:cxn modelId="{B3449EC8-CA91-1A40-9445-7674FB4EE2D0}" srcId="{E4C021FE-8A7E-294E-B917-3CCED5372D53}" destId="{F46CFE8E-B9D8-1F43-BAE5-C0EBA300E1AE}" srcOrd="1" destOrd="0" parTransId="{7BEBD233-7B02-8147-AE4D-E4DD0C76C806}" sibTransId="{FD1FE467-2EB7-0E46-B213-D9C951832CA3}"/>
     <dgm:cxn modelId="{D14CBCC8-289F-E74F-BF8A-0CFC343CDFA2}" srcId="{53F4F2E1-85A6-0544-8CB0-CF4F62FAD169}" destId="{DB23E341-40FA-6743-A94A-2845D3A63174}" srcOrd="1" destOrd="0" parTransId="{0BA4C58A-447C-8A41-A46B-B6EC1E557052}" sibTransId="{F52E8EBD-79A9-F340-8ED7-9B4FE19C96F1}"/>
-    <dgm:cxn modelId="{AAFC8FC9-EE80-2647-B122-6E8867084C18}" type="presOf" srcId="{E652B916-7C94-A442-94DD-868984C90584}" destId="{6A216B04-6334-174E-8CE0-43440AFADB3F}" srcOrd="1" destOrd="0" presId="urn:microsoft.com/office/officeart/2005/8/layout/hierarchy2"/>
-    <dgm:cxn modelId="{4948C6C9-8B7F-464A-8FDE-F48465E0B925}" type="presOf" srcId="{D67B605D-1D92-354B-A719-EF56821C6E13}" destId="{6EB62837-1E38-C84D-ACB4-94B49AFC73CE}" srcOrd="0" destOrd="0" presId="urn:microsoft.com/office/officeart/2005/8/layout/hierarchy2"/>
-    <dgm:cxn modelId="{764214CA-7575-BF4F-8A30-C51EFB96DBAE}" type="presOf" srcId="{2A1D79E9-5180-CD44-A6E4-DF75859017DD}" destId="{17969B6C-27C4-594D-AD5E-6F5032B8027F}" srcOrd="1" destOrd="0" presId="urn:microsoft.com/office/officeart/2005/8/layout/hierarchy2"/>
-    <dgm:cxn modelId="{149348CA-A256-1240-A0C9-0BEDBA0BE505}" type="presOf" srcId="{335EBAED-2E86-8340-B7AC-8CACBDECEB6C}" destId="{FE860302-7B4F-8444-86E7-3E89E24F2AE0}" srcOrd="0" destOrd="0" presId="urn:microsoft.com/office/officeart/2005/8/layout/hierarchy2"/>
-    <dgm:cxn modelId="{7F62C6CA-ABA4-144A-B0D3-AA739374CE8A}" type="presOf" srcId="{C42AF61D-E72F-D440-86F7-95279F71EDF5}" destId="{AE09F7FF-7720-0E4F-A409-200B111906F7}" srcOrd="0" destOrd="0" presId="urn:microsoft.com/office/officeart/2005/8/layout/hierarchy2"/>
-    <dgm:cxn modelId="{0CDCEACA-75F3-4C49-90A9-F30C86F8CF0A}" type="presOf" srcId="{72F39106-3957-544D-AB86-65E8EFCE07A3}" destId="{B8131463-CBB7-BD48-AC92-13CAB2DC079F}" srcOrd="1" destOrd="0" presId="urn:microsoft.com/office/officeart/2005/8/layout/hierarchy2"/>
-    <dgm:cxn modelId="{327BC0CB-CAD7-2D49-8C6E-47860EA310B3}" type="presOf" srcId="{4ECB8E11-E0AC-184C-86D0-7D6C5E4DB6BE}" destId="{D6692AF1-A2BC-EF40-9178-4475E39B2EF6}" srcOrd="0" destOrd="0" presId="urn:microsoft.com/office/officeart/2005/8/layout/hierarchy2"/>
+    <dgm:cxn modelId="{F3F48EC9-100E-774C-8A19-1F41B8EFF081}" type="presOf" srcId="{E5C55A35-ED3B-F147-A326-B9256B7FAB23}" destId="{2915A037-971F-304E-9764-FAB284167672}" srcOrd="0" destOrd="0" presId="urn:microsoft.com/office/officeart/2005/8/layout/hierarchy2"/>
+    <dgm:cxn modelId="{FF49B7CA-F689-AB4C-95A2-B9BBF65DB62E}" type="presOf" srcId="{C42AF61D-E72F-D440-86F7-95279F71EDF5}" destId="{C7F54069-F85F-C24F-B7E5-A79C8F7CF7A2}" srcOrd="1" destOrd="0" presId="urn:microsoft.com/office/officeart/2005/8/layout/hierarchy2"/>
     <dgm:cxn modelId="{582728CC-FE3F-494C-8452-C47D7FC8C06F}" srcId="{6B79D810-F8DD-BC40-A9B1-5D821F1FBA6D}" destId="{A2AFE9BF-4648-8847-9B35-BF89E09D0D1C}" srcOrd="0" destOrd="0" parTransId="{56F3205A-6C26-3647-AD88-9D60DDAC1A4F}" sibTransId="{776BB455-0FDE-8146-BB31-88027AA8A036}"/>
-    <dgm:cxn modelId="{9EBDB2CD-30D4-3E4B-8E26-724C015F048B}" type="presOf" srcId="{070ABDEE-2B94-3A4C-B123-8BFB22D3792E}" destId="{6C8DB8F2-3E6F-E842-B341-B9444FABBF52}" srcOrd="0" destOrd="0" presId="urn:microsoft.com/office/officeart/2005/8/layout/hierarchy2"/>
+    <dgm:cxn modelId="{E75E0ECD-D5AA-1841-AD74-99D439CFD121}" type="presOf" srcId="{7570DA5B-305E-2D4F-9C43-9143998CD399}" destId="{99F05CAB-2148-F444-8941-3147FA138FC8}" srcOrd="1" destOrd="0" presId="urn:microsoft.com/office/officeart/2005/8/layout/hierarchy2"/>
     <dgm:cxn modelId="{76E0C1CD-FEEF-6845-92F4-B444F961DB8C}" srcId="{61EE0437-A230-AA47-BD9B-9EC70641E370}" destId="{018C868C-7E88-1341-95C7-A4A040A901F0}" srcOrd="1" destOrd="0" parTransId="{60A94D8F-EC8A-CA43-AC88-34395F8CC022}" sibTransId="{9E749FD4-ADEA-6B49-AF18-AB0560816FB4}"/>
-    <dgm:cxn modelId="{0DAAF0CD-02A9-5145-869A-BDA2DBC52C8A}" type="presOf" srcId="{C88F80E9-D72C-FE40-A234-5BCA8DA5BF97}" destId="{1EB97A9B-9DB3-9746-B7CA-25A9127E658D}" srcOrd="0" destOrd="0" presId="urn:microsoft.com/office/officeart/2005/8/layout/hierarchy2"/>
     <dgm:cxn modelId="{68CC43CE-009C-5D4F-A0D1-F0707C665BE4}" srcId="{0CC64CDE-03F3-5145-9992-9CBD8640F750}" destId="{E4C021FE-8A7E-294E-B917-3CCED5372D53}" srcOrd="0" destOrd="0" parTransId="{DEC33D82-86DE-144B-A01C-CB3C301AB057}" sibTransId="{B0A50815-5F38-E140-9BCD-BD2F67BCA490}"/>
-    <dgm:cxn modelId="{610447CE-BFCA-B84D-9D6D-D28A1186EE6C}" type="presOf" srcId="{434E16C0-9111-9A46-ABAF-8042E7E425A0}" destId="{EEF9B519-006B-D64A-A894-6F7AC9155FD9}" srcOrd="0" destOrd="0" presId="urn:microsoft.com/office/officeart/2005/8/layout/hierarchy2"/>
-    <dgm:cxn modelId="{49479BCE-3F84-F240-9086-F1578A360BB1}" type="presOf" srcId="{3ECA71C2-7B10-C24A-8256-9BBBEBA76CC4}" destId="{1F61B25A-1771-6C48-A23E-9F44BFFFE83A}" srcOrd="0" destOrd="0" presId="urn:microsoft.com/office/officeart/2005/8/layout/hierarchy2"/>
-    <dgm:cxn modelId="{8F522CD3-4E87-C941-862F-2CAE75FA4692}" type="presOf" srcId="{ADE03602-EDA6-E54F-944C-C5A5CD460E25}" destId="{F84751BB-FB2D-0A40-88BA-778CB80F14B3}" srcOrd="0" destOrd="0" presId="urn:microsoft.com/office/officeart/2005/8/layout/hierarchy2"/>
-    <dgm:cxn modelId="{CE774CD5-2C7A-CE4B-9A11-9BD07572A4C0}" type="presOf" srcId="{7FCE5DCC-58C9-D741-9FAE-6CD0D5FD2F94}" destId="{9CA221DE-8BA7-C642-A298-1EBC15C1C54E}" srcOrd="0" destOrd="0" presId="urn:microsoft.com/office/officeart/2005/8/layout/hierarchy2"/>
-    <dgm:cxn modelId="{623BACD5-8D38-F547-94A0-9C9D80921C38}" type="presOf" srcId="{35D887D7-33BF-1949-B929-3C1A5F9EBA0E}" destId="{D7596022-8BF6-2F44-B88B-8E372A8354ED}" srcOrd="0" destOrd="0" presId="urn:microsoft.com/office/officeart/2005/8/layout/hierarchy2"/>
+    <dgm:cxn modelId="{411BEACE-EB78-8749-95E5-A87C27484B62}" type="presOf" srcId="{4A3BD0D8-5773-6C4C-A796-C027AC6F30B5}" destId="{0944545F-BE28-CB41-9FE0-CB8029CA4E05}" srcOrd="0" destOrd="0" presId="urn:microsoft.com/office/officeart/2005/8/layout/hierarchy2"/>
+    <dgm:cxn modelId="{EAFC21CF-17BF-1948-8945-6387958D743D}" type="presOf" srcId="{7BEBD233-7B02-8147-AE4D-E4DD0C76C806}" destId="{BA1CDD9D-9A6E-0C4E-A9A3-029341159AEA}" srcOrd="0" destOrd="0" presId="urn:microsoft.com/office/officeart/2005/8/layout/hierarchy2"/>
+    <dgm:cxn modelId="{BA7B55CF-8C7C-D74C-A9B7-130BFE8A7FCE}" type="presOf" srcId="{B9D6EB9F-5A0E-B94C-B310-2355C0FB920D}" destId="{E0E8B3D1-202F-F448-A89C-7325EF939FBE}" srcOrd="0" destOrd="0" presId="urn:microsoft.com/office/officeart/2005/8/layout/hierarchy2"/>
+    <dgm:cxn modelId="{A062A5D1-7B65-A64D-A745-1ED38AAD1978}" type="presOf" srcId="{ADE03602-EDA6-E54F-944C-C5A5CD460E25}" destId="{F84751BB-FB2D-0A40-88BA-778CB80F14B3}" srcOrd="0" destOrd="0" presId="urn:microsoft.com/office/officeart/2005/8/layout/hierarchy2"/>
+    <dgm:cxn modelId="{05FBB2D4-CED7-5F47-B2C8-CAC0B2449413}" type="presOf" srcId="{1D127EAA-B7A9-414C-8B63-A85FAAA8474B}" destId="{EE1464C4-316F-E04B-8F78-14DC107A8C10}" srcOrd="0" destOrd="0" presId="urn:microsoft.com/office/officeart/2005/8/layout/hierarchy2"/>
     <dgm:cxn modelId="{72EBC4D5-F654-7945-95B7-FA2927110642}" srcId="{335EBAED-2E86-8340-B7AC-8CACBDECEB6C}" destId="{ECC38862-6814-954F-80AE-DBF7C83AD452}" srcOrd="0" destOrd="0" parTransId="{D06F829E-D606-FF46-A42D-A54189EDC959}" sibTransId="{61540A44-F8A0-A341-893D-8B24B13AE0C0}"/>
-    <dgm:cxn modelId="{9D41F1D5-87FA-A442-8743-902721BAE8C7}" type="presOf" srcId="{3E973414-B004-A34E-918A-C6D1765490F5}" destId="{68E9A118-368E-3244-B463-69DB084DF2CF}" srcOrd="0" destOrd="0" presId="urn:microsoft.com/office/officeart/2005/8/layout/hierarchy2"/>
+    <dgm:cxn modelId="{47C913D6-1704-404C-BC6C-950EE372CF58}" type="presOf" srcId="{473AEA83-E48D-2743-8B8D-2B43A8D4B519}" destId="{F6FDF62A-4F89-A044-8B79-891849B97CC4}" srcOrd="0" destOrd="0" presId="urn:microsoft.com/office/officeart/2005/8/layout/hierarchy2"/>
     <dgm:cxn modelId="{16C767D6-F719-9E45-B8BE-E2B1DF0B53BA}" srcId="{B0AB63BB-9919-1E4C-AFFD-8279A2D23113}" destId="{75B42418-0B78-E744-853C-EAC114FC3471}" srcOrd="0" destOrd="0" parTransId="{64AC65DF-19E6-0F4E-A1E6-DCD2D506B56A}" sibTransId="{C654CD76-E44E-FC44-A624-58B71A292EFD}"/>
-    <dgm:cxn modelId="{C748C3D6-5380-564C-A9D7-F321F7D12A25}" type="presOf" srcId="{4A13B86B-A1BF-F54F-9C92-2FA2F42AAD36}" destId="{7F275FDA-DE69-2B4A-84AB-2462E309FB00}" srcOrd="1" destOrd="0" presId="urn:microsoft.com/office/officeart/2005/8/layout/hierarchy2"/>
-    <dgm:cxn modelId="{CCEC49D7-E016-2E4D-AE0A-0C0C9BE6BCB8}" type="presOf" srcId="{56F3205A-6C26-3647-AD88-9D60DDAC1A4F}" destId="{0BB8C1D1-32D5-F247-90B9-6406D7687D76}" srcOrd="1" destOrd="0" presId="urn:microsoft.com/office/officeart/2005/8/layout/hierarchy2"/>
-    <dgm:cxn modelId="{F1F835DA-9220-8946-879C-F846C70968B3}" type="presOf" srcId="{3E973414-B004-A34E-918A-C6D1765490F5}" destId="{2C1E44BD-A489-2646-AD2D-FB438B53D6D4}" srcOrd="1" destOrd="0" presId="urn:microsoft.com/office/officeart/2005/8/layout/hierarchy2"/>
-    <dgm:cxn modelId="{663595DA-B59E-CE4F-9F3B-D401D1E796BB}" type="presOf" srcId="{D06F829E-D606-FF46-A42D-A54189EDC959}" destId="{AE66067E-8C8F-C146-AE9F-FD6D23D7EA7D}" srcOrd="0" destOrd="0" presId="urn:microsoft.com/office/officeart/2005/8/layout/hierarchy2"/>
-    <dgm:cxn modelId="{55CF97DB-D274-1046-8150-12F3E8341075}" type="presOf" srcId="{1100FF0A-B281-C24B-933C-4A94BA74F661}" destId="{AD0CB518-2F16-A749-9C97-747B3498BAD9}" srcOrd="1" destOrd="0" presId="urn:microsoft.com/office/officeart/2005/8/layout/hierarchy2"/>
+    <dgm:cxn modelId="{48A180D7-B81F-8943-A72C-2FE6AD106620}" type="presOf" srcId="{3ECA71C2-7B10-C24A-8256-9BBBEBA76CC4}" destId="{1F61B25A-1771-6C48-A23E-9F44BFFFE83A}" srcOrd="0" destOrd="0" presId="urn:microsoft.com/office/officeart/2005/8/layout/hierarchy2"/>
+    <dgm:cxn modelId="{4962BBD7-581A-884D-B8BD-0246A16B3900}" type="presOf" srcId="{55836E6C-FEC0-0A4F-9D46-6320613A632B}" destId="{ADC457D0-4675-8749-9954-B3A7E3C7E138}" srcOrd="1" destOrd="0" presId="urn:microsoft.com/office/officeart/2005/8/layout/hierarchy2"/>
+    <dgm:cxn modelId="{10A5E6D9-B633-C64F-9A73-00C47E52AC80}" type="presOf" srcId="{434E16C0-9111-9A46-ABAF-8042E7E425A0}" destId="{EEF9B519-006B-D64A-A894-6F7AC9155FD9}" srcOrd="0" destOrd="0" presId="urn:microsoft.com/office/officeart/2005/8/layout/hierarchy2"/>
+    <dgm:cxn modelId="{AFFC2EDB-DBDF-2549-BE71-1B11116C2BD9}" type="presOf" srcId="{C88F80E9-D72C-FE40-A234-5BCA8DA5BF97}" destId="{1EB97A9B-9DB3-9746-B7CA-25A9127E658D}" srcOrd="0" destOrd="0" presId="urn:microsoft.com/office/officeart/2005/8/layout/hierarchy2"/>
+    <dgm:cxn modelId="{411993DB-80ED-B846-9F38-37FF72C2B11E}" type="presOf" srcId="{DEC33D82-86DE-144B-A01C-CB3C301AB057}" destId="{8CD01425-6999-1B43-A074-9B4B66D474FE}" srcOrd="1" destOrd="0" presId="urn:microsoft.com/office/officeart/2005/8/layout/hierarchy2"/>
     <dgm:cxn modelId="{AFEE3ADC-246C-854D-8BDD-B8DA4124AEF0}" srcId="{658FBE69-F69F-494C-A4A4-B9E0D73E2DCF}" destId="{070ABDEE-2B94-3A4C-B123-8BFB22D3792E}" srcOrd="0" destOrd="0" parTransId="{CCEAFC7A-D65A-504C-A795-E458869A94AA}" sibTransId="{22924C99-ECBA-CD43-AE8A-03AE1D737826}"/>
-    <dgm:cxn modelId="{821265DD-3EA1-D04F-AC17-13BADCAC1818}" type="presOf" srcId="{7570DA5B-305E-2D4F-9C43-9143998CD399}" destId="{99F05CAB-2148-F444-8941-3147FA138FC8}" srcOrd="1" destOrd="0" presId="urn:microsoft.com/office/officeart/2005/8/layout/hierarchy2"/>
+    <dgm:cxn modelId="{650E55DC-5E3C-4843-8B6D-32367DEDAEEB}" type="presOf" srcId="{B743AEA8-216B-2E46-9601-0AD3641A5E9E}" destId="{4488718A-C95B-7B4D-8FA2-82EDC2308CB4}" srcOrd="1" destOrd="0" presId="urn:microsoft.com/office/officeart/2005/8/layout/hierarchy2"/>
     <dgm:cxn modelId="{F4AEABDD-C1A0-D449-94C7-A27E7D4136A6}" srcId="{6B79D810-F8DD-BC40-A9B1-5D821F1FBA6D}" destId="{D67B605D-1D92-354B-A719-EF56821C6E13}" srcOrd="1" destOrd="0" parTransId="{D083BCCB-23E8-3A40-9DC9-70EB5FEA9DBA}" sibTransId="{183F7FF4-7B56-2547-814C-15BEAA6F22F8}"/>
-    <dgm:cxn modelId="{B50262DE-879D-5D4F-8935-1E521FEC0737}" type="presOf" srcId="{B262C4D5-4CB3-B24D-AA92-A44ED0902194}" destId="{87A01F3E-6C55-844D-A489-6FE6695CB6F7}" srcOrd="0" destOrd="0" presId="urn:microsoft.com/office/officeart/2005/8/layout/hierarchy2"/>
+    <dgm:cxn modelId="{B2CF07DE-C317-064A-A8CC-731B5111A82B}" type="presOf" srcId="{56F3205A-6C26-3647-AD88-9D60DDAC1A4F}" destId="{6B63E564-88B8-E64A-B9FB-CD4F663F06C4}" srcOrd="0" destOrd="0" presId="urn:microsoft.com/office/officeart/2005/8/layout/hierarchy2"/>
+    <dgm:cxn modelId="{739AFDDE-E92A-9D40-B483-E76B449742CD}" type="presOf" srcId="{2EE738A1-A1A7-EC4D-BDD6-0DF0DCF2A2FE}" destId="{1A3852B0-3C08-8346-B30F-DB387753D752}" srcOrd="0" destOrd="0" presId="urn:microsoft.com/office/officeart/2005/8/layout/hierarchy2"/>
     <dgm:cxn modelId="{689C21DF-E4D2-E94F-A515-8125303C8F5E}" srcId="{51F97ACA-887C-BA45-AC49-3418727EBE6B}" destId="{61EE0437-A230-AA47-BD9B-9EC70641E370}" srcOrd="1" destOrd="0" parTransId="{3E973414-B004-A34E-918A-C6D1765490F5}" sibTransId="{E174143F-4E60-2648-9790-9566094F1CD8}"/>
-    <dgm:cxn modelId="{660205E2-BCC3-594F-B357-EFA1FF2CC3A4}" type="presOf" srcId="{5B4D6E87-7AAD-9244-B432-B58448146B80}" destId="{00CFE4B8-8832-0246-A40E-11D4FB02AE84}" srcOrd="0" destOrd="0" presId="urn:microsoft.com/office/officeart/2005/8/layout/hierarchy2"/>
-    <dgm:cxn modelId="{7AE42BE4-68FC-634D-8396-0E915F7CE1F5}" type="presOf" srcId="{35D887D7-33BF-1949-B929-3C1A5F9EBA0E}" destId="{17B51E74-34E2-7D49-AA23-10FE3919CFB0}" srcOrd="1" destOrd="0" presId="urn:microsoft.com/office/officeart/2005/8/layout/hierarchy2"/>
-    <dgm:cxn modelId="{F4799BE4-6295-B044-9F03-DF9D9819B399}" type="presOf" srcId="{C3CCA1E9-342B-1B46-82BF-85B68CA8D3EF}" destId="{95415AAC-B97B-3E4C-95D1-E26D4A47F854}" srcOrd="0" destOrd="0" presId="urn:microsoft.com/office/officeart/2005/8/layout/hierarchy2"/>
-    <dgm:cxn modelId="{F95A11E6-9AD0-1B40-BEF0-2F3E594753D3}" type="presOf" srcId="{A765A028-38A0-1747-9403-399C5667C12D}" destId="{09CB360A-D85F-B742-BBC1-624731FCF678}" srcOrd="0" destOrd="0" presId="urn:microsoft.com/office/officeart/2005/8/layout/hierarchy2"/>
-    <dgm:cxn modelId="{E9B0A6E7-F18B-9540-9F81-D259DDA39007}" type="presOf" srcId="{ECC38862-6814-954F-80AE-DBF7C83AD452}" destId="{3FE5FC00-5B11-B04A-8DA8-F4959DA3D91E}" srcOrd="0" destOrd="0" presId="urn:microsoft.com/office/officeart/2005/8/layout/hierarchy2"/>
-    <dgm:cxn modelId="{8818BDE8-F217-8F41-9B23-50EC4185482F}" type="presOf" srcId="{276ECC95-5CB2-9F47-BBC9-1F15D08915F6}" destId="{1A5A45C4-44F9-B14B-8DA5-D65DFB02E004}" srcOrd="1" destOrd="0" presId="urn:microsoft.com/office/officeart/2005/8/layout/hierarchy2"/>
-    <dgm:cxn modelId="{F7A651EA-6D28-F64E-8187-E078C05EFBC8}" srcId="{E4C021FE-8A7E-294E-B917-3CCED5372D53}" destId="{658FBE69-F69F-494C-A4A4-B9E0D73E2DCF}" srcOrd="1" destOrd="0" parTransId="{6575138D-D60D-6742-BB52-DC29084B29E3}" sibTransId="{4CD6AF00-F1D2-F942-9BA4-734540374919}"/>
+    <dgm:cxn modelId="{F41BB4DF-533E-4744-AE11-637E725DF54D}" type="presOf" srcId="{53EA4913-126A-244C-BD5D-7B52A63521C9}" destId="{6D8ECEBA-B209-6749-B193-A8A22E6346C1}" srcOrd="0" destOrd="0" presId="urn:microsoft.com/office/officeart/2005/8/layout/hierarchy2"/>
+    <dgm:cxn modelId="{4C4CB3E1-0142-C148-9496-92C11EF70209}" type="presOf" srcId="{059199F1-FACB-424A-BC60-4F36514A7088}" destId="{3C75570A-8614-8C43-96B0-36C4AA3C4F70}" srcOrd="1" destOrd="0" presId="urn:microsoft.com/office/officeart/2005/8/layout/hierarchy2"/>
+    <dgm:cxn modelId="{BAF1C8E1-42A7-7446-AE99-7ED0F12725D8}" type="presOf" srcId="{5A16902D-83DE-B04B-A3E6-8FE700D2F549}" destId="{A37D193D-BA8D-D841-BBF6-8B93ACA9CA93}" srcOrd="1" destOrd="0" presId="urn:microsoft.com/office/officeart/2005/8/layout/hierarchy2"/>
+    <dgm:cxn modelId="{E39A73E2-EE2F-AD4D-A743-AA0BF4BE254A}" type="presOf" srcId="{E4C021FE-8A7E-294E-B917-3CCED5372D53}" destId="{1FCD5530-9E05-B046-B8ED-0484835169DE}" srcOrd="0" destOrd="0" presId="urn:microsoft.com/office/officeart/2005/8/layout/hierarchy2"/>
+    <dgm:cxn modelId="{14BB0AE4-694C-C445-A9A7-73E472A71D8E}" type="presOf" srcId="{070ABDEE-2B94-3A4C-B123-8BFB22D3792E}" destId="{6C8DB8F2-3E6F-E842-B341-B9444FABBF52}" srcOrd="0" destOrd="0" presId="urn:microsoft.com/office/officeart/2005/8/layout/hierarchy2"/>
+    <dgm:cxn modelId="{32E5FFE4-F72E-7147-B977-0C8243CD6F74}" type="presOf" srcId="{51F97ACA-887C-BA45-AC49-3418727EBE6B}" destId="{3C252244-F4D5-774C-97FC-9730C3CA15AE}" srcOrd="0" destOrd="0" presId="urn:microsoft.com/office/officeart/2005/8/layout/hierarchy2"/>
+    <dgm:cxn modelId="{BD9CAEE7-1BDE-4544-94AF-C28FC627EF85}" type="presOf" srcId="{92C32607-449A-C244-9487-603D02D93CA0}" destId="{011CB822-2D4A-7B42-AE71-43EB941EC0B3}" srcOrd="1" destOrd="0" presId="urn:microsoft.com/office/officeart/2005/8/layout/hierarchy2"/>
+    <dgm:cxn modelId="{2AD8E4E7-6123-8547-A4F2-73DAABDBFC27}" type="presOf" srcId="{B262C4D5-4CB3-B24D-AA92-A44ED0902194}" destId="{87A01F3E-6C55-844D-A489-6FE6695CB6F7}" srcOrd="0" destOrd="0" presId="urn:microsoft.com/office/officeart/2005/8/layout/hierarchy2"/>
+    <dgm:cxn modelId="{F40F29EA-F7BE-C84B-87B0-27BF97AD5046}" type="presOf" srcId="{61EE0437-A230-AA47-BD9B-9EC70641E370}" destId="{D475B07C-EFC2-7840-8B4D-A25CA753797E}" srcOrd="0" destOrd="0" presId="urn:microsoft.com/office/officeart/2005/8/layout/hierarchy2"/>
+    <dgm:cxn modelId="{F7A651EA-6D28-F64E-8187-E078C05EFBC8}" srcId="{E4C021FE-8A7E-294E-B917-3CCED5372D53}" destId="{658FBE69-F69F-494C-A4A4-B9E0D73E2DCF}" srcOrd="2" destOrd="0" parTransId="{6575138D-D60D-6742-BB52-DC29084B29E3}" sibTransId="{4CD6AF00-F1D2-F942-9BA4-734540374919}"/>
+    <dgm:cxn modelId="{AD18A0EA-D7D5-014E-8F08-C6FDBC0D95EF}" type="presOf" srcId="{E9BDD8FF-3087-B34B-A2D2-0F54F0737280}" destId="{A3A57E5D-303D-C64F-A1DC-0E0FF1D6C828}" srcOrd="0" destOrd="0" presId="urn:microsoft.com/office/officeart/2005/8/layout/hierarchy2"/>
+    <dgm:cxn modelId="{B377F5EA-039F-B846-86BF-986809CD208C}" type="presOf" srcId="{0BA4C58A-447C-8A41-A46B-B6EC1E557052}" destId="{BFED5B89-8694-FF4F-9CB3-2BB9C40DD18B}" srcOrd="0" destOrd="0" presId="urn:microsoft.com/office/officeart/2005/8/layout/hierarchy2"/>
     <dgm:cxn modelId="{24C1B8EC-8EE4-B345-8886-DA95C0433F16}" srcId="{61EE0437-A230-AA47-BD9B-9EC70641E370}" destId="{3ECA71C2-7B10-C24A-8256-9BBBEBA76CC4}" srcOrd="0" destOrd="0" parTransId="{B9D6EB9F-5A0E-B94C-B310-2355C0FB920D}" sibTransId="{63EE5E06-6351-1644-AACC-EDFE18EB6C24}"/>
-    <dgm:cxn modelId="{50EE32ED-D91B-FC40-920A-1E7D6783BDD7}" type="presOf" srcId="{069ACE56-904A-2546-AF9F-F8DFD1A5DA59}" destId="{C4443B60-ECB6-1343-A45F-07FEEC62928B}" srcOrd="1" destOrd="0" presId="urn:microsoft.com/office/officeart/2005/8/layout/hierarchy2"/>
-    <dgm:cxn modelId="{0AEC63ED-362A-9C48-BF49-AE9B9602D503}" type="presOf" srcId="{41B2A725-728B-E444-BC64-82E7AAFB531F}" destId="{2AE2315F-57A1-0141-ABF0-D00525BED9D7}" srcOrd="0" destOrd="0" presId="urn:microsoft.com/office/officeart/2005/8/layout/hierarchy2"/>
-    <dgm:cxn modelId="{E8FDECED-DEE5-A048-8906-9796EFE51763}" type="presOf" srcId="{A2AFE9BF-4648-8847-9B35-BF89E09D0D1C}" destId="{2E029F71-35C9-9044-867B-C62FC8CEDC2C}" srcOrd="0" destOrd="0" presId="urn:microsoft.com/office/officeart/2005/8/layout/hierarchy2"/>
+    <dgm:cxn modelId="{4799A2ED-6B1E-314B-9DAB-190B8C35322E}" type="presOf" srcId="{60A94D8F-EC8A-CA43-AC88-34395F8CC022}" destId="{2D1E9B71-E05F-414C-9C94-D01927894E96}" srcOrd="0" destOrd="0" presId="urn:microsoft.com/office/officeart/2005/8/layout/hierarchy2"/>
+    <dgm:cxn modelId="{37D6E6ED-2CC8-E74C-86A0-100D4DE81722}" type="presOf" srcId="{503724C0-4DC0-614D-A895-CD9721E0505E}" destId="{DA5BF4BB-05E1-0E46-B48F-BE2DEE98665B}" srcOrd="0" destOrd="0" presId="urn:microsoft.com/office/officeart/2005/8/layout/hierarchy2"/>
+    <dgm:cxn modelId="{588DE9ED-B01C-EB4F-82B8-C3B0EE58D1AA}" type="presOf" srcId="{187244EF-C31E-6344-8FCF-96AF4AF3BC2A}" destId="{1B19DBDE-7BB1-664E-A05B-426990BEADD2}" srcOrd="1" destOrd="0" presId="urn:microsoft.com/office/officeart/2005/8/layout/hierarchy2"/>
     <dgm:cxn modelId="{9AB265EE-F018-784E-9C88-DF9A032D7C10}" srcId="{99B9F1DD-A4C8-824C-8A75-F8555EA0A282}" destId="{ADE03602-EDA6-E54F-944C-C5A5CD460E25}" srcOrd="1" destOrd="0" parTransId="{4A3BD0D8-5773-6C4C-A796-C027AC6F30B5}" sibTransId="{8AD8DE7D-E501-2E4C-88D0-AACAF6BE080D}"/>
-    <dgm:cxn modelId="{CB0FCDEF-606E-1040-8119-EE563466D364}" type="presOf" srcId="{2EE738A1-A1A7-EC4D-BDD6-0DF0DCF2A2FE}" destId="{1A3852B0-3C08-8346-B30F-DB387753D752}" srcOrd="0" destOrd="0" presId="urn:microsoft.com/office/officeart/2005/8/layout/hierarchy2"/>
-    <dgm:cxn modelId="{2DB74CF0-C936-9245-90D5-61CA240CC848}" type="presOf" srcId="{AC34A3B1-F415-024F-B362-364031611F5C}" destId="{15390832-3CB7-A648-B93F-B9552C39E0C7}" srcOrd="1" destOrd="0" presId="urn:microsoft.com/office/officeart/2005/8/layout/hierarchy2"/>
-    <dgm:cxn modelId="{35AC22F1-82BC-C942-B739-96B8222D7AF3}" type="presOf" srcId="{5A16902D-83DE-B04B-A3E6-8FE700D2F549}" destId="{A37D193D-BA8D-D841-BBF6-8B93ACA9CA93}" srcOrd="1" destOrd="0" presId="urn:microsoft.com/office/officeart/2005/8/layout/hierarchy2"/>
-    <dgm:cxn modelId="{4D4841F1-CA3A-244A-A270-67BDDFB06FC9}" type="presOf" srcId="{58D9B40E-196C-F64A-AD54-97A01917AAC3}" destId="{B3130863-C367-4E49-B7AD-D2B418734F30}" srcOrd="1" destOrd="0" presId="urn:microsoft.com/office/officeart/2005/8/layout/hierarchy2"/>
+    <dgm:cxn modelId="{921456F0-2DA7-8949-92B9-E6864403B714}" type="presOf" srcId="{DB23E341-40FA-6743-A94A-2845D3A63174}" destId="{CB80B394-5FA1-F64A-8C46-262DC0EAFF0C}" srcOrd="0" destOrd="0" presId="urn:microsoft.com/office/officeart/2005/8/layout/hierarchy2"/>
     <dgm:cxn modelId="{2F6E60F1-1762-5746-A9DA-ADAAB4FD91A5}" srcId="{10F4BF1A-E0E8-5247-98A6-E82AA7A267C9}" destId="{51F97ACA-887C-BA45-AC49-3418727EBE6B}" srcOrd="0" destOrd="0" parTransId="{A765A028-38A0-1747-9403-399C5667C12D}" sibTransId="{59900B6E-A397-1949-B38B-8D6D4C07063A}"/>
     <dgm:cxn modelId="{950C2DF2-5CD5-FF49-AE10-D5A75B080C73}" srcId="{D852DDE2-48EC-C949-AD66-1E4551A9BBE8}" destId="{8E4E75CB-8ECD-5946-9B34-A0BF488DBE97}" srcOrd="1" destOrd="0" parTransId="{074D98B8-B5C2-B146-B55F-21A9505F4994}" sibTransId="{B18D4BB3-5E58-EF4B-8007-280291A93180}"/>
-    <dgm:cxn modelId="{A2E2DEF2-69A6-A341-B92D-5EA43B127733}" type="presOf" srcId="{B898F6DC-BA66-A34E-9448-6CD8798FA52C}" destId="{9EADF938-02B1-2C43-8A93-4A4A378C8BDB}" srcOrd="0" destOrd="0" presId="urn:microsoft.com/office/officeart/2005/8/layout/hierarchy2"/>
+    <dgm:cxn modelId="{61677CF2-4E47-8F45-85A7-7CEB630668F4}" type="presOf" srcId="{37687930-03B2-6149-8735-77877F9E8006}" destId="{B0460EF9-21D3-F84E-BBFA-46763C9AE876}" srcOrd="0" destOrd="0" presId="urn:microsoft.com/office/officeart/2005/8/layout/hierarchy2"/>
+    <dgm:cxn modelId="{961DABF2-EDD3-DD42-92A5-A513F6D9FD5C}" type="presOf" srcId="{B743AEA8-216B-2E46-9601-0AD3641A5E9E}" destId="{2B20767A-1A33-C248-85FD-1D93D89083D2}" srcOrd="0" destOrd="0" presId="urn:microsoft.com/office/officeart/2005/8/layout/hierarchy2"/>
     <dgm:cxn modelId="{0FA568F3-9A60-814B-A8AC-891D9F88FE4C}" srcId="{3ECA71C2-7B10-C24A-8256-9BBBEBA76CC4}" destId="{2E1432B9-2340-7B4F-A4FB-3C8F85A920DA}" srcOrd="0" destOrd="0" parTransId="{55836E6C-FEC0-0A4F-9D46-6320613A632B}" sibTransId="{9176BAED-EF42-A449-8EBA-289113551C94}"/>
-    <dgm:cxn modelId="{6278EBF5-E23D-634C-9A59-BAEF3F353E29}" type="presOf" srcId="{187244EF-C31E-6344-8FCF-96AF4AF3BC2A}" destId="{E4AA040D-31C5-5D46-845E-005448A40686}" srcOrd="0" destOrd="0" presId="urn:microsoft.com/office/officeart/2005/8/layout/hierarchy2"/>
-    <dgm:cxn modelId="{D021FEF6-A34F-7F44-B1B9-980147B57280}" type="presOf" srcId="{61EE0437-A230-AA47-BD9B-9EC70641E370}" destId="{D475B07C-EFC2-7840-8B4D-A25CA753797E}" srcOrd="0" destOrd="0" presId="urn:microsoft.com/office/officeart/2005/8/layout/hierarchy2"/>
-    <dgm:cxn modelId="{104DF4F7-A5CE-A44D-9996-3029C081117A}" type="presOf" srcId="{E709B3A6-6ADF-C64F-8A7C-41FF2B111220}" destId="{10FFB18E-4AFA-344C-9BC1-AD34B4676854}" srcOrd="1" destOrd="0" presId="urn:microsoft.com/office/officeart/2005/8/layout/hierarchy2"/>
-    <dgm:cxn modelId="{0D57A0F8-E0BA-3945-879B-F0C3108E294B}" type="presOf" srcId="{72F39106-3957-544D-AB86-65E8EFCE07A3}" destId="{F43BDDDF-1CEF-A047-B3B4-F67711ADE7A9}" srcOrd="0" destOrd="0" presId="urn:microsoft.com/office/officeart/2005/8/layout/hierarchy2"/>
-    <dgm:cxn modelId="{5B47DDF8-2A55-3644-85CB-4A7B68A011F2}" type="presOf" srcId="{A8ADB7F8-470C-734E-B971-8E83D18BAA41}" destId="{3455402C-0615-5140-883D-2091BEC57060}" srcOrd="1" destOrd="0" presId="urn:microsoft.com/office/officeart/2005/8/layout/hierarchy2"/>
+    <dgm:cxn modelId="{2AD1D2F3-9E76-0141-B4AB-992422B779AD}" type="presOf" srcId="{6575138D-D60D-6742-BB52-DC29084B29E3}" destId="{340D38DE-40A2-C548-959C-EA21A68DC045}" srcOrd="1" destOrd="0" presId="urn:microsoft.com/office/officeart/2005/8/layout/hierarchy2"/>
+    <dgm:cxn modelId="{59141FF4-BFEE-764C-A5D3-4650722CCF6B}" type="presOf" srcId="{C88F80E9-D72C-FE40-A234-5BCA8DA5BF97}" destId="{5BDCA2FD-50B3-DD41-B739-4C6FB692068F}" srcOrd="1" destOrd="0" presId="urn:microsoft.com/office/officeart/2005/8/layout/hierarchy2"/>
+    <dgm:cxn modelId="{891078F4-AA0C-4945-9F98-7FED409A7899}" type="presOf" srcId="{E0B2355D-B76E-5347-8DE3-514FFB509C79}" destId="{ABF00753-ADCF-6A42-88C3-5F8E14C158F3}" srcOrd="0" destOrd="0" presId="urn:microsoft.com/office/officeart/2005/8/layout/hierarchy2"/>
+    <dgm:cxn modelId="{CAFBDBF5-3734-384F-8F7C-D946AF428490}" type="presOf" srcId="{1E5F3203-0DED-6643-9C6B-FD536231F97A}" destId="{B8FA6677-848E-B341-89B2-AB26EA8F8983}" srcOrd="1" destOrd="0" presId="urn:microsoft.com/office/officeart/2005/8/layout/hierarchy2"/>
+    <dgm:cxn modelId="{BEB149F7-88B3-9B4C-843C-26C14751E631}" type="presOf" srcId="{53F4F2E1-85A6-0544-8CB0-CF4F62FAD169}" destId="{19E436B0-A0B1-4242-BFBA-BB12B5B5F574}" srcOrd="0" destOrd="0" presId="urn:microsoft.com/office/officeart/2005/8/layout/hierarchy2"/>
+    <dgm:cxn modelId="{AE619DF7-5435-BF4C-B527-321BD15AB8CB}" type="presOf" srcId="{8E4E75CB-8ECD-5946-9B34-A0BF488DBE97}" destId="{B371D0DB-D4F9-F54E-B9CA-FAFBC9F2E03D}" srcOrd="0" destOrd="0" presId="urn:microsoft.com/office/officeart/2005/8/layout/hierarchy2"/>
+    <dgm:cxn modelId="{72208CF8-B376-8E49-BE96-1B834A3CA6F0}" type="presOf" srcId="{64AC65DF-19E6-0F4E-A1E6-DCD2D506B56A}" destId="{AE527926-7596-084F-836D-CE44E210925D}" srcOrd="0" destOrd="0" presId="urn:microsoft.com/office/officeart/2005/8/layout/hierarchy2"/>
+    <dgm:cxn modelId="{738B0DF9-B0A8-394B-9020-B88E557BE887}" type="presOf" srcId="{A0EAD666-74BC-3E49-9167-F107A8C9C557}" destId="{9B21400C-BC60-6743-A106-FEAA64B5ACA7}" srcOrd="0" destOrd="0" presId="urn:microsoft.com/office/officeart/2005/8/layout/hierarchy2"/>
     <dgm:cxn modelId="{082EFCF9-40A1-5046-B019-6EAD93EFB276}" srcId="{F846C330-0900-864C-AFE7-47A6B1C94F7A}" destId="{490DDFD4-19FA-8A41-8884-FA94CEB7FC79}" srcOrd="0" destOrd="0" parTransId="{E652B916-7C94-A442-94DD-868984C90584}" sibTransId="{C09B90E7-B0C7-C443-89FF-8CD671008E43}"/>
-    <dgm:cxn modelId="{1CB213FD-3FDD-3D47-B3F5-A2F2865879FC}" type="presOf" srcId="{10F4BF1A-E0E8-5247-98A6-E82AA7A267C9}" destId="{AE9EA0A6-8921-0A4B-B22A-4033ECDF8CEB}" srcOrd="0" destOrd="0" presId="urn:microsoft.com/office/officeart/2005/8/layout/hierarchy2"/>
-    <dgm:cxn modelId="{AF2358FD-90C5-8C4D-8A29-1C785EEF0C6C}" type="presOf" srcId="{85DFC1C0-544D-1E49-A2B5-A5044611C851}" destId="{188FEBA0-2EEA-BF48-BFFD-9861C935AD27}" srcOrd="1" destOrd="0" presId="urn:microsoft.com/office/officeart/2005/8/layout/hierarchy2"/>
-    <dgm:cxn modelId="{CEF67BFD-F693-6C43-AA20-39BC21BBC169}" type="presOf" srcId="{BF9C033C-4AFB-A34B-AE36-E0F43283D02E}" destId="{69460287-3B04-F142-8B8F-38364A84B16E}" srcOrd="0" destOrd="0" presId="urn:microsoft.com/office/officeart/2005/8/layout/hierarchy2"/>
+    <dgm:cxn modelId="{33CE7CFB-E4F8-684A-BAB5-F05B2C0CA247}" type="presOf" srcId="{D083BCCB-23E8-3A40-9DC9-70EB5FEA9DBA}" destId="{641BAAFD-D329-7E42-8738-0A74C231BC0A}" srcOrd="0" destOrd="0" presId="urn:microsoft.com/office/officeart/2005/8/layout/hierarchy2"/>
+    <dgm:cxn modelId="{94FA38FD-A8CF-1041-BC03-4DEA61CA0A26}" type="presOf" srcId="{D083BCCB-23E8-3A40-9DC9-70EB5FEA9DBA}" destId="{8F379772-4468-2D48-8E1C-02F9C1718421}" srcOrd="1" destOrd="0" presId="urn:microsoft.com/office/officeart/2005/8/layout/hierarchy2"/>
     <dgm:cxn modelId="{01861BFE-CC79-E64D-B195-F28051B8ED68}" srcId="{BF9C033C-4AFB-A34B-AE36-E0F43283D02E}" destId="{89AA8F52-95A6-0A42-B8DB-917B4D349CF6}" srcOrd="0" destOrd="0" parTransId="{1100FF0A-B281-C24B-933C-4A94BA74F661}" sibTransId="{496CEE84-807A-9645-9169-D5146ECFA2A8}"/>
-    <dgm:cxn modelId="{A62BB072-CEEC-8746-8F63-4F004068BCB4}" type="presParOf" srcId="{AAEAF223-4AC7-9243-834C-30AD905AC5ED}" destId="{ACA7A33C-6FD4-6541-8A0C-D3F8CA926844}" srcOrd="0" destOrd="0" presId="urn:microsoft.com/office/officeart/2005/8/layout/hierarchy2"/>
-    <dgm:cxn modelId="{38FE83DF-E48E-FB45-B523-38C48A3E6BC4}" type="presParOf" srcId="{ACA7A33C-6FD4-6541-8A0C-D3F8CA926844}" destId="{AE9EA0A6-8921-0A4B-B22A-4033ECDF8CEB}" srcOrd="0" destOrd="0" presId="urn:microsoft.com/office/officeart/2005/8/layout/hierarchy2"/>
-    <dgm:cxn modelId="{8DA6FBC5-636B-4E4B-A82A-F2A1EAF7D9A3}" type="presParOf" srcId="{ACA7A33C-6FD4-6541-8A0C-D3F8CA926844}" destId="{22BF3431-5CB6-A548-8AFC-FD73A5E82A29}" srcOrd="1" destOrd="0" presId="urn:microsoft.com/office/officeart/2005/8/layout/hierarchy2"/>
-    <dgm:cxn modelId="{57EB3628-B6A1-294B-A5FC-D0B2F65EBDAA}" type="presParOf" srcId="{22BF3431-5CB6-A548-8AFC-FD73A5E82A29}" destId="{09CB360A-D85F-B742-BBC1-624731FCF678}" srcOrd="0" destOrd="0" presId="urn:microsoft.com/office/officeart/2005/8/layout/hierarchy2"/>
-    <dgm:cxn modelId="{8BE67AD6-2238-AB42-A7FC-AF555E7F6B22}" type="presParOf" srcId="{09CB360A-D85F-B742-BBC1-624731FCF678}" destId="{5F1839EB-4F8F-774B-AED9-9D68D74DC9BF}" srcOrd="0" destOrd="0" presId="urn:microsoft.com/office/officeart/2005/8/layout/hierarchy2"/>
-    <dgm:cxn modelId="{179E5F81-77C0-2349-8332-851222FAC7CE}" type="presParOf" srcId="{22BF3431-5CB6-A548-8AFC-FD73A5E82A29}" destId="{A1E5DFB2-4481-2C4D-A093-5BEB6CE92DE1}" srcOrd="1" destOrd="0" presId="urn:microsoft.com/office/officeart/2005/8/layout/hierarchy2"/>
-    <dgm:cxn modelId="{E640176A-1479-D647-8834-65B2BEB6D564}" type="presParOf" srcId="{A1E5DFB2-4481-2C4D-A093-5BEB6CE92DE1}" destId="{3C252244-F4D5-774C-97FC-9730C3CA15AE}" srcOrd="0" destOrd="0" presId="urn:microsoft.com/office/officeart/2005/8/layout/hierarchy2"/>
-    <dgm:cxn modelId="{9BFAB8E3-65ED-A942-A866-7701614A7800}" type="presParOf" srcId="{A1E5DFB2-4481-2C4D-A093-5BEB6CE92DE1}" destId="{D886A097-5038-DC48-BAB1-09A6F2793CBA}" srcOrd="1" destOrd="0" presId="urn:microsoft.com/office/officeart/2005/8/layout/hierarchy2"/>
-    <dgm:cxn modelId="{87C1512B-0E0E-234B-B507-0AFD0F4F3A06}" type="presParOf" srcId="{D886A097-5038-DC48-BAB1-09A6F2793CBA}" destId="{ECCEC597-BD45-C34C-A5EB-49A8E6926768}" srcOrd="0" destOrd="0" presId="urn:microsoft.com/office/officeart/2005/8/layout/hierarchy2"/>
-    <dgm:cxn modelId="{97ADCDA5-4528-3C46-87E1-35F8AFFBF427}" type="presParOf" srcId="{ECCEC597-BD45-C34C-A5EB-49A8E6926768}" destId="{011CB822-2D4A-7B42-AE71-43EB941EC0B3}" srcOrd="0" destOrd="0" presId="urn:microsoft.com/office/officeart/2005/8/layout/hierarchy2"/>
-    <dgm:cxn modelId="{6A4E965D-96CF-3049-B515-FDD288344070}" type="presParOf" srcId="{D886A097-5038-DC48-BAB1-09A6F2793CBA}" destId="{1ECE7BD7-16D9-7E44-9245-05B1CC8FE2AF}" srcOrd="1" destOrd="0" presId="urn:microsoft.com/office/officeart/2005/8/layout/hierarchy2"/>
-    <dgm:cxn modelId="{E983F894-09CF-B348-9968-7D9F72FE97D4}" type="presParOf" srcId="{1ECE7BD7-16D9-7E44-9245-05B1CC8FE2AF}" destId="{23076C38-17B5-7A42-97BC-A3169834B242}" srcOrd="0" destOrd="0" presId="urn:microsoft.com/office/officeart/2005/8/layout/hierarchy2"/>
-    <dgm:cxn modelId="{BA8EF9E0-7D5F-3A4F-898F-31853E9568E4}" type="presParOf" srcId="{1ECE7BD7-16D9-7E44-9245-05B1CC8FE2AF}" destId="{8B975788-FCDE-5642-BD3C-808706F28FBB}" srcOrd="1" destOrd="0" presId="urn:microsoft.com/office/officeart/2005/8/layout/hierarchy2"/>
-    <dgm:cxn modelId="{82619EC8-5EAA-A248-9524-2F060EDDF55D}" type="presParOf" srcId="{8B975788-FCDE-5642-BD3C-808706F28FBB}" destId="{0FE0DC5E-02A4-B44D-8A14-6E47565AF5D5}" srcOrd="0" destOrd="0" presId="urn:microsoft.com/office/officeart/2005/8/layout/hierarchy2"/>
-    <dgm:cxn modelId="{24F29698-4763-604C-8DC0-E81ED3EE9388}" type="presParOf" srcId="{0FE0DC5E-02A4-B44D-8A14-6E47565AF5D5}" destId="{E08C38C7-38ED-BA4D-84A9-FF9D24B54B0A}" srcOrd="0" destOrd="0" presId="urn:microsoft.com/office/officeart/2005/8/layout/hierarchy2"/>
-    <dgm:cxn modelId="{285418E5-E707-6C46-B5A7-1CCB33502F02}" type="presParOf" srcId="{8B975788-FCDE-5642-BD3C-808706F28FBB}" destId="{85005ED8-A8CC-4249-AD76-FA014AECE599}" srcOrd="1" destOrd="0" presId="urn:microsoft.com/office/officeart/2005/8/layout/hierarchy2"/>
-    <dgm:cxn modelId="{5B838A59-AD88-3445-BEDF-5EE6CFE17092}" type="presParOf" srcId="{85005ED8-A8CC-4249-AD76-FA014AECE599}" destId="{1EA76DE5-1C8F-FA4D-A04F-5E95F39407AD}" srcOrd="0" destOrd="0" presId="urn:microsoft.com/office/officeart/2005/8/layout/hierarchy2"/>
-    <dgm:cxn modelId="{2197B4F8-0F41-ED46-ACD2-24A3AFB1CFD8}" type="presParOf" srcId="{85005ED8-A8CC-4249-AD76-FA014AECE599}" destId="{509BC242-1B06-6E44-9BB0-70EB639DAAA9}" srcOrd="1" destOrd="0" presId="urn:microsoft.com/office/officeart/2005/8/layout/hierarchy2"/>
-    <dgm:cxn modelId="{D2D2B76F-D169-A843-AF1C-6220BAE8A71B}" type="presParOf" srcId="{8B975788-FCDE-5642-BD3C-808706F28FBB}" destId="{37DEF7A6-F983-8642-9B6E-B3CCE7EA354A}" srcOrd="2" destOrd="0" presId="urn:microsoft.com/office/officeart/2005/8/layout/hierarchy2"/>
-    <dgm:cxn modelId="{216564D3-DDB1-C44F-982E-99F2CC2A25CA}" type="presParOf" srcId="{37DEF7A6-F983-8642-9B6E-B3CCE7EA354A}" destId="{D0A01E75-22DA-5643-BFF4-8A726FDEB812}" srcOrd="0" destOrd="0" presId="urn:microsoft.com/office/officeart/2005/8/layout/hierarchy2"/>
-    <dgm:cxn modelId="{5ED24E84-8F09-FC4D-8C80-22757464B24A}" type="presParOf" srcId="{8B975788-FCDE-5642-BD3C-808706F28FBB}" destId="{CEF76F03-3D55-3F4A-B724-94E14018B095}" srcOrd="3" destOrd="0" presId="urn:microsoft.com/office/officeart/2005/8/layout/hierarchy2"/>
-    <dgm:cxn modelId="{34BB080C-500E-FE4F-AA7B-1B3FD5ABE99E}" type="presParOf" srcId="{CEF76F03-3D55-3F4A-B724-94E14018B095}" destId="{AA6D8249-2433-114B-AD68-5DAD34076478}" srcOrd="0" destOrd="0" presId="urn:microsoft.com/office/officeart/2005/8/layout/hierarchy2"/>
-    <dgm:cxn modelId="{668D65F1-E3C3-AF48-9967-838138960BF9}" type="presParOf" srcId="{CEF76F03-3D55-3F4A-B724-94E14018B095}" destId="{D4ECBD1D-BCD1-194A-944B-DF5C60377F45}" srcOrd="1" destOrd="0" presId="urn:microsoft.com/office/officeart/2005/8/layout/hierarchy2"/>
-    <dgm:cxn modelId="{5A6E64A0-EC15-7744-AE74-2AA008C17331}" type="presParOf" srcId="{D4ECBD1D-BCD1-194A-944B-DF5C60377F45}" destId="{F2F73D55-5C37-CD44-BC1E-CDBC3CD0F101}" srcOrd="0" destOrd="0" presId="urn:microsoft.com/office/officeart/2005/8/layout/hierarchy2"/>
-    <dgm:cxn modelId="{261CC2F5-5799-4D40-829F-3B55AF3D4326}" type="presParOf" srcId="{F2F73D55-5C37-CD44-BC1E-CDBC3CD0F101}" destId="{8CD01425-6999-1B43-A074-9B4B66D474FE}" srcOrd="0" destOrd="0" presId="urn:microsoft.com/office/officeart/2005/8/layout/hierarchy2"/>
-    <dgm:cxn modelId="{80432BE6-CE13-7641-87E2-BD1F1E202C05}" type="presParOf" srcId="{D4ECBD1D-BCD1-194A-944B-DF5C60377F45}" destId="{0E05F525-FD97-BE49-BACE-281076CC37A6}" srcOrd="1" destOrd="0" presId="urn:microsoft.com/office/officeart/2005/8/layout/hierarchy2"/>
-    <dgm:cxn modelId="{89DD0A09-50B6-CC43-9BCD-526BE913F949}" type="presParOf" srcId="{0E05F525-FD97-BE49-BACE-281076CC37A6}" destId="{1FCD5530-9E05-B046-B8ED-0484835169DE}" srcOrd="0" destOrd="0" presId="urn:microsoft.com/office/officeart/2005/8/layout/hierarchy2"/>
-    <dgm:cxn modelId="{CAAA657F-59C1-5D4C-8239-EDD48D0F1AC3}" type="presParOf" srcId="{0E05F525-FD97-BE49-BACE-281076CC37A6}" destId="{61747978-1319-FA49-B57E-FCC41F19EA84}" srcOrd="1" destOrd="0" presId="urn:microsoft.com/office/officeart/2005/8/layout/hierarchy2"/>
-    <dgm:cxn modelId="{57D20A22-BB9D-3D48-9D9F-3C4FD72960DA}" type="presParOf" srcId="{61747978-1319-FA49-B57E-FCC41F19EA84}" destId="{0904125F-8547-564B-8B1D-703FF6EDB6C9}" srcOrd="0" destOrd="0" presId="urn:microsoft.com/office/officeart/2005/8/layout/hierarchy2"/>
-    <dgm:cxn modelId="{A5489B31-DA6A-A54C-8163-BC03A4F3A210}" type="presParOf" srcId="{0904125F-8547-564B-8B1D-703FF6EDB6C9}" destId="{B5BF25CD-8BF1-5048-868C-30217B5C9A24}" srcOrd="0" destOrd="0" presId="urn:microsoft.com/office/officeart/2005/8/layout/hierarchy2"/>
-    <dgm:cxn modelId="{81453EF9-B131-BE4E-AF5E-80DA2D2DDB58}" type="presParOf" srcId="{61747978-1319-FA49-B57E-FCC41F19EA84}" destId="{1D95E1D6-FA45-614A-B171-8C9054062FA3}" srcOrd="1" destOrd="0" presId="urn:microsoft.com/office/officeart/2005/8/layout/hierarchy2"/>
-    <dgm:cxn modelId="{0BEACCD8-C1DF-AF4F-9475-4AE57C2840BC}" type="presParOf" srcId="{1D95E1D6-FA45-614A-B171-8C9054062FA3}" destId="{69460287-3B04-F142-8B8F-38364A84B16E}" srcOrd="0" destOrd="0" presId="urn:microsoft.com/office/officeart/2005/8/layout/hierarchy2"/>
-    <dgm:cxn modelId="{EBAD0C72-AA3B-C540-A913-42E9E789ABD8}" type="presParOf" srcId="{1D95E1D6-FA45-614A-B171-8C9054062FA3}" destId="{91025FFF-DA47-FC4F-8CA9-4AD70FBA15F4}" srcOrd="1" destOrd="0" presId="urn:microsoft.com/office/officeart/2005/8/layout/hierarchy2"/>
-    <dgm:cxn modelId="{861DFD60-2D1A-D14E-B09E-659F9D406865}" type="presParOf" srcId="{91025FFF-DA47-FC4F-8CA9-4AD70FBA15F4}" destId="{E1CC1DA7-E052-D145-8E3D-02E51BEAF7D1}" srcOrd="0" destOrd="0" presId="urn:microsoft.com/office/officeart/2005/8/layout/hierarchy2"/>
-    <dgm:cxn modelId="{E30DF009-57C1-EB42-92A7-813B4A768767}" type="presParOf" srcId="{E1CC1DA7-E052-D145-8E3D-02E51BEAF7D1}" destId="{AD0CB518-2F16-A749-9C97-747B3498BAD9}" srcOrd="0" destOrd="0" presId="urn:microsoft.com/office/officeart/2005/8/layout/hierarchy2"/>
-    <dgm:cxn modelId="{3622BA64-61B4-964D-8CCA-C1B9D5B6271E}" type="presParOf" srcId="{91025FFF-DA47-FC4F-8CA9-4AD70FBA15F4}" destId="{16328237-3EE4-7943-A3AC-0CF6AEB3A54C}" srcOrd="1" destOrd="0" presId="urn:microsoft.com/office/officeart/2005/8/layout/hierarchy2"/>
-    <dgm:cxn modelId="{D4EF5B00-E3DB-204E-A467-4E454A4E788A}" type="presParOf" srcId="{16328237-3EE4-7943-A3AC-0CF6AEB3A54C}" destId="{39E3DC0E-53C8-5144-B0B1-07F4E7334A85}" srcOrd="0" destOrd="0" presId="urn:microsoft.com/office/officeart/2005/8/layout/hierarchy2"/>
-    <dgm:cxn modelId="{F934D2AC-ACD7-DD4F-A1B6-FD3C64FC2D3D}" type="presParOf" srcId="{16328237-3EE4-7943-A3AC-0CF6AEB3A54C}" destId="{05DFC33C-FBEB-644E-A6E8-E00321F8D1D6}" srcOrd="1" destOrd="0" presId="urn:microsoft.com/office/officeart/2005/8/layout/hierarchy2"/>
-    <dgm:cxn modelId="{5CFDECBB-5F2F-2449-BC2C-A08BCC284B63}" type="presParOf" srcId="{91025FFF-DA47-FC4F-8CA9-4AD70FBA15F4}" destId="{2B20767A-1A33-C248-85FD-1D93D89083D2}" srcOrd="2" destOrd="0" presId="urn:microsoft.com/office/officeart/2005/8/layout/hierarchy2"/>
-    <dgm:cxn modelId="{A66A501F-319E-F849-9408-6746192DB01F}" type="presParOf" srcId="{2B20767A-1A33-C248-85FD-1D93D89083D2}" destId="{4488718A-C95B-7B4D-8FA2-82EDC2308CB4}" srcOrd="0" destOrd="0" presId="urn:microsoft.com/office/officeart/2005/8/layout/hierarchy2"/>
-    <dgm:cxn modelId="{86F8E297-8636-BB49-B182-719FA813B719}" type="presParOf" srcId="{91025FFF-DA47-FC4F-8CA9-4AD70FBA15F4}" destId="{2B3D292C-6E64-6043-8EC9-1C6C07D745B0}" srcOrd="3" destOrd="0" presId="urn:microsoft.com/office/officeart/2005/8/layout/hierarchy2"/>
-    <dgm:cxn modelId="{8436E20F-AF4A-964A-B4C6-AC3C52313E5E}" type="presParOf" srcId="{2B3D292C-6E64-6043-8EC9-1C6C07D745B0}" destId="{2915A037-971F-304E-9764-FAB284167672}" srcOrd="0" destOrd="0" presId="urn:microsoft.com/office/officeart/2005/8/layout/hierarchy2"/>
-    <dgm:cxn modelId="{3822CEAA-99EC-9F48-B754-BC1247467D32}" type="presParOf" srcId="{2B3D292C-6E64-6043-8EC9-1C6C07D745B0}" destId="{D2F2433B-CBF9-B447-8B62-BF382A1041BA}" srcOrd="1" destOrd="0" presId="urn:microsoft.com/office/officeart/2005/8/layout/hierarchy2"/>
-    <dgm:cxn modelId="{91C1A319-D7CE-2E44-B6AF-B9BF0D3E2857}" type="presParOf" srcId="{61747978-1319-FA49-B57E-FCC41F19EA84}" destId="{28940162-CD59-DD4E-88C0-70FA243B6697}" srcOrd="2" destOrd="0" presId="urn:microsoft.com/office/officeart/2005/8/layout/hierarchy2"/>
-    <dgm:cxn modelId="{B27BBDE8-2496-4840-8E16-816F14E23AF2}" type="presParOf" srcId="{28940162-CD59-DD4E-88C0-70FA243B6697}" destId="{340D38DE-40A2-C548-959C-EA21A68DC045}" srcOrd="0" destOrd="0" presId="urn:microsoft.com/office/officeart/2005/8/layout/hierarchy2"/>
-    <dgm:cxn modelId="{3F8963AC-F08E-B44B-86C3-26D7D68C9E9D}" type="presParOf" srcId="{61747978-1319-FA49-B57E-FCC41F19EA84}" destId="{67FF1E95-D42C-0845-B131-6C6E5FC865AB}" srcOrd="3" destOrd="0" presId="urn:microsoft.com/office/officeart/2005/8/layout/hierarchy2"/>
-    <dgm:cxn modelId="{3384C0B5-F84A-3E42-902F-FD61A6F46678}" type="presParOf" srcId="{67FF1E95-D42C-0845-B131-6C6E5FC865AB}" destId="{CC7634C0-ED13-644B-9ED7-D06A037B0A09}" srcOrd="0" destOrd="0" presId="urn:microsoft.com/office/officeart/2005/8/layout/hierarchy2"/>
-    <dgm:cxn modelId="{FCA49DD2-6B1D-1245-BE94-84B15210215F}" type="presParOf" srcId="{67FF1E95-D42C-0845-B131-6C6E5FC865AB}" destId="{FEC1F169-0803-C748-91BB-5F63A1DA3A53}" srcOrd="1" destOrd="0" presId="urn:microsoft.com/office/officeart/2005/8/layout/hierarchy2"/>
-    <dgm:cxn modelId="{15FEAB90-22D9-AD4D-9E81-E05FF964217A}" type="presParOf" srcId="{FEC1F169-0803-C748-91BB-5F63A1DA3A53}" destId="{30C20B8D-B9DE-FC4A-A8FC-F855AACFD13C}" srcOrd="0" destOrd="0" presId="urn:microsoft.com/office/officeart/2005/8/layout/hierarchy2"/>
-    <dgm:cxn modelId="{618C7572-087A-4048-9E4D-E8500C9653D2}" type="presParOf" srcId="{30C20B8D-B9DE-FC4A-A8FC-F855AACFD13C}" destId="{514A0DE5-E2F7-1642-9C22-82D2271D99DD}" srcOrd="0" destOrd="0" presId="urn:microsoft.com/office/officeart/2005/8/layout/hierarchy2"/>
-    <dgm:cxn modelId="{C14FCD8D-B6F0-F245-AF46-6380D4C46A76}" type="presParOf" srcId="{FEC1F169-0803-C748-91BB-5F63A1DA3A53}" destId="{2E659DA2-3323-B74D-8AD2-29FFAF43757D}" srcOrd="1" destOrd="0" presId="urn:microsoft.com/office/officeart/2005/8/layout/hierarchy2"/>
-    <dgm:cxn modelId="{180D52F1-6750-744F-B9ED-93778F692942}" type="presParOf" srcId="{2E659DA2-3323-B74D-8AD2-29FFAF43757D}" destId="{6C8DB8F2-3E6F-E842-B341-B9444FABBF52}" srcOrd="0" destOrd="0" presId="urn:microsoft.com/office/officeart/2005/8/layout/hierarchy2"/>
-    <dgm:cxn modelId="{E7184222-C79A-6643-B757-FEC4AA5D0956}" type="presParOf" srcId="{2E659DA2-3323-B74D-8AD2-29FFAF43757D}" destId="{7DF82C3F-976D-8941-AAC0-E0B3BBE56D03}" srcOrd="1" destOrd="0" presId="urn:microsoft.com/office/officeart/2005/8/layout/hierarchy2"/>
-    <dgm:cxn modelId="{7206CDEF-FAFC-274F-8C72-A1063D7BC9C6}" type="presParOf" srcId="{FEC1F169-0803-C748-91BB-5F63A1DA3A53}" destId="{E4AA040D-31C5-5D46-845E-005448A40686}" srcOrd="2" destOrd="0" presId="urn:microsoft.com/office/officeart/2005/8/layout/hierarchy2"/>
-    <dgm:cxn modelId="{90068DD5-EF10-6948-A597-6536F435DC07}" type="presParOf" srcId="{E4AA040D-31C5-5D46-845E-005448A40686}" destId="{1B19DBDE-7BB1-664E-A05B-426990BEADD2}" srcOrd="0" destOrd="0" presId="urn:microsoft.com/office/officeart/2005/8/layout/hierarchy2"/>
-    <dgm:cxn modelId="{9F72ABCA-77C9-034F-A63B-15A3BCC8C427}" type="presParOf" srcId="{FEC1F169-0803-C748-91BB-5F63A1DA3A53}" destId="{67649436-0A96-A24A-A701-56CB57441ADF}" srcOrd="3" destOrd="0" presId="urn:microsoft.com/office/officeart/2005/8/layout/hierarchy2"/>
-    <dgm:cxn modelId="{01F6183E-962F-324F-8832-2322BB9B9ACC}" type="presParOf" srcId="{67649436-0A96-A24A-A701-56CB57441ADF}" destId="{FE860302-7B4F-8444-86E7-3E89E24F2AE0}" srcOrd="0" destOrd="0" presId="urn:microsoft.com/office/officeart/2005/8/layout/hierarchy2"/>
-    <dgm:cxn modelId="{54D747F2-C3C8-9143-9558-760A3A9A901A}" type="presParOf" srcId="{67649436-0A96-A24A-A701-56CB57441ADF}" destId="{057AE7D0-DCA5-E645-9EBC-E9E5461A3DD4}" srcOrd="1" destOrd="0" presId="urn:microsoft.com/office/officeart/2005/8/layout/hierarchy2"/>
-    <dgm:cxn modelId="{F6A897CF-CF9C-9049-96C8-195ABD67750D}" type="presParOf" srcId="{057AE7D0-DCA5-E645-9EBC-E9E5461A3DD4}" destId="{AE66067E-8C8F-C146-AE9F-FD6D23D7EA7D}" srcOrd="0" destOrd="0" presId="urn:microsoft.com/office/officeart/2005/8/layout/hierarchy2"/>
-    <dgm:cxn modelId="{C92BB2BE-843A-3146-A8D0-C9E2218D9F57}" type="presParOf" srcId="{AE66067E-8C8F-C146-AE9F-FD6D23D7EA7D}" destId="{FBF4C144-F351-7546-9706-1D522BDDE758}" srcOrd="0" destOrd="0" presId="urn:microsoft.com/office/officeart/2005/8/layout/hierarchy2"/>
-    <dgm:cxn modelId="{A820767D-75B7-734D-8681-422966039103}" type="presParOf" srcId="{057AE7D0-DCA5-E645-9EBC-E9E5461A3DD4}" destId="{C2CB1567-B53F-2C4E-9848-D0D9F318BA21}" srcOrd="1" destOrd="0" presId="urn:microsoft.com/office/officeart/2005/8/layout/hierarchy2"/>
-    <dgm:cxn modelId="{1FD36FAA-55A0-6D40-8132-06929181FBBE}" type="presParOf" srcId="{C2CB1567-B53F-2C4E-9848-D0D9F318BA21}" destId="{3FE5FC00-5B11-B04A-8DA8-F4959DA3D91E}" srcOrd="0" destOrd="0" presId="urn:microsoft.com/office/officeart/2005/8/layout/hierarchy2"/>
-    <dgm:cxn modelId="{2B267DF5-9E5A-EF46-BF0D-C317F777536E}" type="presParOf" srcId="{C2CB1567-B53F-2C4E-9848-D0D9F318BA21}" destId="{C845A82A-50F8-5341-ABE4-01A7ECB0DC19}" srcOrd="1" destOrd="0" presId="urn:microsoft.com/office/officeart/2005/8/layout/hierarchy2"/>
-    <dgm:cxn modelId="{CF0C9D71-10A2-DF46-BC2C-8E53928CAB1F}" type="presParOf" srcId="{057AE7D0-DCA5-E645-9EBC-E9E5461A3DD4}" destId="{32E1E92B-B747-1945-8244-8375262856A2}" srcOrd="2" destOrd="0" presId="urn:microsoft.com/office/officeart/2005/8/layout/hierarchy2"/>
-    <dgm:cxn modelId="{76CC5727-EAD9-0047-AAF3-E09925929494}" type="presParOf" srcId="{32E1E92B-B747-1945-8244-8375262856A2}" destId="{B3130863-C367-4E49-B7AD-D2B418734F30}" srcOrd="0" destOrd="0" presId="urn:microsoft.com/office/officeart/2005/8/layout/hierarchy2"/>
-    <dgm:cxn modelId="{49CFA723-86CA-2640-998E-DE7DB11C9EA0}" type="presParOf" srcId="{057AE7D0-DCA5-E645-9EBC-E9E5461A3DD4}" destId="{8C10BC1F-0671-2340-A9C0-9E71D9E53B19}" srcOrd="3" destOrd="0" presId="urn:microsoft.com/office/officeart/2005/8/layout/hierarchy2"/>
-    <dgm:cxn modelId="{7DCFBB60-DC55-064A-A5A2-1E3474654471}" type="presParOf" srcId="{8C10BC1F-0671-2340-A9C0-9E71D9E53B19}" destId="{00CFE4B8-8832-0246-A40E-11D4FB02AE84}" srcOrd="0" destOrd="0" presId="urn:microsoft.com/office/officeart/2005/8/layout/hierarchy2"/>
-    <dgm:cxn modelId="{4542B62F-5207-D248-8102-237587A239E6}" type="presParOf" srcId="{8C10BC1F-0671-2340-A9C0-9E71D9E53B19}" destId="{4A66CD93-FEF2-5647-87D1-459C3DA519CA}" srcOrd="1" destOrd="0" presId="urn:microsoft.com/office/officeart/2005/8/layout/hierarchy2"/>
-    <dgm:cxn modelId="{0CFA6A36-0424-F64C-A72E-265D7BFF4728}" type="presParOf" srcId="{D4ECBD1D-BCD1-194A-944B-DF5C60377F45}" destId="{679B93C1-DE35-6440-84FA-556B81DC0458}" srcOrd="2" destOrd="0" presId="urn:microsoft.com/office/officeart/2005/8/layout/hierarchy2"/>
-    <dgm:cxn modelId="{CAB36BBD-0399-FC47-9D7F-4C33253E65F6}" type="presParOf" srcId="{679B93C1-DE35-6440-84FA-556B81DC0458}" destId="{17969B6C-27C4-594D-AD5E-6F5032B8027F}" srcOrd="0" destOrd="0" presId="urn:microsoft.com/office/officeart/2005/8/layout/hierarchy2"/>
-    <dgm:cxn modelId="{72377EF2-0AC1-F74F-AB09-88D2DC772839}" type="presParOf" srcId="{D4ECBD1D-BCD1-194A-944B-DF5C60377F45}" destId="{607A5C4E-8E72-DF43-B8DD-7245A3FEAF65}" srcOrd="3" destOrd="0" presId="urn:microsoft.com/office/officeart/2005/8/layout/hierarchy2"/>
-    <dgm:cxn modelId="{31DC4F8D-4852-2546-965E-F088875C8768}" type="presParOf" srcId="{607A5C4E-8E72-DF43-B8DD-7245A3FEAF65}" destId="{FFFF1321-B119-DD44-91BC-A8BB725CB204}" srcOrd="0" destOrd="0" presId="urn:microsoft.com/office/officeart/2005/8/layout/hierarchy2"/>
-    <dgm:cxn modelId="{72148CC2-D511-D74A-9CA4-AE4E1899E3B7}" type="presParOf" srcId="{607A5C4E-8E72-DF43-B8DD-7245A3FEAF65}" destId="{6ACF99BD-0065-D644-91BC-8C88EAA585AA}" srcOrd="1" destOrd="0" presId="urn:microsoft.com/office/officeart/2005/8/layout/hierarchy2"/>
-    <dgm:cxn modelId="{AC54D12B-1A9C-4A42-8A8C-11246F34E107}" type="presParOf" srcId="{6ACF99BD-0065-D644-91BC-8C88EAA585AA}" destId="{8C192C57-F760-C64F-93E5-9832B628B4B9}" srcOrd="0" destOrd="0" presId="urn:microsoft.com/office/officeart/2005/8/layout/hierarchy2"/>
-    <dgm:cxn modelId="{485877BC-070A-B147-B721-1BF541BD1B3E}" type="presParOf" srcId="{8C192C57-F760-C64F-93E5-9832B628B4B9}" destId="{231E55CB-9002-9944-B177-034B990C250F}" srcOrd="0" destOrd="0" presId="urn:microsoft.com/office/officeart/2005/8/layout/hierarchy2"/>
-    <dgm:cxn modelId="{A9E0BB3D-6F20-6B47-BD86-9B55ACA1EF81}" type="presParOf" srcId="{6ACF99BD-0065-D644-91BC-8C88EAA585AA}" destId="{77028C31-781D-624B-BB89-6FDBC3329700}" srcOrd="1" destOrd="0" presId="urn:microsoft.com/office/officeart/2005/8/layout/hierarchy2"/>
-    <dgm:cxn modelId="{48E65D00-7DB8-964E-90F6-6A531881B880}" type="presParOf" srcId="{77028C31-781D-624B-BB89-6FDBC3329700}" destId="{1530674F-400B-AA4E-BAF1-41A723567EF5}" srcOrd="0" destOrd="0" presId="urn:microsoft.com/office/officeart/2005/8/layout/hierarchy2"/>
-    <dgm:cxn modelId="{1C0AB832-9FC3-1544-957A-38970FEBA917}" type="presParOf" srcId="{77028C31-781D-624B-BB89-6FDBC3329700}" destId="{822DEA25-8009-FD4B-A009-A8B9E4849BB9}" srcOrd="1" destOrd="0" presId="urn:microsoft.com/office/officeart/2005/8/layout/hierarchy2"/>
-    <dgm:cxn modelId="{F569741B-DE08-D849-BCA6-D7ACDF07BC92}" type="presParOf" srcId="{6ACF99BD-0065-D644-91BC-8C88EAA585AA}" destId="{882C5457-CC43-4A48-A99D-03D91C22C0F5}" srcOrd="2" destOrd="0" presId="urn:microsoft.com/office/officeart/2005/8/layout/hierarchy2"/>
-    <dgm:cxn modelId="{34A9420A-01DE-4744-9A5B-FBCFF5E93ED5}" type="presParOf" srcId="{882C5457-CC43-4A48-A99D-03D91C22C0F5}" destId="{10CA0EB9-E970-1C4C-B964-68E6097168BF}" srcOrd="0" destOrd="0" presId="urn:microsoft.com/office/officeart/2005/8/layout/hierarchy2"/>
-    <dgm:cxn modelId="{5E326C2E-C879-E04B-8418-023F981ED61B}" type="presParOf" srcId="{6ACF99BD-0065-D644-91BC-8C88EAA585AA}" destId="{F0E02FA8-2358-A14C-8DB7-605DE4349BDD}" srcOrd="3" destOrd="0" presId="urn:microsoft.com/office/officeart/2005/8/layout/hierarchy2"/>
-    <dgm:cxn modelId="{D5774502-564B-284E-A57D-8832E3F5A9C3}" type="presParOf" srcId="{F0E02FA8-2358-A14C-8DB7-605DE4349BDD}" destId="{B0BA1A94-5289-E747-92C5-8031204115B7}" srcOrd="0" destOrd="0" presId="urn:microsoft.com/office/officeart/2005/8/layout/hierarchy2"/>
-    <dgm:cxn modelId="{0CF5B5EE-E7BE-B74B-9C4E-38A5C1854727}" type="presParOf" srcId="{F0E02FA8-2358-A14C-8DB7-605DE4349BDD}" destId="{F7D605D8-2D8B-6B43-B35B-5EA2ADCCCA20}" srcOrd="1" destOrd="0" presId="urn:microsoft.com/office/officeart/2005/8/layout/hierarchy2"/>
-    <dgm:cxn modelId="{E11AFA50-7C41-1D48-AD4E-570F240533DB}" type="presParOf" srcId="{D886A097-5038-DC48-BAB1-09A6F2793CBA}" destId="{68E9A118-368E-3244-B463-69DB084DF2CF}" srcOrd="2" destOrd="0" presId="urn:microsoft.com/office/officeart/2005/8/layout/hierarchy2"/>
-    <dgm:cxn modelId="{F2298259-4BFA-3B49-A461-938D0432592D}" type="presParOf" srcId="{68E9A118-368E-3244-B463-69DB084DF2CF}" destId="{2C1E44BD-A489-2646-AD2D-FB438B53D6D4}" srcOrd="0" destOrd="0" presId="urn:microsoft.com/office/officeart/2005/8/layout/hierarchy2"/>
-    <dgm:cxn modelId="{CE0FDCFF-5938-F44C-AD86-5516BC6EF0B3}" type="presParOf" srcId="{D886A097-5038-DC48-BAB1-09A6F2793CBA}" destId="{3FB46357-4815-DB4B-8FDE-777C712B728F}" srcOrd="3" destOrd="0" presId="urn:microsoft.com/office/officeart/2005/8/layout/hierarchy2"/>
-    <dgm:cxn modelId="{58257795-B809-2B4B-903A-5CE249191564}" type="presParOf" srcId="{3FB46357-4815-DB4B-8FDE-777C712B728F}" destId="{D475B07C-EFC2-7840-8B4D-A25CA753797E}" srcOrd="0" destOrd="0" presId="urn:microsoft.com/office/officeart/2005/8/layout/hierarchy2"/>
-    <dgm:cxn modelId="{E02E38DC-074A-E240-9807-8941B46B4EAC}" type="presParOf" srcId="{3FB46357-4815-DB4B-8FDE-777C712B728F}" destId="{2621B116-FEC2-024B-A529-952624AF50D7}" srcOrd="1" destOrd="0" presId="urn:microsoft.com/office/officeart/2005/8/layout/hierarchy2"/>
-    <dgm:cxn modelId="{FF0530C7-7FA7-C746-B703-55909059974D}" type="presParOf" srcId="{2621B116-FEC2-024B-A529-952624AF50D7}" destId="{E0E8B3D1-202F-F448-A89C-7325EF939FBE}" srcOrd="0" destOrd="0" presId="urn:microsoft.com/office/officeart/2005/8/layout/hierarchy2"/>
-    <dgm:cxn modelId="{5A776CC5-C90D-7B41-BD06-BF36935F035A}" type="presParOf" srcId="{E0E8B3D1-202F-F448-A89C-7325EF939FBE}" destId="{82082EF3-F943-6040-8F27-9EE49BF77273}" srcOrd="0" destOrd="0" presId="urn:microsoft.com/office/officeart/2005/8/layout/hierarchy2"/>
-    <dgm:cxn modelId="{949F421E-F30E-D348-AC3D-4848956824B7}" type="presParOf" srcId="{2621B116-FEC2-024B-A529-952624AF50D7}" destId="{FE01A907-E60A-7241-A73F-4556CF4B7B90}" srcOrd="1" destOrd="0" presId="urn:microsoft.com/office/officeart/2005/8/layout/hierarchy2"/>
-    <dgm:cxn modelId="{895A9BDB-BD76-8648-A8DB-800D25A92405}" type="presParOf" srcId="{FE01A907-E60A-7241-A73F-4556CF4B7B90}" destId="{1F61B25A-1771-6C48-A23E-9F44BFFFE83A}" srcOrd="0" destOrd="0" presId="urn:microsoft.com/office/officeart/2005/8/layout/hierarchy2"/>
-    <dgm:cxn modelId="{F4465D4B-B8A2-D045-A3BD-62ACE69C1DFD}" type="presParOf" srcId="{FE01A907-E60A-7241-A73F-4556CF4B7B90}" destId="{9F47EDC6-53C3-A243-AEEE-2D2DB2230807}" srcOrd="1" destOrd="0" presId="urn:microsoft.com/office/officeart/2005/8/layout/hierarchy2"/>
-    <dgm:cxn modelId="{8B3D0453-5FBD-5D43-AEC5-E898EE28184B}" type="presParOf" srcId="{9F47EDC6-53C3-A243-AEEE-2D2DB2230807}" destId="{6F1542E3-3EE9-7643-98A4-02BB96297F69}" srcOrd="0" destOrd="0" presId="urn:microsoft.com/office/officeart/2005/8/layout/hierarchy2"/>
-    <dgm:cxn modelId="{03B76E2E-E1D8-274B-9BED-9F039DC53385}" type="presParOf" srcId="{6F1542E3-3EE9-7643-98A4-02BB96297F69}" destId="{ADC457D0-4675-8749-9954-B3A7E3C7E138}" srcOrd="0" destOrd="0" presId="urn:microsoft.com/office/officeart/2005/8/layout/hierarchy2"/>
-    <dgm:cxn modelId="{0E4FB2CF-C155-7543-906D-51B06EB62372}" type="presParOf" srcId="{9F47EDC6-53C3-A243-AEEE-2D2DB2230807}" destId="{2A862D7C-77B7-264A-A1F0-8F6D2BED61CE}" srcOrd="1" destOrd="0" presId="urn:microsoft.com/office/officeart/2005/8/layout/hierarchy2"/>
-    <dgm:cxn modelId="{BDD99AFD-BB0A-B54B-A94E-9EC18392AA7E}" type="presParOf" srcId="{2A862D7C-77B7-264A-A1F0-8F6D2BED61CE}" destId="{EAF5B26D-7BCE-5249-BEA2-027D32033BF5}" srcOrd="0" destOrd="0" presId="urn:microsoft.com/office/officeart/2005/8/layout/hierarchy2"/>
-    <dgm:cxn modelId="{DC7B8115-ACF2-E349-B731-8A92937D008B}" type="presParOf" srcId="{2A862D7C-77B7-264A-A1F0-8F6D2BED61CE}" destId="{CEF6A641-4A3D-3043-8F9B-85EF97F27AF6}" srcOrd="1" destOrd="0" presId="urn:microsoft.com/office/officeart/2005/8/layout/hierarchy2"/>
-    <dgm:cxn modelId="{33336A15-910F-CB4B-872C-2F28A24A7462}" type="presParOf" srcId="{CEF6A641-4A3D-3043-8F9B-85EF97F27AF6}" destId="{97208B3F-EBA3-4845-94E7-920477ECF453}" srcOrd="0" destOrd="0" presId="urn:microsoft.com/office/officeart/2005/8/layout/hierarchy2"/>
-    <dgm:cxn modelId="{D954F024-F38C-C748-BD70-D2559C709682}" type="presParOf" srcId="{97208B3F-EBA3-4845-94E7-920477ECF453}" destId="{99F05CAB-2148-F444-8941-3147FA138FC8}" srcOrd="0" destOrd="0" presId="urn:microsoft.com/office/officeart/2005/8/layout/hierarchy2"/>
-    <dgm:cxn modelId="{4B733166-8037-6940-903E-6E1A77635B84}" type="presParOf" srcId="{CEF6A641-4A3D-3043-8F9B-85EF97F27AF6}" destId="{BEB9413D-1E65-E648-9E27-A0E8F477336A}" srcOrd="1" destOrd="0" presId="urn:microsoft.com/office/officeart/2005/8/layout/hierarchy2"/>
-    <dgm:cxn modelId="{5761D3A2-0BF2-C84F-B4C1-6D9F068ACDC0}" type="presParOf" srcId="{BEB9413D-1E65-E648-9E27-A0E8F477336A}" destId="{4AC7893F-6937-5446-9898-4892D379DA93}" srcOrd="0" destOrd="0" presId="urn:microsoft.com/office/officeart/2005/8/layout/hierarchy2"/>
-    <dgm:cxn modelId="{C8C2592D-2FD4-C947-81E6-D3DF84305203}" type="presParOf" srcId="{BEB9413D-1E65-E648-9E27-A0E8F477336A}" destId="{07E35A30-71EC-754C-BC38-4AF5BD29A7FB}" srcOrd="1" destOrd="0" presId="urn:microsoft.com/office/officeart/2005/8/layout/hierarchy2"/>
-    <dgm:cxn modelId="{9C2D7013-E951-974E-8CC2-A4902DB78618}" type="presParOf" srcId="{CEF6A641-4A3D-3043-8F9B-85EF97F27AF6}" destId="{DF2248CE-7D7C-5D4B-8277-D213DA6DD3EB}" srcOrd="2" destOrd="0" presId="urn:microsoft.com/office/officeart/2005/8/layout/hierarchy2"/>
-    <dgm:cxn modelId="{4CB8E915-233C-8F48-BADA-E1B8A9975216}" type="presParOf" srcId="{DF2248CE-7D7C-5D4B-8277-D213DA6DD3EB}" destId="{A52AB215-CE3B-6540-84CE-C7392438F501}" srcOrd="0" destOrd="0" presId="urn:microsoft.com/office/officeart/2005/8/layout/hierarchy2"/>
-    <dgm:cxn modelId="{488F0F11-9B3B-FF4A-BD9B-7119B162C63B}" type="presParOf" srcId="{CEF6A641-4A3D-3043-8F9B-85EF97F27AF6}" destId="{1A261F39-0BA9-4948-A5A6-DB65EB31F286}" srcOrd="3" destOrd="0" presId="urn:microsoft.com/office/officeart/2005/8/layout/hierarchy2"/>
-    <dgm:cxn modelId="{270341CF-D36B-D448-8B9E-3352E27C10D0}" type="presParOf" srcId="{1A261F39-0BA9-4948-A5A6-DB65EB31F286}" destId="{973B5C1F-9A88-FA43-9797-E750A0514CF6}" srcOrd="0" destOrd="0" presId="urn:microsoft.com/office/officeart/2005/8/layout/hierarchy2"/>
-    <dgm:cxn modelId="{FAC30B87-A6A9-6F4C-B492-55EBD7031CC7}" type="presParOf" srcId="{1A261F39-0BA9-4948-A5A6-DB65EB31F286}" destId="{51CF1E14-52A3-5847-9202-4DC83418154D}" srcOrd="1" destOrd="0" presId="urn:microsoft.com/office/officeart/2005/8/layout/hierarchy2"/>
-    <dgm:cxn modelId="{8A62664A-4AAB-9F46-AA86-35B04B9434AA}" type="presParOf" srcId="{51CF1E14-52A3-5847-9202-4DC83418154D}" destId="{48C1939D-7F8F-224A-89D3-D240B4AD4863}" srcOrd="0" destOrd="0" presId="urn:microsoft.com/office/officeart/2005/8/layout/hierarchy2"/>
-    <dgm:cxn modelId="{C32412B0-A0A8-CE44-9259-F2517DA07153}" type="presParOf" srcId="{48C1939D-7F8F-224A-89D3-D240B4AD4863}" destId="{9D8B57B8-631C-FB43-A057-C6F4840439BB}" srcOrd="0" destOrd="0" presId="urn:microsoft.com/office/officeart/2005/8/layout/hierarchy2"/>
-    <dgm:cxn modelId="{9A8B671F-789F-F447-94F3-815949F8DD42}" type="presParOf" srcId="{51CF1E14-52A3-5847-9202-4DC83418154D}" destId="{9B156E3B-6B87-DB4D-BA13-CFAC7D71D3F1}" srcOrd="1" destOrd="0" presId="urn:microsoft.com/office/officeart/2005/8/layout/hierarchy2"/>
-    <dgm:cxn modelId="{5ECD4759-EBF7-474A-8A0A-B6AACE466ED1}" type="presParOf" srcId="{9B156E3B-6B87-DB4D-BA13-CFAC7D71D3F1}" destId="{6D61A4E9-20E0-724F-8506-4AF9CF093D61}" srcOrd="0" destOrd="0" presId="urn:microsoft.com/office/officeart/2005/8/layout/hierarchy2"/>
-    <dgm:cxn modelId="{40B34D41-4F11-F144-BFDF-B79B12B86392}" type="presParOf" srcId="{9B156E3B-6B87-DB4D-BA13-CFAC7D71D3F1}" destId="{19E36116-61C3-384D-9648-E48E06A20314}" srcOrd="1" destOrd="0" presId="urn:microsoft.com/office/officeart/2005/8/layout/hierarchy2"/>
-    <dgm:cxn modelId="{64A2F9F0-FEE2-1841-924F-94205FA3C01B}" type="presParOf" srcId="{19E36116-61C3-384D-9648-E48E06A20314}" destId="{D5E03AE9-CD36-1E45-8924-A89701186EA4}" srcOrd="0" destOrd="0" presId="urn:microsoft.com/office/officeart/2005/8/layout/hierarchy2"/>
-    <dgm:cxn modelId="{41C3744D-CFBC-194F-9989-FFD73E5E37E9}" type="presParOf" srcId="{D5E03AE9-CD36-1E45-8924-A89701186EA4}" destId="{A4EEFD49-E628-3740-A93E-6D11E409D24D}" srcOrd="0" destOrd="0" presId="urn:microsoft.com/office/officeart/2005/8/layout/hierarchy2"/>
-    <dgm:cxn modelId="{8BABD73B-50BE-5B48-81C7-1DF0459564DA}" type="presParOf" srcId="{19E36116-61C3-384D-9648-E48E06A20314}" destId="{6788474E-B969-384B-B022-EB3A33F173C9}" srcOrd="1" destOrd="0" presId="urn:microsoft.com/office/officeart/2005/8/layout/hierarchy2"/>
-    <dgm:cxn modelId="{912DD55B-80A1-E044-BC42-E7CFB0F2C375}" type="presParOf" srcId="{6788474E-B969-384B-B022-EB3A33F173C9}" destId="{020ECFE7-D082-9944-8AD2-DBD727F66CA5}" srcOrd="0" destOrd="0" presId="urn:microsoft.com/office/officeart/2005/8/layout/hierarchy2"/>
-    <dgm:cxn modelId="{14B0F6B8-D4C7-584F-B535-10EB9451DF17}" type="presParOf" srcId="{6788474E-B969-384B-B022-EB3A33F173C9}" destId="{0D5535D0-3B22-FD45-86B1-1BDBFD7FAA6F}" srcOrd="1" destOrd="0" presId="urn:microsoft.com/office/officeart/2005/8/layout/hierarchy2"/>
-    <dgm:cxn modelId="{53B0D555-216C-CB45-9EBF-F84E71F66D8D}" type="presParOf" srcId="{0D5535D0-3B22-FD45-86B1-1BDBFD7FAA6F}" destId="{6B63E564-88B8-E64A-B9FB-CD4F663F06C4}" srcOrd="0" destOrd="0" presId="urn:microsoft.com/office/officeart/2005/8/layout/hierarchy2"/>
-    <dgm:cxn modelId="{2606FC34-F2C3-664F-B96C-5C4172052A16}" type="presParOf" srcId="{6B63E564-88B8-E64A-B9FB-CD4F663F06C4}" destId="{0BB8C1D1-32D5-F247-90B9-6406D7687D76}" srcOrd="0" destOrd="0" presId="urn:microsoft.com/office/officeart/2005/8/layout/hierarchy2"/>
-    <dgm:cxn modelId="{69091473-0D55-7F49-B59B-AA9435455495}" type="presParOf" srcId="{0D5535D0-3B22-FD45-86B1-1BDBFD7FAA6F}" destId="{9AA4CB9B-D3ED-B443-B3FD-E68710357950}" srcOrd="1" destOrd="0" presId="urn:microsoft.com/office/officeart/2005/8/layout/hierarchy2"/>
-    <dgm:cxn modelId="{D7CF98F4-EE67-3A46-8AB5-0E995F45809A}" type="presParOf" srcId="{9AA4CB9B-D3ED-B443-B3FD-E68710357950}" destId="{2E029F71-35C9-9044-867B-C62FC8CEDC2C}" srcOrd="0" destOrd="0" presId="urn:microsoft.com/office/officeart/2005/8/layout/hierarchy2"/>
-    <dgm:cxn modelId="{105102B0-B2AD-694A-8C89-243937628ECA}" type="presParOf" srcId="{9AA4CB9B-D3ED-B443-B3FD-E68710357950}" destId="{6B50D666-6773-6F4B-AA48-FA3A531B2932}" srcOrd="1" destOrd="0" presId="urn:microsoft.com/office/officeart/2005/8/layout/hierarchy2"/>
-    <dgm:cxn modelId="{D79477F6-5E7C-1F49-A90A-008A498CE415}" type="presParOf" srcId="{0D5535D0-3B22-FD45-86B1-1BDBFD7FAA6F}" destId="{641BAAFD-D329-7E42-8738-0A74C231BC0A}" srcOrd="2" destOrd="0" presId="urn:microsoft.com/office/officeart/2005/8/layout/hierarchy2"/>
-    <dgm:cxn modelId="{0983B1E9-0B6C-D54C-8438-01FACE298BBC}" type="presParOf" srcId="{641BAAFD-D329-7E42-8738-0A74C231BC0A}" destId="{8F379772-4468-2D48-8E1C-02F9C1718421}" srcOrd="0" destOrd="0" presId="urn:microsoft.com/office/officeart/2005/8/layout/hierarchy2"/>
-    <dgm:cxn modelId="{C0175F95-78F4-D846-A278-485977D89534}" type="presParOf" srcId="{0D5535D0-3B22-FD45-86B1-1BDBFD7FAA6F}" destId="{E4854849-0AC0-954F-BD0F-9A4D48A7DB3F}" srcOrd="3" destOrd="0" presId="urn:microsoft.com/office/officeart/2005/8/layout/hierarchy2"/>
-    <dgm:cxn modelId="{28708482-D206-674B-9247-DF651B03031C}" type="presParOf" srcId="{E4854849-0AC0-954F-BD0F-9A4D48A7DB3F}" destId="{6EB62837-1E38-C84D-ACB4-94B49AFC73CE}" srcOrd="0" destOrd="0" presId="urn:microsoft.com/office/officeart/2005/8/layout/hierarchy2"/>
-    <dgm:cxn modelId="{2D529A25-9353-7B4E-9823-0B23CE3F7659}" type="presParOf" srcId="{E4854849-0AC0-954F-BD0F-9A4D48A7DB3F}" destId="{F149F12C-7158-8441-8A8F-306CE01E326A}" srcOrd="1" destOrd="0" presId="urn:microsoft.com/office/officeart/2005/8/layout/hierarchy2"/>
-    <dgm:cxn modelId="{1F50D0A8-8093-424A-8B09-F0E5E1C4228C}" type="presParOf" srcId="{19E36116-61C3-384D-9648-E48E06A20314}" destId="{0944545F-BE28-CB41-9FE0-CB8029CA4E05}" srcOrd="2" destOrd="0" presId="urn:microsoft.com/office/officeart/2005/8/layout/hierarchy2"/>
-    <dgm:cxn modelId="{793563F4-CDAF-8A4D-92C5-37B5583264F5}" type="presParOf" srcId="{0944545F-BE28-CB41-9FE0-CB8029CA4E05}" destId="{B9DF7744-0386-3343-9BD2-F1987F5C2504}" srcOrd="0" destOrd="0" presId="urn:microsoft.com/office/officeart/2005/8/layout/hierarchy2"/>
-    <dgm:cxn modelId="{5F65AA62-4506-9349-84D5-212F6987EE2C}" type="presParOf" srcId="{19E36116-61C3-384D-9648-E48E06A20314}" destId="{39F3B461-72C8-0145-ACF2-28565415C7A1}" srcOrd="3" destOrd="0" presId="urn:microsoft.com/office/officeart/2005/8/layout/hierarchy2"/>
-    <dgm:cxn modelId="{56AB40A8-FE46-E047-8C35-C067B2383027}" type="presParOf" srcId="{39F3B461-72C8-0145-ACF2-28565415C7A1}" destId="{F84751BB-FB2D-0A40-88BA-778CB80F14B3}" srcOrd="0" destOrd="0" presId="urn:microsoft.com/office/officeart/2005/8/layout/hierarchy2"/>
-    <dgm:cxn modelId="{59E41FA5-EE06-3F45-B08D-DF0CD839CB8C}" type="presParOf" srcId="{39F3B461-72C8-0145-ACF2-28565415C7A1}" destId="{FC4E52E0-921B-154B-A8A5-2FB3A2F0A717}" srcOrd="1" destOrd="0" presId="urn:microsoft.com/office/officeart/2005/8/layout/hierarchy2"/>
-    <dgm:cxn modelId="{54D1AA3B-01CF-0940-A16D-6FE7754AC35F}" type="presParOf" srcId="{FC4E52E0-921B-154B-A8A5-2FB3A2F0A717}" destId="{F03D0C19-6DF7-B64A-9FD1-2A1A5EF6D7CA}" srcOrd="0" destOrd="0" presId="urn:microsoft.com/office/officeart/2005/8/layout/hierarchy2"/>
-    <dgm:cxn modelId="{46852E24-263F-CF4C-ABB2-3DBB1649A7CA}" type="presParOf" srcId="{F03D0C19-6DF7-B64A-9FD1-2A1A5EF6D7CA}" destId="{0DFBADBC-4685-304B-87B0-BD0C0A75C57C}" srcOrd="0" destOrd="0" presId="urn:microsoft.com/office/officeart/2005/8/layout/hierarchy2"/>
-    <dgm:cxn modelId="{7F020B49-5F5A-A648-827C-CF4E8E5D57DF}" type="presParOf" srcId="{FC4E52E0-921B-154B-A8A5-2FB3A2F0A717}" destId="{275D3635-4C9C-434E-9619-C93CEC2EFD77}" srcOrd="1" destOrd="0" presId="urn:microsoft.com/office/officeart/2005/8/layout/hierarchy2"/>
-    <dgm:cxn modelId="{5F3B61C2-0E71-A341-B6CD-7B91F8FE2545}" type="presParOf" srcId="{275D3635-4C9C-434E-9619-C93CEC2EFD77}" destId="{BBF96CC7-6B2B-D546-B69E-E97D847B5E45}" srcOrd="0" destOrd="0" presId="urn:microsoft.com/office/officeart/2005/8/layout/hierarchy2"/>
-    <dgm:cxn modelId="{9CDBA346-7CF9-7547-87D7-8D952D528E94}" type="presParOf" srcId="{275D3635-4C9C-434E-9619-C93CEC2EFD77}" destId="{19BD08D0-6546-9249-90C7-9F1FE933043C}" srcOrd="1" destOrd="0" presId="urn:microsoft.com/office/officeart/2005/8/layout/hierarchy2"/>
-    <dgm:cxn modelId="{26D84C8E-0539-394C-81CF-FEE1F11C60DB}" type="presParOf" srcId="{FC4E52E0-921B-154B-A8A5-2FB3A2F0A717}" destId="{B0460EF9-21D3-F84E-BBFA-46763C9AE876}" srcOrd="2" destOrd="0" presId="urn:microsoft.com/office/officeart/2005/8/layout/hierarchy2"/>
-    <dgm:cxn modelId="{F959E2E1-4DC3-C44A-BD9F-6E107665C357}" type="presParOf" srcId="{B0460EF9-21D3-F84E-BBFA-46763C9AE876}" destId="{9F8B70A0-32E5-A14F-B6F2-42409C13EE93}" srcOrd="0" destOrd="0" presId="urn:microsoft.com/office/officeart/2005/8/layout/hierarchy2"/>
-    <dgm:cxn modelId="{0AB49164-2912-5540-9063-7BACF63AC30B}" type="presParOf" srcId="{FC4E52E0-921B-154B-A8A5-2FB3A2F0A717}" destId="{DA24A719-148D-1546-8E68-CD4A35F46D3E}" srcOrd="3" destOrd="0" presId="urn:microsoft.com/office/officeart/2005/8/layout/hierarchy2"/>
-    <dgm:cxn modelId="{C0C8A4E5-A706-7D47-BA67-D9B2BCC43F2C}" type="presParOf" srcId="{DA24A719-148D-1546-8E68-CD4A35F46D3E}" destId="{C1AD9849-C58B-0841-853D-61235BCF9197}" srcOrd="0" destOrd="0" presId="urn:microsoft.com/office/officeart/2005/8/layout/hierarchy2"/>
-    <dgm:cxn modelId="{E1B1360D-E20C-354D-86EA-CC8F7BC461FC}" type="presParOf" srcId="{DA24A719-148D-1546-8E68-CD4A35F46D3E}" destId="{3E3B37EB-6AA0-E04A-A04B-9356DFCDCF10}" srcOrd="1" destOrd="0" presId="urn:microsoft.com/office/officeart/2005/8/layout/hierarchy2"/>
-    <dgm:cxn modelId="{A176D532-D5BC-F84A-8E12-33E28DF60B8E}" type="presParOf" srcId="{9F47EDC6-53C3-A243-AEEE-2D2DB2230807}" destId="{AE09F7FF-7720-0E4F-A409-200B111906F7}" srcOrd="2" destOrd="0" presId="urn:microsoft.com/office/officeart/2005/8/layout/hierarchy2"/>
-    <dgm:cxn modelId="{49E83D19-581A-C24A-BB91-7E24B419847F}" type="presParOf" srcId="{AE09F7FF-7720-0E4F-A409-200B111906F7}" destId="{C7F54069-F85F-C24F-B7E5-A79C8F7CF7A2}" srcOrd="0" destOrd="0" presId="urn:microsoft.com/office/officeart/2005/8/layout/hierarchy2"/>
-    <dgm:cxn modelId="{D96A6BC7-2A6F-1C4F-9907-51C81EE7B189}" type="presParOf" srcId="{9F47EDC6-53C3-A243-AEEE-2D2DB2230807}" destId="{D4BEEA34-09B6-2F46-9BEC-1EEBB06552F3}" srcOrd="3" destOrd="0" presId="urn:microsoft.com/office/officeart/2005/8/layout/hierarchy2"/>
-    <dgm:cxn modelId="{6B7D3EBF-EC71-6342-92BD-10583C95B032}" type="presParOf" srcId="{D4BEEA34-09B6-2F46-9BEC-1EEBB06552F3}" destId="{CD3E6B27-7BAA-1A4F-A778-AAC952E047EB}" srcOrd="0" destOrd="0" presId="urn:microsoft.com/office/officeart/2005/8/layout/hierarchy2"/>
-    <dgm:cxn modelId="{F8CCCDDF-4B31-164F-AC24-E2FE89E39859}" type="presParOf" srcId="{D4BEEA34-09B6-2F46-9BEC-1EEBB06552F3}" destId="{5DAC9447-BDD2-9E43-B909-4E243359A1EA}" srcOrd="1" destOrd="0" presId="urn:microsoft.com/office/officeart/2005/8/layout/hierarchy2"/>
-    <dgm:cxn modelId="{AA2F87DB-3058-994B-8BB8-57873CAAA7BA}" type="presParOf" srcId="{5DAC9447-BDD2-9E43-B909-4E243359A1EA}" destId="{579EAB07-4F83-F743-9508-5D825E6D182C}" srcOrd="0" destOrd="0" presId="urn:microsoft.com/office/officeart/2005/8/layout/hierarchy2"/>
-    <dgm:cxn modelId="{1D8BE2CF-1BA5-584D-A33F-E8FF6D76E75B}" type="presParOf" srcId="{579EAB07-4F83-F743-9508-5D825E6D182C}" destId="{3455402C-0615-5140-883D-2091BEC57060}" srcOrd="0" destOrd="0" presId="urn:microsoft.com/office/officeart/2005/8/layout/hierarchy2"/>
-    <dgm:cxn modelId="{E63D22C1-6D0F-B246-856E-4B4BF8555154}" type="presParOf" srcId="{5DAC9447-BDD2-9E43-B909-4E243359A1EA}" destId="{4D159BF9-163C-BD48-8527-9D25AAAAA168}" srcOrd="1" destOrd="0" presId="urn:microsoft.com/office/officeart/2005/8/layout/hierarchy2"/>
-    <dgm:cxn modelId="{4C859235-628C-D04D-8A6D-42866DF86B3D}" type="presParOf" srcId="{4D159BF9-163C-BD48-8527-9D25AAAAA168}" destId="{EEF9B519-006B-D64A-A894-6F7AC9155FD9}" srcOrd="0" destOrd="0" presId="urn:microsoft.com/office/officeart/2005/8/layout/hierarchy2"/>
-    <dgm:cxn modelId="{EF5B9F15-E79D-B94D-9CD3-9AE10661D324}" type="presParOf" srcId="{4D159BF9-163C-BD48-8527-9D25AAAAA168}" destId="{E5454DC6-C250-9C4F-850A-E9FCDACA022C}" srcOrd="1" destOrd="0" presId="urn:microsoft.com/office/officeart/2005/8/layout/hierarchy2"/>
-    <dgm:cxn modelId="{8F6AD27C-D9E5-E34A-8132-8B3667CFB039}" type="presParOf" srcId="{E5454DC6-C250-9C4F-850A-E9FCDACA022C}" destId="{FF0504E2-FEC3-884B-B595-DCBAEFD33946}" srcOrd="0" destOrd="0" presId="urn:microsoft.com/office/officeart/2005/8/layout/hierarchy2"/>
-    <dgm:cxn modelId="{7A16B054-9A7F-A24C-B649-4417355299D0}" type="presParOf" srcId="{FF0504E2-FEC3-884B-B595-DCBAEFD33946}" destId="{A99DEBE2-A9C8-9640-947F-1F27481BC737}" srcOrd="0" destOrd="0" presId="urn:microsoft.com/office/officeart/2005/8/layout/hierarchy2"/>
-    <dgm:cxn modelId="{BD0C51B7-AB17-A542-A982-9543D080E496}" type="presParOf" srcId="{E5454DC6-C250-9C4F-850A-E9FCDACA022C}" destId="{E4F67987-96F8-6A4A-A2FB-CBA1B366E3C5}" srcOrd="1" destOrd="0" presId="urn:microsoft.com/office/officeart/2005/8/layout/hierarchy2"/>
-    <dgm:cxn modelId="{A3E5AE18-F4F5-E04F-A67A-77E61A7840A6}" type="presParOf" srcId="{E4F67987-96F8-6A4A-A2FB-CBA1B366E3C5}" destId="{87A01F3E-6C55-844D-A489-6FE6695CB6F7}" srcOrd="0" destOrd="0" presId="urn:microsoft.com/office/officeart/2005/8/layout/hierarchy2"/>
-    <dgm:cxn modelId="{13DBBD99-19D2-0A43-9584-B098937D3F8E}" type="presParOf" srcId="{E4F67987-96F8-6A4A-A2FB-CBA1B366E3C5}" destId="{59A98818-16A4-4746-83CE-4AF7710A77D4}" srcOrd="1" destOrd="0" presId="urn:microsoft.com/office/officeart/2005/8/layout/hierarchy2"/>
-    <dgm:cxn modelId="{62E1F9F2-2E38-574C-ACFF-F43E7C946B3F}" type="presParOf" srcId="{E5454DC6-C250-9C4F-850A-E9FCDACA022C}" destId="{180BC466-B29A-4F46-A85D-CA4AB8E5E528}" srcOrd="2" destOrd="0" presId="urn:microsoft.com/office/officeart/2005/8/layout/hierarchy2"/>
-    <dgm:cxn modelId="{5341B3AF-9307-9C4A-A386-0A3190BBB7B3}" type="presParOf" srcId="{180BC466-B29A-4F46-A85D-CA4AB8E5E528}" destId="{A37D193D-BA8D-D841-BBF6-8B93ACA9CA93}" srcOrd="0" destOrd="0" presId="urn:microsoft.com/office/officeart/2005/8/layout/hierarchy2"/>
-    <dgm:cxn modelId="{31D1E12B-C11E-B240-8563-ADB97B83CF0A}" type="presParOf" srcId="{E5454DC6-C250-9C4F-850A-E9FCDACA022C}" destId="{AFE36984-70CB-5743-868B-9D1AACD819F9}" srcOrd="3" destOrd="0" presId="urn:microsoft.com/office/officeart/2005/8/layout/hierarchy2"/>
-    <dgm:cxn modelId="{5E5B52F1-D931-AB46-9DFD-81E55F3E0F13}" type="presParOf" srcId="{AFE36984-70CB-5743-868B-9D1AACD819F9}" destId="{9EADF938-02B1-2C43-8A93-4A4A378C8BDB}" srcOrd="0" destOrd="0" presId="urn:microsoft.com/office/officeart/2005/8/layout/hierarchy2"/>
-    <dgm:cxn modelId="{F5FE36E1-97F3-D249-AF1C-4E79E29145B0}" type="presParOf" srcId="{AFE36984-70CB-5743-868B-9D1AACD819F9}" destId="{FDF33A1F-8DF9-554F-99D4-45EE059313BC}" srcOrd="1" destOrd="0" presId="urn:microsoft.com/office/officeart/2005/8/layout/hierarchy2"/>
-    <dgm:cxn modelId="{24FEA08A-20F4-C245-B4FE-6DE28F6D436D}" type="presParOf" srcId="{5DAC9447-BDD2-9E43-B909-4E243359A1EA}" destId="{DD49C87D-B15D-704F-8833-A4B4C4143ED4}" srcOrd="2" destOrd="0" presId="urn:microsoft.com/office/officeart/2005/8/layout/hierarchy2"/>
-    <dgm:cxn modelId="{8C54F22C-6212-4F44-8263-89BC82EAEA46}" type="presParOf" srcId="{DD49C87D-B15D-704F-8833-A4B4C4143ED4}" destId="{42039CC0-63F7-F24E-99BE-507AD122C4A6}" srcOrd="0" destOrd="0" presId="urn:microsoft.com/office/officeart/2005/8/layout/hierarchy2"/>
-    <dgm:cxn modelId="{39B91F29-37B1-0B43-8AEA-45CDFAAABE6E}" type="presParOf" srcId="{5DAC9447-BDD2-9E43-B909-4E243359A1EA}" destId="{E1D6F75D-5D8D-4A43-9AD9-B6051EE89439}" srcOrd="3" destOrd="0" presId="urn:microsoft.com/office/officeart/2005/8/layout/hierarchy2"/>
-    <dgm:cxn modelId="{C27F8F94-2421-B34C-9222-4A2DF94B5221}" type="presParOf" srcId="{E1D6F75D-5D8D-4A43-9AD9-B6051EE89439}" destId="{B371D0DB-D4F9-F54E-B9CA-FAFBC9F2E03D}" srcOrd="0" destOrd="0" presId="urn:microsoft.com/office/officeart/2005/8/layout/hierarchy2"/>
-    <dgm:cxn modelId="{A12CD104-5807-3145-8124-896C0830EDF2}" type="presParOf" srcId="{E1D6F75D-5D8D-4A43-9AD9-B6051EE89439}" destId="{0554742E-D4B9-2544-B8F0-FA8345D1032F}" srcOrd="1" destOrd="0" presId="urn:microsoft.com/office/officeart/2005/8/layout/hierarchy2"/>
-    <dgm:cxn modelId="{EEA25CB9-8BDB-2148-A6AB-1FB0A5DF7BB3}" type="presParOf" srcId="{2621B116-FEC2-024B-A529-952624AF50D7}" destId="{2D1E9B71-E05F-414C-9C94-D01927894E96}" srcOrd="2" destOrd="0" presId="urn:microsoft.com/office/officeart/2005/8/layout/hierarchy2"/>
-    <dgm:cxn modelId="{9F1739E3-5727-0741-96C0-E48A3993895B}" type="presParOf" srcId="{2D1E9B71-E05F-414C-9C94-D01927894E96}" destId="{DF081D17-BB5A-8841-8B93-BD4D83616D20}" srcOrd="0" destOrd="0" presId="urn:microsoft.com/office/officeart/2005/8/layout/hierarchy2"/>
-    <dgm:cxn modelId="{9D5DDADB-0274-DE40-AAA4-96716459398D}" type="presParOf" srcId="{2621B116-FEC2-024B-A529-952624AF50D7}" destId="{2184EBE1-C0CA-CF4A-9AAA-18BF18AE5881}" srcOrd="3" destOrd="0" presId="urn:microsoft.com/office/officeart/2005/8/layout/hierarchy2"/>
-    <dgm:cxn modelId="{81F69504-0201-964C-9CA5-3C7014FB8DDF}" type="presParOf" srcId="{2184EBE1-C0CA-CF4A-9AAA-18BF18AE5881}" destId="{F46DFD37-2A53-3145-8804-1FE00FF9EE35}" srcOrd="0" destOrd="0" presId="urn:microsoft.com/office/officeart/2005/8/layout/hierarchy2"/>
-    <dgm:cxn modelId="{1B8DE584-7CCB-164A-A71A-0EDBDECC25CD}" type="presParOf" srcId="{2184EBE1-C0CA-CF4A-9AAA-18BF18AE5881}" destId="{DFF4E02D-E420-8E43-9B06-533FB45D6A87}" srcOrd="1" destOrd="0" presId="urn:microsoft.com/office/officeart/2005/8/layout/hierarchy2"/>
-    <dgm:cxn modelId="{4AE597CA-336E-944B-9200-3CB5E082F0C0}" type="presParOf" srcId="{DFF4E02D-E420-8E43-9B06-533FB45D6A87}" destId="{869EE02D-617D-B44A-B5B1-15C6745F808C}" srcOrd="0" destOrd="0" presId="urn:microsoft.com/office/officeart/2005/8/layout/hierarchy2"/>
-    <dgm:cxn modelId="{1F368E6B-0A60-2C45-A817-6D910586A644}" type="presParOf" srcId="{869EE02D-617D-B44A-B5B1-15C6745F808C}" destId="{15390832-3CB7-A648-B93F-B9552C39E0C7}" srcOrd="0" destOrd="0" presId="urn:microsoft.com/office/officeart/2005/8/layout/hierarchy2"/>
-    <dgm:cxn modelId="{E73FC619-61F9-4548-A71E-3838C942AE78}" type="presParOf" srcId="{DFF4E02D-E420-8E43-9B06-533FB45D6A87}" destId="{1AF0473B-AA8E-214D-93A2-63C6C783545F}" srcOrd="1" destOrd="0" presId="urn:microsoft.com/office/officeart/2005/8/layout/hierarchy2"/>
-    <dgm:cxn modelId="{2B8B2A20-F7B0-104F-B240-984194D31266}" type="presParOf" srcId="{1AF0473B-AA8E-214D-93A2-63C6C783545F}" destId="{BC80C050-C05C-EE4F-8A85-26778F146866}" srcOrd="0" destOrd="0" presId="urn:microsoft.com/office/officeart/2005/8/layout/hierarchy2"/>
-    <dgm:cxn modelId="{51AA830F-2C49-9F47-A257-3206808CF53D}" type="presParOf" srcId="{1AF0473B-AA8E-214D-93A2-63C6C783545F}" destId="{D3983196-DF97-F94C-9A81-9808004A2CDA}" srcOrd="1" destOrd="0" presId="urn:microsoft.com/office/officeart/2005/8/layout/hierarchy2"/>
-    <dgm:cxn modelId="{79958D5D-4B80-7F44-A75A-7FD4A0F990E8}" type="presParOf" srcId="{DFF4E02D-E420-8E43-9B06-533FB45D6A87}" destId="{6720575C-1BAC-0144-BC7F-01F88A777532}" srcOrd="2" destOrd="0" presId="urn:microsoft.com/office/officeart/2005/8/layout/hierarchy2"/>
-    <dgm:cxn modelId="{ABC9D690-7236-634F-A860-E69212C1F5EE}" type="presParOf" srcId="{6720575C-1BAC-0144-BC7F-01F88A777532}" destId="{BFFD3F83-879B-344E-9F97-BBFA92EBA5A1}" srcOrd="0" destOrd="0" presId="urn:microsoft.com/office/officeart/2005/8/layout/hierarchy2"/>
-    <dgm:cxn modelId="{7AA0F9D6-379A-D94B-B024-68CAF34E8781}" type="presParOf" srcId="{DFF4E02D-E420-8E43-9B06-533FB45D6A87}" destId="{28F8F523-F5B1-3548-AEA4-6A99D9B09239}" srcOrd="3" destOrd="0" presId="urn:microsoft.com/office/officeart/2005/8/layout/hierarchy2"/>
-    <dgm:cxn modelId="{3802DF64-81BC-784A-9AC0-C154C0576C82}" type="presParOf" srcId="{28F8F523-F5B1-3548-AEA4-6A99D9B09239}" destId="{D54C132A-9E8C-C649-BA54-66D04BA9F9D2}" srcOrd="0" destOrd="0" presId="urn:microsoft.com/office/officeart/2005/8/layout/hierarchy2"/>
-    <dgm:cxn modelId="{E9D50EEB-A88B-8745-87A7-072899F1E18F}" type="presParOf" srcId="{28F8F523-F5B1-3548-AEA4-6A99D9B09239}" destId="{D33145FA-17D5-7E4A-82CD-695D3D79B00C}" srcOrd="1" destOrd="0" presId="urn:microsoft.com/office/officeart/2005/8/layout/hierarchy2"/>
-    <dgm:cxn modelId="{84D42E02-47AD-214A-B277-FD39079ED67C}" type="presParOf" srcId="{22BF3431-5CB6-A548-8AFC-FD73A5E82A29}" destId="{D7596022-8BF6-2F44-B88B-8E372A8354ED}" srcOrd="2" destOrd="0" presId="urn:microsoft.com/office/officeart/2005/8/layout/hierarchy2"/>
-    <dgm:cxn modelId="{F86719DB-0747-0444-8AC9-AE6AFFED5914}" type="presParOf" srcId="{D7596022-8BF6-2F44-B88B-8E372A8354ED}" destId="{17B51E74-34E2-7D49-AA23-10FE3919CFB0}" srcOrd="0" destOrd="0" presId="urn:microsoft.com/office/officeart/2005/8/layout/hierarchy2"/>
-    <dgm:cxn modelId="{92BB44AC-700B-A04A-8D17-300DADFF29ED}" type="presParOf" srcId="{22BF3431-5CB6-A548-8AFC-FD73A5E82A29}" destId="{C007AC2C-2EC9-6C44-A699-CA6AE9B8655D}" srcOrd="3" destOrd="0" presId="urn:microsoft.com/office/officeart/2005/8/layout/hierarchy2"/>
-    <dgm:cxn modelId="{317AD6CC-8C8F-474F-8221-C073340E85A5}" type="presParOf" srcId="{C007AC2C-2EC9-6C44-A699-CA6AE9B8655D}" destId="{9CA221DE-8BA7-C642-A298-1EBC15C1C54E}" srcOrd="0" destOrd="0" presId="urn:microsoft.com/office/officeart/2005/8/layout/hierarchy2"/>
-    <dgm:cxn modelId="{E1F0C7A4-1FD8-BD42-B09D-7C30EED0676F}" type="presParOf" srcId="{C007AC2C-2EC9-6C44-A699-CA6AE9B8655D}" destId="{87D61914-56D8-7D43-A69D-CE66D030DE47}" srcOrd="1" destOrd="0" presId="urn:microsoft.com/office/officeart/2005/8/layout/hierarchy2"/>
-    <dgm:cxn modelId="{1D8D1F09-AD29-484F-A3F4-1E2D048F771C}" type="presParOf" srcId="{87D61914-56D8-7D43-A69D-CE66D030DE47}" destId="{557D6FDE-1A5F-A343-AAC9-B64134858DAA}" srcOrd="0" destOrd="0" presId="urn:microsoft.com/office/officeart/2005/8/layout/hierarchy2"/>
-    <dgm:cxn modelId="{D3C09923-A80B-314C-8763-91B781B3CEF0}" type="presParOf" srcId="{557D6FDE-1A5F-A343-AAC9-B64134858DAA}" destId="{C4443B60-ECB6-1343-A45F-07FEEC62928B}" srcOrd="0" destOrd="0" presId="urn:microsoft.com/office/officeart/2005/8/layout/hierarchy2"/>
-    <dgm:cxn modelId="{879E8AAC-DC45-944C-94CE-27D94C442AB1}" type="presParOf" srcId="{87D61914-56D8-7D43-A69D-CE66D030DE47}" destId="{5B928F95-2A80-9144-A01A-A3556977B2BD}" srcOrd="1" destOrd="0" presId="urn:microsoft.com/office/officeart/2005/8/layout/hierarchy2"/>
-    <dgm:cxn modelId="{DFADFF99-8B4A-EF4E-A7CB-EFFC59C07ADC}" type="presParOf" srcId="{5B928F95-2A80-9144-A01A-A3556977B2BD}" destId="{ABF00753-ADCF-6A42-88C3-5F8E14C158F3}" srcOrd="0" destOrd="0" presId="urn:microsoft.com/office/officeart/2005/8/layout/hierarchy2"/>
-    <dgm:cxn modelId="{24C59EF5-C9FC-B54C-B3FE-A59E73BAB76E}" type="presParOf" srcId="{5B928F95-2A80-9144-A01A-A3556977B2BD}" destId="{CCB47E8E-0439-B84E-AAC8-9755722EC914}" srcOrd="1" destOrd="0" presId="urn:microsoft.com/office/officeart/2005/8/layout/hierarchy2"/>
-    <dgm:cxn modelId="{A2CDD6ED-573B-074E-815D-E399FB5CBC28}" type="presParOf" srcId="{CCB47E8E-0439-B84E-AAC8-9755722EC914}" destId="{22F37B2C-0144-4B42-B610-EDE869332C91}" srcOrd="0" destOrd="0" presId="urn:microsoft.com/office/officeart/2005/8/layout/hierarchy2"/>
-    <dgm:cxn modelId="{202C1762-56DF-AB44-94DB-470CF1F01E1E}" type="presParOf" srcId="{22F37B2C-0144-4B42-B610-EDE869332C91}" destId="{3A7EA8F2-16F7-6D4B-B19E-6E24918EA42B}" srcOrd="0" destOrd="0" presId="urn:microsoft.com/office/officeart/2005/8/layout/hierarchy2"/>
-    <dgm:cxn modelId="{DF8A91FC-FB2B-5E4A-8403-B4CDCA64E670}" type="presParOf" srcId="{CCB47E8E-0439-B84E-AAC8-9755722EC914}" destId="{84E57F8A-7884-7447-990E-1633FF21CF70}" srcOrd="1" destOrd="0" presId="urn:microsoft.com/office/officeart/2005/8/layout/hierarchy2"/>
-    <dgm:cxn modelId="{27D065F9-F194-D142-98E5-BC4E3946AA86}" type="presParOf" srcId="{84E57F8A-7884-7447-990E-1633FF21CF70}" destId="{DA5BF4BB-05E1-0E46-B48F-BE2DEE98665B}" srcOrd="0" destOrd="0" presId="urn:microsoft.com/office/officeart/2005/8/layout/hierarchy2"/>
-    <dgm:cxn modelId="{13ACD080-54AB-4F4A-AB62-37448766660C}" type="presParOf" srcId="{84E57F8A-7884-7447-990E-1633FF21CF70}" destId="{DF0395F5-1E8C-9E48-8267-6EF17C2A0DA2}" srcOrd="1" destOrd="0" presId="urn:microsoft.com/office/officeart/2005/8/layout/hierarchy2"/>
-    <dgm:cxn modelId="{2D151ECE-D512-2343-BC58-5232298539C2}" type="presParOf" srcId="{DF0395F5-1E8C-9E48-8267-6EF17C2A0DA2}" destId="{622CDB72-9FE3-E446-8D99-51F2FE63E17B}" srcOrd="0" destOrd="0" presId="urn:microsoft.com/office/officeart/2005/8/layout/hierarchy2"/>
-    <dgm:cxn modelId="{E619AE98-B404-3F40-B040-C19257185B06}" type="presParOf" srcId="{622CDB72-9FE3-E446-8D99-51F2FE63E17B}" destId="{999F5CA8-9E6C-F741-B72D-1CBCFB0A9AFA}" srcOrd="0" destOrd="0" presId="urn:microsoft.com/office/officeart/2005/8/layout/hierarchy2"/>
-    <dgm:cxn modelId="{E3ADBEFD-A61E-9F45-9AB1-5EECC193A089}" type="presParOf" srcId="{DF0395F5-1E8C-9E48-8267-6EF17C2A0DA2}" destId="{C54DEB9E-51D0-3540-92C2-4820C63F494E}" srcOrd="1" destOrd="0" presId="urn:microsoft.com/office/officeart/2005/8/layout/hierarchy2"/>
-    <dgm:cxn modelId="{7CCCCEFF-A060-5845-B7FE-3A8BAE1875FE}" type="presParOf" srcId="{C54DEB9E-51D0-3540-92C2-4820C63F494E}" destId="{64730E10-34D9-EB40-9A15-71653BD55138}" srcOrd="0" destOrd="0" presId="urn:microsoft.com/office/officeart/2005/8/layout/hierarchy2"/>
-    <dgm:cxn modelId="{4896062C-0AFF-BF4A-B7AF-629EBD718456}" type="presParOf" srcId="{C54DEB9E-51D0-3540-92C2-4820C63F494E}" destId="{0B897CC9-EF58-6B4A-B032-3869518C427D}" srcOrd="1" destOrd="0" presId="urn:microsoft.com/office/officeart/2005/8/layout/hierarchy2"/>
-    <dgm:cxn modelId="{8DE127E4-F958-FD45-B2C8-529C26E77388}" type="presParOf" srcId="{0B897CC9-EF58-6B4A-B032-3869518C427D}" destId="{AE527926-7596-084F-836D-CE44E210925D}" srcOrd="0" destOrd="0" presId="urn:microsoft.com/office/officeart/2005/8/layout/hierarchy2"/>
-    <dgm:cxn modelId="{D37968A6-6916-E241-BCB9-2A869187FC1C}" type="presParOf" srcId="{AE527926-7596-084F-836D-CE44E210925D}" destId="{E20C8D68-D800-1B40-A349-E4C52EEA6DBB}" srcOrd="0" destOrd="0" presId="urn:microsoft.com/office/officeart/2005/8/layout/hierarchy2"/>
-    <dgm:cxn modelId="{9FAAD3D6-D44A-0A4E-8695-30A5696DF329}" type="presParOf" srcId="{0B897CC9-EF58-6B4A-B032-3869518C427D}" destId="{8D15DFB1-6BB6-264C-97B2-E08857AECF60}" srcOrd="1" destOrd="0" presId="urn:microsoft.com/office/officeart/2005/8/layout/hierarchy2"/>
-    <dgm:cxn modelId="{D60CC4D4-C456-AB4D-83A0-F008302C200E}" type="presParOf" srcId="{8D15DFB1-6BB6-264C-97B2-E08857AECF60}" destId="{1AC5AEE2-E726-6949-8FEB-26946D8A5549}" srcOrd="0" destOrd="0" presId="urn:microsoft.com/office/officeart/2005/8/layout/hierarchy2"/>
-    <dgm:cxn modelId="{01CE1278-090D-354B-9936-15181F449D21}" type="presParOf" srcId="{8D15DFB1-6BB6-264C-97B2-E08857AECF60}" destId="{CAAE6E7E-3C66-C74F-8D47-E2B8FEE54E1A}" srcOrd="1" destOrd="0" presId="urn:microsoft.com/office/officeart/2005/8/layout/hierarchy2"/>
-    <dgm:cxn modelId="{6A0A52A5-10F8-724F-886C-92733F01BB0D}" type="presParOf" srcId="{CAAE6E7E-3C66-C74F-8D47-E2B8FEE54E1A}" destId="{0B37985A-F439-1845-B8DC-86E79F8066D1}" srcOrd="0" destOrd="0" presId="urn:microsoft.com/office/officeart/2005/8/layout/hierarchy2"/>
-    <dgm:cxn modelId="{1C0D285D-1C78-594C-B5E5-548C3754FD5C}" type="presParOf" srcId="{0B37985A-F439-1845-B8DC-86E79F8066D1}" destId="{89D62D01-044A-5E49-BF87-E08569D899ED}" srcOrd="0" destOrd="0" presId="urn:microsoft.com/office/officeart/2005/8/layout/hierarchy2"/>
-    <dgm:cxn modelId="{A3092CC0-AD3B-2A4D-B2DB-998EFB4EFD8A}" type="presParOf" srcId="{CAAE6E7E-3C66-C74F-8D47-E2B8FEE54E1A}" destId="{066E29CF-6128-0648-B8F7-1B6E27951783}" srcOrd="1" destOrd="0" presId="urn:microsoft.com/office/officeart/2005/8/layout/hierarchy2"/>
-    <dgm:cxn modelId="{BE85F89C-8C6D-064C-A234-FB7D5D27D831}" type="presParOf" srcId="{066E29CF-6128-0648-B8F7-1B6E27951783}" destId="{D6692AF1-A2BC-EF40-9178-4475E39B2EF6}" srcOrd="0" destOrd="0" presId="urn:microsoft.com/office/officeart/2005/8/layout/hierarchy2"/>
-    <dgm:cxn modelId="{B8DA3160-6440-0A48-96FF-24AAE590A61B}" type="presParOf" srcId="{066E29CF-6128-0648-B8F7-1B6E27951783}" destId="{C8274F6F-BDED-8D4E-BB65-3E74AC91CA60}" srcOrd="1" destOrd="0" presId="urn:microsoft.com/office/officeart/2005/8/layout/hierarchy2"/>
-    <dgm:cxn modelId="{8DCCA3E7-FC60-5443-96EF-085790175725}" type="presParOf" srcId="{C8274F6F-BDED-8D4E-BB65-3E74AC91CA60}" destId="{6C711774-F7B9-7448-AFA4-AA549455F4F8}" srcOrd="0" destOrd="0" presId="urn:microsoft.com/office/officeart/2005/8/layout/hierarchy2"/>
-    <dgm:cxn modelId="{8CC9E932-941E-AD42-84AA-7A62E99914EC}" type="presParOf" srcId="{6C711774-F7B9-7448-AFA4-AA549455F4F8}" destId="{B8FA6677-848E-B341-89B2-AB26EA8F8983}" srcOrd="0" destOrd="0" presId="urn:microsoft.com/office/officeart/2005/8/layout/hierarchy2"/>
-    <dgm:cxn modelId="{A7318719-3FF9-754C-AD16-AD3B1E0FE83D}" type="presParOf" srcId="{C8274F6F-BDED-8D4E-BB65-3E74AC91CA60}" destId="{43856134-03E5-A14E-A8FE-D4291140F40F}" srcOrd="1" destOrd="0" presId="urn:microsoft.com/office/officeart/2005/8/layout/hierarchy2"/>
-    <dgm:cxn modelId="{88D60309-A509-1449-A188-E19FB4EBBCB8}" type="presParOf" srcId="{43856134-03E5-A14E-A8FE-D4291140F40F}" destId="{B8C27370-6C50-BC4C-B96A-F7009FCE9B29}" srcOrd="0" destOrd="0" presId="urn:microsoft.com/office/officeart/2005/8/layout/hierarchy2"/>
-    <dgm:cxn modelId="{9CB7FC10-1F99-4646-B2AE-E1FD3BE69B6F}" type="presParOf" srcId="{43856134-03E5-A14E-A8FE-D4291140F40F}" destId="{420C22EA-31B8-C44A-9FD3-E0930664A3D4}" srcOrd="1" destOrd="0" presId="urn:microsoft.com/office/officeart/2005/8/layout/hierarchy2"/>
-    <dgm:cxn modelId="{DF1B94E6-1A9C-E442-A484-32F5AA5E476A}" type="presParOf" srcId="{420C22EA-31B8-C44A-9FD3-E0930664A3D4}" destId="{CDF88616-E8B3-974C-B110-36BD4AC3B825}" srcOrd="0" destOrd="0" presId="urn:microsoft.com/office/officeart/2005/8/layout/hierarchy2"/>
-    <dgm:cxn modelId="{05FAD6A3-E67F-514F-895F-A07B080600BD}" type="presParOf" srcId="{CDF88616-E8B3-974C-B110-36BD4AC3B825}" destId="{6A216B04-6334-174E-8CE0-43440AFADB3F}" srcOrd="0" destOrd="0" presId="urn:microsoft.com/office/officeart/2005/8/layout/hierarchy2"/>
-    <dgm:cxn modelId="{2F5C307C-768C-DF44-954B-1C7D4BAEA66E}" type="presParOf" srcId="{420C22EA-31B8-C44A-9FD3-E0930664A3D4}" destId="{CC3E32CD-2A44-6A45-A849-8BC305DB350A}" srcOrd="1" destOrd="0" presId="urn:microsoft.com/office/officeart/2005/8/layout/hierarchy2"/>
-    <dgm:cxn modelId="{42FF2A57-039D-8546-B0B2-E9243F56327A}" type="presParOf" srcId="{CC3E32CD-2A44-6A45-A849-8BC305DB350A}" destId="{4CBA9568-78F6-874F-BAE1-422DBB36998B}" srcOrd="0" destOrd="0" presId="urn:microsoft.com/office/officeart/2005/8/layout/hierarchy2"/>
-    <dgm:cxn modelId="{2670EDC6-7687-E649-A8A7-96631FFDA659}" type="presParOf" srcId="{CC3E32CD-2A44-6A45-A849-8BC305DB350A}" destId="{98E29829-2104-3448-870B-CDD6F1132600}" srcOrd="1" destOrd="0" presId="urn:microsoft.com/office/officeart/2005/8/layout/hierarchy2"/>
-    <dgm:cxn modelId="{758A29B1-CE37-5641-A93C-D2A339D99DF8}" type="presParOf" srcId="{420C22EA-31B8-C44A-9FD3-E0930664A3D4}" destId="{178DCFF1-CC55-904C-80A7-201C4962CD0C}" srcOrd="2" destOrd="0" presId="urn:microsoft.com/office/officeart/2005/8/layout/hierarchy2"/>
-    <dgm:cxn modelId="{FE0BBF52-94C3-B648-89CD-21D337DB210B}" type="presParOf" srcId="{178DCFF1-CC55-904C-80A7-201C4962CD0C}" destId="{188FEBA0-2EEA-BF48-BFFD-9861C935AD27}" srcOrd="0" destOrd="0" presId="urn:microsoft.com/office/officeart/2005/8/layout/hierarchy2"/>
-    <dgm:cxn modelId="{83B26D36-B8C5-5C47-B598-237A84E8B4D6}" type="presParOf" srcId="{420C22EA-31B8-C44A-9FD3-E0930664A3D4}" destId="{47110B4E-EB42-BA47-957D-4C32AAE3E1AE}" srcOrd="3" destOrd="0" presId="urn:microsoft.com/office/officeart/2005/8/layout/hierarchy2"/>
-    <dgm:cxn modelId="{3B51AA53-DAA8-694E-8D05-D15D8246A6DE}" type="presParOf" srcId="{47110B4E-EB42-BA47-957D-4C32AAE3E1AE}" destId="{E82A36AA-0C9C-1243-965F-505DB32A7A7C}" srcOrd="0" destOrd="0" presId="urn:microsoft.com/office/officeart/2005/8/layout/hierarchy2"/>
-    <dgm:cxn modelId="{964666E0-649C-644A-8FCF-3325A3C8E042}" type="presParOf" srcId="{47110B4E-EB42-BA47-957D-4C32AAE3E1AE}" destId="{32766C5B-C0DF-754A-830F-F00D88629829}" srcOrd="1" destOrd="0" presId="urn:microsoft.com/office/officeart/2005/8/layout/hierarchy2"/>
-    <dgm:cxn modelId="{EE16978E-A2FD-D544-BE0A-A8D1A7DA2EA8}" type="presParOf" srcId="{32766C5B-C0DF-754A-830F-F00D88629829}" destId="{F6FDF62A-4F89-A044-8B79-891849B97CC4}" srcOrd="0" destOrd="0" presId="urn:microsoft.com/office/officeart/2005/8/layout/hierarchy2"/>
-    <dgm:cxn modelId="{33E4F80F-8888-8747-9415-931DA9C18678}" type="presParOf" srcId="{F6FDF62A-4F89-A044-8B79-891849B97CC4}" destId="{41B3D365-4B97-A64F-B00F-8B4601200E94}" srcOrd="0" destOrd="0" presId="urn:microsoft.com/office/officeart/2005/8/layout/hierarchy2"/>
-    <dgm:cxn modelId="{DE058AA1-B260-D046-8E35-B35705686B59}" type="presParOf" srcId="{32766C5B-C0DF-754A-830F-F00D88629829}" destId="{9A82C880-6A7D-9742-A14A-486B5C72D281}" srcOrd="1" destOrd="0" presId="urn:microsoft.com/office/officeart/2005/8/layout/hierarchy2"/>
-    <dgm:cxn modelId="{F2D2F826-427A-E04B-9AC9-CE2F8A74079D}" type="presParOf" srcId="{9A82C880-6A7D-9742-A14A-486B5C72D281}" destId="{5B9880E6-BA2C-2E4D-838B-9DD0423AE609}" srcOrd="0" destOrd="0" presId="urn:microsoft.com/office/officeart/2005/8/layout/hierarchy2"/>
-    <dgm:cxn modelId="{F8A6E57D-E507-F543-81E3-E0E45DACD68D}" type="presParOf" srcId="{9A82C880-6A7D-9742-A14A-486B5C72D281}" destId="{9B6E72DC-391F-4746-AAA7-2D0EB6662689}" srcOrd="1" destOrd="0" presId="urn:microsoft.com/office/officeart/2005/8/layout/hierarchy2"/>
-    <dgm:cxn modelId="{770F7621-3C16-3141-A9A0-201C0895C86F}" type="presParOf" srcId="{9B6E72DC-391F-4746-AAA7-2D0EB6662689}" destId="{1A3852B0-3C08-8346-B30F-DB387753D752}" srcOrd="0" destOrd="0" presId="urn:microsoft.com/office/officeart/2005/8/layout/hierarchy2"/>
-    <dgm:cxn modelId="{D6E54744-7EBB-1F40-BA0C-58BE93F56CC7}" type="presParOf" srcId="{1A3852B0-3C08-8346-B30F-DB387753D752}" destId="{41A60FF1-F20F-0448-80F5-03D17D8A4922}" srcOrd="0" destOrd="0" presId="urn:microsoft.com/office/officeart/2005/8/layout/hierarchy2"/>
-    <dgm:cxn modelId="{ED4B1258-600C-B246-B46A-3FE3F39BB026}" type="presParOf" srcId="{9B6E72DC-391F-4746-AAA7-2D0EB6662689}" destId="{BBCAC040-E2DB-AB4A-8AF0-10C15525D014}" srcOrd="1" destOrd="0" presId="urn:microsoft.com/office/officeart/2005/8/layout/hierarchy2"/>
-    <dgm:cxn modelId="{49496C94-F846-0C4A-8C79-904B3E26B088}" type="presParOf" srcId="{BBCAC040-E2DB-AB4A-8AF0-10C15525D014}" destId="{225564EB-75DD-F042-994E-EC3A2D54F08F}" srcOrd="0" destOrd="0" presId="urn:microsoft.com/office/officeart/2005/8/layout/hierarchy2"/>
-    <dgm:cxn modelId="{B58208EA-5DAA-414B-9612-76B075C81EA6}" type="presParOf" srcId="{BBCAC040-E2DB-AB4A-8AF0-10C15525D014}" destId="{61F46161-454D-F548-8079-F889517F3EB7}" srcOrd="1" destOrd="0" presId="urn:microsoft.com/office/officeart/2005/8/layout/hierarchy2"/>
-    <dgm:cxn modelId="{3C32CF69-5C2F-AF40-B287-5045F5B74ABE}" type="presParOf" srcId="{9B6E72DC-391F-4746-AAA7-2D0EB6662689}" destId="{A5B33E4E-336A-0B40-8C52-A2221287F345}" srcOrd="2" destOrd="0" presId="urn:microsoft.com/office/officeart/2005/8/layout/hierarchy2"/>
-    <dgm:cxn modelId="{09E2F42F-437C-2F46-9D49-87EBA3BB5AED}" type="presParOf" srcId="{A5B33E4E-336A-0B40-8C52-A2221287F345}" destId="{BE34ED06-A23A-F749-8104-B508C9262FDE}" srcOrd="0" destOrd="0" presId="urn:microsoft.com/office/officeart/2005/8/layout/hierarchy2"/>
-    <dgm:cxn modelId="{9111A1CE-6127-EC47-90B5-3048B42FB7E5}" type="presParOf" srcId="{9B6E72DC-391F-4746-AAA7-2D0EB6662689}" destId="{985744FB-7BAB-1A44-9722-4113A2C373BD}" srcOrd="3" destOrd="0" presId="urn:microsoft.com/office/officeart/2005/8/layout/hierarchy2"/>
-    <dgm:cxn modelId="{64013D94-A9D7-CA45-B4B5-0830FE85299B}" type="presParOf" srcId="{985744FB-7BAB-1A44-9722-4113A2C373BD}" destId="{07354C4D-1110-8245-ACDF-A7DFEEBFD7F3}" srcOrd="0" destOrd="0" presId="urn:microsoft.com/office/officeart/2005/8/layout/hierarchy2"/>
-    <dgm:cxn modelId="{5F133F01-0A59-EE47-98D6-5060275E82A8}" type="presParOf" srcId="{985744FB-7BAB-1A44-9722-4113A2C373BD}" destId="{5F490B55-C660-6E4D-82F8-30AD97E17EAE}" srcOrd="1" destOrd="0" presId="urn:microsoft.com/office/officeart/2005/8/layout/hierarchy2"/>
-    <dgm:cxn modelId="{9F115796-DFD8-7B47-B583-B2A0DA4756B5}" type="presParOf" srcId="{CAAE6E7E-3C66-C74F-8D47-E2B8FEE54E1A}" destId="{5230EDD4-2155-4C4B-9D01-61125A45B27E}" srcOrd="2" destOrd="0" presId="urn:microsoft.com/office/officeart/2005/8/layout/hierarchy2"/>
-    <dgm:cxn modelId="{E4BF63DD-85FE-4E4C-B542-C67F526E8366}" type="presParOf" srcId="{5230EDD4-2155-4C4B-9D01-61125A45B27E}" destId="{062A7194-78C8-F943-A247-3B3F469D7F62}" srcOrd="0" destOrd="0" presId="urn:microsoft.com/office/officeart/2005/8/layout/hierarchy2"/>
-    <dgm:cxn modelId="{CF222007-21CE-1348-A51B-AB1BC3928E19}" type="presParOf" srcId="{CAAE6E7E-3C66-C74F-8D47-E2B8FEE54E1A}" destId="{68685D26-F45A-0249-8C44-58A68F4E8E41}" srcOrd="3" destOrd="0" presId="urn:microsoft.com/office/officeart/2005/8/layout/hierarchy2"/>
-    <dgm:cxn modelId="{AC78DD10-856E-A64C-B05B-90FFBDDACA37}" type="presParOf" srcId="{68685D26-F45A-0249-8C44-58A68F4E8E41}" destId="{74606542-DF75-9244-9F75-2B19D3C6F8C9}" srcOrd="0" destOrd="0" presId="urn:microsoft.com/office/officeart/2005/8/layout/hierarchy2"/>
-    <dgm:cxn modelId="{D38EC634-AB45-3442-83A7-AE93F97010AD}" type="presParOf" srcId="{68685D26-F45A-0249-8C44-58A68F4E8E41}" destId="{683DEBD1-C165-1147-AFE7-984E82E6B1D2}" srcOrd="1" destOrd="0" presId="urn:microsoft.com/office/officeart/2005/8/layout/hierarchy2"/>
-    <dgm:cxn modelId="{9D9E02DB-4B03-FF48-8E5D-A2D5C8239181}" type="presParOf" srcId="{683DEBD1-C165-1147-AFE7-984E82E6B1D2}" destId="{2C48A912-7C0B-D34F-8BCD-E79759DED104}" srcOrd="0" destOrd="0" presId="urn:microsoft.com/office/officeart/2005/8/layout/hierarchy2"/>
-    <dgm:cxn modelId="{3C51A193-1B59-1C40-8F8E-D7767C4A24F0}" type="presParOf" srcId="{2C48A912-7C0B-D34F-8BCD-E79759DED104}" destId="{3C75570A-8614-8C43-96B0-36C4AA3C4F70}" srcOrd="0" destOrd="0" presId="urn:microsoft.com/office/officeart/2005/8/layout/hierarchy2"/>
-    <dgm:cxn modelId="{3228BE0D-3FBC-1744-85A1-9C466616CB91}" type="presParOf" srcId="{683DEBD1-C165-1147-AFE7-984E82E6B1D2}" destId="{B6CD3AB0-EB80-754C-8255-700DE8BD8608}" srcOrd="1" destOrd="0" presId="urn:microsoft.com/office/officeart/2005/8/layout/hierarchy2"/>
-    <dgm:cxn modelId="{97F9301E-B90F-BB43-A728-BDD6CDAA7A91}" type="presParOf" srcId="{B6CD3AB0-EB80-754C-8255-700DE8BD8608}" destId="{19E436B0-A0B1-4242-BFBA-BB12B5B5F574}" srcOrd="0" destOrd="0" presId="urn:microsoft.com/office/officeart/2005/8/layout/hierarchy2"/>
-    <dgm:cxn modelId="{EB2E3289-5852-0947-9B4D-9F0692186A5F}" type="presParOf" srcId="{B6CD3AB0-EB80-754C-8255-700DE8BD8608}" destId="{7D02E330-57D1-2249-AE72-AF0EA3AC5426}" srcOrd="1" destOrd="0" presId="urn:microsoft.com/office/officeart/2005/8/layout/hierarchy2"/>
-    <dgm:cxn modelId="{EEB7D1FE-E42D-4D43-9087-3A6A8BA02F35}" type="presParOf" srcId="{7D02E330-57D1-2249-AE72-AF0EA3AC5426}" destId="{1EB97A9B-9DB3-9746-B7CA-25A9127E658D}" srcOrd="0" destOrd="0" presId="urn:microsoft.com/office/officeart/2005/8/layout/hierarchy2"/>
-    <dgm:cxn modelId="{4CA100D8-36B0-8B43-8E41-B801DD67066C}" type="presParOf" srcId="{1EB97A9B-9DB3-9746-B7CA-25A9127E658D}" destId="{5BDCA2FD-50B3-DD41-B739-4C6FB692068F}" srcOrd="0" destOrd="0" presId="urn:microsoft.com/office/officeart/2005/8/layout/hierarchy2"/>
-    <dgm:cxn modelId="{4ACE42B6-9498-874C-A5EE-05C0D039FF40}" type="presParOf" srcId="{7D02E330-57D1-2249-AE72-AF0EA3AC5426}" destId="{1A766636-ACA3-5343-8F20-EA71F3F235B2}" srcOrd="1" destOrd="0" presId="urn:microsoft.com/office/officeart/2005/8/layout/hierarchy2"/>
-    <dgm:cxn modelId="{B8EC9A0A-4706-F74A-B033-61DBF8EB6AD3}" type="presParOf" srcId="{1A766636-ACA3-5343-8F20-EA71F3F235B2}" destId="{EE1464C4-316F-E04B-8F78-14DC107A8C10}" srcOrd="0" destOrd="0" presId="urn:microsoft.com/office/officeart/2005/8/layout/hierarchy2"/>
-    <dgm:cxn modelId="{AF32608D-F7F4-B046-8455-F0614592DC3F}" type="presParOf" srcId="{1A766636-ACA3-5343-8F20-EA71F3F235B2}" destId="{7BF48219-8B8F-5043-A3CC-73CB22EABDD2}" srcOrd="1" destOrd="0" presId="urn:microsoft.com/office/officeart/2005/8/layout/hierarchy2"/>
-    <dgm:cxn modelId="{B0C1D414-8838-DC47-B99F-196460AD177F}" type="presParOf" srcId="{7D02E330-57D1-2249-AE72-AF0EA3AC5426}" destId="{BFED5B89-8694-FF4F-9CB3-2BB9C40DD18B}" srcOrd="2" destOrd="0" presId="urn:microsoft.com/office/officeart/2005/8/layout/hierarchy2"/>
-    <dgm:cxn modelId="{FB257092-C17C-E442-BCB1-E911A809DB7C}" type="presParOf" srcId="{BFED5B89-8694-FF4F-9CB3-2BB9C40DD18B}" destId="{B814019D-DF4F-304F-8975-6C097F6D3E30}" srcOrd="0" destOrd="0" presId="urn:microsoft.com/office/officeart/2005/8/layout/hierarchy2"/>
-    <dgm:cxn modelId="{3C517D7B-B3C7-304F-9EE3-C68F062397EB}" type="presParOf" srcId="{7D02E330-57D1-2249-AE72-AF0EA3AC5426}" destId="{C3B2522B-FEE8-7541-8BCE-20AEEEF84FA9}" srcOrd="3" destOrd="0" presId="urn:microsoft.com/office/officeart/2005/8/layout/hierarchy2"/>
-    <dgm:cxn modelId="{68B2E2C8-D306-0E41-B9FF-8D24B284CE35}" type="presParOf" srcId="{C3B2522B-FEE8-7541-8BCE-20AEEEF84FA9}" destId="{CB80B394-5FA1-F64A-8C46-262DC0EAFF0C}" srcOrd="0" destOrd="0" presId="urn:microsoft.com/office/officeart/2005/8/layout/hierarchy2"/>
-    <dgm:cxn modelId="{1802C4F3-5648-8C40-9C2B-3978BD91F528}" type="presParOf" srcId="{C3B2522B-FEE8-7541-8BCE-20AEEEF84FA9}" destId="{AD5EC6A6-F444-6140-A556-21F3E25845A3}" srcOrd="1" destOrd="0" presId="urn:microsoft.com/office/officeart/2005/8/layout/hierarchy2"/>
-    <dgm:cxn modelId="{BC753CA9-561E-8749-90B2-81AF968DC849}" type="presParOf" srcId="{AD5EC6A6-F444-6140-A556-21F3E25845A3}" destId="{9D8B8718-1219-3340-BF7B-D6462FA11EE9}" srcOrd="0" destOrd="0" presId="urn:microsoft.com/office/officeart/2005/8/layout/hierarchy2"/>
-    <dgm:cxn modelId="{06731162-FD4B-B948-BEDA-48C8B143AA92}" type="presParOf" srcId="{9D8B8718-1219-3340-BF7B-D6462FA11EE9}" destId="{61440551-8B50-B440-BAAC-4ACBEC254999}" srcOrd="0" destOrd="0" presId="urn:microsoft.com/office/officeart/2005/8/layout/hierarchy2"/>
-    <dgm:cxn modelId="{96899D23-B413-E242-A14F-B9E4BF3F4DFD}" type="presParOf" srcId="{AD5EC6A6-F444-6140-A556-21F3E25845A3}" destId="{40220438-574A-934A-B52A-D4C09F85442C}" srcOrd="1" destOrd="0" presId="urn:microsoft.com/office/officeart/2005/8/layout/hierarchy2"/>
-    <dgm:cxn modelId="{8DBC4F36-F40B-7443-9D18-9D1D05810E60}" type="presParOf" srcId="{40220438-574A-934A-B52A-D4C09F85442C}" destId="{2AE2315F-57A1-0141-ABF0-D00525BED9D7}" srcOrd="0" destOrd="0" presId="urn:microsoft.com/office/officeart/2005/8/layout/hierarchy2"/>
-    <dgm:cxn modelId="{F2287929-7C47-C44E-B278-BE44189BE399}" type="presParOf" srcId="{40220438-574A-934A-B52A-D4C09F85442C}" destId="{23780A80-8F50-844A-8CC9-C1761F5B6574}" srcOrd="1" destOrd="0" presId="urn:microsoft.com/office/officeart/2005/8/layout/hierarchy2"/>
-    <dgm:cxn modelId="{0C7B991D-8598-3B40-9966-7A4583A7D48F}" type="presParOf" srcId="{AD5EC6A6-F444-6140-A556-21F3E25845A3}" destId="{F43BDDDF-1CEF-A047-B3B4-F67711ADE7A9}" srcOrd="2" destOrd="0" presId="urn:microsoft.com/office/officeart/2005/8/layout/hierarchy2"/>
-    <dgm:cxn modelId="{A752C327-D165-4D46-81C4-A2DD7828DE4A}" type="presParOf" srcId="{F43BDDDF-1CEF-A047-B3B4-F67711ADE7A9}" destId="{B8131463-CBB7-BD48-AC92-13CAB2DC079F}" srcOrd="0" destOrd="0" presId="urn:microsoft.com/office/officeart/2005/8/layout/hierarchy2"/>
-    <dgm:cxn modelId="{9998928E-17EF-4741-A136-BE7EBD16ACC3}" type="presParOf" srcId="{AD5EC6A6-F444-6140-A556-21F3E25845A3}" destId="{2DD5DBEC-061A-F846-B506-540124A97D51}" srcOrd="3" destOrd="0" presId="urn:microsoft.com/office/officeart/2005/8/layout/hierarchy2"/>
-    <dgm:cxn modelId="{3FC2DDB6-5588-784F-9F78-F03376A31C6A}" type="presParOf" srcId="{2DD5DBEC-061A-F846-B506-540124A97D51}" destId="{D6F167D2-280C-2549-A642-C1FAA099010E}" srcOrd="0" destOrd="0" presId="urn:microsoft.com/office/officeart/2005/8/layout/hierarchy2"/>
-    <dgm:cxn modelId="{CF13D35A-1FFD-8D4D-ABC8-0FBAB69518DA}" type="presParOf" srcId="{2DD5DBEC-061A-F846-B506-540124A97D51}" destId="{E9271D71-73C4-6746-80F8-074EA95D9A39}" srcOrd="1" destOrd="0" presId="urn:microsoft.com/office/officeart/2005/8/layout/hierarchy2"/>
-    <dgm:cxn modelId="{4B4DC877-7D03-0E4E-8E55-653C6CAD4DF4}" type="presParOf" srcId="{0B897CC9-EF58-6B4A-B032-3869518C427D}" destId="{F97F2B5C-A310-FE4C-A812-DB282E261D0A}" srcOrd="2" destOrd="0" presId="urn:microsoft.com/office/officeart/2005/8/layout/hierarchy2"/>
-    <dgm:cxn modelId="{B531BACA-AD91-8748-AF1E-83D86E9083DD}" type="presParOf" srcId="{F97F2B5C-A310-FE4C-A812-DB282E261D0A}" destId="{1A5A45C4-44F9-B14B-8DA5-D65DFB02E004}" srcOrd="0" destOrd="0" presId="urn:microsoft.com/office/officeart/2005/8/layout/hierarchy2"/>
-    <dgm:cxn modelId="{D6FA6152-F31B-4E41-A320-7CFDD3310CF6}" type="presParOf" srcId="{0B897CC9-EF58-6B4A-B032-3869518C427D}" destId="{39F7DEB9-7822-E542-83AE-1253A185C07F}" srcOrd="3" destOrd="0" presId="urn:microsoft.com/office/officeart/2005/8/layout/hierarchy2"/>
-    <dgm:cxn modelId="{5D244F57-703D-1A46-A26D-33076BFF0837}" type="presParOf" srcId="{39F7DEB9-7822-E542-83AE-1253A185C07F}" destId="{6D8ECEBA-B209-6749-B193-A8A22E6346C1}" srcOrd="0" destOrd="0" presId="urn:microsoft.com/office/officeart/2005/8/layout/hierarchy2"/>
-    <dgm:cxn modelId="{1230EE08-8BAF-6941-98A1-7418D20234B1}" type="presParOf" srcId="{39F7DEB9-7822-E542-83AE-1253A185C07F}" destId="{25395A98-CFD0-D946-ADE9-6F9519F7EFAA}" srcOrd="1" destOrd="0" presId="urn:microsoft.com/office/officeart/2005/8/layout/hierarchy2"/>
-    <dgm:cxn modelId="{90E8CC27-302C-864B-9C05-D290CF46A1A9}" type="presParOf" srcId="{25395A98-CFD0-D946-ADE9-6F9519F7EFAA}" destId="{C5DF0D25-D767-8B42-BF93-5162DFF05855}" srcOrd="0" destOrd="0" presId="urn:microsoft.com/office/officeart/2005/8/layout/hierarchy2"/>
-    <dgm:cxn modelId="{947B806E-B71F-EF4D-8F7C-EDAFE4231329}" type="presParOf" srcId="{C5DF0D25-D767-8B42-BF93-5162DFF05855}" destId="{3ADF03C0-B77F-EF41-BE57-79DF4D231738}" srcOrd="0" destOrd="0" presId="urn:microsoft.com/office/officeart/2005/8/layout/hierarchy2"/>
-    <dgm:cxn modelId="{76ABA5A8-44AB-CD4C-8C54-F1F133428F76}" type="presParOf" srcId="{25395A98-CFD0-D946-ADE9-6F9519F7EFAA}" destId="{0AA4E00B-8AE2-6F48-A1E1-39B09B4D9A17}" srcOrd="1" destOrd="0" presId="urn:microsoft.com/office/officeart/2005/8/layout/hierarchy2"/>
-    <dgm:cxn modelId="{0A43C9DF-1275-B04F-A16E-03D1877F6C2E}" type="presParOf" srcId="{0AA4E00B-8AE2-6F48-A1E1-39B09B4D9A17}" destId="{95415AAC-B97B-3E4C-95D1-E26D4A47F854}" srcOrd="0" destOrd="0" presId="urn:microsoft.com/office/officeart/2005/8/layout/hierarchy2"/>
-    <dgm:cxn modelId="{B0104BDD-9B18-8341-A151-9A6DFACC4F51}" type="presParOf" srcId="{0AA4E00B-8AE2-6F48-A1E1-39B09B4D9A17}" destId="{42EAE2B0-6AD7-C447-A139-26AA90B805F3}" srcOrd="1" destOrd="0" presId="urn:microsoft.com/office/officeart/2005/8/layout/hierarchy2"/>
-    <dgm:cxn modelId="{6273A8F5-3EF2-E34A-8FD6-702185732718}" type="presParOf" srcId="{87D61914-56D8-7D43-A69D-CE66D030DE47}" destId="{8B4760E7-4D8A-8B41-A8D7-171FBE42BA05}" srcOrd="2" destOrd="0" presId="urn:microsoft.com/office/officeart/2005/8/layout/hierarchy2"/>
-    <dgm:cxn modelId="{BAAAB24A-0076-3840-8DE8-7EE4B0DE6267}" type="presParOf" srcId="{8B4760E7-4D8A-8B41-A8D7-171FBE42BA05}" destId="{7F275FDA-DE69-2B4A-84AB-2462E309FB00}" srcOrd="0" destOrd="0" presId="urn:microsoft.com/office/officeart/2005/8/layout/hierarchy2"/>
-    <dgm:cxn modelId="{B43A3BB3-F37A-FE44-817A-6C16A65B40E6}" type="presParOf" srcId="{87D61914-56D8-7D43-A69D-CE66D030DE47}" destId="{E480E9C8-28D3-6148-A09F-3FF374BCCA24}" srcOrd="3" destOrd="0" presId="urn:microsoft.com/office/officeart/2005/8/layout/hierarchy2"/>
-    <dgm:cxn modelId="{5CB76F28-8BA5-0D47-9F16-D77523BB16D9}" type="presParOf" srcId="{E480E9C8-28D3-6148-A09F-3FF374BCCA24}" destId="{A3A57E5D-303D-C64F-A1DC-0E0FF1D6C828}" srcOrd="0" destOrd="0" presId="urn:microsoft.com/office/officeart/2005/8/layout/hierarchy2"/>
-    <dgm:cxn modelId="{08DE987F-B22F-D749-802B-E0C7C8769357}" type="presParOf" srcId="{E480E9C8-28D3-6148-A09F-3FF374BCCA24}" destId="{1F0547D6-6B49-0E45-BA93-83C86CD2FE86}" srcOrd="1" destOrd="0" presId="urn:microsoft.com/office/officeart/2005/8/layout/hierarchy2"/>
-    <dgm:cxn modelId="{03E1B96D-8306-0249-9811-906A0D61A563}" type="presParOf" srcId="{1F0547D6-6B49-0E45-BA93-83C86CD2FE86}" destId="{AFFBA743-03F7-5F4C-8E88-C1E1454AED05}" srcOrd="0" destOrd="0" presId="urn:microsoft.com/office/officeart/2005/8/layout/hierarchy2"/>
-    <dgm:cxn modelId="{75E90FE3-9A2D-A64E-A64E-03954FE13F5B}" type="presParOf" srcId="{AFFBA743-03F7-5F4C-8E88-C1E1454AED05}" destId="{10FFB18E-4AFA-344C-9BC1-AD34B4676854}" srcOrd="0" destOrd="0" presId="urn:microsoft.com/office/officeart/2005/8/layout/hierarchy2"/>
-    <dgm:cxn modelId="{65049080-E303-FA4B-AE4D-61265F89372F}" type="presParOf" srcId="{1F0547D6-6B49-0E45-BA93-83C86CD2FE86}" destId="{39BCB3DC-885B-2441-A34B-335D8FC1992C}" srcOrd="1" destOrd="0" presId="urn:microsoft.com/office/officeart/2005/8/layout/hierarchy2"/>
-    <dgm:cxn modelId="{B4E843D7-2180-674E-B0A4-E63EA682B266}" type="presParOf" srcId="{39BCB3DC-885B-2441-A34B-335D8FC1992C}" destId="{80107EDB-8FCD-2346-A353-02A87C9089DE}" srcOrd="0" destOrd="0" presId="urn:microsoft.com/office/officeart/2005/8/layout/hierarchy2"/>
-    <dgm:cxn modelId="{F5CD6111-52A9-FF43-9C96-1546200D715C}" type="presParOf" srcId="{39BCB3DC-885B-2441-A34B-335D8FC1992C}" destId="{D5231619-B6C4-0C42-B74F-B68722D45424}" srcOrd="1" destOrd="0" presId="urn:microsoft.com/office/officeart/2005/8/layout/hierarchy2"/>
-    <dgm:cxn modelId="{6D25E28F-FCBE-EE41-9CF9-7E60C258F333}" type="presParOf" srcId="{D5231619-B6C4-0C42-B74F-B68722D45424}" destId="{9B21400C-BC60-6743-A106-FEAA64B5ACA7}" srcOrd="0" destOrd="0" presId="urn:microsoft.com/office/officeart/2005/8/layout/hierarchy2"/>
-    <dgm:cxn modelId="{35DA9C36-8D86-9B40-9B42-57B2031B2CF7}" type="presParOf" srcId="{9B21400C-BC60-6743-A106-FEAA64B5ACA7}" destId="{F55BCE5E-1DB2-264E-8E89-E7825D9D3A45}" srcOrd="0" destOrd="0" presId="urn:microsoft.com/office/officeart/2005/8/layout/hierarchy2"/>
-    <dgm:cxn modelId="{41184646-2585-B647-BC27-2F16BCE930FD}" type="presParOf" srcId="{D5231619-B6C4-0C42-B74F-B68722D45424}" destId="{7F60B46B-B2A5-254A-9873-C072F7FA4725}" srcOrd="1" destOrd="0" presId="urn:microsoft.com/office/officeart/2005/8/layout/hierarchy2"/>
-    <dgm:cxn modelId="{C7F0429E-613D-CD48-AC5A-8B0E964549CD}" type="presParOf" srcId="{7F60B46B-B2A5-254A-9873-C072F7FA4725}" destId="{4BB2793D-87B3-EF41-9A4F-7716D66373B1}" srcOrd="0" destOrd="0" presId="urn:microsoft.com/office/officeart/2005/8/layout/hierarchy2"/>
-    <dgm:cxn modelId="{5D22E44C-5FDD-1544-9AB0-A1D9024A6097}" type="presParOf" srcId="{7F60B46B-B2A5-254A-9873-C072F7FA4725}" destId="{EA6DFC94-2BC4-3D40-AB95-A9E1CDC41D56}" srcOrd="1" destOrd="0" presId="urn:microsoft.com/office/officeart/2005/8/layout/hierarchy2"/>
+    <dgm:cxn modelId="{284C26FF-72DF-1848-9324-6CF8E1A35558}" type="presOf" srcId="{58D9B40E-196C-F64A-AD54-97A01917AAC3}" destId="{B3130863-C367-4E49-B7AD-D2B418734F30}" srcOrd="1" destOrd="0" presId="urn:microsoft.com/office/officeart/2005/8/layout/hierarchy2"/>
+    <dgm:cxn modelId="{5A6297FF-1F29-2548-B167-273729D491FD}" type="presOf" srcId="{658FBE69-F69F-494C-A4A4-B9E0D73E2DCF}" destId="{CC7634C0-ED13-644B-9ED7-D06A037B0A09}" srcOrd="0" destOrd="0" presId="urn:microsoft.com/office/officeart/2005/8/layout/hierarchy2"/>
+    <dgm:cxn modelId="{1A19D36E-7B43-A24E-8304-A6C02753E89F}" type="presParOf" srcId="{AAEAF223-4AC7-9243-834C-30AD905AC5ED}" destId="{ACA7A33C-6FD4-6541-8A0C-D3F8CA926844}" srcOrd="0" destOrd="0" presId="urn:microsoft.com/office/officeart/2005/8/layout/hierarchy2"/>
+    <dgm:cxn modelId="{66583FA2-C233-544F-B8F1-A576011B7277}" type="presParOf" srcId="{ACA7A33C-6FD4-6541-8A0C-D3F8CA926844}" destId="{AE9EA0A6-8921-0A4B-B22A-4033ECDF8CEB}" srcOrd="0" destOrd="0" presId="urn:microsoft.com/office/officeart/2005/8/layout/hierarchy2"/>
+    <dgm:cxn modelId="{6B5959F0-C0D2-7545-BB80-8147006A0F01}" type="presParOf" srcId="{ACA7A33C-6FD4-6541-8A0C-D3F8CA926844}" destId="{22BF3431-5CB6-A548-8AFC-FD73A5E82A29}" srcOrd="1" destOrd="0" presId="urn:microsoft.com/office/officeart/2005/8/layout/hierarchy2"/>
+    <dgm:cxn modelId="{D8812478-23F7-9747-94D5-8709A10164AD}" type="presParOf" srcId="{22BF3431-5CB6-A548-8AFC-FD73A5E82A29}" destId="{09CB360A-D85F-B742-BBC1-624731FCF678}" srcOrd="0" destOrd="0" presId="urn:microsoft.com/office/officeart/2005/8/layout/hierarchy2"/>
+    <dgm:cxn modelId="{75F2663D-5A86-C646-9A9E-3E6959678E2E}" type="presParOf" srcId="{09CB360A-D85F-B742-BBC1-624731FCF678}" destId="{5F1839EB-4F8F-774B-AED9-9D68D74DC9BF}" srcOrd="0" destOrd="0" presId="urn:microsoft.com/office/officeart/2005/8/layout/hierarchy2"/>
+    <dgm:cxn modelId="{BA2F5C8F-2DC7-1C45-9AA5-91D594915BAA}" type="presParOf" srcId="{22BF3431-5CB6-A548-8AFC-FD73A5E82A29}" destId="{A1E5DFB2-4481-2C4D-A093-5BEB6CE92DE1}" srcOrd="1" destOrd="0" presId="urn:microsoft.com/office/officeart/2005/8/layout/hierarchy2"/>
+    <dgm:cxn modelId="{1B2E9E3B-566C-B147-978E-E7795C8D7936}" type="presParOf" srcId="{A1E5DFB2-4481-2C4D-A093-5BEB6CE92DE1}" destId="{3C252244-F4D5-774C-97FC-9730C3CA15AE}" srcOrd="0" destOrd="0" presId="urn:microsoft.com/office/officeart/2005/8/layout/hierarchy2"/>
+    <dgm:cxn modelId="{1DC7E68F-C100-724D-89D0-0B8E7092AB07}" type="presParOf" srcId="{A1E5DFB2-4481-2C4D-A093-5BEB6CE92DE1}" destId="{D886A097-5038-DC48-BAB1-09A6F2793CBA}" srcOrd="1" destOrd="0" presId="urn:microsoft.com/office/officeart/2005/8/layout/hierarchy2"/>
+    <dgm:cxn modelId="{A5EFA8B3-BA24-F841-9312-FCB99BD8F240}" type="presParOf" srcId="{D886A097-5038-DC48-BAB1-09A6F2793CBA}" destId="{ECCEC597-BD45-C34C-A5EB-49A8E6926768}" srcOrd="0" destOrd="0" presId="urn:microsoft.com/office/officeart/2005/8/layout/hierarchy2"/>
+    <dgm:cxn modelId="{82934564-DE8E-354A-B2B0-4429DC17B678}" type="presParOf" srcId="{ECCEC597-BD45-C34C-A5EB-49A8E6926768}" destId="{011CB822-2D4A-7B42-AE71-43EB941EC0B3}" srcOrd="0" destOrd="0" presId="urn:microsoft.com/office/officeart/2005/8/layout/hierarchy2"/>
+    <dgm:cxn modelId="{36144474-E6F8-D342-9F2E-CD7DE384AFF2}" type="presParOf" srcId="{D886A097-5038-DC48-BAB1-09A6F2793CBA}" destId="{1ECE7BD7-16D9-7E44-9245-05B1CC8FE2AF}" srcOrd="1" destOrd="0" presId="urn:microsoft.com/office/officeart/2005/8/layout/hierarchy2"/>
+    <dgm:cxn modelId="{4832D108-AAE2-4D43-BAAD-AEB804FE73DE}" type="presParOf" srcId="{1ECE7BD7-16D9-7E44-9245-05B1CC8FE2AF}" destId="{23076C38-17B5-7A42-97BC-A3169834B242}" srcOrd="0" destOrd="0" presId="urn:microsoft.com/office/officeart/2005/8/layout/hierarchy2"/>
+    <dgm:cxn modelId="{81F78035-D551-6848-A34D-639B19827693}" type="presParOf" srcId="{1ECE7BD7-16D9-7E44-9245-05B1CC8FE2AF}" destId="{8B975788-FCDE-5642-BD3C-808706F28FBB}" srcOrd="1" destOrd="0" presId="urn:microsoft.com/office/officeart/2005/8/layout/hierarchy2"/>
+    <dgm:cxn modelId="{C4A89469-B6A1-4C4E-ABCF-AF08116A9369}" type="presParOf" srcId="{8B975788-FCDE-5642-BD3C-808706F28FBB}" destId="{0FE0DC5E-02A4-B44D-8A14-6E47565AF5D5}" srcOrd="0" destOrd="0" presId="urn:microsoft.com/office/officeart/2005/8/layout/hierarchy2"/>
+    <dgm:cxn modelId="{69D07ED2-F227-1745-8CFB-C66037887ABF}" type="presParOf" srcId="{0FE0DC5E-02A4-B44D-8A14-6E47565AF5D5}" destId="{E08C38C7-38ED-BA4D-84A9-FF9D24B54B0A}" srcOrd="0" destOrd="0" presId="urn:microsoft.com/office/officeart/2005/8/layout/hierarchy2"/>
+    <dgm:cxn modelId="{7C10526C-B238-564E-ADB6-F026C6FCE192}" type="presParOf" srcId="{8B975788-FCDE-5642-BD3C-808706F28FBB}" destId="{85005ED8-A8CC-4249-AD76-FA014AECE599}" srcOrd="1" destOrd="0" presId="urn:microsoft.com/office/officeart/2005/8/layout/hierarchy2"/>
+    <dgm:cxn modelId="{55FC30F8-8686-3F4F-A2D3-C66F57215EB9}" type="presParOf" srcId="{85005ED8-A8CC-4249-AD76-FA014AECE599}" destId="{1EA76DE5-1C8F-FA4D-A04F-5E95F39407AD}" srcOrd="0" destOrd="0" presId="urn:microsoft.com/office/officeart/2005/8/layout/hierarchy2"/>
+    <dgm:cxn modelId="{999319D6-6EED-6E4D-9C4F-B5EAC2C07275}" type="presParOf" srcId="{85005ED8-A8CC-4249-AD76-FA014AECE599}" destId="{509BC242-1B06-6E44-9BB0-70EB639DAAA9}" srcOrd="1" destOrd="0" presId="urn:microsoft.com/office/officeart/2005/8/layout/hierarchy2"/>
+    <dgm:cxn modelId="{B2948767-2486-E641-8E9D-61068AE92417}" type="presParOf" srcId="{8B975788-FCDE-5642-BD3C-808706F28FBB}" destId="{37DEF7A6-F983-8642-9B6E-B3CCE7EA354A}" srcOrd="2" destOrd="0" presId="urn:microsoft.com/office/officeart/2005/8/layout/hierarchy2"/>
+    <dgm:cxn modelId="{1D5CE4C1-05D1-1E49-80DA-2B282804B89F}" type="presParOf" srcId="{37DEF7A6-F983-8642-9B6E-B3CCE7EA354A}" destId="{D0A01E75-22DA-5643-BFF4-8A726FDEB812}" srcOrd="0" destOrd="0" presId="urn:microsoft.com/office/officeart/2005/8/layout/hierarchy2"/>
+    <dgm:cxn modelId="{8BF90E63-7EC5-8444-A824-75D872814B13}" type="presParOf" srcId="{8B975788-FCDE-5642-BD3C-808706F28FBB}" destId="{CEF76F03-3D55-3F4A-B724-94E14018B095}" srcOrd="3" destOrd="0" presId="urn:microsoft.com/office/officeart/2005/8/layout/hierarchy2"/>
+    <dgm:cxn modelId="{9D499E09-2C08-A04E-9CD6-F40551F1D9CB}" type="presParOf" srcId="{CEF76F03-3D55-3F4A-B724-94E14018B095}" destId="{AA6D8249-2433-114B-AD68-5DAD34076478}" srcOrd="0" destOrd="0" presId="urn:microsoft.com/office/officeart/2005/8/layout/hierarchy2"/>
+    <dgm:cxn modelId="{7B2BE688-5250-5740-AC0B-367C8CE37D42}" type="presParOf" srcId="{CEF76F03-3D55-3F4A-B724-94E14018B095}" destId="{D4ECBD1D-BCD1-194A-944B-DF5C60377F45}" srcOrd="1" destOrd="0" presId="urn:microsoft.com/office/officeart/2005/8/layout/hierarchy2"/>
+    <dgm:cxn modelId="{96FCC88A-35C0-C74D-8815-54130FF81C51}" type="presParOf" srcId="{D4ECBD1D-BCD1-194A-944B-DF5C60377F45}" destId="{F2F73D55-5C37-CD44-BC1E-CDBC3CD0F101}" srcOrd="0" destOrd="0" presId="urn:microsoft.com/office/officeart/2005/8/layout/hierarchy2"/>
+    <dgm:cxn modelId="{322157F6-7165-6F4C-A1DD-528FEA4E2356}" type="presParOf" srcId="{F2F73D55-5C37-CD44-BC1E-CDBC3CD0F101}" destId="{8CD01425-6999-1B43-A074-9B4B66D474FE}" srcOrd="0" destOrd="0" presId="urn:microsoft.com/office/officeart/2005/8/layout/hierarchy2"/>
+    <dgm:cxn modelId="{AB5C08C9-A002-0943-BE93-70EF5B6C0207}" type="presParOf" srcId="{D4ECBD1D-BCD1-194A-944B-DF5C60377F45}" destId="{0E05F525-FD97-BE49-BACE-281076CC37A6}" srcOrd="1" destOrd="0" presId="urn:microsoft.com/office/officeart/2005/8/layout/hierarchy2"/>
+    <dgm:cxn modelId="{CD4FB193-E118-704F-8660-93D43986CAAA}" type="presParOf" srcId="{0E05F525-FD97-BE49-BACE-281076CC37A6}" destId="{1FCD5530-9E05-B046-B8ED-0484835169DE}" srcOrd="0" destOrd="0" presId="urn:microsoft.com/office/officeart/2005/8/layout/hierarchy2"/>
+    <dgm:cxn modelId="{249F82BA-9854-1349-A729-CDAF42091CE4}" type="presParOf" srcId="{0E05F525-FD97-BE49-BACE-281076CC37A6}" destId="{61747978-1319-FA49-B57E-FCC41F19EA84}" srcOrd="1" destOrd="0" presId="urn:microsoft.com/office/officeart/2005/8/layout/hierarchy2"/>
+    <dgm:cxn modelId="{A12F35E0-F3F3-B349-A5C1-E2944624ADF0}" type="presParOf" srcId="{61747978-1319-FA49-B57E-FCC41F19EA84}" destId="{0904125F-8547-564B-8B1D-703FF6EDB6C9}" srcOrd="0" destOrd="0" presId="urn:microsoft.com/office/officeart/2005/8/layout/hierarchy2"/>
+    <dgm:cxn modelId="{5ADE4472-B0CE-4042-9EAA-98C584B5DC96}" type="presParOf" srcId="{0904125F-8547-564B-8B1D-703FF6EDB6C9}" destId="{B5BF25CD-8BF1-5048-868C-30217B5C9A24}" srcOrd="0" destOrd="0" presId="urn:microsoft.com/office/officeart/2005/8/layout/hierarchy2"/>
+    <dgm:cxn modelId="{ABCEA3B7-D8CD-7543-BCAC-8B7194093AC1}" type="presParOf" srcId="{61747978-1319-FA49-B57E-FCC41F19EA84}" destId="{1D95E1D6-FA45-614A-B171-8C9054062FA3}" srcOrd="1" destOrd="0" presId="urn:microsoft.com/office/officeart/2005/8/layout/hierarchy2"/>
+    <dgm:cxn modelId="{BFD4BFCE-326D-534B-9494-C84D5671BE87}" type="presParOf" srcId="{1D95E1D6-FA45-614A-B171-8C9054062FA3}" destId="{69460287-3B04-F142-8B8F-38364A84B16E}" srcOrd="0" destOrd="0" presId="urn:microsoft.com/office/officeart/2005/8/layout/hierarchy2"/>
+    <dgm:cxn modelId="{A15F66EE-BAC4-DB41-B888-001574E13B28}" type="presParOf" srcId="{1D95E1D6-FA45-614A-B171-8C9054062FA3}" destId="{91025FFF-DA47-FC4F-8CA9-4AD70FBA15F4}" srcOrd="1" destOrd="0" presId="urn:microsoft.com/office/officeart/2005/8/layout/hierarchy2"/>
+    <dgm:cxn modelId="{781BC7CC-04C1-1241-B8B6-33A63ABEE91F}" type="presParOf" srcId="{91025FFF-DA47-FC4F-8CA9-4AD70FBA15F4}" destId="{E1CC1DA7-E052-D145-8E3D-02E51BEAF7D1}" srcOrd="0" destOrd="0" presId="urn:microsoft.com/office/officeart/2005/8/layout/hierarchy2"/>
+    <dgm:cxn modelId="{5C019DC8-E98A-034A-A890-27DD5DFE37A2}" type="presParOf" srcId="{E1CC1DA7-E052-D145-8E3D-02E51BEAF7D1}" destId="{AD0CB518-2F16-A749-9C97-747B3498BAD9}" srcOrd="0" destOrd="0" presId="urn:microsoft.com/office/officeart/2005/8/layout/hierarchy2"/>
+    <dgm:cxn modelId="{37223EE6-25E1-BC44-A3E7-AA91512FF682}" type="presParOf" srcId="{91025FFF-DA47-FC4F-8CA9-4AD70FBA15F4}" destId="{16328237-3EE4-7943-A3AC-0CF6AEB3A54C}" srcOrd="1" destOrd="0" presId="urn:microsoft.com/office/officeart/2005/8/layout/hierarchy2"/>
+    <dgm:cxn modelId="{45485AE3-2FF4-E94B-8331-8E814E5276A3}" type="presParOf" srcId="{16328237-3EE4-7943-A3AC-0CF6AEB3A54C}" destId="{39E3DC0E-53C8-5144-B0B1-07F4E7334A85}" srcOrd="0" destOrd="0" presId="urn:microsoft.com/office/officeart/2005/8/layout/hierarchy2"/>
+    <dgm:cxn modelId="{9265BAB2-1004-E246-AB5E-A5D1785872C1}" type="presParOf" srcId="{16328237-3EE4-7943-A3AC-0CF6AEB3A54C}" destId="{05DFC33C-FBEB-644E-A6E8-E00321F8D1D6}" srcOrd="1" destOrd="0" presId="urn:microsoft.com/office/officeart/2005/8/layout/hierarchy2"/>
+    <dgm:cxn modelId="{63321D2E-BDE6-4346-B8B8-6EE2A8DEB2F2}" type="presParOf" srcId="{91025FFF-DA47-FC4F-8CA9-4AD70FBA15F4}" destId="{2B20767A-1A33-C248-85FD-1D93D89083D2}" srcOrd="2" destOrd="0" presId="urn:microsoft.com/office/officeart/2005/8/layout/hierarchy2"/>
+    <dgm:cxn modelId="{EEA87FF1-19D9-E649-A99E-416176C237E7}" type="presParOf" srcId="{2B20767A-1A33-C248-85FD-1D93D89083D2}" destId="{4488718A-C95B-7B4D-8FA2-82EDC2308CB4}" srcOrd="0" destOrd="0" presId="urn:microsoft.com/office/officeart/2005/8/layout/hierarchy2"/>
+    <dgm:cxn modelId="{C8A27B9B-16FB-F146-8553-5103775A8816}" type="presParOf" srcId="{91025FFF-DA47-FC4F-8CA9-4AD70FBA15F4}" destId="{2B3D292C-6E64-6043-8EC9-1C6C07D745B0}" srcOrd="3" destOrd="0" presId="urn:microsoft.com/office/officeart/2005/8/layout/hierarchy2"/>
+    <dgm:cxn modelId="{09BE1D10-C02A-CB42-82B9-9146BB88DDD3}" type="presParOf" srcId="{2B3D292C-6E64-6043-8EC9-1C6C07D745B0}" destId="{2915A037-971F-304E-9764-FAB284167672}" srcOrd="0" destOrd="0" presId="urn:microsoft.com/office/officeart/2005/8/layout/hierarchy2"/>
+    <dgm:cxn modelId="{396E30A6-9A11-DF4E-9004-43F441EFC242}" type="presParOf" srcId="{2B3D292C-6E64-6043-8EC9-1C6C07D745B0}" destId="{D2F2433B-CBF9-B447-8B62-BF382A1041BA}" srcOrd="1" destOrd="0" presId="urn:microsoft.com/office/officeart/2005/8/layout/hierarchy2"/>
+    <dgm:cxn modelId="{BBA3E9B7-3AFF-0144-8D4C-5FDA005615D6}" type="presParOf" srcId="{61747978-1319-FA49-B57E-FCC41F19EA84}" destId="{BA1CDD9D-9A6E-0C4E-A9A3-029341159AEA}" srcOrd="2" destOrd="0" presId="urn:microsoft.com/office/officeart/2005/8/layout/hierarchy2"/>
+    <dgm:cxn modelId="{CFD55053-2C87-774E-9FDD-3A9386FFBD5C}" type="presParOf" srcId="{BA1CDD9D-9A6E-0C4E-A9A3-029341159AEA}" destId="{078132C5-A031-0748-9C75-15F7D2568E9E}" srcOrd="0" destOrd="0" presId="urn:microsoft.com/office/officeart/2005/8/layout/hierarchy2"/>
+    <dgm:cxn modelId="{58C6EE07-1483-8043-BFCC-930EE555D3A7}" type="presParOf" srcId="{61747978-1319-FA49-B57E-FCC41F19EA84}" destId="{02397F2C-1A5D-AF43-82E6-F4645AE83246}" srcOrd="3" destOrd="0" presId="urn:microsoft.com/office/officeart/2005/8/layout/hierarchy2"/>
+    <dgm:cxn modelId="{94D3E228-A4E8-D44E-A6C0-4E934634EA44}" type="presParOf" srcId="{02397F2C-1A5D-AF43-82E6-F4645AE83246}" destId="{01AE4A20-5465-E046-9D6A-4C2689ECEBB2}" srcOrd="0" destOrd="0" presId="urn:microsoft.com/office/officeart/2005/8/layout/hierarchy2"/>
+    <dgm:cxn modelId="{CDAC640C-220B-C543-B6A8-57E1BD231985}" type="presParOf" srcId="{02397F2C-1A5D-AF43-82E6-F4645AE83246}" destId="{7745136C-2619-9042-AE17-7EFDD8230B96}" srcOrd="1" destOrd="0" presId="urn:microsoft.com/office/officeart/2005/8/layout/hierarchy2"/>
+    <dgm:cxn modelId="{AEDE0086-D13C-2940-9F5D-789A3CB94750}" type="presParOf" srcId="{61747978-1319-FA49-B57E-FCC41F19EA84}" destId="{28940162-CD59-DD4E-88C0-70FA243B6697}" srcOrd="4" destOrd="0" presId="urn:microsoft.com/office/officeart/2005/8/layout/hierarchy2"/>
+    <dgm:cxn modelId="{D1C8D511-9486-394E-9A61-ED07EC19C1CF}" type="presParOf" srcId="{28940162-CD59-DD4E-88C0-70FA243B6697}" destId="{340D38DE-40A2-C548-959C-EA21A68DC045}" srcOrd="0" destOrd="0" presId="urn:microsoft.com/office/officeart/2005/8/layout/hierarchy2"/>
+    <dgm:cxn modelId="{523392F6-2C1D-AD4B-AEC2-59F553B1DC16}" type="presParOf" srcId="{61747978-1319-FA49-B57E-FCC41F19EA84}" destId="{67FF1E95-D42C-0845-B131-6C6E5FC865AB}" srcOrd="5" destOrd="0" presId="urn:microsoft.com/office/officeart/2005/8/layout/hierarchy2"/>
+    <dgm:cxn modelId="{FDC8C29C-61C6-3146-A9EC-CA96193C630E}" type="presParOf" srcId="{67FF1E95-D42C-0845-B131-6C6E5FC865AB}" destId="{CC7634C0-ED13-644B-9ED7-D06A037B0A09}" srcOrd="0" destOrd="0" presId="urn:microsoft.com/office/officeart/2005/8/layout/hierarchy2"/>
+    <dgm:cxn modelId="{B6292B87-082D-3343-A30F-B5A586238455}" type="presParOf" srcId="{67FF1E95-D42C-0845-B131-6C6E5FC865AB}" destId="{FEC1F169-0803-C748-91BB-5F63A1DA3A53}" srcOrd="1" destOrd="0" presId="urn:microsoft.com/office/officeart/2005/8/layout/hierarchy2"/>
+    <dgm:cxn modelId="{DD44E61E-E14B-1F44-A2A3-F8A26CA1A2C1}" type="presParOf" srcId="{FEC1F169-0803-C748-91BB-5F63A1DA3A53}" destId="{30C20B8D-B9DE-FC4A-A8FC-F855AACFD13C}" srcOrd="0" destOrd="0" presId="urn:microsoft.com/office/officeart/2005/8/layout/hierarchy2"/>
+    <dgm:cxn modelId="{E890A188-887E-2C45-A942-B17C95497A45}" type="presParOf" srcId="{30C20B8D-B9DE-FC4A-A8FC-F855AACFD13C}" destId="{514A0DE5-E2F7-1642-9C22-82D2271D99DD}" srcOrd="0" destOrd="0" presId="urn:microsoft.com/office/officeart/2005/8/layout/hierarchy2"/>
+    <dgm:cxn modelId="{93E4571C-48D3-1A47-A829-9A9837BCBD3D}" type="presParOf" srcId="{FEC1F169-0803-C748-91BB-5F63A1DA3A53}" destId="{2E659DA2-3323-B74D-8AD2-29FFAF43757D}" srcOrd="1" destOrd="0" presId="urn:microsoft.com/office/officeart/2005/8/layout/hierarchy2"/>
+    <dgm:cxn modelId="{0E171930-4F54-2D4E-8C54-27B66FF7CB1B}" type="presParOf" srcId="{2E659DA2-3323-B74D-8AD2-29FFAF43757D}" destId="{6C8DB8F2-3E6F-E842-B341-B9444FABBF52}" srcOrd="0" destOrd="0" presId="urn:microsoft.com/office/officeart/2005/8/layout/hierarchy2"/>
+    <dgm:cxn modelId="{77C8603D-91C0-6B48-9171-FC765AC5B502}" type="presParOf" srcId="{2E659DA2-3323-B74D-8AD2-29FFAF43757D}" destId="{7DF82C3F-976D-8941-AAC0-E0B3BBE56D03}" srcOrd="1" destOrd="0" presId="urn:microsoft.com/office/officeart/2005/8/layout/hierarchy2"/>
+    <dgm:cxn modelId="{CB9D4CC2-E42F-004C-A2B3-7A115B80A72A}" type="presParOf" srcId="{FEC1F169-0803-C748-91BB-5F63A1DA3A53}" destId="{E4AA040D-31C5-5D46-845E-005448A40686}" srcOrd="2" destOrd="0" presId="urn:microsoft.com/office/officeart/2005/8/layout/hierarchy2"/>
+    <dgm:cxn modelId="{AB9F5DD4-7D5C-214C-8FF1-3930A150ED39}" type="presParOf" srcId="{E4AA040D-31C5-5D46-845E-005448A40686}" destId="{1B19DBDE-7BB1-664E-A05B-426990BEADD2}" srcOrd="0" destOrd="0" presId="urn:microsoft.com/office/officeart/2005/8/layout/hierarchy2"/>
+    <dgm:cxn modelId="{AE11DC7E-733E-674A-9F90-D1CB0AE3014C}" type="presParOf" srcId="{FEC1F169-0803-C748-91BB-5F63A1DA3A53}" destId="{67649436-0A96-A24A-A701-56CB57441ADF}" srcOrd="3" destOrd="0" presId="urn:microsoft.com/office/officeart/2005/8/layout/hierarchy2"/>
+    <dgm:cxn modelId="{6167CFE3-DF32-5443-80C1-A7D152644268}" type="presParOf" srcId="{67649436-0A96-A24A-A701-56CB57441ADF}" destId="{FE860302-7B4F-8444-86E7-3E89E24F2AE0}" srcOrd="0" destOrd="0" presId="urn:microsoft.com/office/officeart/2005/8/layout/hierarchy2"/>
+    <dgm:cxn modelId="{EEA678CC-0785-064E-BA28-51ABF40B0621}" type="presParOf" srcId="{67649436-0A96-A24A-A701-56CB57441ADF}" destId="{057AE7D0-DCA5-E645-9EBC-E9E5461A3DD4}" srcOrd="1" destOrd="0" presId="urn:microsoft.com/office/officeart/2005/8/layout/hierarchy2"/>
+    <dgm:cxn modelId="{804F5BA4-466E-CD4A-9D26-8EE76A4AF953}" type="presParOf" srcId="{057AE7D0-DCA5-E645-9EBC-E9E5461A3DD4}" destId="{AE66067E-8C8F-C146-AE9F-FD6D23D7EA7D}" srcOrd="0" destOrd="0" presId="urn:microsoft.com/office/officeart/2005/8/layout/hierarchy2"/>
+    <dgm:cxn modelId="{B6B8A908-7710-F34B-8E2B-AF7C5998FB8E}" type="presParOf" srcId="{AE66067E-8C8F-C146-AE9F-FD6D23D7EA7D}" destId="{FBF4C144-F351-7546-9706-1D522BDDE758}" srcOrd="0" destOrd="0" presId="urn:microsoft.com/office/officeart/2005/8/layout/hierarchy2"/>
+    <dgm:cxn modelId="{3CC9E37A-5E61-684E-9469-E011278AAA9C}" type="presParOf" srcId="{057AE7D0-DCA5-E645-9EBC-E9E5461A3DD4}" destId="{C2CB1567-B53F-2C4E-9848-D0D9F318BA21}" srcOrd="1" destOrd="0" presId="urn:microsoft.com/office/officeart/2005/8/layout/hierarchy2"/>
+    <dgm:cxn modelId="{2EBF5C11-2E71-6C4B-B484-7979A8E1B342}" type="presParOf" srcId="{C2CB1567-B53F-2C4E-9848-D0D9F318BA21}" destId="{3FE5FC00-5B11-B04A-8DA8-F4959DA3D91E}" srcOrd="0" destOrd="0" presId="urn:microsoft.com/office/officeart/2005/8/layout/hierarchy2"/>
+    <dgm:cxn modelId="{C0B8BF2A-DFE4-1640-B77F-ED7A388A184F}" type="presParOf" srcId="{C2CB1567-B53F-2C4E-9848-D0D9F318BA21}" destId="{C845A82A-50F8-5341-ABE4-01A7ECB0DC19}" srcOrd="1" destOrd="0" presId="urn:microsoft.com/office/officeart/2005/8/layout/hierarchy2"/>
+    <dgm:cxn modelId="{319717C8-0888-FC49-9D67-B5B07E33EDB9}" type="presParOf" srcId="{057AE7D0-DCA5-E645-9EBC-E9E5461A3DD4}" destId="{32E1E92B-B747-1945-8244-8375262856A2}" srcOrd="2" destOrd="0" presId="urn:microsoft.com/office/officeart/2005/8/layout/hierarchy2"/>
+    <dgm:cxn modelId="{3127F649-B1C5-1240-AEB1-03AE08DE045A}" type="presParOf" srcId="{32E1E92B-B747-1945-8244-8375262856A2}" destId="{B3130863-C367-4E49-B7AD-D2B418734F30}" srcOrd="0" destOrd="0" presId="urn:microsoft.com/office/officeart/2005/8/layout/hierarchy2"/>
+    <dgm:cxn modelId="{CC7C9430-63AA-FA4D-8021-6CB00044F3A9}" type="presParOf" srcId="{057AE7D0-DCA5-E645-9EBC-E9E5461A3DD4}" destId="{8C10BC1F-0671-2340-A9C0-9E71D9E53B19}" srcOrd="3" destOrd="0" presId="urn:microsoft.com/office/officeart/2005/8/layout/hierarchy2"/>
+    <dgm:cxn modelId="{ED950DD0-0CB0-8149-B815-C2F8F22C7CF2}" type="presParOf" srcId="{8C10BC1F-0671-2340-A9C0-9E71D9E53B19}" destId="{00CFE4B8-8832-0246-A40E-11D4FB02AE84}" srcOrd="0" destOrd="0" presId="urn:microsoft.com/office/officeart/2005/8/layout/hierarchy2"/>
+    <dgm:cxn modelId="{747B09D4-788A-A248-9429-937875E30AAB}" type="presParOf" srcId="{8C10BC1F-0671-2340-A9C0-9E71D9E53B19}" destId="{4A66CD93-FEF2-5647-87D1-459C3DA519CA}" srcOrd="1" destOrd="0" presId="urn:microsoft.com/office/officeart/2005/8/layout/hierarchy2"/>
+    <dgm:cxn modelId="{87C0293E-5909-A043-A750-C3F65B2B953A}" type="presParOf" srcId="{D4ECBD1D-BCD1-194A-944B-DF5C60377F45}" destId="{679B93C1-DE35-6440-84FA-556B81DC0458}" srcOrd="2" destOrd="0" presId="urn:microsoft.com/office/officeart/2005/8/layout/hierarchy2"/>
+    <dgm:cxn modelId="{761C8A55-BEAE-1F43-99CC-1D2C8806E90F}" type="presParOf" srcId="{679B93C1-DE35-6440-84FA-556B81DC0458}" destId="{17969B6C-27C4-594D-AD5E-6F5032B8027F}" srcOrd="0" destOrd="0" presId="urn:microsoft.com/office/officeart/2005/8/layout/hierarchy2"/>
+    <dgm:cxn modelId="{15ABF565-112D-2F4E-BBAB-C2E36697B72D}" type="presParOf" srcId="{D4ECBD1D-BCD1-194A-944B-DF5C60377F45}" destId="{607A5C4E-8E72-DF43-B8DD-7245A3FEAF65}" srcOrd="3" destOrd="0" presId="urn:microsoft.com/office/officeart/2005/8/layout/hierarchy2"/>
+    <dgm:cxn modelId="{1AE69E42-82CC-354B-B249-79A2CBD8BD54}" type="presParOf" srcId="{607A5C4E-8E72-DF43-B8DD-7245A3FEAF65}" destId="{FFFF1321-B119-DD44-91BC-A8BB725CB204}" srcOrd="0" destOrd="0" presId="urn:microsoft.com/office/officeart/2005/8/layout/hierarchy2"/>
+    <dgm:cxn modelId="{4044263B-B369-C14C-98F7-E0B59288EEDF}" type="presParOf" srcId="{607A5C4E-8E72-DF43-B8DD-7245A3FEAF65}" destId="{6ACF99BD-0065-D644-91BC-8C88EAA585AA}" srcOrd="1" destOrd="0" presId="urn:microsoft.com/office/officeart/2005/8/layout/hierarchy2"/>
+    <dgm:cxn modelId="{3D40E033-C79A-6841-8A2A-3EF34FDEA131}" type="presParOf" srcId="{6ACF99BD-0065-D644-91BC-8C88EAA585AA}" destId="{8C192C57-F760-C64F-93E5-9832B628B4B9}" srcOrd="0" destOrd="0" presId="urn:microsoft.com/office/officeart/2005/8/layout/hierarchy2"/>
+    <dgm:cxn modelId="{07F3AE25-A842-1148-958C-A642921C7323}" type="presParOf" srcId="{8C192C57-F760-C64F-93E5-9832B628B4B9}" destId="{231E55CB-9002-9944-B177-034B990C250F}" srcOrd="0" destOrd="0" presId="urn:microsoft.com/office/officeart/2005/8/layout/hierarchy2"/>
+    <dgm:cxn modelId="{1E36ECB9-318F-6442-920C-D8D3A03564EB}" type="presParOf" srcId="{6ACF99BD-0065-D644-91BC-8C88EAA585AA}" destId="{77028C31-781D-624B-BB89-6FDBC3329700}" srcOrd="1" destOrd="0" presId="urn:microsoft.com/office/officeart/2005/8/layout/hierarchy2"/>
+    <dgm:cxn modelId="{ADE50664-62B9-8446-AE69-6F6B7A723BF9}" type="presParOf" srcId="{77028C31-781D-624B-BB89-6FDBC3329700}" destId="{1530674F-400B-AA4E-BAF1-41A723567EF5}" srcOrd="0" destOrd="0" presId="urn:microsoft.com/office/officeart/2005/8/layout/hierarchy2"/>
+    <dgm:cxn modelId="{A8429B60-3BA2-8844-8A33-AB0F5B83D2DA}" type="presParOf" srcId="{77028C31-781D-624B-BB89-6FDBC3329700}" destId="{822DEA25-8009-FD4B-A009-A8B9E4849BB9}" srcOrd="1" destOrd="0" presId="urn:microsoft.com/office/officeart/2005/8/layout/hierarchy2"/>
+    <dgm:cxn modelId="{1DA994C5-CF0A-E340-8C52-10CF72CCECB7}" type="presParOf" srcId="{6ACF99BD-0065-D644-91BC-8C88EAA585AA}" destId="{882C5457-CC43-4A48-A99D-03D91C22C0F5}" srcOrd="2" destOrd="0" presId="urn:microsoft.com/office/officeart/2005/8/layout/hierarchy2"/>
+    <dgm:cxn modelId="{AD9E1F47-26F8-B94D-861B-BE30435788CB}" type="presParOf" srcId="{882C5457-CC43-4A48-A99D-03D91C22C0F5}" destId="{10CA0EB9-E970-1C4C-B964-68E6097168BF}" srcOrd="0" destOrd="0" presId="urn:microsoft.com/office/officeart/2005/8/layout/hierarchy2"/>
+    <dgm:cxn modelId="{79FA3482-6AA8-3442-AF7A-0DAE016DDB42}" type="presParOf" srcId="{6ACF99BD-0065-D644-91BC-8C88EAA585AA}" destId="{F0E02FA8-2358-A14C-8DB7-605DE4349BDD}" srcOrd="3" destOrd="0" presId="urn:microsoft.com/office/officeart/2005/8/layout/hierarchy2"/>
+    <dgm:cxn modelId="{642DB4ED-6D0F-A246-B342-D7F76D2081D0}" type="presParOf" srcId="{F0E02FA8-2358-A14C-8DB7-605DE4349BDD}" destId="{B0BA1A94-5289-E747-92C5-8031204115B7}" srcOrd="0" destOrd="0" presId="urn:microsoft.com/office/officeart/2005/8/layout/hierarchy2"/>
+    <dgm:cxn modelId="{FFA3C250-D470-0F4E-8487-31E0418765F3}" type="presParOf" srcId="{F0E02FA8-2358-A14C-8DB7-605DE4349BDD}" destId="{F7D605D8-2D8B-6B43-B35B-5EA2ADCCCA20}" srcOrd="1" destOrd="0" presId="urn:microsoft.com/office/officeart/2005/8/layout/hierarchy2"/>
+    <dgm:cxn modelId="{1F75BE61-404F-2744-A4AA-3148A7C5D9AB}" type="presParOf" srcId="{D886A097-5038-DC48-BAB1-09A6F2793CBA}" destId="{68E9A118-368E-3244-B463-69DB084DF2CF}" srcOrd="2" destOrd="0" presId="urn:microsoft.com/office/officeart/2005/8/layout/hierarchy2"/>
+    <dgm:cxn modelId="{21A3AC20-D478-8145-8CBD-0184714F84BC}" type="presParOf" srcId="{68E9A118-368E-3244-B463-69DB084DF2CF}" destId="{2C1E44BD-A489-2646-AD2D-FB438B53D6D4}" srcOrd="0" destOrd="0" presId="urn:microsoft.com/office/officeart/2005/8/layout/hierarchy2"/>
+    <dgm:cxn modelId="{10D64951-D2B0-1941-8640-9FE752E471C9}" type="presParOf" srcId="{D886A097-5038-DC48-BAB1-09A6F2793CBA}" destId="{3FB46357-4815-DB4B-8FDE-777C712B728F}" srcOrd="3" destOrd="0" presId="urn:microsoft.com/office/officeart/2005/8/layout/hierarchy2"/>
+    <dgm:cxn modelId="{84CCC28A-0ECD-3742-9B46-3460EAC6DBBB}" type="presParOf" srcId="{3FB46357-4815-DB4B-8FDE-777C712B728F}" destId="{D475B07C-EFC2-7840-8B4D-A25CA753797E}" srcOrd="0" destOrd="0" presId="urn:microsoft.com/office/officeart/2005/8/layout/hierarchy2"/>
+    <dgm:cxn modelId="{D84E48EA-4DE4-DF42-90D9-70BC1BA33A10}" type="presParOf" srcId="{3FB46357-4815-DB4B-8FDE-777C712B728F}" destId="{2621B116-FEC2-024B-A529-952624AF50D7}" srcOrd="1" destOrd="0" presId="urn:microsoft.com/office/officeart/2005/8/layout/hierarchy2"/>
+    <dgm:cxn modelId="{4823A591-6883-B549-A1D1-F224C9A2BD7E}" type="presParOf" srcId="{2621B116-FEC2-024B-A529-952624AF50D7}" destId="{E0E8B3D1-202F-F448-A89C-7325EF939FBE}" srcOrd="0" destOrd="0" presId="urn:microsoft.com/office/officeart/2005/8/layout/hierarchy2"/>
+    <dgm:cxn modelId="{359DF888-98DB-D047-B5B6-79BA71EFA1D3}" type="presParOf" srcId="{E0E8B3D1-202F-F448-A89C-7325EF939FBE}" destId="{82082EF3-F943-6040-8F27-9EE49BF77273}" srcOrd="0" destOrd="0" presId="urn:microsoft.com/office/officeart/2005/8/layout/hierarchy2"/>
+    <dgm:cxn modelId="{B5DE7D64-0492-EC4F-B325-CEAC7D3EF6ED}" type="presParOf" srcId="{2621B116-FEC2-024B-A529-952624AF50D7}" destId="{FE01A907-E60A-7241-A73F-4556CF4B7B90}" srcOrd="1" destOrd="0" presId="urn:microsoft.com/office/officeart/2005/8/layout/hierarchy2"/>
+    <dgm:cxn modelId="{654B0867-3EE4-274B-B873-C592550E7CEA}" type="presParOf" srcId="{FE01A907-E60A-7241-A73F-4556CF4B7B90}" destId="{1F61B25A-1771-6C48-A23E-9F44BFFFE83A}" srcOrd="0" destOrd="0" presId="urn:microsoft.com/office/officeart/2005/8/layout/hierarchy2"/>
+    <dgm:cxn modelId="{D5900111-4BE8-764F-8FD7-AB83B5508D77}" type="presParOf" srcId="{FE01A907-E60A-7241-A73F-4556CF4B7B90}" destId="{9F47EDC6-53C3-A243-AEEE-2D2DB2230807}" srcOrd="1" destOrd="0" presId="urn:microsoft.com/office/officeart/2005/8/layout/hierarchy2"/>
+    <dgm:cxn modelId="{51E7C310-262C-CB4E-9CB2-55F8212D4F98}" type="presParOf" srcId="{9F47EDC6-53C3-A243-AEEE-2D2DB2230807}" destId="{6F1542E3-3EE9-7643-98A4-02BB96297F69}" srcOrd="0" destOrd="0" presId="urn:microsoft.com/office/officeart/2005/8/layout/hierarchy2"/>
+    <dgm:cxn modelId="{50F19F78-8EB6-4546-BF0E-E40B50900E99}" type="presParOf" srcId="{6F1542E3-3EE9-7643-98A4-02BB96297F69}" destId="{ADC457D0-4675-8749-9954-B3A7E3C7E138}" srcOrd="0" destOrd="0" presId="urn:microsoft.com/office/officeart/2005/8/layout/hierarchy2"/>
+    <dgm:cxn modelId="{D9FA0C29-9B90-B541-9010-49B2E101D079}" type="presParOf" srcId="{9F47EDC6-53C3-A243-AEEE-2D2DB2230807}" destId="{2A862D7C-77B7-264A-A1F0-8F6D2BED61CE}" srcOrd="1" destOrd="0" presId="urn:microsoft.com/office/officeart/2005/8/layout/hierarchy2"/>
+    <dgm:cxn modelId="{37CA7D95-0B3D-8D42-9D2D-A2C3D5C3930D}" type="presParOf" srcId="{2A862D7C-77B7-264A-A1F0-8F6D2BED61CE}" destId="{EAF5B26D-7BCE-5249-BEA2-027D32033BF5}" srcOrd="0" destOrd="0" presId="urn:microsoft.com/office/officeart/2005/8/layout/hierarchy2"/>
+    <dgm:cxn modelId="{6773B0A9-838E-D346-B6ED-E5CE12FC05E3}" type="presParOf" srcId="{2A862D7C-77B7-264A-A1F0-8F6D2BED61CE}" destId="{CEF6A641-4A3D-3043-8F9B-85EF97F27AF6}" srcOrd="1" destOrd="0" presId="urn:microsoft.com/office/officeart/2005/8/layout/hierarchy2"/>
+    <dgm:cxn modelId="{4BB81B17-27F5-4941-9034-CABF18D863AD}" type="presParOf" srcId="{CEF6A641-4A3D-3043-8F9B-85EF97F27AF6}" destId="{97208B3F-EBA3-4845-94E7-920477ECF453}" srcOrd="0" destOrd="0" presId="urn:microsoft.com/office/officeart/2005/8/layout/hierarchy2"/>
+    <dgm:cxn modelId="{0E8CAC37-EC5E-2944-9E93-3B77F2841EA7}" type="presParOf" srcId="{97208B3F-EBA3-4845-94E7-920477ECF453}" destId="{99F05CAB-2148-F444-8941-3147FA138FC8}" srcOrd="0" destOrd="0" presId="urn:microsoft.com/office/officeart/2005/8/layout/hierarchy2"/>
+    <dgm:cxn modelId="{275626E6-9B76-5C4E-8C51-2260CB662E7E}" type="presParOf" srcId="{CEF6A641-4A3D-3043-8F9B-85EF97F27AF6}" destId="{BEB9413D-1E65-E648-9E27-A0E8F477336A}" srcOrd="1" destOrd="0" presId="urn:microsoft.com/office/officeart/2005/8/layout/hierarchy2"/>
+    <dgm:cxn modelId="{2568C766-24F3-E548-A26A-0094F8123B9F}" type="presParOf" srcId="{BEB9413D-1E65-E648-9E27-A0E8F477336A}" destId="{4AC7893F-6937-5446-9898-4892D379DA93}" srcOrd="0" destOrd="0" presId="urn:microsoft.com/office/officeart/2005/8/layout/hierarchy2"/>
+    <dgm:cxn modelId="{0DF6848A-5A5E-D244-A768-94799E9AE7D6}" type="presParOf" srcId="{BEB9413D-1E65-E648-9E27-A0E8F477336A}" destId="{07E35A30-71EC-754C-BC38-4AF5BD29A7FB}" srcOrd="1" destOrd="0" presId="urn:microsoft.com/office/officeart/2005/8/layout/hierarchy2"/>
+    <dgm:cxn modelId="{0CFFA5BF-3551-A143-A1B8-1237E51028F9}" type="presParOf" srcId="{CEF6A641-4A3D-3043-8F9B-85EF97F27AF6}" destId="{DF2248CE-7D7C-5D4B-8277-D213DA6DD3EB}" srcOrd="2" destOrd="0" presId="urn:microsoft.com/office/officeart/2005/8/layout/hierarchy2"/>
+    <dgm:cxn modelId="{A62A0329-E7D0-C440-B837-02CCA67E7909}" type="presParOf" srcId="{DF2248CE-7D7C-5D4B-8277-D213DA6DD3EB}" destId="{A52AB215-CE3B-6540-84CE-C7392438F501}" srcOrd="0" destOrd="0" presId="urn:microsoft.com/office/officeart/2005/8/layout/hierarchy2"/>
+    <dgm:cxn modelId="{8E52FC2D-9D58-5940-9EBD-4B7359FEE714}" type="presParOf" srcId="{CEF6A641-4A3D-3043-8F9B-85EF97F27AF6}" destId="{1A261F39-0BA9-4948-A5A6-DB65EB31F286}" srcOrd="3" destOrd="0" presId="urn:microsoft.com/office/officeart/2005/8/layout/hierarchy2"/>
+    <dgm:cxn modelId="{F8C56EA9-6426-7942-8436-48789207623F}" type="presParOf" srcId="{1A261F39-0BA9-4948-A5A6-DB65EB31F286}" destId="{973B5C1F-9A88-FA43-9797-E750A0514CF6}" srcOrd="0" destOrd="0" presId="urn:microsoft.com/office/officeart/2005/8/layout/hierarchy2"/>
+    <dgm:cxn modelId="{93932436-47DF-5746-94B3-F3265F163E94}" type="presParOf" srcId="{1A261F39-0BA9-4948-A5A6-DB65EB31F286}" destId="{51CF1E14-52A3-5847-9202-4DC83418154D}" srcOrd="1" destOrd="0" presId="urn:microsoft.com/office/officeart/2005/8/layout/hierarchy2"/>
+    <dgm:cxn modelId="{356FA06D-A2FB-E346-B5F0-C2717E9C99A9}" type="presParOf" srcId="{51CF1E14-52A3-5847-9202-4DC83418154D}" destId="{48C1939D-7F8F-224A-89D3-D240B4AD4863}" srcOrd="0" destOrd="0" presId="urn:microsoft.com/office/officeart/2005/8/layout/hierarchy2"/>
+    <dgm:cxn modelId="{B8465CC6-89B1-7945-A0DF-9BB5385A799F}" type="presParOf" srcId="{48C1939D-7F8F-224A-89D3-D240B4AD4863}" destId="{9D8B57B8-631C-FB43-A057-C6F4840439BB}" srcOrd="0" destOrd="0" presId="urn:microsoft.com/office/officeart/2005/8/layout/hierarchy2"/>
+    <dgm:cxn modelId="{A70C17AA-2C8F-A443-BFEE-1FC029E15F04}" type="presParOf" srcId="{51CF1E14-52A3-5847-9202-4DC83418154D}" destId="{9B156E3B-6B87-DB4D-BA13-CFAC7D71D3F1}" srcOrd="1" destOrd="0" presId="urn:microsoft.com/office/officeart/2005/8/layout/hierarchy2"/>
+    <dgm:cxn modelId="{6AAFAAB7-B04B-F645-BB98-632FC24398CE}" type="presParOf" srcId="{9B156E3B-6B87-DB4D-BA13-CFAC7D71D3F1}" destId="{6D61A4E9-20E0-724F-8506-4AF9CF093D61}" srcOrd="0" destOrd="0" presId="urn:microsoft.com/office/officeart/2005/8/layout/hierarchy2"/>
+    <dgm:cxn modelId="{A5F7B0F4-C9B1-0B4E-B785-0766F273A550}" type="presParOf" srcId="{9B156E3B-6B87-DB4D-BA13-CFAC7D71D3F1}" destId="{19E36116-61C3-384D-9648-E48E06A20314}" srcOrd="1" destOrd="0" presId="urn:microsoft.com/office/officeart/2005/8/layout/hierarchy2"/>
+    <dgm:cxn modelId="{B39F3BFE-2AD1-0D44-9149-4908A3CDA48D}" type="presParOf" srcId="{19E36116-61C3-384D-9648-E48E06A20314}" destId="{D5E03AE9-CD36-1E45-8924-A89701186EA4}" srcOrd="0" destOrd="0" presId="urn:microsoft.com/office/officeart/2005/8/layout/hierarchy2"/>
+    <dgm:cxn modelId="{2639B83A-9BF9-4B43-901C-0F6AF17636CE}" type="presParOf" srcId="{D5E03AE9-CD36-1E45-8924-A89701186EA4}" destId="{A4EEFD49-E628-3740-A93E-6D11E409D24D}" srcOrd="0" destOrd="0" presId="urn:microsoft.com/office/officeart/2005/8/layout/hierarchy2"/>
+    <dgm:cxn modelId="{BB1A856D-DFF8-1944-B0AC-070FAE2A32F3}" type="presParOf" srcId="{19E36116-61C3-384D-9648-E48E06A20314}" destId="{6788474E-B969-384B-B022-EB3A33F173C9}" srcOrd="1" destOrd="0" presId="urn:microsoft.com/office/officeart/2005/8/layout/hierarchy2"/>
+    <dgm:cxn modelId="{479393F7-9466-7745-8C48-90D90CA8C7CC}" type="presParOf" srcId="{6788474E-B969-384B-B022-EB3A33F173C9}" destId="{020ECFE7-D082-9944-8AD2-DBD727F66CA5}" srcOrd="0" destOrd="0" presId="urn:microsoft.com/office/officeart/2005/8/layout/hierarchy2"/>
+    <dgm:cxn modelId="{33234AF1-1FDD-2746-9BC6-93F4B2A3A306}" type="presParOf" srcId="{6788474E-B969-384B-B022-EB3A33F173C9}" destId="{0D5535D0-3B22-FD45-86B1-1BDBFD7FAA6F}" srcOrd="1" destOrd="0" presId="urn:microsoft.com/office/officeart/2005/8/layout/hierarchy2"/>
+    <dgm:cxn modelId="{55D905EF-2177-7143-8BAD-306BEF2F6266}" type="presParOf" srcId="{0D5535D0-3B22-FD45-86B1-1BDBFD7FAA6F}" destId="{6B63E564-88B8-E64A-B9FB-CD4F663F06C4}" srcOrd="0" destOrd="0" presId="urn:microsoft.com/office/officeart/2005/8/layout/hierarchy2"/>
+    <dgm:cxn modelId="{414BCB17-A9C5-344D-8E97-2B7CDF68C030}" type="presParOf" srcId="{6B63E564-88B8-E64A-B9FB-CD4F663F06C4}" destId="{0BB8C1D1-32D5-F247-90B9-6406D7687D76}" srcOrd="0" destOrd="0" presId="urn:microsoft.com/office/officeart/2005/8/layout/hierarchy2"/>
+    <dgm:cxn modelId="{8A11D948-1088-2840-A79F-6B634E8D430E}" type="presParOf" srcId="{0D5535D0-3B22-FD45-86B1-1BDBFD7FAA6F}" destId="{9AA4CB9B-D3ED-B443-B3FD-E68710357950}" srcOrd="1" destOrd="0" presId="urn:microsoft.com/office/officeart/2005/8/layout/hierarchy2"/>
+    <dgm:cxn modelId="{E183086B-EB29-AF4F-90E9-EEF9367561B9}" type="presParOf" srcId="{9AA4CB9B-D3ED-B443-B3FD-E68710357950}" destId="{2E029F71-35C9-9044-867B-C62FC8CEDC2C}" srcOrd="0" destOrd="0" presId="urn:microsoft.com/office/officeart/2005/8/layout/hierarchy2"/>
+    <dgm:cxn modelId="{667F72B3-5D46-7548-ADCB-B8E107D7B746}" type="presParOf" srcId="{9AA4CB9B-D3ED-B443-B3FD-E68710357950}" destId="{6B50D666-6773-6F4B-AA48-FA3A531B2932}" srcOrd="1" destOrd="0" presId="urn:microsoft.com/office/officeart/2005/8/layout/hierarchy2"/>
+    <dgm:cxn modelId="{2B419748-0241-154A-8B1C-8ABDB270E202}" type="presParOf" srcId="{0D5535D0-3B22-FD45-86B1-1BDBFD7FAA6F}" destId="{641BAAFD-D329-7E42-8738-0A74C231BC0A}" srcOrd="2" destOrd="0" presId="urn:microsoft.com/office/officeart/2005/8/layout/hierarchy2"/>
+    <dgm:cxn modelId="{C1E0D4EC-0382-9944-96C8-2F5B9DEF51C9}" type="presParOf" srcId="{641BAAFD-D329-7E42-8738-0A74C231BC0A}" destId="{8F379772-4468-2D48-8E1C-02F9C1718421}" srcOrd="0" destOrd="0" presId="urn:microsoft.com/office/officeart/2005/8/layout/hierarchy2"/>
+    <dgm:cxn modelId="{15BF72BD-4A76-2045-AE14-A0FFA78BF5D2}" type="presParOf" srcId="{0D5535D0-3B22-FD45-86B1-1BDBFD7FAA6F}" destId="{E4854849-0AC0-954F-BD0F-9A4D48A7DB3F}" srcOrd="3" destOrd="0" presId="urn:microsoft.com/office/officeart/2005/8/layout/hierarchy2"/>
+    <dgm:cxn modelId="{C0F95B7B-2CEA-5D42-8E0D-AF4C39CB6073}" type="presParOf" srcId="{E4854849-0AC0-954F-BD0F-9A4D48A7DB3F}" destId="{6EB62837-1E38-C84D-ACB4-94B49AFC73CE}" srcOrd="0" destOrd="0" presId="urn:microsoft.com/office/officeart/2005/8/layout/hierarchy2"/>
+    <dgm:cxn modelId="{C4350D5B-AF3C-FE45-B7C3-FA0457B99B14}" type="presParOf" srcId="{E4854849-0AC0-954F-BD0F-9A4D48A7DB3F}" destId="{F149F12C-7158-8441-8A8F-306CE01E326A}" srcOrd="1" destOrd="0" presId="urn:microsoft.com/office/officeart/2005/8/layout/hierarchy2"/>
+    <dgm:cxn modelId="{70F3FA52-91E4-E246-94FC-87672F0B0C3C}" type="presParOf" srcId="{19E36116-61C3-384D-9648-E48E06A20314}" destId="{0944545F-BE28-CB41-9FE0-CB8029CA4E05}" srcOrd="2" destOrd="0" presId="urn:microsoft.com/office/officeart/2005/8/layout/hierarchy2"/>
+    <dgm:cxn modelId="{D6E387D6-D470-0946-846C-0C79CCE01C8F}" type="presParOf" srcId="{0944545F-BE28-CB41-9FE0-CB8029CA4E05}" destId="{B9DF7744-0386-3343-9BD2-F1987F5C2504}" srcOrd="0" destOrd="0" presId="urn:microsoft.com/office/officeart/2005/8/layout/hierarchy2"/>
+    <dgm:cxn modelId="{C9001363-DCB8-574D-9727-21AB6386ED51}" type="presParOf" srcId="{19E36116-61C3-384D-9648-E48E06A20314}" destId="{39F3B461-72C8-0145-ACF2-28565415C7A1}" srcOrd="3" destOrd="0" presId="urn:microsoft.com/office/officeart/2005/8/layout/hierarchy2"/>
+    <dgm:cxn modelId="{6AE126C9-321B-EA4B-995B-F204BEA66E18}" type="presParOf" srcId="{39F3B461-72C8-0145-ACF2-28565415C7A1}" destId="{F84751BB-FB2D-0A40-88BA-778CB80F14B3}" srcOrd="0" destOrd="0" presId="urn:microsoft.com/office/officeart/2005/8/layout/hierarchy2"/>
+    <dgm:cxn modelId="{8EBD72BA-5B3B-B244-B0AF-284D017CB3F2}" type="presParOf" srcId="{39F3B461-72C8-0145-ACF2-28565415C7A1}" destId="{FC4E52E0-921B-154B-A8A5-2FB3A2F0A717}" srcOrd="1" destOrd="0" presId="urn:microsoft.com/office/officeart/2005/8/layout/hierarchy2"/>
+    <dgm:cxn modelId="{EEB34B72-981B-0C44-8FF3-F0F9930F3A38}" type="presParOf" srcId="{FC4E52E0-921B-154B-A8A5-2FB3A2F0A717}" destId="{F03D0C19-6DF7-B64A-9FD1-2A1A5EF6D7CA}" srcOrd="0" destOrd="0" presId="urn:microsoft.com/office/officeart/2005/8/layout/hierarchy2"/>
+    <dgm:cxn modelId="{58DA0F63-4102-174F-B7F3-39A11B5A6303}" type="presParOf" srcId="{F03D0C19-6DF7-B64A-9FD1-2A1A5EF6D7CA}" destId="{0DFBADBC-4685-304B-87B0-BD0C0A75C57C}" srcOrd="0" destOrd="0" presId="urn:microsoft.com/office/officeart/2005/8/layout/hierarchy2"/>
+    <dgm:cxn modelId="{1B4D25CB-8DC3-824B-90D7-0B6312546933}" type="presParOf" srcId="{FC4E52E0-921B-154B-A8A5-2FB3A2F0A717}" destId="{275D3635-4C9C-434E-9619-C93CEC2EFD77}" srcOrd="1" destOrd="0" presId="urn:microsoft.com/office/officeart/2005/8/layout/hierarchy2"/>
+    <dgm:cxn modelId="{E3B3CFE2-7D9D-3143-B658-28DD427AAAD9}" type="presParOf" srcId="{275D3635-4C9C-434E-9619-C93CEC2EFD77}" destId="{BBF96CC7-6B2B-D546-B69E-E97D847B5E45}" srcOrd="0" destOrd="0" presId="urn:microsoft.com/office/officeart/2005/8/layout/hierarchy2"/>
+    <dgm:cxn modelId="{73992EB0-E279-6442-A4F1-76C9AACF8BE7}" type="presParOf" srcId="{275D3635-4C9C-434E-9619-C93CEC2EFD77}" destId="{19BD08D0-6546-9249-90C7-9F1FE933043C}" srcOrd="1" destOrd="0" presId="urn:microsoft.com/office/officeart/2005/8/layout/hierarchy2"/>
+    <dgm:cxn modelId="{DF3941C2-B478-CA44-98BF-54E6FF4D8001}" type="presParOf" srcId="{FC4E52E0-921B-154B-A8A5-2FB3A2F0A717}" destId="{B0460EF9-21D3-F84E-BBFA-46763C9AE876}" srcOrd="2" destOrd="0" presId="urn:microsoft.com/office/officeart/2005/8/layout/hierarchy2"/>
+    <dgm:cxn modelId="{CE80997D-0981-1D48-9C81-7CA196207215}" type="presParOf" srcId="{B0460EF9-21D3-F84E-BBFA-46763C9AE876}" destId="{9F8B70A0-32E5-A14F-B6F2-42409C13EE93}" srcOrd="0" destOrd="0" presId="urn:microsoft.com/office/officeart/2005/8/layout/hierarchy2"/>
+    <dgm:cxn modelId="{312DB6E9-48A4-6148-87F9-1BAD63119DB3}" type="presParOf" srcId="{FC4E52E0-921B-154B-A8A5-2FB3A2F0A717}" destId="{DA24A719-148D-1546-8E68-CD4A35F46D3E}" srcOrd="3" destOrd="0" presId="urn:microsoft.com/office/officeart/2005/8/layout/hierarchy2"/>
+    <dgm:cxn modelId="{6D914D66-5CD0-614C-9C53-DB1A654A9D50}" type="presParOf" srcId="{DA24A719-148D-1546-8E68-CD4A35F46D3E}" destId="{C1AD9849-C58B-0841-853D-61235BCF9197}" srcOrd="0" destOrd="0" presId="urn:microsoft.com/office/officeart/2005/8/layout/hierarchy2"/>
+    <dgm:cxn modelId="{EF173492-90CC-A54D-97F3-507DFACE8FC4}" type="presParOf" srcId="{DA24A719-148D-1546-8E68-CD4A35F46D3E}" destId="{3E3B37EB-6AA0-E04A-A04B-9356DFCDCF10}" srcOrd="1" destOrd="0" presId="urn:microsoft.com/office/officeart/2005/8/layout/hierarchy2"/>
+    <dgm:cxn modelId="{BE132463-5BA0-C648-B5C4-24ABACE3AE60}" type="presParOf" srcId="{9F47EDC6-53C3-A243-AEEE-2D2DB2230807}" destId="{AE09F7FF-7720-0E4F-A409-200B111906F7}" srcOrd="2" destOrd="0" presId="urn:microsoft.com/office/officeart/2005/8/layout/hierarchy2"/>
+    <dgm:cxn modelId="{8733CEAF-58B7-1F44-8BD4-2908E71EFBCE}" type="presParOf" srcId="{AE09F7FF-7720-0E4F-A409-200B111906F7}" destId="{C7F54069-F85F-C24F-B7E5-A79C8F7CF7A2}" srcOrd="0" destOrd="0" presId="urn:microsoft.com/office/officeart/2005/8/layout/hierarchy2"/>
+    <dgm:cxn modelId="{3B584CAB-6A2A-FA4F-A84D-F7C6B1EF7EE4}" type="presParOf" srcId="{9F47EDC6-53C3-A243-AEEE-2D2DB2230807}" destId="{D4BEEA34-09B6-2F46-9BEC-1EEBB06552F3}" srcOrd="3" destOrd="0" presId="urn:microsoft.com/office/officeart/2005/8/layout/hierarchy2"/>
+    <dgm:cxn modelId="{6A902F44-6323-2941-A1C8-6A7666ADA896}" type="presParOf" srcId="{D4BEEA34-09B6-2F46-9BEC-1EEBB06552F3}" destId="{CD3E6B27-7BAA-1A4F-A778-AAC952E047EB}" srcOrd="0" destOrd="0" presId="urn:microsoft.com/office/officeart/2005/8/layout/hierarchy2"/>
+    <dgm:cxn modelId="{3F4BBB50-227B-4E4B-8186-3ADC31A00B91}" type="presParOf" srcId="{D4BEEA34-09B6-2F46-9BEC-1EEBB06552F3}" destId="{5DAC9447-BDD2-9E43-B909-4E243359A1EA}" srcOrd="1" destOrd="0" presId="urn:microsoft.com/office/officeart/2005/8/layout/hierarchy2"/>
+    <dgm:cxn modelId="{A63B823E-0548-9A4B-BF42-094B3F519888}" type="presParOf" srcId="{5DAC9447-BDD2-9E43-B909-4E243359A1EA}" destId="{579EAB07-4F83-F743-9508-5D825E6D182C}" srcOrd="0" destOrd="0" presId="urn:microsoft.com/office/officeart/2005/8/layout/hierarchy2"/>
+    <dgm:cxn modelId="{9B1FFA45-9775-694F-BF60-37BFC957A849}" type="presParOf" srcId="{579EAB07-4F83-F743-9508-5D825E6D182C}" destId="{3455402C-0615-5140-883D-2091BEC57060}" srcOrd="0" destOrd="0" presId="urn:microsoft.com/office/officeart/2005/8/layout/hierarchy2"/>
+    <dgm:cxn modelId="{8B03BDF4-4261-BD4A-8A60-6F67B165426F}" type="presParOf" srcId="{5DAC9447-BDD2-9E43-B909-4E243359A1EA}" destId="{4D159BF9-163C-BD48-8527-9D25AAAAA168}" srcOrd="1" destOrd="0" presId="urn:microsoft.com/office/officeart/2005/8/layout/hierarchy2"/>
+    <dgm:cxn modelId="{B4F40C0C-5104-5A4B-A5F7-4BECDAE0AC26}" type="presParOf" srcId="{4D159BF9-163C-BD48-8527-9D25AAAAA168}" destId="{EEF9B519-006B-D64A-A894-6F7AC9155FD9}" srcOrd="0" destOrd="0" presId="urn:microsoft.com/office/officeart/2005/8/layout/hierarchy2"/>
+    <dgm:cxn modelId="{4BFF4F8A-91E5-9A4C-B01C-CF31DF47CAF3}" type="presParOf" srcId="{4D159BF9-163C-BD48-8527-9D25AAAAA168}" destId="{E5454DC6-C250-9C4F-850A-E9FCDACA022C}" srcOrd="1" destOrd="0" presId="urn:microsoft.com/office/officeart/2005/8/layout/hierarchy2"/>
+    <dgm:cxn modelId="{9C051E07-0AA7-784A-AD55-B04CC0D75BD8}" type="presParOf" srcId="{E5454DC6-C250-9C4F-850A-E9FCDACA022C}" destId="{FF0504E2-FEC3-884B-B595-DCBAEFD33946}" srcOrd="0" destOrd="0" presId="urn:microsoft.com/office/officeart/2005/8/layout/hierarchy2"/>
+    <dgm:cxn modelId="{0C51E4CC-2AD1-6C45-99C3-BD3549707346}" type="presParOf" srcId="{FF0504E2-FEC3-884B-B595-DCBAEFD33946}" destId="{A99DEBE2-A9C8-9640-947F-1F27481BC737}" srcOrd="0" destOrd="0" presId="urn:microsoft.com/office/officeart/2005/8/layout/hierarchy2"/>
+    <dgm:cxn modelId="{0E34E395-1917-814E-BC60-0AC21229263F}" type="presParOf" srcId="{E5454DC6-C250-9C4F-850A-E9FCDACA022C}" destId="{E4F67987-96F8-6A4A-A2FB-CBA1B366E3C5}" srcOrd="1" destOrd="0" presId="urn:microsoft.com/office/officeart/2005/8/layout/hierarchy2"/>
+    <dgm:cxn modelId="{E6FB7D70-4C60-EB43-8576-82229C1C9654}" type="presParOf" srcId="{E4F67987-96F8-6A4A-A2FB-CBA1B366E3C5}" destId="{87A01F3E-6C55-844D-A489-6FE6695CB6F7}" srcOrd="0" destOrd="0" presId="urn:microsoft.com/office/officeart/2005/8/layout/hierarchy2"/>
+    <dgm:cxn modelId="{3D2B87FD-7F11-AF42-8F47-5E5BB2F9F0B3}" type="presParOf" srcId="{E4F67987-96F8-6A4A-A2FB-CBA1B366E3C5}" destId="{59A98818-16A4-4746-83CE-4AF7710A77D4}" srcOrd="1" destOrd="0" presId="urn:microsoft.com/office/officeart/2005/8/layout/hierarchy2"/>
+    <dgm:cxn modelId="{21D1AAB3-2F73-9C4A-81BE-ABF00BA96176}" type="presParOf" srcId="{E5454DC6-C250-9C4F-850A-E9FCDACA022C}" destId="{180BC466-B29A-4F46-A85D-CA4AB8E5E528}" srcOrd="2" destOrd="0" presId="urn:microsoft.com/office/officeart/2005/8/layout/hierarchy2"/>
+    <dgm:cxn modelId="{DC8342E2-9161-754D-863E-6D3439317594}" type="presParOf" srcId="{180BC466-B29A-4F46-A85D-CA4AB8E5E528}" destId="{A37D193D-BA8D-D841-BBF6-8B93ACA9CA93}" srcOrd="0" destOrd="0" presId="urn:microsoft.com/office/officeart/2005/8/layout/hierarchy2"/>
+    <dgm:cxn modelId="{33B09A27-4A6E-4344-A96B-A042D73137D8}" type="presParOf" srcId="{E5454DC6-C250-9C4F-850A-E9FCDACA022C}" destId="{AFE36984-70CB-5743-868B-9D1AACD819F9}" srcOrd="3" destOrd="0" presId="urn:microsoft.com/office/officeart/2005/8/layout/hierarchy2"/>
+    <dgm:cxn modelId="{9A5BC7B9-B122-EC41-8F12-4B68A8610D80}" type="presParOf" srcId="{AFE36984-70CB-5743-868B-9D1AACD819F9}" destId="{9EADF938-02B1-2C43-8A93-4A4A378C8BDB}" srcOrd="0" destOrd="0" presId="urn:microsoft.com/office/officeart/2005/8/layout/hierarchy2"/>
+    <dgm:cxn modelId="{3A7301CA-11E8-DB4E-8F76-7DB3D97CA259}" type="presParOf" srcId="{AFE36984-70CB-5743-868B-9D1AACD819F9}" destId="{FDF33A1F-8DF9-554F-99D4-45EE059313BC}" srcOrd="1" destOrd="0" presId="urn:microsoft.com/office/officeart/2005/8/layout/hierarchy2"/>
+    <dgm:cxn modelId="{39CD6805-632C-DB45-8417-3854F33B46DF}" type="presParOf" srcId="{5DAC9447-BDD2-9E43-B909-4E243359A1EA}" destId="{DD49C87D-B15D-704F-8833-A4B4C4143ED4}" srcOrd="2" destOrd="0" presId="urn:microsoft.com/office/officeart/2005/8/layout/hierarchy2"/>
+    <dgm:cxn modelId="{C308F12D-7498-8940-921F-875919061F64}" type="presParOf" srcId="{DD49C87D-B15D-704F-8833-A4B4C4143ED4}" destId="{42039CC0-63F7-F24E-99BE-507AD122C4A6}" srcOrd="0" destOrd="0" presId="urn:microsoft.com/office/officeart/2005/8/layout/hierarchy2"/>
+    <dgm:cxn modelId="{31261FEC-75C4-F24A-832B-86C713E3C689}" type="presParOf" srcId="{5DAC9447-BDD2-9E43-B909-4E243359A1EA}" destId="{E1D6F75D-5D8D-4A43-9AD9-B6051EE89439}" srcOrd="3" destOrd="0" presId="urn:microsoft.com/office/officeart/2005/8/layout/hierarchy2"/>
+    <dgm:cxn modelId="{1548D2E9-A799-B24D-BAFE-5B19F44140D8}" type="presParOf" srcId="{E1D6F75D-5D8D-4A43-9AD9-B6051EE89439}" destId="{B371D0DB-D4F9-F54E-B9CA-FAFBC9F2E03D}" srcOrd="0" destOrd="0" presId="urn:microsoft.com/office/officeart/2005/8/layout/hierarchy2"/>
+    <dgm:cxn modelId="{8A7119A5-9850-9346-B048-7E75E2D93F76}" type="presParOf" srcId="{E1D6F75D-5D8D-4A43-9AD9-B6051EE89439}" destId="{0554742E-D4B9-2544-B8F0-FA8345D1032F}" srcOrd="1" destOrd="0" presId="urn:microsoft.com/office/officeart/2005/8/layout/hierarchy2"/>
+    <dgm:cxn modelId="{7E95CC4C-F610-094C-BDC0-C98386A7716C}" type="presParOf" srcId="{2621B116-FEC2-024B-A529-952624AF50D7}" destId="{2D1E9B71-E05F-414C-9C94-D01927894E96}" srcOrd="2" destOrd="0" presId="urn:microsoft.com/office/officeart/2005/8/layout/hierarchy2"/>
+    <dgm:cxn modelId="{A0283CCB-0D53-9341-8CBC-C80D957746AC}" type="presParOf" srcId="{2D1E9B71-E05F-414C-9C94-D01927894E96}" destId="{DF081D17-BB5A-8841-8B93-BD4D83616D20}" srcOrd="0" destOrd="0" presId="urn:microsoft.com/office/officeart/2005/8/layout/hierarchy2"/>
+    <dgm:cxn modelId="{8AC12961-3264-8442-AE7A-2822815F971B}" type="presParOf" srcId="{2621B116-FEC2-024B-A529-952624AF50D7}" destId="{2184EBE1-C0CA-CF4A-9AAA-18BF18AE5881}" srcOrd="3" destOrd="0" presId="urn:microsoft.com/office/officeart/2005/8/layout/hierarchy2"/>
+    <dgm:cxn modelId="{EC52298A-FA47-A040-995B-8FD2B738614D}" type="presParOf" srcId="{2184EBE1-C0CA-CF4A-9AAA-18BF18AE5881}" destId="{F46DFD37-2A53-3145-8804-1FE00FF9EE35}" srcOrd="0" destOrd="0" presId="urn:microsoft.com/office/officeart/2005/8/layout/hierarchy2"/>
+    <dgm:cxn modelId="{73D0C5C5-E997-9B46-8AA7-C0694F11EE6C}" type="presParOf" srcId="{2184EBE1-C0CA-CF4A-9AAA-18BF18AE5881}" destId="{DFF4E02D-E420-8E43-9B06-533FB45D6A87}" srcOrd="1" destOrd="0" presId="urn:microsoft.com/office/officeart/2005/8/layout/hierarchy2"/>
+    <dgm:cxn modelId="{203556EB-296F-984C-A148-6B49536FD1A3}" type="presParOf" srcId="{DFF4E02D-E420-8E43-9B06-533FB45D6A87}" destId="{869EE02D-617D-B44A-B5B1-15C6745F808C}" srcOrd="0" destOrd="0" presId="urn:microsoft.com/office/officeart/2005/8/layout/hierarchy2"/>
+    <dgm:cxn modelId="{B97918EA-7263-E041-8711-0236B7B9C104}" type="presParOf" srcId="{869EE02D-617D-B44A-B5B1-15C6745F808C}" destId="{15390832-3CB7-A648-B93F-B9552C39E0C7}" srcOrd="0" destOrd="0" presId="urn:microsoft.com/office/officeart/2005/8/layout/hierarchy2"/>
+    <dgm:cxn modelId="{7B52ACB7-9FBF-1948-9023-DC74FA3DA283}" type="presParOf" srcId="{DFF4E02D-E420-8E43-9B06-533FB45D6A87}" destId="{1AF0473B-AA8E-214D-93A2-63C6C783545F}" srcOrd="1" destOrd="0" presId="urn:microsoft.com/office/officeart/2005/8/layout/hierarchy2"/>
+    <dgm:cxn modelId="{4AC06F95-5AAC-5646-B018-1B97289AF942}" type="presParOf" srcId="{1AF0473B-AA8E-214D-93A2-63C6C783545F}" destId="{BC80C050-C05C-EE4F-8A85-26778F146866}" srcOrd="0" destOrd="0" presId="urn:microsoft.com/office/officeart/2005/8/layout/hierarchy2"/>
+    <dgm:cxn modelId="{04457D46-D94F-724A-97C4-322B4ECBFB8A}" type="presParOf" srcId="{1AF0473B-AA8E-214D-93A2-63C6C783545F}" destId="{D3983196-DF97-F94C-9A81-9808004A2CDA}" srcOrd="1" destOrd="0" presId="urn:microsoft.com/office/officeart/2005/8/layout/hierarchy2"/>
+    <dgm:cxn modelId="{5AA56DC7-B211-A44D-A97C-804282E634A7}" type="presParOf" srcId="{DFF4E02D-E420-8E43-9B06-533FB45D6A87}" destId="{6720575C-1BAC-0144-BC7F-01F88A777532}" srcOrd="2" destOrd="0" presId="urn:microsoft.com/office/officeart/2005/8/layout/hierarchy2"/>
+    <dgm:cxn modelId="{3C0C7ABD-0186-C24E-B197-AE2230955A3D}" type="presParOf" srcId="{6720575C-1BAC-0144-BC7F-01F88A777532}" destId="{BFFD3F83-879B-344E-9F97-BBFA92EBA5A1}" srcOrd="0" destOrd="0" presId="urn:microsoft.com/office/officeart/2005/8/layout/hierarchy2"/>
+    <dgm:cxn modelId="{C64F0537-E3A6-0943-A0C1-91CF6850EFAA}" type="presParOf" srcId="{DFF4E02D-E420-8E43-9B06-533FB45D6A87}" destId="{28F8F523-F5B1-3548-AEA4-6A99D9B09239}" srcOrd="3" destOrd="0" presId="urn:microsoft.com/office/officeart/2005/8/layout/hierarchy2"/>
+    <dgm:cxn modelId="{DFA84970-1CC8-F749-963D-F9A95E4E90D3}" type="presParOf" srcId="{28F8F523-F5B1-3548-AEA4-6A99D9B09239}" destId="{D54C132A-9E8C-C649-BA54-66D04BA9F9D2}" srcOrd="0" destOrd="0" presId="urn:microsoft.com/office/officeart/2005/8/layout/hierarchy2"/>
+    <dgm:cxn modelId="{FA676AC7-F2EC-1F45-ABC6-71B477FFA0D0}" type="presParOf" srcId="{28F8F523-F5B1-3548-AEA4-6A99D9B09239}" destId="{D33145FA-17D5-7E4A-82CD-695D3D79B00C}" srcOrd="1" destOrd="0" presId="urn:microsoft.com/office/officeart/2005/8/layout/hierarchy2"/>
+    <dgm:cxn modelId="{D8EFA0C2-028F-154E-8581-6DD875B7BFC4}" type="presParOf" srcId="{22BF3431-5CB6-A548-8AFC-FD73A5E82A29}" destId="{D7596022-8BF6-2F44-B88B-8E372A8354ED}" srcOrd="2" destOrd="0" presId="urn:microsoft.com/office/officeart/2005/8/layout/hierarchy2"/>
+    <dgm:cxn modelId="{D26F4CC0-E5DE-2749-B85C-AF857FB35304}" type="presParOf" srcId="{D7596022-8BF6-2F44-B88B-8E372A8354ED}" destId="{17B51E74-34E2-7D49-AA23-10FE3919CFB0}" srcOrd="0" destOrd="0" presId="urn:microsoft.com/office/officeart/2005/8/layout/hierarchy2"/>
+    <dgm:cxn modelId="{7E1F8550-92A9-AF46-B171-15448492772C}" type="presParOf" srcId="{22BF3431-5CB6-A548-8AFC-FD73A5E82A29}" destId="{C007AC2C-2EC9-6C44-A699-CA6AE9B8655D}" srcOrd="3" destOrd="0" presId="urn:microsoft.com/office/officeart/2005/8/layout/hierarchy2"/>
+    <dgm:cxn modelId="{D96C2C6B-72E0-8540-ADF1-C750C12D54CA}" type="presParOf" srcId="{C007AC2C-2EC9-6C44-A699-CA6AE9B8655D}" destId="{9CA221DE-8BA7-C642-A298-1EBC15C1C54E}" srcOrd="0" destOrd="0" presId="urn:microsoft.com/office/officeart/2005/8/layout/hierarchy2"/>
+    <dgm:cxn modelId="{3B5E8A82-901F-D040-8511-891FDB499CA5}" type="presParOf" srcId="{C007AC2C-2EC9-6C44-A699-CA6AE9B8655D}" destId="{87D61914-56D8-7D43-A69D-CE66D030DE47}" srcOrd="1" destOrd="0" presId="urn:microsoft.com/office/officeart/2005/8/layout/hierarchy2"/>
+    <dgm:cxn modelId="{385E9207-8F34-0542-8B9C-05886B790B39}" type="presParOf" srcId="{87D61914-56D8-7D43-A69D-CE66D030DE47}" destId="{557D6FDE-1A5F-A343-AAC9-B64134858DAA}" srcOrd="0" destOrd="0" presId="urn:microsoft.com/office/officeart/2005/8/layout/hierarchy2"/>
+    <dgm:cxn modelId="{BBDCAFE8-2E51-A24B-9DE5-1251725C0F41}" type="presParOf" srcId="{557D6FDE-1A5F-A343-AAC9-B64134858DAA}" destId="{C4443B60-ECB6-1343-A45F-07FEEC62928B}" srcOrd="0" destOrd="0" presId="urn:microsoft.com/office/officeart/2005/8/layout/hierarchy2"/>
+    <dgm:cxn modelId="{715EBF93-B897-8D43-9849-8B3186C63E5A}" type="presParOf" srcId="{87D61914-56D8-7D43-A69D-CE66D030DE47}" destId="{5B928F95-2A80-9144-A01A-A3556977B2BD}" srcOrd="1" destOrd="0" presId="urn:microsoft.com/office/officeart/2005/8/layout/hierarchy2"/>
+    <dgm:cxn modelId="{A0CDDB58-E207-B64E-A2FD-85E620FCE9CE}" type="presParOf" srcId="{5B928F95-2A80-9144-A01A-A3556977B2BD}" destId="{ABF00753-ADCF-6A42-88C3-5F8E14C158F3}" srcOrd="0" destOrd="0" presId="urn:microsoft.com/office/officeart/2005/8/layout/hierarchy2"/>
+    <dgm:cxn modelId="{99939AB2-FBD9-BA41-BE96-59DBD681CF25}" type="presParOf" srcId="{5B928F95-2A80-9144-A01A-A3556977B2BD}" destId="{CCB47E8E-0439-B84E-AAC8-9755722EC914}" srcOrd="1" destOrd="0" presId="urn:microsoft.com/office/officeart/2005/8/layout/hierarchy2"/>
+    <dgm:cxn modelId="{F168933B-B631-0C4D-8D62-A1F4BF915D45}" type="presParOf" srcId="{CCB47E8E-0439-B84E-AAC8-9755722EC914}" destId="{22F37B2C-0144-4B42-B610-EDE869332C91}" srcOrd="0" destOrd="0" presId="urn:microsoft.com/office/officeart/2005/8/layout/hierarchy2"/>
+    <dgm:cxn modelId="{8BBB83F0-ADA3-204A-A3C1-7E30AD9E1421}" type="presParOf" srcId="{22F37B2C-0144-4B42-B610-EDE869332C91}" destId="{3A7EA8F2-16F7-6D4B-B19E-6E24918EA42B}" srcOrd="0" destOrd="0" presId="urn:microsoft.com/office/officeart/2005/8/layout/hierarchy2"/>
+    <dgm:cxn modelId="{B188916C-5E80-E143-8350-130473BA663A}" type="presParOf" srcId="{CCB47E8E-0439-B84E-AAC8-9755722EC914}" destId="{84E57F8A-7884-7447-990E-1633FF21CF70}" srcOrd="1" destOrd="0" presId="urn:microsoft.com/office/officeart/2005/8/layout/hierarchy2"/>
+    <dgm:cxn modelId="{7EC35AF3-00D0-6440-A7A0-F9578EEB67F8}" type="presParOf" srcId="{84E57F8A-7884-7447-990E-1633FF21CF70}" destId="{DA5BF4BB-05E1-0E46-B48F-BE2DEE98665B}" srcOrd="0" destOrd="0" presId="urn:microsoft.com/office/officeart/2005/8/layout/hierarchy2"/>
+    <dgm:cxn modelId="{0BD5D80D-6C79-F545-87EE-486A890BC398}" type="presParOf" srcId="{84E57F8A-7884-7447-990E-1633FF21CF70}" destId="{DF0395F5-1E8C-9E48-8267-6EF17C2A0DA2}" srcOrd="1" destOrd="0" presId="urn:microsoft.com/office/officeart/2005/8/layout/hierarchy2"/>
+    <dgm:cxn modelId="{CA667591-BC30-F749-AC7F-34BFE436ADE4}" type="presParOf" srcId="{DF0395F5-1E8C-9E48-8267-6EF17C2A0DA2}" destId="{622CDB72-9FE3-E446-8D99-51F2FE63E17B}" srcOrd="0" destOrd="0" presId="urn:microsoft.com/office/officeart/2005/8/layout/hierarchy2"/>
+    <dgm:cxn modelId="{48904CAE-2971-5340-A37A-12A7193C30B2}" type="presParOf" srcId="{622CDB72-9FE3-E446-8D99-51F2FE63E17B}" destId="{999F5CA8-9E6C-F741-B72D-1CBCFB0A9AFA}" srcOrd="0" destOrd="0" presId="urn:microsoft.com/office/officeart/2005/8/layout/hierarchy2"/>
+    <dgm:cxn modelId="{E837E077-56EB-A34D-A39E-342133F08E21}" type="presParOf" srcId="{DF0395F5-1E8C-9E48-8267-6EF17C2A0DA2}" destId="{C54DEB9E-51D0-3540-92C2-4820C63F494E}" srcOrd="1" destOrd="0" presId="urn:microsoft.com/office/officeart/2005/8/layout/hierarchy2"/>
+    <dgm:cxn modelId="{9F437C90-B381-0147-ABB4-ED1BE0131746}" type="presParOf" srcId="{C54DEB9E-51D0-3540-92C2-4820C63F494E}" destId="{64730E10-34D9-EB40-9A15-71653BD55138}" srcOrd="0" destOrd="0" presId="urn:microsoft.com/office/officeart/2005/8/layout/hierarchy2"/>
+    <dgm:cxn modelId="{6B93D3BD-B88C-FE48-945F-C7FDA183AD5E}" type="presParOf" srcId="{C54DEB9E-51D0-3540-92C2-4820C63F494E}" destId="{0B897CC9-EF58-6B4A-B032-3869518C427D}" srcOrd="1" destOrd="0" presId="urn:microsoft.com/office/officeart/2005/8/layout/hierarchy2"/>
+    <dgm:cxn modelId="{1A042E06-61A9-4440-B39E-6C4834C7C724}" type="presParOf" srcId="{0B897CC9-EF58-6B4A-B032-3869518C427D}" destId="{AE527926-7596-084F-836D-CE44E210925D}" srcOrd="0" destOrd="0" presId="urn:microsoft.com/office/officeart/2005/8/layout/hierarchy2"/>
+    <dgm:cxn modelId="{F4583CFC-9D3E-FA49-A7FD-45F28888ACC9}" type="presParOf" srcId="{AE527926-7596-084F-836D-CE44E210925D}" destId="{E20C8D68-D800-1B40-A349-E4C52EEA6DBB}" srcOrd="0" destOrd="0" presId="urn:microsoft.com/office/officeart/2005/8/layout/hierarchy2"/>
+    <dgm:cxn modelId="{D167D47A-0D0E-BC4E-B1DE-B73FDD086D82}" type="presParOf" srcId="{0B897CC9-EF58-6B4A-B032-3869518C427D}" destId="{8D15DFB1-6BB6-264C-97B2-E08857AECF60}" srcOrd="1" destOrd="0" presId="urn:microsoft.com/office/officeart/2005/8/layout/hierarchy2"/>
+    <dgm:cxn modelId="{C1458188-7464-6C47-A29F-6724844B7DD7}" type="presParOf" srcId="{8D15DFB1-6BB6-264C-97B2-E08857AECF60}" destId="{1AC5AEE2-E726-6949-8FEB-26946D8A5549}" srcOrd="0" destOrd="0" presId="urn:microsoft.com/office/officeart/2005/8/layout/hierarchy2"/>
+    <dgm:cxn modelId="{76967544-ABCD-5042-B3C7-62906005F96A}" type="presParOf" srcId="{8D15DFB1-6BB6-264C-97B2-E08857AECF60}" destId="{CAAE6E7E-3C66-C74F-8D47-E2B8FEE54E1A}" srcOrd="1" destOrd="0" presId="urn:microsoft.com/office/officeart/2005/8/layout/hierarchy2"/>
+    <dgm:cxn modelId="{A09ADC64-535C-E445-9984-2B0BB79DACF0}" type="presParOf" srcId="{CAAE6E7E-3C66-C74F-8D47-E2B8FEE54E1A}" destId="{0B37985A-F439-1845-B8DC-86E79F8066D1}" srcOrd="0" destOrd="0" presId="urn:microsoft.com/office/officeart/2005/8/layout/hierarchy2"/>
+    <dgm:cxn modelId="{8A55402E-F4F7-9043-A3B4-6967AFEC691B}" type="presParOf" srcId="{0B37985A-F439-1845-B8DC-86E79F8066D1}" destId="{89D62D01-044A-5E49-BF87-E08569D899ED}" srcOrd="0" destOrd="0" presId="urn:microsoft.com/office/officeart/2005/8/layout/hierarchy2"/>
+    <dgm:cxn modelId="{F04CE4F1-3E55-C44F-B97C-CF9A9C193FA7}" type="presParOf" srcId="{CAAE6E7E-3C66-C74F-8D47-E2B8FEE54E1A}" destId="{066E29CF-6128-0648-B8F7-1B6E27951783}" srcOrd="1" destOrd="0" presId="urn:microsoft.com/office/officeart/2005/8/layout/hierarchy2"/>
+    <dgm:cxn modelId="{7FF44EAF-F0C2-E049-81F1-0C535663522A}" type="presParOf" srcId="{066E29CF-6128-0648-B8F7-1B6E27951783}" destId="{D6692AF1-A2BC-EF40-9178-4475E39B2EF6}" srcOrd="0" destOrd="0" presId="urn:microsoft.com/office/officeart/2005/8/layout/hierarchy2"/>
+    <dgm:cxn modelId="{67150076-B4A8-DB4B-A3A9-B44C722B8AD3}" type="presParOf" srcId="{066E29CF-6128-0648-B8F7-1B6E27951783}" destId="{C8274F6F-BDED-8D4E-BB65-3E74AC91CA60}" srcOrd="1" destOrd="0" presId="urn:microsoft.com/office/officeart/2005/8/layout/hierarchy2"/>
+    <dgm:cxn modelId="{A3646B14-850F-5F4C-9E11-0A660BAD549A}" type="presParOf" srcId="{C8274F6F-BDED-8D4E-BB65-3E74AC91CA60}" destId="{6C711774-F7B9-7448-AFA4-AA549455F4F8}" srcOrd="0" destOrd="0" presId="urn:microsoft.com/office/officeart/2005/8/layout/hierarchy2"/>
+    <dgm:cxn modelId="{4F537428-10EF-8548-A7E7-3D751A372074}" type="presParOf" srcId="{6C711774-F7B9-7448-AFA4-AA549455F4F8}" destId="{B8FA6677-848E-B341-89B2-AB26EA8F8983}" srcOrd="0" destOrd="0" presId="urn:microsoft.com/office/officeart/2005/8/layout/hierarchy2"/>
+    <dgm:cxn modelId="{A8B5CDF7-84DA-BB4A-9DE5-5807E049E7E0}" type="presParOf" srcId="{C8274F6F-BDED-8D4E-BB65-3E74AC91CA60}" destId="{43856134-03E5-A14E-A8FE-D4291140F40F}" srcOrd="1" destOrd="0" presId="urn:microsoft.com/office/officeart/2005/8/layout/hierarchy2"/>
+    <dgm:cxn modelId="{67312AEB-BFAC-184C-BCC1-DA1365F179E1}" type="presParOf" srcId="{43856134-03E5-A14E-A8FE-D4291140F40F}" destId="{B8C27370-6C50-BC4C-B96A-F7009FCE9B29}" srcOrd="0" destOrd="0" presId="urn:microsoft.com/office/officeart/2005/8/layout/hierarchy2"/>
+    <dgm:cxn modelId="{5A5D90AD-0BB8-F148-8276-82B3260E96C4}" type="presParOf" srcId="{43856134-03E5-A14E-A8FE-D4291140F40F}" destId="{420C22EA-31B8-C44A-9FD3-E0930664A3D4}" srcOrd="1" destOrd="0" presId="urn:microsoft.com/office/officeart/2005/8/layout/hierarchy2"/>
+    <dgm:cxn modelId="{8AD01B18-6F8D-424E-BF65-5C25C44CF5E3}" type="presParOf" srcId="{420C22EA-31B8-C44A-9FD3-E0930664A3D4}" destId="{CDF88616-E8B3-974C-B110-36BD4AC3B825}" srcOrd="0" destOrd="0" presId="urn:microsoft.com/office/officeart/2005/8/layout/hierarchy2"/>
+    <dgm:cxn modelId="{68E49384-C9EB-C347-BCFB-343D84DEB234}" type="presParOf" srcId="{CDF88616-E8B3-974C-B110-36BD4AC3B825}" destId="{6A216B04-6334-174E-8CE0-43440AFADB3F}" srcOrd="0" destOrd="0" presId="urn:microsoft.com/office/officeart/2005/8/layout/hierarchy2"/>
+    <dgm:cxn modelId="{E8BDB6EB-0416-2143-8961-26F4642B7D23}" type="presParOf" srcId="{420C22EA-31B8-C44A-9FD3-E0930664A3D4}" destId="{CC3E32CD-2A44-6A45-A849-8BC305DB350A}" srcOrd="1" destOrd="0" presId="urn:microsoft.com/office/officeart/2005/8/layout/hierarchy2"/>
+    <dgm:cxn modelId="{260C4B6A-EC6C-A245-BA3A-E42DD116584D}" type="presParOf" srcId="{CC3E32CD-2A44-6A45-A849-8BC305DB350A}" destId="{4CBA9568-78F6-874F-BAE1-422DBB36998B}" srcOrd="0" destOrd="0" presId="urn:microsoft.com/office/officeart/2005/8/layout/hierarchy2"/>
+    <dgm:cxn modelId="{9252A1C8-B1A7-8E44-B2C6-848DF26F3EAE}" type="presParOf" srcId="{CC3E32CD-2A44-6A45-A849-8BC305DB350A}" destId="{98E29829-2104-3448-870B-CDD6F1132600}" srcOrd="1" destOrd="0" presId="urn:microsoft.com/office/officeart/2005/8/layout/hierarchy2"/>
+    <dgm:cxn modelId="{06A94E07-7EA3-EB42-9A53-4167B079F3DC}" type="presParOf" srcId="{420C22EA-31B8-C44A-9FD3-E0930664A3D4}" destId="{178DCFF1-CC55-904C-80A7-201C4962CD0C}" srcOrd="2" destOrd="0" presId="urn:microsoft.com/office/officeart/2005/8/layout/hierarchy2"/>
+    <dgm:cxn modelId="{D6AF57F0-05C1-8342-8237-7BCFF7A9FACC}" type="presParOf" srcId="{178DCFF1-CC55-904C-80A7-201C4962CD0C}" destId="{188FEBA0-2EEA-BF48-BFFD-9861C935AD27}" srcOrd="0" destOrd="0" presId="urn:microsoft.com/office/officeart/2005/8/layout/hierarchy2"/>
+    <dgm:cxn modelId="{810CBD67-B162-184F-8E8E-7858D3BCAF72}" type="presParOf" srcId="{420C22EA-31B8-C44A-9FD3-E0930664A3D4}" destId="{47110B4E-EB42-BA47-957D-4C32AAE3E1AE}" srcOrd="3" destOrd="0" presId="urn:microsoft.com/office/officeart/2005/8/layout/hierarchy2"/>
+    <dgm:cxn modelId="{30D1E4C7-0674-3C48-AA06-0C04CBB53F3A}" type="presParOf" srcId="{47110B4E-EB42-BA47-957D-4C32AAE3E1AE}" destId="{E82A36AA-0C9C-1243-965F-505DB32A7A7C}" srcOrd="0" destOrd="0" presId="urn:microsoft.com/office/officeart/2005/8/layout/hierarchy2"/>
+    <dgm:cxn modelId="{94FD76FC-A1F1-3E48-90DA-94D0D6641DCB}" type="presParOf" srcId="{47110B4E-EB42-BA47-957D-4C32AAE3E1AE}" destId="{32766C5B-C0DF-754A-830F-F00D88629829}" srcOrd="1" destOrd="0" presId="urn:microsoft.com/office/officeart/2005/8/layout/hierarchy2"/>
+    <dgm:cxn modelId="{E5F68652-EEFE-4949-854A-A0046E505076}" type="presParOf" srcId="{32766C5B-C0DF-754A-830F-F00D88629829}" destId="{F6FDF62A-4F89-A044-8B79-891849B97CC4}" srcOrd="0" destOrd="0" presId="urn:microsoft.com/office/officeart/2005/8/layout/hierarchy2"/>
+    <dgm:cxn modelId="{9AD78AFE-1A99-F645-8CBE-C6B09D4976CD}" type="presParOf" srcId="{F6FDF62A-4F89-A044-8B79-891849B97CC4}" destId="{41B3D365-4B97-A64F-B00F-8B4601200E94}" srcOrd="0" destOrd="0" presId="urn:microsoft.com/office/officeart/2005/8/layout/hierarchy2"/>
+    <dgm:cxn modelId="{82E8C4B2-B54F-A346-835B-CFCAABD0DB2C}" type="presParOf" srcId="{32766C5B-C0DF-754A-830F-F00D88629829}" destId="{9A82C880-6A7D-9742-A14A-486B5C72D281}" srcOrd="1" destOrd="0" presId="urn:microsoft.com/office/officeart/2005/8/layout/hierarchy2"/>
+    <dgm:cxn modelId="{B5AD9B84-CBE3-E146-84EF-67571D98667A}" type="presParOf" srcId="{9A82C880-6A7D-9742-A14A-486B5C72D281}" destId="{5B9880E6-BA2C-2E4D-838B-9DD0423AE609}" srcOrd="0" destOrd="0" presId="urn:microsoft.com/office/officeart/2005/8/layout/hierarchy2"/>
+    <dgm:cxn modelId="{02CC5783-399E-6542-A0BD-B8A0A460BA3C}" type="presParOf" srcId="{9A82C880-6A7D-9742-A14A-486B5C72D281}" destId="{9B6E72DC-391F-4746-AAA7-2D0EB6662689}" srcOrd="1" destOrd="0" presId="urn:microsoft.com/office/officeart/2005/8/layout/hierarchy2"/>
+    <dgm:cxn modelId="{FBD21407-E32E-7849-99A1-131D61DE0AB2}" type="presParOf" srcId="{9B6E72DC-391F-4746-AAA7-2D0EB6662689}" destId="{1A3852B0-3C08-8346-B30F-DB387753D752}" srcOrd="0" destOrd="0" presId="urn:microsoft.com/office/officeart/2005/8/layout/hierarchy2"/>
+    <dgm:cxn modelId="{1B63DD50-7F89-1C40-9A76-A03788832C69}" type="presParOf" srcId="{1A3852B0-3C08-8346-B30F-DB387753D752}" destId="{41A60FF1-F20F-0448-80F5-03D17D8A4922}" srcOrd="0" destOrd="0" presId="urn:microsoft.com/office/officeart/2005/8/layout/hierarchy2"/>
+    <dgm:cxn modelId="{21839932-612D-0440-A752-5BF7A59B8430}" type="presParOf" srcId="{9B6E72DC-391F-4746-AAA7-2D0EB6662689}" destId="{BBCAC040-E2DB-AB4A-8AF0-10C15525D014}" srcOrd="1" destOrd="0" presId="urn:microsoft.com/office/officeart/2005/8/layout/hierarchy2"/>
+    <dgm:cxn modelId="{2FB4F6EB-8868-D04B-A0F0-25B021926E43}" type="presParOf" srcId="{BBCAC040-E2DB-AB4A-8AF0-10C15525D014}" destId="{225564EB-75DD-F042-994E-EC3A2D54F08F}" srcOrd="0" destOrd="0" presId="urn:microsoft.com/office/officeart/2005/8/layout/hierarchy2"/>
+    <dgm:cxn modelId="{73523628-08AA-5744-BF1E-DDDA05EC829B}" type="presParOf" srcId="{BBCAC040-E2DB-AB4A-8AF0-10C15525D014}" destId="{61F46161-454D-F548-8079-F889517F3EB7}" srcOrd="1" destOrd="0" presId="urn:microsoft.com/office/officeart/2005/8/layout/hierarchy2"/>
+    <dgm:cxn modelId="{7369E8E0-A4A0-DC43-A4FB-10D990EEDF23}" type="presParOf" srcId="{9B6E72DC-391F-4746-AAA7-2D0EB6662689}" destId="{A5B33E4E-336A-0B40-8C52-A2221287F345}" srcOrd="2" destOrd="0" presId="urn:microsoft.com/office/officeart/2005/8/layout/hierarchy2"/>
+    <dgm:cxn modelId="{6A016E4D-D20C-8646-8FCF-EB2CAB23CC9B}" type="presParOf" srcId="{A5B33E4E-336A-0B40-8C52-A2221287F345}" destId="{BE34ED06-A23A-F749-8104-B508C9262FDE}" srcOrd="0" destOrd="0" presId="urn:microsoft.com/office/officeart/2005/8/layout/hierarchy2"/>
+    <dgm:cxn modelId="{97141735-269A-B245-8F54-1F4B921B1A55}" type="presParOf" srcId="{9B6E72DC-391F-4746-AAA7-2D0EB6662689}" destId="{985744FB-7BAB-1A44-9722-4113A2C373BD}" srcOrd="3" destOrd="0" presId="urn:microsoft.com/office/officeart/2005/8/layout/hierarchy2"/>
+    <dgm:cxn modelId="{99699D75-F15E-F147-905E-1E5F064A280D}" type="presParOf" srcId="{985744FB-7BAB-1A44-9722-4113A2C373BD}" destId="{07354C4D-1110-8245-ACDF-A7DFEEBFD7F3}" srcOrd="0" destOrd="0" presId="urn:microsoft.com/office/officeart/2005/8/layout/hierarchy2"/>
+    <dgm:cxn modelId="{8EE04C04-9A1A-5242-9CCE-EB16C4E99A45}" type="presParOf" srcId="{985744FB-7BAB-1A44-9722-4113A2C373BD}" destId="{5F490B55-C660-6E4D-82F8-30AD97E17EAE}" srcOrd="1" destOrd="0" presId="urn:microsoft.com/office/officeart/2005/8/layout/hierarchy2"/>
+    <dgm:cxn modelId="{DF1B50DE-4B1F-704A-ABC1-E34526617929}" type="presParOf" srcId="{CAAE6E7E-3C66-C74F-8D47-E2B8FEE54E1A}" destId="{5230EDD4-2155-4C4B-9D01-61125A45B27E}" srcOrd="2" destOrd="0" presId="urn:microsoft.com/office/officeart/2005/8/layout/hierarchy2"/>
+    <dgm:cxn modelId="{6406EE65-7DD2-094B-B7E6-2DF953F18C0C}" type="presParOf" srcId="{5230EDD4-2155-4C4B-9D01-61125A45B27E}" destId="{062A7194-78C8-F943-A247-3B3F469D7F62}" srcOrd="0" destOrd="0" presId="urn:microsoft.com/office/officeart/2005/8/layout/hierarchy2"/>
+    <dgm:cxn modelId="{B6F6DA1D-DBCD-6240-A095-D78C2338EDAF}" type="presParOf" srcId="{CAAE6E7E-3C66-C74F-8D47-E2B8FEE54E1A}" destId="{68685D26-F45A-0249-8C44-58A68F4E8E41}" srcOrd="3" destOrd="0" presId="urn:microsoft.com/office/officeart/2005/8/layout/hierarchy2"/>
+    <dgm:cxn modelId="{BE424D5A-BC5B-6344-B3F1-8CFF502A2E7D}" type="presParOf" srcId="{68685D26-F45A-0249-8C44-58A68F4E8E41}" destId="{74606542-DF75-9244-9F75-2B19D3C6F8C9}" srcOrd="0" destOrd="0" presId="urn:microsoft.com/office/officeart/2005/8/layout/hierarchy2"/>
+    <dgm:cxn modelId="{F3EDE7D4-0C56-EA40-87C4-9DB8D5215B77}" type="presParOf" srcId="{68685D26-F45A-0249-8C44-58A68F4E8E41}" destId="{683DEBD1-C165-1147-AFE7-984E82E6B1D2}" srcOrd="1" destOrd="0" presId="urn:microsoft.com/office/officeart/2005/8/layout/hierarchy2"/>
+    <dgm:cxn modelId="{633D56FC-D297-AB4B-A5F3-AB9B09C71F21}" type="presParOf" srcId="{683DEBD1-C165-1147-AFE7-984E82E6B1D2}" destId="{2C48A912-7C0B-D34F-8BCD-E79759DED104}" srcOrd="0" destOrd="0" presId="urn:microsoft.com/office/officeart/2005/8/layout/hierarchy2"/>
+    <dgm:cxn modelId="{5FA6E145-7568-5641-BA72-97343872336F}" type="presParOf" srcId="{2C48A912-7C0B-D34F-8BCD-E79759DED104}" destId="{3C75570A-8614-8C43-96B0-36C4AA3C4F70}" srcOrd="0" destOrd="0" presId="urn:microsoft.com/office/officeart/2005/8/layout/hierarchy2"/>
+    <dgm:cxn modelId="{A8476B3B-D071-7F4B-BBB8-E18503278F49}" type="presParOf" srcId="{683DEBD1-C165-1147-AFE7-984E82E6B1D2}" destId="{B6CD3AB0-EB80-754C-8255-700DE8BD8608}" srcOrd="1" destOrd="0" presId="urn:microsoft.com/office/officeart/2005/8/layout/hierarchy2"/>
+    <dgm:cxn modelId="{908FBA94-607F-F44D-BFDA-5E3BA73DDCC7}" type="presParOf" srcId="{B6CD3AB0-EB80-754C-8255-700DE8BD8608}" destId="{19E436B0-A0B1-4242-BFBA-BB12B5B5F574}" srcOrd="0" destOrd="0" presId="urn:microsoft.com/office/officeart/2005/8/layout/hierarchy2"/>
+    <dgm:cxn modelId="{343664B7-A27D-8745-9F50-85F7E77D40C0}" type="presParOf" srcId="{B6CD3AB0-EB80-754C-8255-700DE8BD8608}" destId="{7D02E330-57D1-2249-AE72-AF0EA3AC5426}" srcOrd="1" destOrd="0" presId="urn:microsoft.com/office/officeart/2005/8/layout/hierarchy2"/>
+    <dgm:cxn modelId="{9C1D9A33-754E-6C4A-8CF0-BA6DEBDFCEBB}" type="presParOf" srcId="{7D02E330-57D1-2249-AE72-AF0EA3AC5426}" destId="{1EB97A9B-9DB3-9746-B7CA-25A9127E658D}" srcOrd="0" destOrd="0" presId="urn:microsoft.com/office/officeart/2005/8/layout/hierarchy2"/>
+    <dgm:cxn modelId="{F5FA0D87-5C5E-FA4B-84FA-2FE72EA965C5}" type="presParOf" srcId="{1EB97A9B-9DB3-9746-B7CA-25A9127E658D}" destId="{5BDCA2FD-50B3-DD41-B739-4C6FB692068F}" srcOrd="0" destOrd="0" presId="urn:microsoft.com/office/officeart/2005/8/layout/hierarchy2"/>
+    <dgm:cxn modelId="{4538E115-8E88-224C-9235-2B09EBD3E0E1}" type="presParOf" srcId="{7D02E330-57D1-2249-AE72-AF0EA3AC5426}" destId="{1A766636-ACA3-5343-8F20-EA71F3F235B2}" srcOrd="1" destOrd="0" presId="urn:microsoft.com/office/officeart/2005/8/layout/hierarchy2"/>
+    <dgm:cxn modelId="{0753CA01-2BA2-B449-B0B2-2ECFDC288242}" type="presParOf" srcId="{1A766636-ACA3-5343-8F20-EA71F3F235B2}" destId="{EE1464C4-316F-E04B-8F78-14DC107A8C10}" srcOrd="0" destOrd="0" presId="urn:microsoft.com/office/officeart/2005/8/layout/hierarchy2"/>
+    <dgm:cxn modelId="{B31010D8-589B-BC40-B5B6-3246245FF2CC}" type="presParOf" srcId="{1A766636-ACA3-5343-8F20-EA71F3F235B2}" destId="{7BF48219-8B8F-5043-A3CC-73CB22EABDD2}" srcOrd="1" destOrd="0" presId="urn:microsoft.com/office/officeart/2005/8/layout/hierarchy2"/>
+    <dgm:cxn modelId="{E29B1342-C317-5F4D-8849-0C291F01261F}" type="presParOf" srcId="{7D02E330-57D1-2249-AE72-AF0EA3AC5426}" destId="{BFED5B89-8694-FF4F-9CB3-2BB9C40DD18B}" srcOrd="2" destOrd="0" presId="urn:microsoft.com/office/officeart/2005/8/layout/hierarchy2"/>
+    <dgm:cxn modelId="{B1039C7A-A6CB-954A-B761-BA7CDF7213ED}" type="presParOf" srcId="{BFED5B89-8694-FF4F-9CB3-2BB9C40DD18B}" destId="{B814019D-DF4F-304F-8975-6C097F6D3E30}" srcOrd="0" destOrd="0" presId="urn:microsoft.com/office/officeart/2005/8/layout/hierarchy2"/>
+    <dgm:cxn modelId="{F9114794-ED46-7C48-88FD-2F9EA93A50E0}" type="presParOf" srcId="{7D02E330-57D1-2249-AE72-AF0EA3AC5426}" destId="{C3B2522B-FEE8-7541-8BCE-20AEEEF84FA9}" srcOrd="3" destOrd="0" presId="urn:microsoft.com/office/officeart/2005/8/layout/hierarchy2"/>
+    <dgm:cxn modelId="{525904AE-0996-A644-B148-49205831B9A8}" type="presParOf" srcId="{C3B2522B-FEE8-7541-8BCE-20AEEEF84FA9}" destId="{CB80B394-5FA1-F64A-8C46-262DC0EAFF0C}" srcOrd="0" destOrd="0" presId="urn:microsoft.com/office/officeart/2005/8/layout/hierarchy2"/>
+    <dgm:cxn modelId="{E9E78BB7-76EB-B24C-8FF7-F9FE321A30F6}" type="presParOf" srcId="{C3B2522B-FEE8-7541-8BCE-20AEEEF84FA9}" destId="{AD5EC6A6-F444-6140-A556-21F3E25845A3}" srcOrd="1" destOrd="0" presId="urn:microsoft.com/office/officeart/2005/8/layout/hierarchy2"/>
+    <dgm:cxn modelId="{EF6DC865-0627-484A-ABCA-C445AB036F1F}" type="presParOf" srcId="{AD5EC6A6-F444-6140-A556-21F3E25845A3}" destId="{9D8B8718-1219-3340-BF7B-D6462FA11EE9}" srcOrd="0" destOrd="0" presId="urn:microsoft.com/office/officeart/2005/8/layout/hierarchy2"/>
+    <dgm:cxn modelId="{26796407-4FB3-534C-9B65-51028BA88126}" type="presParOf" srcId="{9D8B8718-1219-3340-BF7B-D6462FA11EE9}" destId="{61440551-8B50-B440-BAAC-4ACBEC254999}" srcOrd="0" destOrd="0" presId="urn:microsoft.com/office/officeart/2005/8/layout/hierarchy2"/>
+    <dgm:cxn modelId="{AA59F4B9-1417-2D40-8CC9-C39A21DDABE0}" type="presParOf" srcId="{AD5EC6A6-F444-6140-A556-21F3E25845A3}" destId="{40220438-574A-934A-B52A-D4C09F85442C}" srcOrd="1" destOrd="0" presId="urn:microsoft.com/office/officeart/2005/8/layout/hierarchy2"/>
+    <dgm:cxn modelId="{F3B03593-96B3-B845-8308-3BF6D5A61091}" type="presParOf" srcId="{40220438-574A-934A-B52A-D4C09F85442C}" destId="{2AE2315F-57A1-0141-ABF0-D00525BED9D7}" srcOrd="0" destOrd="0" presId="urn:microsoft.com/office/officeart/2005/8/layout/hierarchy2"/>
+    <dgm:cxn modelId="{49EC5C50-D8F8-904E-9041-A8A46B774918}" type="presParOf" srcId="{40220438-574A-934A-B52A-D4C09F85442C}" destId="{23780A80-8F50-844A-8CC9-C1761F5B6574}" srcOrd="1" destOrd="0" presId="urn:microsoft.com/office/officeart/2005/8/layout/hierarchy2"/>
+    <dgm:cxn modelId="{1772C945-3308-8849-84BE-B83FDD219D90}" type="presParOf" srcId="{AD5EC6A6-F444-6140-A556-21F3E25845A3}" destId="{F43BDDDF-1CEF-A047-B3B4-F67711ADE7A9}" srcOrd="2" destOrd="0" presId="urn:microsoft.com/office/officeart/2005/8/layout/hierarchy2"/>
+    <dgm:cxn modelId="{396B5B2E-E702-5E47-896C-B6A3754EE6ED}" type="presParOf" srcId="{F43BDDDF-1CEF-A047-B3B4-F67711ADE7A9}" destId="{B8131463-CBB7-BD48-AC92-13CAB2DC079F}" srcOrd="0" destOrd="0" presId="urn:microsoft.com/office/officeart/2005/8/layout/hierarchy2"/>
+    <dgm:cxn modelId="{F1BC92F0-7E01-DD4C-AE80-A3AD3326A080}" type="presParOf" srcId="{AD5EC6A6-F444-6140-A556-21F3E25845A3}" destId="{2DD5DBEC-061A-F846-B506-540124A97D51}" srcOrd="3" destOrd="0" presId="urn:microsoft.com/office/officeart/2005/8/layout/hierarchy2"/>
+    <dgm:cxn modelId="{65A0F08D-D3B9-294B-93A2-0B4642234F76}" type="presParOf" srcId="{2DD5DBEC-061A-F846-B506-540124A97D51}" destId="{D6F167D2-280C-2549-A642-C1FAA099010E}" srcOrd="0" destOrd="0" presId="urn:microsoft.com/office/officeart/2005/8/layout/hierarchy2"/>
+    <dgm:cxn modelId="{9BC51314-A75D-2249-ADD5-E78B1B1F567C}" type="presParOf" srcId="{2DD5DBEC-061A-F846-B506-540124A97D51}" destId="{E9271D71-73C4-6746-80F8-074EA95D9A39}" srcOrd="1" destOrd="0" presId="urn:microsoft.com/office/officeart/2005/8/layout/hierarchy2"/>
+    <dgm:cxn modelId="{5EE0E75D-282A-6B41-BD2B-970ACB3A5266}" type="presParOf" srcId="{0B897CC9-EF58-6B4A-B032-3869518C427D}" destId="{F97F2B5C-A310-FE4C-A812-DB282E261D0A}" srcOrd="2" destOrd="0" presId="urn:microsoft.com/office/officeart/2005/8/layout/hierarchy2"/>
+    <dgm:cxn modelId="{3B67D5B9-85AD-8F46-ABBA-504D974E0066}" type="presParOf" srcId="{F97F2B5C-A310-FE4C-A812-DB282E261D0A}" destId="{1A5A45C4-44F9-B14B-8DA5-D65DFB02E004}" srcOrd="0" destOrd="0" presId="urn:microsoft.com/office/officeart/2005/8/layout/hierarchy2"/>
+    <dgm:cxn modelId="{BC79AB22-50E0-ED43-BDBB-7B22D256235B}" type="presParOf" srcId="{0B897CC9-EF58-6B4A-B032-3869518C427D}" destId="{39F7DEB9-7822-E542-83AE-1253A185C07F}" srcOrd="3" destOrd="0" presId="urn:microsoft.com/office/officeart/2005/8/layout/hierarchy2"/>
+    <dgm:cxn modelId="{E475CB49-6F81-3543-8DFA-019C94565757}" type="presParOf" srcId="{39F7DEB9-7822-E542-83AE-1253A185C07F}" destId="{6D8ECEBA-B209-6749-B193-A8A22E6346C1}" srcOrd="0" destOrd="0" presId="urn:microsoft.com/office/officeart/2005/8/layout/hierarchy2"/>
+    <dgm:cxn modelId="{55F43B1B-B07F-8344-8C50-3E1AAF4D1C5B}" type="presParOf" srcId="{39F7DEB9-7822-E542-83AE-1253A185C07F}" destId="{25395A98-CFD0-D946-ADE9-6F9519F7EFAA}" srcOrd="1" destOrd="0" presId="urn:microsoft.com/office/officeart/2005/8/layout/hierarchy2"/>
+    <dgm:cxn modelId="{8DC9A48C-FDAA-0C46-AE20-84EA3F4744D1}" type="presParOf" srcId="{25395A98-CFD0-D946-ADE9-6F9519F7EFAA}" destId="{C5DF0D25-D767-8B42-BF93-5162DFF05855}" srcOrd="0" destOrd="0" presId="urn:microsoft.com/office/officeart/2005/8/layout/hierarchy2"/>
+    <dgm:cxn modelId="{4F66F834-B390-F342-A69C-EB3261FC069C}" type="presParOf" srcId="{C5DF0D25-D767-8B42-BF93-5162DFF05855}" destId="{3ADF03C0-B77F-EF41-BE57-79DF4D231738}" srcOrd="0" destOrd="0" presId="urn:microsoft.com/office/officeart/2005/8/layout/hierarchy2"/>
+    <dgm:cxn modelId="{BEFEF7E0-E11F-3E4A-B3D2-06EA2F7573AC}" type="presParOf" srcId="{25395A98-CFD0-D946-ADE9-6F9519F7EFAA}" destId="{0AA4E00B-8AE2-6F48-A1E1-39B09B4D9A17}" srcOrd="1" destOrd="0" presId="urn:microsoft.com/office/officeart/2005/8/layout/hierarchy2"/>
+    <dgm:cxn modelId="{E89A8AF6-6A76-EA4A-8EB5-2CFAA9DBC03B}" type="presParOf" srcId="{0AA4E00B-8AE2-6F48-A1E1-39B09B4D9A17}" destId="{95415AAC-B97B-3E4C-95D1-E26D4A47F854}" srcOrd="0" destOrd="0" presId="urn:microsoft.com/office/officeart/2005/8/layout/hierarchy2"/>
+    <dgm:cxn modelId="{7C836E8D-9915-DA48-8F23-4DD9BA559D52}" type="presParOf" srcId="{0AA4E00B-8AE2-6F48-A1E1-39B09B4D9A17}" destId="{42EAE2B0-6AD7-C447-A139-26AA90B805F3}" srcOrd="1" destOrd="0" presId="urn:microsoft.com/office/officeart/2005/8/layout/hierarchy2"/>
+    <dgm:cxn modelId="{C49AD281-90A0-1743-9909-EB577AB9A963}" type="presParOf" srcId="{87D61914-56D8-7D43-A69D-CE66D030DE47}" destId="{8B4760E7-4D8A-8B41-A8D7-171FBE42BA05}" srcOrd="2" destOrd="0" presId="urn:microsoft.com/office/officeart/2005/8/layout/hierarchy2"/>
+    <dgm:cxn modelId="{E0B7356F-EF52-8442-ADE0-E7893B7581A6}" type="presParOf" srcId="{8B4760E7-4D8A-8B41-A8D7-171FBE42BA05}" destId="{7F275FDA-DE69-2B4A-84AB-2462E309FB00}" srcOrd="0" destOrd="0" presId="urn:microsoft.com/office/officeart/2005/8/layout/hierarchy2"/>
+    <dgm:cxn modelId="{249F709C-0379-3F4D-901A-5AFD45326A79}" type="presParOf" srcId="{87D61914-56D8-7D43-A69D-CE66D030DE47}" destId="{E480E9C8-28D3-6148-A09F-3FF374BCCA24}" srcOrd="3" destOrd="0" presId="urn:microsoft.com/office/officeart/2005/8/layout/hierarchy2"/>
+    <dgm:cxn modelId="{5C261285-7E48-0842-B14A-B28B3DE30E00}" type="presParOf" srcId="{E480E9C8-28D3-6148-A09F-3FF374BCCA24}" destId="{A3A57E5D-303D-C64F-A1DC-0E0FF1D6C828}" srcOrd="0" destOrd="0" presId="urn:microsoft.com/office/officeart/2005/8/layout/hierarchy2"/>
+    <dgm:cxn modelId="{A3F31F59-95F5-BC48-B0C8-813DC412ABB1}" type="presParOf" srcId="{E480E9C8-28D3-6148-A09F-3FF374BCCA24}" destId="{1F0547D6-6B49-0E45-BA93-83C86CD2FE86}" srcOrd="1" destOrd="0" presId="urn:microsoft.com/office/officeart/2005/8/layout/hierarchy2"/>
+    <dgm:cxn modelId="{F69020E9-E090-2648-8FEC-DA2396B97828}" type="presParOf" srcId="{1F0547D6-6B49-0E45-BA93-83C86CD2FE86}" destId="{AFFBA743-03F7-5F4C-8E88-C1E1454AED05}" srcOrd="0" destOrd="0" presId="urn:microsoft.com/office/officeart/2005/8/layout/hierarchy2"/>
+    <dgm:cxn modelId="{ED2795BA-BA8A-E94B-BD9B-E38A2ABF0C9F}" type="presParOf" srcId="{AFFBA743-03F7-5F4C-8E88-C1E1454AED05}" destId="{10FFB18E-4AFA-344C-9BC1-AD34B4676854}" srcOrd="0" destOrd="0" presId="urn:microsoft.com/office/officeart/2005/8/layout/hierarchy2"/>
+    <dgm:cxn modelId="{F60B9366-DFB8-9446-920D-A9C0ADE1C53A}" type="presParOf" srcId="{1F0547D6-6B49-0E45-BA93-83C86CD2FE86}" destId="{39BCB3DC-885B-2441-A34B-335D8FC1992C}" srcOrd="1" destOrd="0" presId="urn:microsoft.com/office/officeart/2005/8/layout/hierarchy2"/>
+    <dgm:cxn modelId="{BF4F65E6-51EF-724F-BE67-57D6D094E21C}" type="presParOf" srcId="{39BCB3DC-885B-2441-A34B-335D8FC1992C}" destId="{80107EDB-8FCD-2346-A353-02A87C9089DE}" srcOrd="0" destOrd="0" presId="urn:microsoft.com/office/officeart/2005/8/layout/hierarchy2"/>
+    <dgm:cxn modelId="{257D4CA1-7D6A-8441-8A4B-113A809E5A34}" type="presParOf" srcId="{39BCB3DC-885B-2441-A34B-335D8FC1992C}" destId="{D5231619-B6C4-0C42-B74F-B68722D45424}" srcOrd="1" destOrd="0" presId="urn:microsoft.com/office/officeart/2005/8/layout/hierarchy2"/>
+    <dgm:cxn modelId="{DEECEA14-D80D-D145-BFB0-B536D87B94B2}" type="presParOf" srcId="{D5231619-B6C4-0C42-B74F-B68722D45424}" destId="{9B21400C-BC60-6743-A106-FEAA64B5ACA7}" srcOrd="0" destOrd="0" presId="urn:microsoft.com/office/officeart/2005/8/layout/hierarchy2"/>
+    <dgm:cxn modelId="{6DAF0C0F-F422-DA43-8479-D911427F21B6}" type="presParOf" srcId="{9B21400C-BC60-6743-A106-FEAA64B5ACA7}" destId="{F55BCE5E-1DB2-264E-8E89-E7825D9D3A45}" srcOrd="0" destOrd="0" presId="urn:microsoft.com/office/officeart/2005/8/layout/hierarchy2"/>
+    <dgm:cxn modelId="{664F6DF6-9502-C24E-A844-7CB5AF8B9DCB}" type="presParOf" srcId="{D5231619-B6C4-0C42-B74F-B68722D45424}" destId="{7F60B46B-B2A5-254A-9873-C072F7FA4725}" srcOrd="1" destOrd="0" presId="urn:microsoft.com/office/officeart/2005/8/layout/hierarchy2"/>
+    <dgm:cxn modelId="{FD5122AC-75C2-6C4D-8243-1290C19B0554}" type="presParOf" srcId="{7F60B46B-B2A5-254A-9873-C072F7FA4725}" destId="{4BB2793D-87B3-EF41-9A4F-7716D66373B1}" srcOrd="0" destOrd="0" presId="urn:microsoft.com/office/officeart/2005/8/layout/hierarchy2"/>
+    <dgm:cxn modelId="{32E15A29-4A2F-CD46-ABC9-24109FE0C695}" type="presParOf" srcId="{7F60B46B-B2A5-254A-9873-C072F7FA4725}" destId="{EA6DFC94-2BC4-3D40-AB95-A9E1CDC41D56}" srcOrd="1" destOrd="0" presId="urn:microsoft.com/office/officeart/2005/8/layout/hierarchy2"/>
   </dgm:cxnLst>
   <dgm:bg>
     <a:noFill/>
@@ -7285,6 +7344,191 @@
       </dsp:txBody>
       <dsp:txXfrm>
         <a:off x="8109396" y="275400"/>
+        <a:ext cx="363574" cy="176302"/>
+      </dsp:txXfrm>
+    </dsp:sp>
+    <dsp:sp modelId="{BA1CDD9D-9A6E-0C4E-A9A3-029341159AEA}">
+      <dsp:nvSpPr>
+        <dsp:cNvPr id="0" name=""/>
+        <dsp:cNvSpPr/>
+      </dsp:nvSpPr>
+      <dsp:spPr>
+        <a:xfrm rot="18157058">
+          <a:off x="6957051" y="365469"/>
+          <a:ext cx="352065" cy="5004"/>
+        </a:xfrm>
+        <a:custGeom>
+          <a:avLst/>
+          <a:gdLst/>
+          <a:ahLst/>
+          <a:cxnLst/>
+          <a:rect l="0" t="0" r="0" b="0"/>
+          <a:pathLst>
+            <a:path>
+              <a:moveTo>
+                <a:pt x="0" y="2502"/>
+              </a:moveTo>
+              <a:lnTo>
+                <a:pt x="352065" y="2502"/>
+              </a:lnTo>
+            </a:path>
+          </a:pathLst>
+        </a:custGeom>
+        <a:noFill/>
+        <a:ln w="12700" cap="flat" cmpd="sng" algn="ctr">
+          <a:solidFill>
+            <a:schemeClr val="dk2">
+              <a:shade val="80000"/>
+              <a:hueOff val="0"/>
+              <a:satOff val="0"/>
+              <a:lumOff val="0"/>
+              <a:alphaOff val="0"/>
+            </a:schemeClr>
+          </a:solidFill>
+          <a:prstDash val="solid"/>
+          <a:miter lim="800000"/>
+        </a:ln>
+        <a:effectLst/>
+      </dsp:spPr>
+      <dsp:style>
+        <a:lnRef idx="2">
+          <a:scrgbClr r="0" g="0" b="0"/>
+        </a:lnRef>
+        <a:fillRef idx="0">
+          <a:scrgbClr r="0" g="0" b="0"/>
+        </a:fillRef>
+        <a:effectRef idx="0">
+          <a:scrgbClr r="0" g="0" b="0"/>
+        </a:effectRef>
+        <a:fontRef idx="minor"/>
+      </dsp:style>
+      <dsp:txBody>
+        <a:bodyPr spcFirstLastPara="0" vert="horz" wrap="square" lIns="12700" tIns="0" rIns="12700" bIns="0" numCol="1" spcCol="1270" anchor="ctr" anchorCtr="0">
+          <a:noAutofit/>
+        </a:bodyPr>
+        <a:lstStyle/>
+        <a:p>
+          <a:pPr marL="0" lvl="0" indent="0" algn="ctr" defTabSz="177800">
+            <a:lnSpc>
+              <a:spcPct val="90000"/>
+            </a:lnSpc>
+            <a:spcBef>
+              <a:spcPct val="0"/>
+            </a:spcBef>
+            <a:spcAft>
+              <a:spcPct val="35000"/>
+            </a:spcAft>
+            <a:buNone/>
+          </a:pPr>
+          <a:endParaRPr lang="en-US" sz="400" kern="1200"/>
+        </a:p>
+      </dsp:txBody>
+      <dsp:txXfrm>
+        <a:off x="7124283" y="359170"/>
+        <a:ext cx="17603" cy="17603"/>
+      </dsp:txXfrm>
+    </dsp:sp>
+    <dsp:sp modelId="{01AE4A20-5465-E046-9D6A-4C2689ECEBB2}">
+      <dsp:nvSpPr>
+        <dsp:cNvPr id="0" name=""/>
+        <dsp:cNvSpPr/>
+      </dsp:nvSpPr>
+      <dsp:spPr>
+        <a:xfrm>
+          <a:off x="7227971" y="126066"/>
+          <a:ext cx="374544" cy="187272"/>
+        </a:xfrm>
+        <a:prstGeom prst="roundRect">
+          <a:avLst>
+            <a:gd name="adj" fmla="val 10000"/>
+          </a:avLst>
+        </a:prstGeom>
+        <a:gradFill rotWithShape="0">
+          <a:gsLst>
+            <a:gs pos="0">
+              <a:schemeClr val="dk2">
+                <a:hueOff val="0"/>
+                <a:satOff val="0"/>
+                <a:lumOff val="0"/>
+                <a:alphaOff val="0"/>
+                <a:satMod val="103000"/>
+                <a:lumMod val="102000"/>
+                <a:tint val="94000"/>
+              </a:schemeClr>
+            </a:gs>
+            <a:gs pos="50000">
+              <a:schemeClr val="dk2">
+                <a:hueOff val="0"/>
+                <a:satOff val="0"/>
+                <a:lumOff val="0"/>
+                <a:alphaOff val="0"/>
+                <a:satMod val="110000"/>
+                <a:lumMod val="100000"/>
+                <a:shade val="100000"/>
+              </a:schemeClr>
+            </a:gs>
+            <a:gs pos="100000">
+              <a:schemeClr val="dk2">
+                <a:hueOff val="0"/>
+                <a:satOff val="0"/>
+                <a:lumOff val="0"/>
+                <a:alphaOff val="0"/>
+                <a:lumMod val="99000"/>
+                <a:satMod val="120000"/>
+                <a:shade val="78000"/>
+              </a:schemeClr>
+            </a:gs>
+          </a:gsLst>
+          <a:lin ang="5400000" scaled="0"/>
+        </a:gradFill>
+        <a:ln>
+          <a:noFill/>
+        </a:ln>
+        <a:effectLst>
+          <a:outerShdw blurRad="57150" dist="19050" dir="5400000" algn="ctr" rotWithShape="0">
+            <a:srgbClr val="000000">
+              <a:alpha val="63000"/>
+            </a:srgbClr>
+          </a:outerShdw>
+        </a:effectLst>
+      </dsp:spPr>
+      <dsp:style>
+        <a:lnRef idx="0">
+          <a:scrgbClr r="0" g="0" b="0"/>
+        </a:lnRef>
+        <a:fillRef idx="3">
+          <a:scrgbClr r="0" g="0" b="0"/>
+        </a:fillRef>
+        <a:effectRef idx="3">
+          <a:scrgbClr r="0" g="0" b="0"/>
+        </a:effectRef>
+        <a:fontRef idx="minor">
+          <a:schemeClr val="lt1"/>
+        </a:fontRef>
+      </dsp:style>
+      <dsp:txBody>
+        <a:bodyPr spcFirstLastPara="0" vert="horz" wrap="square" lIns="3175" tIns="3175" rIns="3175" bIns="3175" numCol="1" spcCol="1270" anchor="ctr" anchorCtr="0">
+          <a:noAutofit/>
+        </a:bodyPr>
+        <a:lstStyle/>
+        <a:p>
+          <a:pPr marL="0" lvl="0" indent="0" algn="ctr" defTabSz="222250">
+            <a:lnSpc>
+              <a:spcPct val="90000"/>
+            </a:lnSpc>
+            <a:spcBef>
+              <a:spcPct val="0"/>
+            </a:spcBef>
+            <a:spcAft>
+              <a:spcPct val="35000"/>
+            </a:spcAft>
+            <a:buNone/>
+          </a:pPr>
+          <a:endParaRPr lang="en-US" sz="500" kern="1200"/>
+        </a:p>
+      </dsp:txBody>
+      <dsp:txXfrm>
+        <a:off x="7233456" y="131551"/>
         <a:ext cx="363574" cy="176302"/>
       </dsp:txXfrm>
     </dsp:sp>
@@ -18859,7 +19103,7 @@
           <a:p>
             <a:fld id="{4A9CD62A-E206-AE4E-BB6C-F153981C626C}" type="datetimeFigureOut">
               <a:rPr lang="en-US" smtClean="0"/>
-              <a:t>9/25/21</a:t>
+              <a:t>9/26/21</a:t>
             </a:fld>
             <a:endParaRPr lang="en-US"/>
           </a:p>
@@ -19374,7 +19618,7 @@
           <a:p>
             <a:fld id="{890EF5FD-FC7A-0F46-9F5E-D4CF4B99B4CF}" type="datetimeFigureOut">
               <a:rPr lang="en-US" smtClean="0"/>
-              <a:t>9/25/21</a:t>
+              <a:t>9/26/21</a:t>
             </a:fld>
             <a:endParaRPr lang="en-US"/>
           </a:p>
@@ -19572,7 +19816,7 @@
           <a:p>
             <a:fld id="{890EF5FD-FC7A-0F46-9F5E-D4CF4B99B4CF}" type="datetimeFigureOut">
               <a:rPr lang="en-US" smtClean="0"/>
-              <a:t>9/25/21</a:t>
+              <a:t>9/26/21</a:t>
             </a:fld>
             <a:endParaRPr lang="en-US"/>
           </a:p>
@@ -19780,7 +20024,7 @@
           <a:p>
             <a:fld id="{890EF5FD-FC7A-0F46-9F5E-D4CF4B99B4CF}" type="datetimeFigureOut">
               <a:rPr lang="en-US" smtClean="0"/>
-              <a:t>9/25/21</a:t>
+              <a:t>9/26/21</a:t>
             </a:fld>
             <a:endParaRPr lang="en-US"/>
           </a:p>
@@ -19978,7 +20222,7 @@
           <a:p>
             <a:fld id="{890EF5FD-FC7A-0F46-9F5E-D4CF4B99B4CF}" type="datetimeFigureOut">
               <a:rPr lang="en-US" smtClean="0"/>
-              <a:t>9/25/21</a:t>
+              <a:t>9/26/21</a:t>
             </a:fld>
             <a:endParaRPr lang="en-US"/>
           </a:p>
@@ -20253,7 +20497,7 @@
           <a:p>
             <a:fld id="{890EF5FD-FC7A-0F46-9F5E-D4CF4B99B4CF}" type="datetimeFigureOut">
               <a:rPr lang="en-US" smtClean="0"/>
-              <a:t>9/25/21</a:t>
+              <a:t>9/26/21</a:t>
             </a:fld>
             <a:endParaRPr lang="en-US"/>
           </a:p>
@@ -20518,7 +20762,7 @@
           <a:p>
             <a:fld id="{890EF5FD-FC7A-0F46-9F5E-D4CF4B99B4CF}" type="datetimeFigureOut">
               <a:rPr lang="en-US" smtClean="0"/>
-              <a:t>9/25/21</a:t>
+              <a:t>9/26/21</a:t>
             </a:fld>
             <a:endParaRPr lang="en-US"/>
           </a:p>
@@ -20930,7 +21174,7 @@
           <a:p>
             <a:fld id="{890EF5FD-FC7A-0F46-9F5E-D4CF4B99B4CF}" type="datetimeFigureOut">
               <a:rPr lang="en-US" smtClean="0"/>
-              <a:t>9/25/21</a:t>
+              <a:t>9/26/21</a:t>
             </a:fld>
             <a:endParaRPr lang="en-US"/>
           </a:p>
@@ -21071,7 +21315,7 @@
           <a:p>
             <a:fld id="{890EF5FD-FC7A-0F46-9F5E-D4CF4B99B4CF}" type="datetimeFigureOut">
               <a:rPr lang="en-US" smtClean="0"/>
-              <a:t>9/25/21</a:t>
+              <a:t>9/26/21</a:t>
             </a:fld>
             <a:endParaRPr lang="en-US"/>
           </a:p>
@@ -21184,7 +21428,7 @@
           <a:p>
             <a:fld id="{890EF5FD-FC7A-0F46-9F5E-D4CF4B99B4CF}" type="datetimeFigureOut">
               <a:rPr lang="en-US" smtClean="0"/>
-              <a:t>9/25/21</a:t>
+              <a:t>9/26/21</a:t>
             </a:fld>
             <a:endParaRPr lang="en-US"/>
           </a:p>
@@ -21495,7 +21739,7 @@
           <a:p>
             <a:fld id="{890EF5FD-FC7A-0F46-9F5E-D4CF4B99B4CF}" type="datetimeFigureOut">
               <a:rPr lang="en-US" smtClean="0"/>
-              <a:t>9/25/21</a:t>
+              <a:t>9/26/21</a:t>
             </a:fld>
             <a:endParaRPr lang="en-US"/>
           </a:p>
@@ -21783,7 +22027,7 @@
           <a:p>
             <a:fld id="{890EF5FD-FC7A-0F46-9F5E-D4CF4B99B4CF}" type="datetimeFigureOut">
               <a:rPr lang="en-US" smtClean="0"/>
-              <a:t>9/25/21</a:t>
+              <a:t>9/26/21</a:t>
             </a:fld>
             <a:endParaRPr lang="en-US"/>
           </a:p>
@@ -22024,7 +22268,7 @@
           <a:p>
             <a:fld id="{890EF5FD-FC7A-0F46-9F5E-D4CF4B99B4CF}" type="datetimeFigureOut">
               <a:rPr lang="en-US" smtClean="0"/>
-              <a:t>9/25/21</a:t>
+              <a:t>9/26/21</a:t>
             </a:fld>
             <a:endParaRPr lang="en-US"/>
           </a:p>
@@ -22454,7 +22698,7 @@
           <p:nvPr>
             <p:extLst>
               <p:ext uri="{D42A27DB-BD31-4B8C-83A1-F6EECF244321}">
-                <p14:modId xmlns:p14="http://schemas.microsoft.com/office/powerpoint/2010/main" val="3303433870"/>
+                <p14:modId xmlns:p14="http://schemas.microsoft.com/office/powerpoint/2010/main" val="3953110245"/>
               </p:ext>
             </p:extLst>
           </p:nvPr>

</xml_diff>